<commit_message>
Add document and code sample.
</commit_message>
<xml_diff>
--- a/doc/Lecture 5 - 2015.09.26 Design Pattern.pptx
+++ b/doc/Lecture 5 - 2015.09.26 Design Pattern.pptx
@@ -5,10 +5,10 @@
     <p:sldMasterId id="2147483648" r:id="rId1"/>
   </p:sldMasterIdLst>
   <p:notesMasterIdLst>
-    <p:notesMasterId r:id="rId15"/>
+    <p:notesMasterId r:id="rId14"/>
   </p:notesMasterIdLst>
   <p:handoutMasterIdLst>
-    <p:handoutMasterId r:id="rId16"/>
+    <p:handoutMasterId r:id="rId15"/>
   </p:handoutMasterIdLst>
   <p:sldIdLst>
     <p:sldId id="259" r:id="rId2"/>
@@ -16,14 +16,13 @@
     <p:sldId id="318" r:id="rId4"/>
     <p:sldId id="322" r:id="rId5"/>
     <p:sldId id="319" r:id="rId6"/>
-    <p:sldId id="324" r:id="rId7"/>
-    <p:sldId id="325" r:id="rId8"/>
-    <p:sldId id="326" r:id="rId9"/>
-    <p:sldId id="327" r:id="rId10"/>
-    <p:sldId id="328" r:id="rId11"/>
-    <p:sldId id="323" r:id="rId12"/>
-    <p:sldId id="317" r:id="rId13"/>
-    <p:sldId id="316" r:id="rId14"/>
+    <p:sldId id="325" r:id="rId7"/>
+    <p:sldId id="326" r:id="rId8"/>
+    <p:sldId id="327" r:id="rId9"/>
+    <p:sldId id="328" r:id="rId10"/>
+    <p:sldId id="323" r:id="rId11"/>
+    <p:sldId id="317" r:id="rId12"/>
+    <p:sldId id="316" r:id="rId13"/>
   </p:sldIdLst>
   <p:sldSz cx="9144000" cy="6858000" type="screen4x3"/>
   <p:notesSz cx="6858000" cy="9144000"/>
@@ -4429,80 +4428,6 @@
         </a:p>
       </dgm:t>
     </dgm:pt>
-    <dgm:pt modelId="{71138977-AE20-4A63-8AF4-0E723D582ED3}">
-      <dgm:prSet/>
-      <dgm:spPr/>
-      <dgm:t>
-        <a:bodyPr/>
-        <a:lstStyle/>
-        <a:p>
-          <a:r>
-            <a:rPr lang="en-US" dirty="0" smtClean="0"/>
-            <a:t>Mediator</a:t>
-          </a:r>
-          <a:endParaRPr lang="en-US" dirty="0"/>
-        </a:p>
-      </dgm:t>
-    </dgm:pt>
-    <dgm:pt modelId="{B3D466E1-8FB3-4EA1-A67B-713577ADC49F}" type="parTrans" cxnId="{996EF6DC-D24A-42CD-9563-E35EF70A96B6}">
-      <dgm:prSet/>
-      <dgm:spPr/>
-      <dgm:t>
-        <a:bodyPr/>
-        <a:lstStyle/>
-        <a:p>
-          <a:endParaRPr lang="en-US"/>
-        </a:p>
-      </dgm:t>
-    </dgm:pt>
-    <dgm:pt modelId="{BFBE0F24-C4CA-4CCB-A72B-3641BF147EAA}" type="sibTrans" cxnId="{996EF6DC-D24A-42CD-9563-E35EF70A96B6}">
-      <dgm:prSet/>
-      <dgm:spPr/>
-      <dgm:t>
-        <a:bodyPr/>
-        <a:lstStyle/>
-        <a:p>
-          <a:endParaRPr lang="en-US"/>
-        </a:p>
-      </dgm:t>
-    </dgm:pt>
-    <dgm:pt modelId="{6175B78C-5CED-46E0-8F24-D25760BDA1C1}">
-      <dgm:prSet/>
-      <dgm:spPr/>
-      <dgm:t>
-        <a:bodyPr/>
-        <a:lstStyle/>
-        <a:p>
-          <a:r>
-            <a:rPr lang="en-US" dirty="0" smtClean="0"/>
-            <a:t>Memento</a:t>
-          </a:r>
-          <a:endParaRPr lang="en-US" dirty="0"/>
-        </a:p>
-      </dgm:t>
-    </dgm:pt>
-    <dgm:pt modelId="{1348F839-8279-4353-BA53-B5C34A1D61F5}" type="parTrans" cxnId="{A70C17C4-A30C-4205-8CFF-8D975586B368}">
-      <dgm:prSet/>
-      <dgm:spPr/>
-      <dgm:t>
-        <a:bodyPr/>
-        <a:lstStyle/>
-        <a:p>
-          <a:endParaRPr lang="en-US"/>
-        </a:p>
-      </dgm:t>
-    </dgm:pt>
-    <dgm:pt modelId="{73F274D8-20D0-456C-868F-DF7A1F461787}" type="sibTrans" cxnId="{A70C17C4-A30C-4205-8CFF-8D975586B368}">
-      <dgm:prSet/>
-      <dgm:spPr/>
-      <dgm:t>
-        <a:bodyPr/>
-        <a:lstStyle/>
-        <a:p>
-          <a:endParaRPr lang="en-US"/>
-        </a:p>
-      </dgm:t>
-    </dgm:pt>
     <dgm:pt modelId="{BAC3BBE6-2CFA-44FC-85F0-0C1463E1117B}">
       <dgm:prSet/>
       <dgm:spPr/>
@@ -4530,43 +4455,6 @@
       </dgm:t>
     </dgm:pt>
     <dgm:pt modelId="{6529A9CF-C828-4490-9A69-5007CD9E726D}" type="sibTrans" cxnId="{5F0C7B92-4A41-45E0-B666-FA92666C5D30}">
-      <dgm:prSet/>
-      <dgm:spPr/>
-      <dgm:t>
-        <a:bodyPr/>
-        <a:lstStyle/>
-        <a:p>
-          <a:endParaRPr lang="en-US"/>
-        </a:p>
-      </dgm:t>
-    </dgm:pt>
-    <dgm:pt modelId="{B42B2BE8-9C51-4575-ABE2-C81450ECE0C2}">
-      <dgm:prSet/>
-      <dgm:spPr/>
-      <dgm:t>
-        <a:bodyPr/>
-        <a:lstStyle/>
-        <a:p>
-          <a:r>
-            <a:rPr lang="en-US" dirty="0" smtClean="0"/>
-            <a:t>State</a:t>
-          </a:r>
-          <a:endParaRPr lang="en-US" dirty="0"/>
-        </a:p>
-      </dgm:t>
-    </dgm:pt>
-    <dgm:pt modelId="{899C3D7D-E69C-48F0-AEB8-18CB195ACC45}" type="parTrans" cxnId="{DA51E834-FAAB-4CD2-817B-25EA02BFE659}">
-      <dgm:prSet/>
-      <dgm:spPr/>
-      <dgm:t>
-        <a:bodyPr/>
-        <a:lstStyle/>
-        <a:p>
-          <a:endParaRPr lang="en-US"/>
-        </a:p>
-      </dgm:t>
-    </dgm:pt>
-    <dgm:pt modelId="{49D19B4F-B481-4271-B195-8B60739439AF}" type="sibTrans" cxnId="{DA51E834-FAAB-4CD2-817B-25EA02BFE659}">
       <dgm:prSet/>
       <dgm:spPr/>
       <dgm:t>
@@ -4614,7 +4502,7 @@
         </a:p>
       </dgm:t>
     </dgm:pt>
-    <dgm:pt modelId="{257322CC-FE8B-476A-A888-9CBAF071D519}">
+    <dgm:pt modelId="{38C6CF7C-CFEE-40B4-896A-67650067C7E7}">
       <dgm:prSet/>
       <dgm:spPr/>
       <dgm:t>
@@ -4623,70 +4511,19 @@
         <a:p>
           <a:r>
             <a:rPr lang="en-US" dirty="0" smtClean="0"/>
-            <a:t>Template Method</a:t>
+            <a:t>…</a:t>
           </a:r>
           <a:endParaRPr lang="en-US" dirty="0"/>
         </a:p>
       </dgm:t>
     </dgm:pt>
-    <dgm:pt modelId="{BC6F5ABC-7FAF-4E81-BFD3-A7160995BBA0}" type="parTrans" cxnId="{07C45377-B749-44EA-AB85-6AB98F63B068}">
+    <dgm:pt modelId="{588723B5-8233-4BBE-A8DC-E6F55C63D8BC}" type="parTrans" cxnId="{6D72FC6D-D1D4-46B4-A825-A7810C903114}">
       <dgm:prSet/>
       <dgm:spPr/>
-      <dgm:t>
-        <a:bodyPr/>
-        <a:lstStyle/>
-        <a:p>
-          <a:endParaRPr lang="en-US"/>
-        </a:p>
-      </dgm:t>
     </dgm:pt>
-    <dgm:pt modelId="{4C77B9C6-C92E-4861-90CF-11903742F78E}" type="sibTrans" cxnId="{07C45377-B749-44EA-AB85-6AB98F63B068}">
+    <dgm:pt modelId="{DD55D6D6-192A-4DAE-B0DC-9410F8444455}" type="sibTrans" cxnId="{6D72FC6D-D1D4-46B4-A825-A7810C903114}">
       <dgm:prSet/>
       <dgm:spPr/>
-      <dgm:t>
-        <a:bodyPr/>
-        <a:lstStyle/>
-        <a:p>
-          <a:endParaRPr lang="en-US"/>
-        </a:p>
-      </dgm:t>
-    </dgm:pt>
-    <dgm:pt modelId="{7143AC0B-B1F0-460D-AAB5-888AAD3F0D57}">
-      <dgm:prSet/>
-      <dgm:spPr/>
-      <dgm:t>
-        <a:bodyPr/>
-        <a:lstStyle/>
-        <a:p>
-          <a:r>
-            <a:rPr lang="en-US" dirty="0" smtClean="0"/>
-            <a:t>Visitor</a:t>
-          </a:r>
-          <a:endParaRPr lang="en-US" dirty="0"/>
-        </a:p>
-      </dgm:t>
-    </dgm:pt>
-    <dgm:pt modelId="{A0E6B007-CDDE-4703-B724-D250A85E3882}" type="parTrans" cxnId="{E30EF22B-31F6-4F55-9D54-12C0562F4E6F}">
-      <dgm:prSet/>
-      <dgm:spPr/>
-      <dgm:t>
-        <a:bodyPr/>
-        <a:lstStyle/>
-        <a:p>
-          <a:endParaRPr lang="en-US"/>
-        </a:p>
-      </dgm:t>
-    </dgm:pt>
-    <dgm:pt modelId="{0DB0ECE1-13A1-4A69-A39A-AFA03C0E7FE8}" type="sibTrans" cxnId="{E30EF22B-31F6-4F55-9D54-12C0562F4E6F}">
-      <dgm:prSet/>
-      <dgm:spPr/>
-      <dgm:t>
-        <a:bodyPr/>
-        <a:lstStyle/>
-        <a:p>
-          <a:endParaRPr lang="en-US"/>
-        </a:p>
-      </dgm:t>
     </dgm:pt>
     <dgm:pt modelId="{F26CEA5A-689D-4105-B63A-9612EBD15CC8}" type="pres">
       <dgm:prSet presAssocID="{8645DBF3-D766-4E9C-9509-A1AC02DA01CD}" presName="linearFlow" presStyleCnt="0">
@@ -4702,11 +4539,11 @@
       <dgm:spPr/>
     </dgm:pt>
     <dgm:pt modelId="{61EB4A0E-E38E-4FC9-9032-C8EB8BBF1894}" type="pres">
-      <dgm:prSet presAssocID="{0D77B6EF-510F-4577-84F0-9A7CEA31D1BF}" presName="imgShp" presStyleLbl="fgImgPlace1" presStyleIdx="0" presStyleCnt="11"/>
+      <dgm:prSet presAssocID="{0D77B6EF-510F-4577-84F0-9A7CEA31D1BF}" presName="imgShp" presStyleLbl="fgImgPlace1" presStyleIdx="0" presStyleCnt="7"/>
       <dgm:spPr/>
     </dgm:pt>
     <dgm:pt modelId="{EC613F0C-2CCE-4C4A-8A0F-097FF9013F06}" type="pres">
-      <dgm:prSet presAssocID="{0D77B6EF-510F-4577-84F0-9A7CEA31D1BF}" presName="txShp" presStyleLbl="node1" presStyleIdx="0" presStyleCnt="11">
+      <dgm:prSet presAssocID="{0D77B6EF-510F-4577-84F0-9A7CEA31D1BF}" presName="txShp" presStyleLbl="node1" presStyleIdx="0" presStyleCnt="7">
         <dgm:presLayoutVars>
           <dgm:bulletEnabled val="1"/>
         </dgm:presLayoutVars>
@@ -4729,11 +4566,11 @@
       <dgm:spPr/>
     </dgm:pt>
     <dgm:pt modelId="{A7B013B6-E598-4143-8859-9D9974156C11}" type="pres">
-      <dgm:prSet presAssocID="{A92F1BD3-6479-4DA1-907A-F5A8C1750816}" presName="imgShp" presStyleLbl="fgImgPlace1" presStyleIdx="1" presStyleCnt="11"/>
+      <dgm:prSet presAssocID="{A92F1BD3-6479-4DA1-907A-F5A8C1750816}" presName="imgShp" presStyleLbl="fgImgPlace1" presStyleIdx="1" presStyleCnt="7"/>
       <dgm:spPr/>
     </dgm:pt>
     <dgm:pt modelId="{7D4C3070-190E-4B55-80D0-A4B6FA7AEBD7}" type="pres">
-      <dgm:prSet presAssocID="{A92F1BD3-6479-4DA1-907A-F5A8C1750816}" presName="txShp" presStyleLbl="node1" presStyleIdx="1" presStyleCnt="11">
+      <dgm:prSet presAssocID="{A92F1BD3-6479-4DA1-907A-F5A8C1750816}" presName="txShp" presStyleLbl="node1" presStyleIdx="1" presStyleCnt="7">
         <dgm:presLayoutVars>
           <dgm:bulletEnabled val="1"/>
         </dgm:presLayoutVars>
@@ -4756,11 +4593,11 @@
       <dgm:spPr/>
     </dgm:pt>
     <dgm:pt modelId="{C73195EA-CB97-4458-9C93-1CD410DA78C6}" type="pres">
-      <dgm:prSet presAssocID="{C141CADB-4A11-4B21-A555-9F8EE9EA8E97}" presName="imgShp" presStyleLbl="fgImgPlace1" presStyleIdx="2" presStyleCnt="11"/>
+      <dgm:prSet presAssocID="{C141CADB-4A11-4B21-A555-9F8EE9EA8E97}" presName="imgShp" presStyleLbl="fgImgPlace1" presStyleIdx="2" presStyleCnt="7"/>
       <dgm:spPr/>
     </dgm:pt>
     <dgm:pt modelId="{77C38AEC-886E-4F4F-A3B0-6840519B353A}" type="pres">
-      <dgm:prSet presAssocID="{C141CADB-4A11-4B21-A555-9F8EE9EA8E97}" presName="txShp" presStyleLbl="node1" presStyleIdx="2" presStyleCnt="11">
+      <dgm:prSet presAssocID="{C141CADB-4A11-4B21-A555-9F8EE9EA8E97}" presName="txShp" presStyleLbl="node1" presStyleIdx="2" presStyleCnt="7">
         <dgm:presLayoutVars>
           <dgm:bulletEnabled val="1"/>
         </dgm:presLayoutVars>
@@ -4783,11 +4620,11 @@
       <dgm:spPr/>
     </dgm:pt>
     <dgm:pt modelId="{B93695E8-0A7A-47A1-9D19-690B35925A98}" type="pres">
-      <dgm:prSet presAssocID="{891FA1E3-5D29-4888-A1F9-E5A9BEADAAA9}" presName="imgShp" presStyleLbl="fgImgPlace1" presStyleIdx="3" presStyleCnt="11"/>
+      <dgm:prSet presAssocID="{891FA1E3-5D29-4888-A1F9-E5A9BEADAAA9}" presName="imgShp" presStyleLbl="fgImgPlace1" presStyleIdx="3" presStyleCnt="7"/>
       <dgm:spPr/>
     </dgm:pt>
     <dgm:pt modelId="{3F343952-278E-4762-AD99-C388636C6902}" type="pres">
-      <dgm:prSet presAssocID="{891FA1E3-5D29-4888-A1F9-E5A9BEADAAA9}" presName="txShp" presStyleLbl="node1" presStyleIdx="3" presStyleCnt="11">
+      <dgm:prSet presAssocID="{891FA1E3-5D29-4888-A1F9-E5A9BEADAAA9}" presName="txShp" presStyleLbl="node1" presStyleIdx="3" presStyleCnt="7">
         <dgm:presLayoutVars>
           <dgm:bulletEnabled val="1"/>
         </dgm:presLayoutVars>
@@ -4805,70 +4642,16 @@
       <dgm:prSet presAssocID="{09D30867-ED5D-4F72-8300-A924B6B77D09}" presName="spacing" presStyleCnt="0"/>
       <dgm:spPr/>
     </dgm:pt>
-    <dgm:pt modelId="{EB375A32-6803-4FDF-8894-4ED2DB997B37}" type="pres">
-      <dgm:prSet presAssocID="{71138977-AE20-4A63-8AF4-0E723D582ED3}" presName="composite" presStyleCnt="0"/>
-      <dgm:spPr/>
-    </dgm:pt>
-    <dgm:pt modelId="{6C91433B-57A2-427D-B4E5-2DFA6796A2FA}" type="pres">
-      <dgm:prSet presAssocID="{71138977-AE20-4A63-8AF4-0E723D582ED3}" presName="imgShp" presStyleLbl="fgImgPlace1" presStyleIdx="4" presStyleCnt="11"/>
-      <dgm:spPr/>
-    </dgm:pt>
-    <dgm:pt modelId="{3D4E6BA6-27F1-4FA1-B636-4B1CECE92945}" type="pres">
-      <dgm:prSet presAssocID="{71138977-AE20-4A63-8AF4-0E723D582ED3}" presName="txShp" presStyleLbl="node1" presStyleIdx="4" presStyleCnt="11">
-        <dgm:presLayoutVars>
-          <dgm:bulletEnabled val="1"/>
-        </dgm:presLayoutVars>
-      </dgm:prSet>
-      <dgm:spPr/>
-      <dgm:t>
-        <a:bodyPr/>
-        <a:lstStyle/>
-        <a:p>
-          <a:endParaRPr lang="en-US"/>
-        </a:p>
-      </dgm:t>
-    </dgm:pt>
-    <dgm:pt modelId="{F4667011-7DA4-4086-B652-85B20E458D0A}" type="pres">
-      <dgm:prSet presAssocID="{BFBE0F24-C4CA-4CCB-A72B-3641BF147EAA}" presName="spacing" presStyleCnt="0"/>
-      <dgm:spPr/>
-    </dgm:pt>
-    <dgm:pt modelId="{FCAF5D98-9F57-4D0F-889E-283F7B4FA2F9}" type="pres">
-      <dgm:prSet presAssocID="{6175B78C-5CED-46E0-8F24-D25760BDA1C1}" presName="composite" presStyleCnt="0"/>
-      <dgm:spPr/>
-    </dgm:pt>
-    <dgm:pt modelId="{52FEEC7E-241A-4DCA-9CDE-134769A1CE5C}" type="pres">
-      <dgm:prSet presAssocID="{6175B78C-5CED-46E0-8F24-D25760BDA1C1}" presName="imgShp" presStyleLbl="fgImgPlace1" presStyleIdx="5" presStyleCnt="11"/>
-      <dgm:spPr/>
-    </dgm:pt>
-    <dgm:pt modelId="{07159912-276E-42EB-8083-187E57580219}" type="pres">
-      <dgm:prSet presAssocID="{6175B78C-5CED-46E0-8F24-D25760BDA1C1}" presName="txShp" presStyleLbl="node1" presStyleIdx="5" presStyleCnt="11">
-        <dgm:presLayoutVars>
-          <dgm:bulletEnabled val="1"/>
-        </dgm:presLayoutVars>
-      </dgm:prSet>
-      <dgm:spPr/>
-      <dgm:t>
-        <a:bodyPr/>
-        <a:lstStyle/>
-        <a:p>
-          <a:endParaRPr lang="en-US"/>
-        </a:p>
-      </dgm:t>
-    </dgm:pt>
-    <dgm:pt modelId="{91F8B152-814A-4D0A-BFAB-9D01F3F1695B}" type="pres">
-      <dgm:prSet presAssocID="{73F274D8-20D0-456C-868F-DF7A1F461787}" presName="spacing" presStyleCnt="0"/>
-      <dgm:spPr/>
-    </dgm:pt>
     <dgm:pt modelId="{D6EB1741-D0E5-4D7F-8794-C17CC2FCC3AC}" type="pres">
       <dgm:prSet presAssocID="{BAC3BBE6-2CFA-44FC-85F0-0C1463E1117B}" presName="composite" presStyleCnt="0"/>
       <dgm:spPr/>
     </dgm:pt>
     <dgm:pt modelId="{88B3FE18-0B39-43AA-AFFC-8CA66A5D3B20}" type="pres">
-      <dgm:prSet presAssocID="{BAC3BBE6-2CFA-44FC-85F0-0C1463E1117B}" presName="imgShp" presStyleLbl="fgImgPlace1" presStyleIdx="6" presStyleCnt="11"/>
+      <dgm:prSet presAssocID="{BAC3BBE6-2CFA-44FC-85F0-0C1463E1117B}" presName="imgShp" presStyleLbl="fgImgPlace1" presStyleIdx="4" presStyleCnt="7"/>
       <dgm:spPr/>
     </dgm:pt>
     <dgm:pt modelId="{6B3C036E-74A3-4958-A43B-D1084CE1E10D}" type="pres">
-      <dgm:prSet presAssocID="{BAC3BBE6-2CFA-44FC-85F0-0C1463E1117B}" presName="txShp" presStyleLbl="node1" presStyleIdx="6" presStyleCnt="11">
+      <dgm:prSet presAssocID="{BAC3BBE6-2CFA-44FC-85F0-0C1463E1117B}" presName="txShp" presStyleLbl="node1" presStyleIdx="4" presStyleCnt="7">
         <dgm:presLayoutVars>
           <dgm:bulletEnabled val="1"/>
         </dgm:presLayoutVars>
@@ -4886,43 +4669,16 @@
       <dgm:prSet presAssocID="{6529A9CF-C828-4490-9A69-5007CD9E726D}" presName="spacing" presStyleCnt="0"/>
       <dgm:spPr/>
     </dgm:pt>
-    <dgm:pt modelId="{378BFDE1-95A4-406C-93C5-389982A34826}" type="pres">
-      <dgm:prSet presAssocID="{B42B2BE8-9C51-4575-ABE2-C81450ECE0C2}" presName="composite" presStyleCnt="0"/>
-      <dgm:spPr/>
-    </dgm:pt>
-    <dgm:pt modelId="{DC245991-AA9E-4875-BB32-E19A10EEE7BB}" type="pres">
-      <dgm:prSet presAssocID="{B42B2BE8-9C51-4575-ABE2-C81450ECE0C2}" presName="imgShp" presStyleLbl="fgImgPlace1" presStyleIdx="7" presStyleCnt="11"/>
-      <dgm:spPr/>
-    </dgm:pt>
-    <dgm:pt modelId="{2516A04B-4C41-4EE1-B19A-C2B7F77237DC}" type="pres">
-      <dgm:prSet presAssocID="{B42B2BE8-9C51-4575-ABE2-C81450ECE0C2}" presName="txShp" presStyleLbl="node1" presStyleIdx="7" presStyleCnt="11">
-        <dgm:presLayoutVars>
-          <dgm:bulletEnabled val="1"/>
-        </dgm:presLayoutVars>
-      </dgm:prSet>
-      <dgm:spPr/>
-      <dgm:t>
-        <a:bodyPr/>
-        <a:lstStyle/>
-        <a:p>
-          <a:endParaRPr lang="en-US"/>
-        </a:p>
-      </dgm:t>
-    </dgm:pt>
-    <dgm:pt modelId="{D2E159DD-2CAE-4038-A81C-123DE3E641B3}" type="pres">
-      <dgm:prSet presAssocID="{49D19B4F-B481-4271-B195-8B60739439AF}" presName="spacing" presStyleCnt="0"/>
-      <dgm:spPr/>
-    </dgm:pt>
     <dgm:pt modelId="{598B63BD-E10D-46CC-A692-7ED1AC61F8B3}" type="pres">
       <dgm:prSet presAssocID="{D271A796-3E87-43D8-84A8-1B6B39DF2595}" presName="composite" presStyleCnt="0"/>
       <dgm:spPr/>
     </dgm:pt>
     <dgm:pt modelId="{13FAD4E5-2420-49E9-9462-FBF7DD908FF1}" type="pres">
-      <dgm:prSet presAssocID="{D271A796-3E87-43D8-84A8-1B6B39DF2595}" presName="imgShp" presStyleLbl="fgImgPlace1" presStyleIdx="8" presStyleCnt="11"/>
+      <dgm:prSet presAssocID="{D271A796-3E87-43D8-84A8-1B6B39DF2595}" presName="imgShp" presStyleLbl="fgImgPlace1" presStyleIdx="5" presStyleCnt="7"/>
       <dgm:spPr/>
     </dgm:pt>
     <dgm:pt modelId="{712A02A0-0414-49B8-B1E0-FA035CAF9D11}" type="pres">
-      <dgm:prSet presAssocID="{D271A796-3E87-43D8-84A8-1B6B39DF2595}" presName="txShp" presStyleLbl="node1" presStyleIdx="8" presStyleCnt="11">
+      <dgm:prSet presAssocID="{D271A796-3E87-43D8-84A8-1B6B39DF2595}" presName="txShp" presStyleLbl="node1" presStyleIdx="5" presStyleCnt="7">
         <dgm:presLayoutVars>
           <dgm:bulletEnabled val="1"/>
         </dgm:presLayoutVars>
@@ -4940,43 +4696,16 @@
       <dgm:prSet presAssocID="{1DB3D68B-28C7-48C7-BB93-2DC9AA4EE4ED}" presName="spacing" presStyleCnt="0"/>
       <dgm:spPr/>
     </dgm:pt>
-    <dgm:pt modelId="{73BE2FA4-82CD-4153-8F00-5797C08E3AC6}" type="pres">
-      <dgm:prSet presAssocID="{257322CC-FE8B-476A-A888-9CBAF071D519}" presName="composite" presStyleCnt="0"/>
+    <dgm:pt modelId="{37C90BC7-5C52-4CA4-ACF7-28C66F120072}" type="pres">
+      <dgm:prSet presAssocID="{38C6CF7C-CFEE-40B4-896A-67650067C7E7}" presName="composite" presStyleCnt="0"/>
       <dgm:spPr/>
     </dgm:pt>
-    <dgm:pt modelId="{A3D2E2B6-E218-459F-B528-73A4A0C2E649}" type="pres">
-      <dgm:prSet presAssocID="{257322CC-FE8B-476A-A888-9CBAF071D519}" presName="imgShp" presStyleLbl="fgImgPlace1" presStyleIdx="9" presStyleCnt="11"/>
+    <dgm:pt modelId="{72E85A79-F72A-44C5-B601-7E3F5E926880}" type="pres">
+      <dgm:prSet presAssocID="{38C6CF7C-CFEE-40B4-896A-67650067C7E7}" presName="imgShp" presStyleLbl="fgImgPlace1" presStyleIdx="6" presStyleCnt="7"/>
       <dgm:spPr/>
     </dgm:pt>
-    <dgm:pt modelId="{10E05AE9-C755-4B89-B80F-6821000F6D86}" type="pres">
-      <dgm:prSet presAssocID="{257322CC-FE8B-476A-A888-9CBAF071D519}" presName="txShp" presStyleLbl="node1" presStyleIdx="9" presStyleCnt="11">
-        <dgm:presLayoutVars>
-          <dgm:bulletEnabled val="1"/>
-        </dgm:presLayoutVars>
-      </dgm:prSet>
-      <dgm:spPr/>
-      <dgm:t>
-        <a:bodyPr/>
-        <a:lstStyle/>
-        <a:p>
-          <a:endParaRPr lang="en-US"/>
-        </a:p>
-      </dgm:t>
-    </dgm:pt>
-    <dgm:pt modelId="{2CD5EBAA-7A21-457A-B520-FECF93F14EDF}" type="pres">
-      <dgm:prSet presAssocID="{4C77B9C6-C92E-4861-90CF-11903742F78E}" presName="spacing" presStyleCnt="0"/>
-      <dgm:spPr/>
-    </dgm:pt>
-    <dgm:pt modelId="{268FEB48-4BC5-4062-938C-C93C9AC55AE2}" type="pres">
-      <dgm:prSet presAssocID="{7143AC0B-B1F0-460D-AAB5-888AAD3F0D57}" presName="composite" presStyleCnt="0"/>
-      <dgm:spPr/>
-    </dgm:pt>
-    <dgm:pt modelId="{AA1295BC-093F-482B-8FDB-60167ED18EBC}" type="pres">
-      <dgm:prSet presAssocID="{7143AC0B-B1F0-460D-AAB5-888AAD3F0D57}" presName="imgShp" presStyleLbl="fgImgPlace1" presStyleIdx="10" presStyleCnt="11"/>
-      <dgm:spPr/>
-    </dgm:pt>
-    <dgm:pt modelId="{2E3CEB46-780E-4CF9-9719-B491FE1B9C61}" type="pres">
-      <dgm:prSet presAssocID="{7143AC0B-B1F0-460D-AAB5-888AAD3F0D57}" presName="txShp" presStyleLbl="node1" presStyleIdx="10" presStyleCnt="11">
+    <dgm:pt modelId="{24C8095E-364B-47DE-9642-0E5B54B5FD87}" type="pres">
+      <dgm:prSet presAssocID="{38C6CF7C-CFEE-40B4-896A-67650067C7E7}" presName="txShp" presStyleLbl="node1" presStyleIdx="6" presStyleCnt="7">
         <dgm:presLayoutVars>
           <dgm:bulletEnabled val="1"/>
         </dgm:presLayoutVars>
@@ -4992,29 +4721,21 @@
     </dgm:pt>
   </dgm:ptLst>
   <dgm:cxnLst>
+    <dgm:cxn modelId="{16F30B3B-3FB9-4D78-94AE-228C9DA73EAB}" type="presOf" srcId="{D271A796-3E87-43D8-84A8-1B6B39DF2595}" destId="{712A02A0-0414-49B8-B1E0-FA035CAF9D11}" srcOrd="0" destOrd="0" presId="urn:microsoft.com/office/officeart/2005/8/layout/vList3"/>
+    <dgm:cxn modelId="{81BA0608-3E25-48D9-B105-BE5164994F5E}" type="presOf" srcId="{38C6CF7C-CFEE-40B4-896A-67650067C7E7}" destId="{24C8095E-364B-47DE-9642-0E5B54B5FD87}" srcOrd="0" destOrd="0" presId="urn:microsoft.com/office/officeart/2005/8/layout/vList3"/>
+    <dgm:cxn modelId="{6D72FC6D-D1D4-46B4-A825-A7810C903114}" srcId="{8645DBF3-D766-4E9C-9509-A1AC02DA01CD}" destId="{38C6CF7C-CFEE-40B4-896A-67650067C7E7}" srcOrd="6" destOrd="0" parTransId="{588723B5-8233-4BBE-A8DC-E6F55C63D8BC}" sibTransId="{DD55D6D6-192A-4DAE-B0DC-9410F8444455}"/>
+    <dgm:cxn modelId="{B334B557-68F3-4B45-8490-A0AA9267F668}" type="presOf" srcId="{891FA1E3-5D29-4888-A1F9-E5A9BEADAAA9}" destId="{3F343952-278E-4762-AD99-C388636C6902}" srcOrd="0" destOrd="0" presId="urn:microsoft.com/office/officeart/2005/8/layout/vList3"/>
+    <dgm:cxn modelId="{62A0118C-3F53-4920-BD35-83F9E2769E39}" srcId="{8645DBF3-D766-4E9C-9509-A1AC02DA01CD}" destId="{D271A796-3E87-43D8-84A8-1B6B39DF2595}" srcOrd="5" destOrd="0" parTransId="{B8843B96-2FE6-4B2A-BCB3-A28E9B499B3A}" sibTransId="{1DB3D68B-28C7-48C7-BB93-2DC9AA4EE4ED}"/>
+    <dgm:cxn modelId="{EBE2EF64-4B4A-4F28-B1B2-052D8709410D}" type="presOf" srcId="{BAC3BBE6-2CFA-44FC-85F0-0C1463E1117B}" destId="{6B3C036E-74A3-4958-A43B-D1084CE1E10D}" srcOrd="0" destOrd="0" presId="urn:microsoft.com/office/officeart/2005/8/layout/vList3"/>
+    <dgm:cxn modelId="{D2B13300-FA95-487F-A705-DF1F1DC8DA9D}" srcId="{8645DBF3-D766-4E9C-9509-A1AC02DA01CD}" destId="{0D77B6EF-510F-4577-84F0-9A7CEA31D1BF}" srcOrd="0" destOrd="0" parTransId="{D9ED720C-CE49-4851-B5F5-3DE12783D42B}" sibTransId="{C23424EB-0653-41CF-8D26-19C4BD592C08}"/>
+    <dgm:cxn modelId="{D0376C59-9AD1-469F-9132-FEB4F66AC51C}" type="presOf" srcId="{A92F1BD3-6479-4DA1-907A-F5A8C1750816}" destId="{7D4C3070-190E-4B55-80D0-A4B6FA7AEBD7}" srcOrd="0" destOrd="0" presId="urn:microsoft.com/office/officeart/2005/8/layout/vList3"/>
+    <dgm:cxn modelId="{06C57ABE-E3C7-46AE-B9DD-905C79E51B28}" type="presOf" srcId="{0D77B6EF-510F-4577-84F0-9A7CEA31D1BF}" destId="{EC613F0C-2CCE-4C4A-8A0F-097FF9013F06}" srcOrd="0" destOrd="0" presId="urn:microsoft.com/office/officeart/2005/8/layout/vList3"/>
+    <dgm:cxn modelId="{96B391FA-E995-4718-9BAF-3B8D4FC42AA3}" type="presOf" srcId="{C141CADB-4A11-4B21-A555-9F8EE9EA8E97}" destId="{77C38AEC-886E-4F4F-A3B0-6840519B353A}" srcOrd="0" destOrd="0" presId="urn:microsoft.com/office/officeart/2005/8/layout/vList3"/>
+    <dgm:cxn modelId="{79AF6161-00CF-4AC8-B200-682B256E81D2}" srcId="{8645DBF3-D766-4E9C-9509-A1AC02DA01CD}" destId="{A92F1BD3-6479-4DA1-907A-F5A8C1750816}" srcOrd="1" destOrd="0" parTransId="{FAE1A573-58DA-497B-9D64-8D53A99198B8}" sibTransId="{7A12C82E-4B75-41F6-BEE2-BB08EDF1145C}"/>
+    <dgm:cxn modelId="{5F0C7B92-4A41-45E0-B666-FA92666C5D30}" srcId="{8645DBF3-D766-4E9C-9509-A1AC02DA01CD}" destId="{BAC3BBE6-2CFA-44FC-85F0-0C1463E1117B}" srcOrd="4" destOrd="0" parTransId="{78D916AE-CC58-4DA3-A7C5-FB81372A052F}" sibTransId="{6529A9CF-C828-4490-9A69-5007CD9E726D}"/>
+    <dgm:cxn modelId="{4A64FDBF-1F4C-4883-A13B-FB59B4846FF2}" type="presOf" srcId="{8645DBF3-D766-4E9C-9509-A1AC02DA01CD}" destId="{F26CEA5A-689D-4105-B63A-9612EBD15CC8}" srcOrd="0" destOrd="0" presId="urn:microsoft.com/office/officeart/2005/8/layout/vList3"/>
+    <dgm:cxn modelId="{E95FCC32-C3CD-4493-A753-C54473C51B68}" srcId="{8645DBF3-D766-4E9C-9509-A1AC02DA01CD}" destId="{891FA1E3-5D29-4888-A1F9-E5A9BEADAAA9}" srcOrd="3" destOrd="0" parTransId="{D279C6F3-E559-4282-862E-03FE438334A1}" sibTransId="{09D30867-ED5D-4F72-8300-A924B6B77D09}"/>
     <dgm:cxn modelId="{0919CA1E-0988-4B4D-ABBD-8F7FFA81B33E}" srcId="{8645DBF3-D766-4E9C-9509-A1AC02DA01CD}" destId="{C141CADB-4A11-4B21-A555-9F8EE9EA8E97}" srcOrd="2" destOrd="0" parTransId="{6EC8685B-9EE7-479B-A9A8-35507150442D}" sibTransId="{C5871109-29F2-49C5-B8A0-992B8918BB5B}"/>
-    <dgm:cxn modelId="{996EF6DC-D24A-42CD-9563-E35EF70A96B6}" srcId="{8645DBF3-D766-4E9C-9509-A1AC02DA01CD}" destId="{71138977-AE20-4A63-8AF4-0E723D582ED3}" srcOrd="4" destOrd="0" parTransId="{B3D466E1-8FB3-4EA1-A67B-713577ADC49F}" sibTransId="{BFBE0F24-C4CA-4CCB-A72B-3641BF147EAA}"/>
-    <dgm:cxn modelId="{16F30B3B-3FB9-4D78-94AE-228C9DA73EAB}" type="presOf" srcId="{D271A796-3E87-43D8-84A8-1B6B39DF2595}" destId="{712A02A0-0414-49B8-B1E0-FA035CAF9D11}" srcOrd="0" destOrd="0" presId="urn:microsoft.com/office/officeart/2005/8/layout/vList3"/>
-    <dgm:cxn modelId="{E95FCC32-C3CD-4493-A753-C54473C51B68}" srcId="{8645DBF3-D766-4E9C-9509-A1AC02DA01CD}" destId="{891FA1E3-5D29-4888-A1F9-E5A9BEADAAA9}" srcOrd="3" destOrd="0" parTransId="{D279C6F3-E559-4282-862E-03FE438334A1}" sibTransId="{09D30867-ED5D-4F72-8300-A924B6B77D09}"/>
-    <dgm:cxn modelId="{96B391FA-E995-4718-9BAF-3B8D4FC42AA3}" type="presOf" srcId="{C141CADB-4A11-4B21-A555-9F8EE9EA8E97}" destId="{77C38AEC-886E-4F4F-A3B0-6840519B353A}" srcOrd="0" destOrd="0" presId="urn:microsoft.com/office/officeart/2005/8/layout/vList3"/>
-    <dgm:cxn modelId="{ED89F2B8-FA62-46E7-B5E3-F77CB1879375}" type="presOf" srcId="{6175B78C-5CED-46E0-8F24-D25760BDA1C1}" destId="{07159912-276E-42EB-8083-187E57580219}" srcOrd="0" destOrd="0" presId="urn:microsoft.com/office/officeart/2005/8/layout/vList3"/>
-    <dgm:cxn modelId="{5EB92279-1B70-4F2C-B37A-271D4C64B3A5}" type="presOf" srcId="{7143AC0B-B1F0-460D-AAB5-888AAD3F0D57}" destId="{2E3CEB46-780E-4CF9-9719-B491FE1B9C61}" srcOrd="0" destOrd="0" presId="urn:microsoft.com/office/officeart/2005/8/layout/vList3"/>
-    <dgm:cxn modelId="{806225E9-7C29-42F0-BF36-9315C872BC22}" type="presOf" srcId="{257322CC-FE8B-476A-A888-9CBAF071D519}" destId="{10E05AE9-C755-4B89-B80F-6821000F6D86}" srcOrd="0" destOrd="0" presId="urn:microsoft.com/office/officeart/2005/8/layout/vList3"/>
-    <dgm:cxn modelId="{D0376C59-9AD1-469F-9132-FEB4F66AC51C}" type="presOf" srcId="{A92F1BD3-6479-4DA1-907A-F5A8C1750816}" destId="{7D4C3070-190E-4B55-80D0-A4B6FA7AEBD7}" srcOrd="0" destOrd="0" presId="urn:microsoft.com/office/officeart/2005/8/layout/vList3"/>
-    <dgm:cxn modelId="{B334B557-68F3-4B45-8490-A0AA9267F668}" type="presOf" srcId="{891FA1E3-5D29-4888-A1F9-E5A9BEADAAA9}" destId="{3F343952-278E-4762-AD99-C388636C6902}" srcOrd="0" destOrd="0" presId="urn:microsoft.com/office/officeart/2005/8/layout/vList3"/>
-    <dgm:cxn modelId="{07C45377-B749-44EA-AB85-6AB98F63B068}" srcId="{8645DBF3-D766-4E9C-9509-A1AC02DA01CD}" destId="{257322CC-FE8B-476A-A888-9CBAF071D519}" srcOrd="9" destOrd="0" parTransId="{BC6F5ABC-7FAF-4E81-BFD3-A7160995BBA0}" sibTransId="{4C77B9C6-C92E-4861-90CF-11903742F78E}"/>
-    <dgm:cxn modelId="{EBE2EF64-4B4A-4F28-B1B2-052D8709410D}" type="presOf" srcId="{BAC3BBE6-2CFA-44FC-85F0-0C1463E1117B}" destId="{6B3C036E-74A3-4958-A43B-D1084CE1E10D}" srcOrd="0" destOrd="0" presId="urn:microsoft.com/office/officeart/2005/8/layout/vList3"/>
-    <dgm:cxn modelId="{DA51E834-FAAB-4CD2-817B-25EA02BFE659}" srcId="{8645DBF3-D766-4E9C-9509-A1AC02DA01CD}" destId="{B42B2BE8-9C51-4575-ABE2-C81450ECE0C2}" srcOrd="7" destOrd="0" parTransId="{899C3D7D-E69C-48F0-AEB8-18CB195ACC45}" sibTransId="{49D19B4F-B481-4271-B195-8B60739439AF}"/>
-    <dgm:cxn modelId="{A70C17C4-A30C-4205-8CFF-8D975586B368}" srcId="{8645DBF3-D766-4E9C-9509-A1AC02DA01CD}" destId="{6175B78C-5CED-46E0-8F24-D25760BDA1C1}" srcOrd="5" destOrd="0" parTransId="{1348F839-8279-4353-BA53-B5C34A1D61F5}" sibTransId="{73F274D8-20D0-456C-868F-DF7A1F461787}"/>
-    <dgm:cxn modelId="{E30EF22B-31F6-4F55-9D54-12C0562F4E6F}" srcId="{8645DBF3-D766-4E9C-9509-A1AC02DA01CD}" destId="{7143AC0B-B1F0-460D-AAB5-888AAD3F0D57}" srcOrd="10" destOrd="0" parTransId="{A0E6B007-CDDE-4703-B724-D250A85E3882}" sibTransId="{0DB0ECE1-13A1-4A69-A39A-AFA03C0E7FE8}"/>
-    <dgm:cxn modelId="{5F0C7B92-4A41-45E0-B666-FA92666C5D30}" srcId="{8645DBF3-D766-4E9C-9509-A1AC02DA01CD}" destId="{BAC3BBE6-2CFA-44FC-85F0-0C1463E1117B}" srcOrd="6" destOrd="0" parTransId="{78D916AE-CC58-4DA3-A7C5-FB81372A052F}" sibTransId="{6529A9CF-C828-4490-9A69-5007CD9E726D}"/>
-    <dgm:cxn modelId="{D2B13300-FA95-487F-A705-DF1F1DC8DA9D}" srcId="{8645DBF3-D766-4E9C-9509-A1AC02DA01CD}" destId="{0D77B6EF-510F-4577-84F0-9A7CEA31D1BF}" srcOrd="0" destOrd="0" parTransId="{D9ED720C-CE49-4851-B5F5-3DE12783D42B}" sibTransId="{C23424EB-0653-41CF-8D26-19C4BD592C08}"/>
-    <dgm:cxn modelId="{06C57ABE-E3C7-46AE-B9DD-905C79E51B28}" type="presOf" srcId="{0D77B6EF-510F-4577-84F0-9A7CEA31D1BF}" destId="{EC613F0C-2CCE-4C4A-8A0F-097FF9013F06}" srcOrd="0" destOrd="0" presId="urn:microsoft.com/office/officeart/2005/8/layout/vList3"/>
-    <dgm:cxn modelId="{4A64FDBF-1F4C-4883-A13B-FB59B4846FF2}" type="presOf" srcId="{8645DBF3-D766-4E9C-9509-A1AC02DA01CD}" destId="{F26CEA5A-689D-4105-B63A-9612EBD15CC8}" srcOrd="0" destOrd="0" presId="urn:microsoft.com/office/officeart/2005/8/layout/vList3"/>
-    <dgm:cxn modelId="{79AF6161-00CF-4AC8-B200-682B256E81D2}" srcId="{8645DBF3-D766-4E9C-9509-A1AC02DA01CD}" destId="{A92F1BD3-6479-4DA1-907A-F5A8C1750816}" srcOrd="1" destOrd="0" parTransId="{FAE1A573-58DA-497B-9D64-8D53A99198B8}" sibTransId="{7A12C82E-4B75-41F6-BEE2-BB08EDF1145C}"/>
-    <dgm:cxn modelId="{531EB3EE-5467-43B4-A98B-6AB58030BC2A}" type="presOf" srcId="{71138977-AE20-4A63-8AF4-0E723D582ED3}" destId="{3D4E6BA6-27F1-4FA1-B636-4B1CECE92945}" srcOrd="0" destOrd="0" presId="urn:microsoft.com/office/officeart/2005/8/layout/vList3"/>
-    <dgm:cxn modelId="{C71DD65C-8BFD-4A6C-9C4B-6ABCB9B61BA6}" type="presOf" srcId="{B42B2BE8-9C51-4575-ABE2-C81450ECE0C2}" destId="{2516A04B-4C41-4EE1-B19A-C2B7F77237DC}" srcOrd="0" destOrd="0" presId="urn:microsoft.com/office/officeart/2005/8/layout/vList3"/>
-    <dgm:cxn modelId="{62A0118C-3F53-4920-BD35-83F9E2769E39}" srcId="{8645DBF3-D766-4E9C-9509-A1AC02DA01CD}" destId="{D271A796-3E87-43D8-84A8-1B6B39DF2595}" srcOrd="8" destOrd="0" parTransId="{B8843B96-2FE6-4B2A-BCB3-A28E9B499B3A}" sibTransId="{1DB3D68B-28C7-48C7-BB93-2DC9AA4EE4ED}"/>
     <dgm:cxn modelId="{C4CAB196-CCE8-452F-9C40-FC13F73FB87F}" type="presParOf" srcId="{F26CEA5A-689D-4105-B63A-9612EBD15CC8}" destId="{1925409C-D156-40B8-B679-CAB889E882B6}" srcOrd="0" destOrd="0" presId="urn:microsoft.com/office/officeart/2005/8/layout/vList3"/>
     <dgm:cxn modelId="{222C6F31-33B6-4C76-AB05-F067612C43CA}" type="presParOf" srcId="{1925409C-D156-40B8-B679-CAB889E882B6}" destId="{61EB4A0E-E38E-4FC9-9032-C8EB8BBF1894}" srcOrd="0" destOrd="0" presId="urn:microsoft.com/office/officeart/2005/8/layout/vList3"/>
     <dgm:cxn modelId="{6A541BFF-AF82-432A-B546-7E5C2853394D}" type="presParOf" srcId="{1925409C-D156-40B8-B679-CAB889E882B6}" destId="{EC613F0C-2CCE-4C4A-8A0F-097FF9013F06}" srcOrd="1" destOrd="0" presId="urn:microsoft.com/office/officeart/2005/8/layout/vList3"/>
@@ -5031,33 +4752,17 @@
     <dgm:cxn modelId="{A3EDD15C-8083-4694-B67B-715432D35B68}" type="presParOf" srcId="{857A9A07-EB5C-4644-835B-C1BDA4611FEF}" destId="{B93695E8-0A7A-47A1-9D19-690B35925A98}" srcOrd="0" destOrd="0" presId="urn:microsoft.com/office/officeart/2005/8/layout/vList3"/>
     <dgm:cxn modelId="{64F12058-E7C3-4BEE-A93D-EC66A7AA3B7C}" type="presParOf" srcId="{857A9A07-EB5C-4644-835B-C1BDA4611FEF}" destId="{3F343952-278E-4762-AD99-C388636C6902}" srcOrd="1" destOrd="0" presId="urn:microsoft.com/office/officeart/2005/8/layout/vList3"/>
     <dgm:cxn modelId="{C1FC4B4B-411C-4791-908B-45F5C76D9330}" type="presParOf" srcId="{F26CEA5A-689D-4105-B63A-9612EBD15CC8}" destId="{C6DD16B6-6257-43CB-951D-EB2F2E1069B9}" srcOrd="7" destOrd="0" presId="urn:microsoft.com/office/officeart/2005/8/layout/vList3"/>
-    <dgm:cxn modelId="{535FFDE5-8FEF-491C-80F8-1EEE6CFECB52}" type="presParOf" srcId="{F26CEA5A-689D-4105-B63A-9612EBD15CC8}" destId="{EB375A32-6803-4FDF-8894-4ED2DB997B37}" srcOrd="8" destOrd="0" presId="urn:microsoft.com/office/officeart/2005/8/layout/vList3"/>
-    <dgm:cxn modelId="{CAB4B179-F34E-43D3-A14B-35BE83323F93}" type="presParOf" srcId="{EB375A32-6803-4FDF-8894-4ED2DB997B37}" destId="{6C91433B-57A2-427D-B4E5-2DFA6796A2FA}" srcOrd="0" destOrd="0" presId="urn:microsoft.com/office/officeart/2005/8/layout/vList3"/>
-    <dgm:cxn modelId="{85611525-C430-4289-94E5-96C4D8C20823}" type="presParOf" srcId="{EB375A32-6803-4FDF-8894-4ED2DB997B37}" destId="{3D4E6BA6-27F1-4FA1-B636-4B1CECE92945}" srcOrd="1" destOrd="0" presId="urn:microsoft.com/office/officeart/2005/8/layout/vList3"/>
-    <dgm:cxn modelId="{83136071-9B9A-4D3C-B292-71D8F134E058}" type="presParOf" srcId="{F26CEA5A-689D-4105-B63A-9612EBD15CC8}" destId="{F4667011-7DA4-4086-B652-85B20E458D0A}" srcOrd="9" destOrd="0" presId="urn:microsoft.com/office/officeart/2005/8/layout/vList3"/>
-    <dgm:cxn modelId="{48BD8DEF-D24B-4C8A-A039-29DFC215BD93}" type="presParOf" srcId="{F26CEA5A-689D-4105-B63A-9612EBD15CC8}" destId="{FCAF5D98-9F57-4D0F-889E-283F7B4FA2F9}" srcOrd="10" destOrd="0" presId="urn:microsoft.com/office/officeart/2005/8/layout/vList3"/>
-    <dgm:cxn modelId="{7D88AB22-C6DD-4B1D-ACD6-83BB95928D7C}" type="presParOf" srcId="{FCAF5D98-9F57-4D0F-889E-283F7B4FA2F9}" destId="{52FEEC7E-241A-4DCA-9CDE-134769A1CE5C}" srcOrd="0" destOrd="0" presId="urn:microsoft.com/office/officeart/2005/8/layout/vList3"/>
-    <dgm:cxn modelId="{629B5926-61A5-4E77-9E0C-18DCD4C50742}" type="presParOf" srcId="{FCAF5D98-9F57-4D0F-889E-283F7B4FA2F9}" destId="{07159912-276E-42EB-8083-187E57580219}" srcOrd="1" destOrd="0" presId="urn:microsoft.com/office/officeart/2005/8/layout/vList3"/>
-    <dgm:cxn modelId="{71100402-0738-4F1C-939C-9E0B9AA870A1}" type="presParOf" srcId="{F26CEA5A-689D-4105-B63A-9612EBD15CC8}" destId="{91F8B152-814A-4D0A-BFAB-9D01F3F1695B}" srcOrd="11" destOrd="0" presId="urn:microsoft.com/office/officeart/2005/8/layout/vList3"/>
-    <dgm:cxn modelId="{01EAB42D-267D-4FD6-84B1-69B2B6D5B7AD}" type="presParOf" srcId="{F26CEA5A-689D-4105-B63A-9612EBD15CC8}" destId="{D6EB1741-D0E5-4D7F-8794-C17CC2FCC3AC}" srcOrd="12" destOrd="0" presId="urn:microsoft.com/office/officeart/2005/8/layout/vList3"/>
+    <dgm:cxn modelId="{01EAB42D-267D-4FD6-84B1-69B2B6D5B7AD}" type="presParOf" srcId="{F26CEA5A-689D-4105-B63A-9612EBD15CC8}" destId="{D6EB1741-D0E5-4D7F-8794-C17CC2FCC3AC}" srcOrd="8" destOrd="0" presId="urn:microsoft.com/office/officeart/2005/8/layout/vList3"/>
     <dgm:cxn modelId="{0D499CE8-34E9-4376-9475-35B967F05F61}" type="presParOf" srcId="{D6EB1741-D0E5-4D7F-8794-C17CC2FCC3AC}" destId="{88B3FE18-0B39-43AA-AFFC-8CA66A5D3B20}" srcOrd="0" destOrd="0" presId="urn:microsoft.com/office/officeart/2005/8/layout/vList3"/>
     <dgm:cxn modelId="{FD0B1D7A-083E-45CB-8250-73B846FA9CE6}" type="presParOf" srcId="{D6EB1741-D0E5-4D7F-8794-C17CC2FCC3AC}" destId="{6B3C036E-74A3-4958-A43B-D1084CE1E10D}" srcOrd="1" destOrd="0" presId="urn:microsoft.com/office/officeart/2005/8/layout/vList3"/>
-    <dgm:cxn modelId="{A878B4D3-F203-47B6-A7C0-D59E503331E7}" type="presParOf" srcId="{F26CEA5A-689D-4105-B63A-9612EBD15CC8}" destId="{EA299634-C27C-4E6A-BC27-AC0EE887E476}" srcOrd="13" destOrd="0" presId="urn:microsoft.com/office/officeart/2005/8/layout/vList3"/>
-    <dgm:cxn modelId="{0E8C995F-DF08-4B59-B2DA-ABDD5C559315}" type="presParOf" srcId="{F26CEA5A-689D-4105-B63A-9612EBD15CC8}" destId="{378BFDE1-95A4-406C-93C5-389982A34826}" srcOrd="14" destOrd="0" presId="urn:microsoft.com/office/officeart/2005/8/layout/vList3"/>
-    <dgm:cxn modelId="{1ECD6BCB-E726-43C3-8052-47ED2885A59E}" type="presParOf" srcId="{378BFDE1-95A4-406C-93C5-389982A34826}" destId="{DC245991-AA9E-4875-BB32-E19A10EEE7BB}" srcOrd="0" destOrd="0" presId="urn:microsoft.com/office/officeart/2005/8/layout/vList3"/>
-    <dgm:cxn modelId="{19602771-021F-42D2-8C00-C3E211B38B95}" type="presParOf" srcId="{378BFDE1-95A4-406C-93C5-389982A34826}" destId="{2516A04B-4C41-4EE1-B19A-C2B7F77237DC}" srcOrd="1" destOrd="0" presId="urn:microsoft.com/office/officeart/2005/8/layout/vList3"/>
-    <dgm:cxn modelId="{C27ECF2D-A8D7-46AA-B042-47D2D47E6F9B}" type="presParOf" srcId="{F26CEA5A-689D-4105-B63A-9612EBD15CC8}" destId="{D2E159DD-2CAE-4038-A81C-123DE3E641B3}" srcOrd="15" destOrd="0" presId="urn:microsoft.com/office/officeart/2005/8/layout/vList3"/>
-    <dgm:cxn modelId="{92D9166B-8785-42C4-B388-955A00CB245F}" type="presParOf" srcId="{F26CEA5A-689D-4105-B63A-9612EBD15CC8}" destId="{598B63BD-E10D-46CC-A692-7ED1AC61F8B3}" srcOrd="16" destOrd="0" presId="urn:microsoft.com/office/officeart/2005/8/layout/vList3"/>
+    <dgm:cxn modelId="{A878B4D3-F203-47B6-A7C0-D59E503331E7}" type="presParOf" srcId="{F26CEA5A-689D-4105-B63A-9612EBD15CC8}" destId="{EA299634-C27C-4E6A-BC27-AC0EE887E476}" srcOrd="9" destOrd="0" presId="urn:microsoft.com/office/officeart/2005/8/layout/vList3"/>
+    <dgm:cxn modelId="{92D9166B-8785-42C4-B388-955A00CB245F}" type="presParOf" srcId="{F26CEA5A-689D-4105-B63A-9612EBD15CC8}" destId="{598B63BD-E10D-46CC-A692-7ED1AC61F8B3}" srcOrd="10" destOrd="0" presId="urn:microsoft.com/office/officeart/2005/8/layout/vList3"/>
     <dgm:cxn modelId="{B52668B8-D88E-49D9-8740-E7FB84142AF4}" type="presParOf" srcId="{598B63BD-E10D-46CC-A692-7ED1AC61F8B3}" destId="{13FAD4E5-2420-49E9-9462-FBF7DD908FF1}" srcOrd="0" destOrd="0" presId="urn:microsoft.com/office/officeart/2005/8/layout/vList3"/>
     <dgm:cxn modelId="{29893EAF-65E1-48D1-B346-9AFBB5AEE95B}" type="presParOf" srcId="{598B63BD-E10D-46CC-A692-7ED1AC61F8B3}" destId="{712A02A0-0414-49B8-B1E0-FA035CAF9D11}" srcOrd="1" destOrd="0" presId="urn:microsoft.com/office/officeart/2005/8/layout/vList3"/>
-    <dgm:cxn modelId="{FBF9800C-0733-4CEB-8E1A-5E5393692A46}" type="presParOf" srcId="{F26CEA5A-689D-4105-B63A-9612EBD15CC8}" destId="{9DCA7942-6148-447B-926E-C8BB8FE97C04}" srcOrd="17" destOrd="0" presId="urn:microsoft.com/office/officeart/2005/8/layout/vList3"/>
-    <dgm:cxn modelId="{81BCF829-D8C3-415C-A104-10853CDE4A62}" type="presParOf" srcId="{F26CEA5A-689D-4105-B63A-9612EBD15CC8}" destId="{73BE2FA4-82CD-4153-8F00-5797C08E3AC6}" srcOrd="18" destOrd="0" presId="urn:microsoft.com/office/officeart/2005/8/layout/vList3"/>
-    <dgm:cxn modelId="{7ADFEB00-C306-4AB3-A50F-EB45D8D8AB10}" type="presParOf" srcId="{73BE2FA4-82CD-4153-8F00-5797C08E3AC6}" destId="{A3D2E2B6-E218-459F-B528-73A4A0C2E649}" srcOrd="0" destOrd="0" presId="urn:microsoft.com/office/officeart/2005/8/layout/vList3"/>
-    <dgm:cxn modelId="{636C7FB5-B101-4AFE-85C1-F904672C10FC}" type="presParOf" srcId="{73BE2FA4-82CD-4153-8F00-5797C08E3AC6}" destId="{10E05AE9-C755-4B89-B80F-6821000F6D86}" srcOrd="1" destOrd="0" presId="urn:microsoft.com/office/officeart/2005/8/layout/vList3"/>
-    <dgm:cxn modelId="{E2C83352-ACC9-4C71-8901-2270E714D963}" type="presParOf" srcId="{F26CEA5A-689D-4105-B63A-9612EBD15CC8}" destId="{2CD5EBAA-7A21-457A-B520-FECF93F14EDF}" srcOrd="19" destOrd="0" presId="urn:microsoft.com/office/officeart/2005/8/layout/vList3"/>
-    <dgm:cxn modelId="{D507CD9E-004C-4ED5-83D2-5A76ECC01574}" type="presParOf" srcId="{F26CEA5A-689D-4105-B63A-9612EBD15CC8}" destId="{268FEB48-4BC5-4062-938C-C93C9AC55AE2}" srcOrd="20" destOrd="0" presId="urn:microsoft.com/office/officeart/2005/8/layout/vList3"/>
-    <dgm:cxn modelId="{060023F5-7240-4B34-AEE0-54A81BCE64D6}" type="presParOf" srcId="{268FEB48-4BC5-4062-938C-C93C9AC55AE2}" destId="{AA1295BC-093F-482B-8FDB-60167ED18EBC}" srcOrd="0" destOrd="0" presId="urn:microsoft.com/office/officeart/2005/8/layout/vList3"/>
-    <dgm:cxn modelId="{09FCE993-DA08-4659-82EB-5B0E5FDDA16C}" type="presParOf" srcId="{268FEB48-4BC5-4062-938C-C93C9AC55AE2}" destId="{2E3CEB46-780E-4CF9-9719-B491FE1B9C61}" srcOrd="1" destOrd="0" presId="urn:microsoft.com/office/officeart/2005/8/layout/vList3"/>
+    <dgm:cxn modelId="{E709A900-2221-4A68-B1C7-FB4584FA19B4}" type="presParOf" srcId="{F26CEA5A-689D-4105-B63A-9612EBD15CC8}" destId="{9DCA7942-6148-447B-926E-C8BB8FE97C04}" srcOrd="11" destOrd="0" presId="urn:microsoft.com/office/officeart/2005/8/layout/vList3"/>
+    <dgm:cxn modelId="{A9B626A0-8310-4CF0-B859-E0926C6AB552}" type="presParOf" srcId="{F26CEA5A-689D-4105-B63A-9612EBD15CC8}" destId="{37C90BC7-5C52-4CA4-ACF7-28C66F120072}" srcOrd="12" destOrd="0" presId="urn:microsoft.com/office/officeart/2005/8/layout/vList3"/>
+    <dgm:cxn modelId="{B3BEC609-5EAC-45A5-96C3-E535CE3EECAB}" type="presParOf" srcId="{37C90BC7-5C52-4CA4-ACF7-28C66F120072}" destId="{72E85A79-F72A-44C5-B601-7E3F5E926880}" srcOrd="0" destOrd="0" presId="urn:microsoft.com/office/officeart/2005/8/layout/vList3"/>
+    <dgm:cxn modelId="{FAA888DD-A50E-496C-974F-470DEA77CDF6}" type="presParOf" srcId="{37C90BC7-5C52-4CA4-ACF7-28C66F120072}" destId="{24C8095E-364B-47DE-9642-0E5B54B5FD87}" srcOrd="1" destOrd="0" presId="urn:microsoft.com/office/officeart/2005/8/layout/vList3"/>
   </dgm:cxnLst>
   <dgm:bg/>
   <dgm:whole/>
@@ -6860,8 +6565,8 @@
       </dsp:nvSpPr>
       <dsp:spPr>
         <a:xfrm rot="10800000">
-          <a:off x="1501749" y="571"/>
-          <a:ext cx="5624703" cy="340005"/>
+          <a:off x="1551989" y="249"/>
+          <a:ext cx="5624703" cy="540965"/>
         </a:xfrm>
         <a:prstGeom prst="homePlate">
           <a:avLst/>
@@ -6902,12 +6607,12 @@
         </a:fontRef>
       </dsp:style>
       <dsp:txBody>
-        <a:bodyPr spcFirstLastPara="0" vert="horz" wrap="square" lIns="149933" tIns="60960" rIns="113792" bIns="60960" numCol="1" spcCol="1270" anchor="ctr" anchorCtr="0">
+        <a:bodyPr spcFirstLastPara="0" vert="horz" wrap="square" lIns="238551" tIns="99060" rIns="184912" bIns="99060" numCol="1" spcCol="1270" anchor="ctr" anchorCtr="0">
           <a:noAutofit/>
         </a:bodyPr>
         <a:lstStyle/>
         <a:p>
-          <a:pPr lvl="0" algn="ctr" defTabSz="711200">
+          <a:pPr lvl="0" algn="ctr" defTabSz="1155700">
             <a:lnSpc>
               <a:spcPct val="90000"/>
             </a:lnSpc>
@@ -6919,15 +6624,15 @@
             </a:spcAft>
           </a:pPr>
           <a:r>
-            <a:rPr lang="en-US" sz="1600" kern="1200" dirty="0" smtClean="0"/>
+            <a:rPr lang="en-US" sz="2600" kern="1200" dirty="0" smtClean="0"/>
             <a:t>Chain of Resp.</a:t>
           </a:r>
-          <a:endParaRPr lang="en-US" sz="1600" kern="1200" dirty="0"/>
+          <a:endParaRPr lang="en-US" sz="2600" kern="1200" dirty="0"/>
         </a:p>
       </dsp:txBody>
       <dsp:txXfrm rot="10800000">
-        <a:off x="1586750" y="571"/>
-        <a:ext cx="5539702" cy="340005"/>
+        <a:off x="1687230" y="249"/>
+        <a:ext cx="5489462" cy="540965"/>
       </dsp:txXfrm>
     </dsp:sp>
     <dsp:sp modelId="{61EB4A0E-E38E-4FC9-9032-C8EB8BBF1894}">
@@ -6937,8 +6642,8 @@
       </dsp:nvSpPr>
       <dsp:spPr>
         <a:xfrm>
-          <a:off x="1331747" y="571"/>
-          <a:ext cx="340005" cy="340005"/>
+          <a:off x="1281507" y="249"/>
+          <a:ext cx="540965" cy="540965"/>
         </a:xfrm>
         <a:prstGeom prst="ellipse">
           <a:avLst/>
@@ -6985,8 +6690,8 @@
       </dsp:nvSpPr>
       <dsp:spPr>
         <a:xfrm rot="10800000">
-          <a:off x="1501749" y="442071"/>
-          <a:ext cx="5624703" cy="340005"/>
+          <a:off x="1551989" y="702696"/>
+          <a:ext cx="5624703" cy="540965"/>
         </a:xfrm>
         <a:prstGeom prst="homePlate">
           <a:avLst/>
@@ -7027,12 +6732,12 @@
         </a:fontRef>
       </dsp:style>
       <dsp:txBody>
-        <a:bodyPr spcFirstLastPara="0" vert="horz" wrap="square" lIns="149933" tIns="60960" rIns="113792" bIns="60960" numCol="1" spcCol="1270" anchor="ctr" anchorCtr="0">
+        <a:bodyPr spcFirstLastPara="0" vert="horz" wrap="square" lIns="238551" tIns="99060" rIns="184912" bIns="99060" numCol="1" spcCol="1270" anchor="ctr" anchorCtr="0">
           <a:noAutofit/>
         </a:bodyPr>
         <a:lstStyle/>
         <a:p>
-          <a:pPr lvl="0" algn="ctr" defTabSz="711200">
+          <a:pPr lvl="0" algn="ctr" defTabSz="1155700">
             <a:lnSpc>
               <a:spcPct val="90000"/>
             </a:lnSpc>
@@ -7044,15 +6749,15 @@
             </a:spcAft>
           </a:pPr>
           <a:r>
-            <a:rPr lang="en-US" sz="1600" kern="1200" dirty="0" smtClean="0"/>
+            <a:rPr lang="en-US" sz="2600" kern="1200" dirty="0" smtClean="0"/>
             <a:t> Command</a:t>
           </a:r>
-          <a:endParaRPr lang="en-US" sz="1600" kern="1200" dirty="0"/>
+          <a:endParaRPr lang="en-US" sz="2600" kern="1200" dirty="0"/>
         </a:p>
       </dsp:txBody>
       <dsp:txXfrm rot="10800000">
-        <a:off x="1586750" y="442071"/>
-        <a:ext cx="5539702" cy="340005"/>
+        <a:off x="1687230" y="702696"/>
+        <a:ext cx="5489462" cy="540965"/>
       </dsp:txXfrm>
     </dsp:sp>
     <dsp:sp modelId="{A7B013B6-E598-4143-8859-9D9974156C11}">
@@ -7062,8 +6767,8 @@
       </dsp:nvSpPr>
       <dsp:spPr>
         <a:xfrm>
-          <a:off x="1331747" y="442071"/>
-          <a:ext cx="340005" cy="340005"/>
+          <a:off x="1281507" y="702696"/>
+          <a:ext cx="540965" cy="540965"/>
         </a:xfrm>
         <a:prstGeom prst="ellipse">
           <a:avLst/>
@@ -7110,8 +6815,8 @@
       </dsp:nvSpPr>
       <dsp:spPr>
         <a:xfrm rot="10800000">
-          <a:off x="1501749" y="883571"/>
-          <a:ext cx="5624703" cy="340005"/>
+          <a:off x="1551989" y="1405144"/>
+          <a:ext cx="5624703" cy="540965"/>
         </a:xfrm>
         <a:prstGeom prst="homePlate">
           <a:avLst/>
@@ -7152,12 +6857,12 @@
         </a:fontRef>
       </dsp:style>
       <dsp:txBody>
-        <a:bodyPr spcFirstLastPara="0" vert="horz" wrap="square" lIns="149933" tIns="60960" rIns="113792" bIns="60960" numCol="1" spcCol="1270" anchor="ctr" anchorCtr="0">
+        <a:bodyPr spcFirstLastPara="0" vert="horz" wrap="square" lIns="238551" tIns="99060" rIns="184912" bIns="99060" numCol="1" spcCol="1270" anchor="ctr" anchorCtr="0">
           <a:noAutofit/>
         </a:bodyPr>
         <a:lstStyle/>
         <a:p>
-          <a:pPr lvl="0" algn="ctr" defTabSz="711200">
+          <a:pPr lvl="0" algn="ctr" defTabSz="1155700">
             <a:lnSpc>
               <a:spcPct val="90000"/>
             </a:lnSpc>
@@ -7169,15 +6874,15 @@
             </a:spcAft>
           </a:pPr>
           <a:r>
-            <a:rPr lang="en-US" sz="1600" kern="1200" dirty="0" smtClean="0"/>
+            <a:rPr lang="en-US" sz="2600" kern="1200" dirty="0" smtClean="0"/>
             <a:t>Interpreter</a:t>
           </a:r>
-          <a:endParaRPr lang="en-US" sz="1600" kern="1200" dirty="0"/>
+          <a:endParaRPr lang="en-US" sz="2600" kern="1200" dirty="0"/>
         </a:p>
       </dsp:txBody>
       <dsp:txXfrm rot="10800000">
-        <a:off x="1586750" y="883571"/>
-        <a:ext cx="5539702" cy="340005"/>
+        <a:off x="1687230" y="1405144"/>
+        <a:ext cx="5489462" cy="540965"/>
       </dsp:txXfrm>
     </dsp:sp>
     <dsp:sp modelId="{C73195EA-CB97-4458-9C93-1CD410DA78C6}">
@@ -7187,8 +6892,8 @@
       </dsp:nvSpPr>
       <dsp:spPr>
         <a:xfrm>
-          <a:off x="1331747" y="883571"/>
-          <a:ext cx="340005" cy="340005"/>
+          <a:off x="1281507" y="1405144"/>
+          <a:ext cx="540965" cy="540965"/>
         </a:xfrm>
         <a:prstGeom prst="ellipse">
           <a:avLst/>
@@ -7235,8 +6940,8 @@
       </dsp:nvSpPr>
       <dsp:spPr>
         <a:xfrm rot="10800000">
-          <a:off x="1501749" y="1325071"/>
-          <a:ext cx="5624703" cy="340005"/>
+          <a:off x="1551989" y="2107592"/>
+          <a:ext cx="5624703" cy="540965"/>
         </a:xfrm>
         <a:prstGeom prst="homePlate">
           <a:avLst/>
@@ -7277,12 +6982,12 @@
         </a:fontRef>
       </dsp:style>
       <dsp:txBody>
-        <a:bodyPr spcFirstLastPara="0" vert="horz" wrap="square" lIns="149933" tIns="60960" rIns="113792" bIns="60960" numCol="1" spcCol="1270" anchor="ctr" anchorCtr="0">
+        <a:bodyPr spcFirstLastPara="0" vert="horz" wrap="square" lIns="238551" tIns="99060" rIns="184912" bIns="99060" numCol="1" spcCol="1270" anchor="ctr" anchorCtr="0">
           <a:noAutofit/>
         </a:bodyPr>
         <a:lstStyle/>
         <a:p>
-          <a:pPr lvl="0" algn="ctr" defTabSz="711200">
+          <a:pPr lvl="0" algn="ctr" defTabSz="1155700">
             <a:lnSpc>
               <a:spcPct val="90000"/>
             </a:lnSpc>
@@ -7294,15 +6999,15 @@
             </a:spcAft>
           </a:pPr>
           <a:r>
-            <a:rPr lang="en-US" sz="1600" kern="1200" dirty="0" smtClean="0"/>
+            <a:rPr lang="en-US" sz="2600" kern="1200" dirty="0" smtClean="0"/>
             <a:t>Iterator</a:t>
           </a:r>
-          <a:endParaRPr lang="en-US" sz="1600" kern="1200" dirty="0"/>
+          <a:endParaRPr lang="en-US" sz="2600" kern="1200" dirty="0"/>
         </a:p>
       </dsp:txBody>
       <dsp:txXfrm rot="10800000">
-        <a:off x="1586750" y="1325071"/>
-        <a:ext cx="5539702" cy="340005"/>
+        <a:off x="1687230" y="2107592"/>
+        <a:ext cx="5489462" cy="540965"/>
       </dsp:txXfrm>
     </dsp:sp>
     <dsp:sp modelId="{B93695E8-0A7A-47A1-9D19-690B35925A98}">
@@ -7312,258 +7017,8 @@
       </dsp:nvSpPr>
       <dsp:spPr>
         <a:xfrm>
-          <a:off x="1331747" y="1325071"/>
-          <a:ext cx="340005" cy="340005"/>
-        </a:xfrm>
-        <a:prstGeom prst="ellipse">
-          <a:avLst/>
-        </a:prstGeom>
-        <a:solidFill>
-          <a:schemeClr val="accent1">
-            <a:tint val="50000"/>
-            <a:hueOff val="0"/>
-            <a:satOff val="0"/>
-            <a:lumOff val="0"/>
-            <a:alphaOff val="0"/>
-          </a:schemeClr>
-        </a:solidFill>
-        <a:ln w="25400" cap="flat" cmpd="sng" algn="ctr">
-          <a:solidFill>
-            <a:schemeClr val="lt1">
-              <a:hueOff val="0"/>
-              <a:satOff val="0"/>
-              <a:lumOff val="0"/>
-              <a:alphaOff val="0"/>
-            </a:schemeClr>
-          </a:solidFill>
-          <a:prstDash val="solid"/>
-        </a:ln>
-        <a:effectLst/>
-      </dsp:spPr>
-      <dsp:style>
-        <a:lnRef idx="2">
-          <a:scrgbClr r="0" g="0" b="0"/>
-        </a:lnRef>
-        <a:fillRef idx="1">
-          <a:scrgbClr r="0" g="0" b="0"/>
-        </a:fillRef>
-        <a:effectRef idx="0">
-          <a:scrgbClr r="0" g="0" b="0"/>
-        </a:effectRef>
-        <a:fontRef idx="minor"/>
-      </dsp:style>
-    </dsp:sp>
-    <dsp:sp modelId="{3D4E6BA6-27F1-4FA1-B636-4B1CECE92945}">
-      <dsp:nvSpPr>
-        <dsp:cNvPr id="0" name=""/>
-        <dsp:cNvSpPr/>
-      </dsp:nvSpPr>
-      <dsp:spPr>
-        <a:xfrm rot="10800000">
-          <a:off x="1501749" y="1766572"/>
-          <a:ext cx="5624703" cy="340005"/>
-        </a:xfrm>
-        <a:prstGeom prst="homePlate">
-          <a:avLst/>
-        </a:prstGeom>
-        <a:solidFill>
-          <a:schemeClr val="accent1">
-            <a:hueOff val="0"/>
-            <a:satOff val="0"/>
-            <a:lumOff val="0"/>
-            <a:alphaOff val="0"/>
-          </a:schemeClr>
-        </a:solidFill>
-        <a:ln w="25400" cap="flat" cmpd="sng" algn="ctr">
-          <a:solidFill>
-            <a:schemeClr val="lt1">
-              <a:hueOff val="0"/>
-              <a:satOff val="0"/>
-              <a:lumOff val="0"/>
-              <a:alphaOff val="0"/>
-            </a:schemeClr>
-          </a:solidFill>
-          <a:prstDash val="solid"/>
-        </a:ln>
-        <a:effectLst/>
-      </dsp:spPr>
-      <dsp:style>
-        <a:lnRef idx="2">
-          <a:scrgbClr r="0" g="0" b="0"/>
-        </a:lnRef>
-        <a:fillRef idx="1">
-          <a:scrgbClr r="0" g="0" b="0"/>
-        </a:fillRef>
-        <a:effectRef idx="0">
-          <a:scrgbClr r="0" g="0" b="0"/>
-        </a:effectRef>
-        <a:fontRef idx="minor">
-          <a:schemeClr val="lt1"/>
-        </a:fontRef>
-      </dsp:style>
-      <dsp:txBody>
-        <a:bodyPr spcFirstLastPara="0" vert="horz" wrap="square" lIns="149933" tIns="60960" rIns="113792" bIns="60960" numCol="1" spcCol="1270" anchor="ctr" anchorCtr="0">
-          <a:noAutofit/>
-        </a:bodyPr>
-        <a:lstStyle/>
-        <a:p>
-          <a:pPr lvl="0" algn="ctr" defTabSz="711200">
-            <a:lnSpc>
-              <a:spcPct val="90000"/>
-            </a:lnSpc>
-            <a:spcBef>
-              <a:spcPct val="0"/>
-            </a:spcBef>
-            <a:spcAft>
-              <a:spcPct val="35000"/>
-            </a:spcAft>
-          </a:pPr>
-          <a:r>
-            <a:rPr lang="en-US" sz="1600" kern="1200" dirty="0" smtClean="0"/>
-            <a:t>Mediator</a:t>
-          </a:r>
-          <a:endParaRPr lang="en-US" sz="1600" kern="1200" dirty="0"/>
-        </a:p>
-      </dsp:txBody>
-      <dsp:txXfrm rot="10800000">
-        <a:off x="1586750" y="1766572"/>
-        <a:ext cx="5539702" cy="340005"/>
-      </dsp:txXfrm>
-    </dsp:sp>
-    <dsp:sp modelId="{6C91433B-57A2-427D-B4E5-2DFA6796A2FA}">
-      <dsp:nvSpPr>
-        <dsp:cNvPr id="0" name=""/>
-        <dsp:cNvSpPr/>
-      </dsp:nvSpPr>
-      <dsp:spPr>
-        <a:xfrm>
-          <a:off x="1331747" y="1766572"/>
-          <a:ext cx="340005" cy="340005"/>
-        </a:xfrm>
-        <a:prstGeom prst="ellipse">
-          <a:avLst/>
-        </a:prstGeom>
-        <a:solidFill>
-          <a:schemeClr val="accent1">
-            <a:tint val="50000"/>
-            <a:hueOff val="0"/>
-            <a:satOff val="0"/>
-            <a:lumOff val="0"/>
-            <a:alphaOff val="0"/>
-          </a:schemeClr>
-        </a:solidFill>
-        <a:ln w="25400" cap="flat" cmpd="sng" algn="ctr">
-          <a:solidFill>
-            <a:schemeClr val="lt1">
-              <a:hueOff val="0"/>
-              <a:satOff val="0"/>
-              <a:lumOff val="0"/>
-              <a:alphaOff val="0"/>
-            </a:schemeClr>
-          </a:solidFill>
-          <a:prstDash val="solid"/>
-        </a:ln>
-        <a:effectLst/>
-      </dsp:spPr>
-      <dsp:style>
-        <a:lnRef idx="2">
-          <a:scrgbClr r="0" g="0" b="0"/>
-        </a:lnRef>
-        <a:fillRef idx="1">
-          <a:scrgbClr r="0" g="0" b="0"/>
-        </a:fillRef>
-        <a:effectRef idx="0">
-          <a:scrgbClr r="0" g="0" b="0"/>
-        </a:effectRef>
-        <a:fontRef idx="minor"/>
-      </dsp:style>
-    </dsp:sp>
-    <dsp:sp modelId="{07159912-276E-42EB-8083-187E57580219}">
-      <dsp:nvSpPr>
-        <dsp:cNvPr id="0" name=""/>
-        <dsp:cNvSpPr/>
-      </dsp:nvSpPr>
-      <dsp:spPr>
-        <a:xfrm rot="10800000">
-          <a:off x="1501749" y="2208072"/>
-          <a:ext cx="5624703" cy="340005"/>
-        </a:xfrm>
-        <a:prstGeom prst="homePlate">
-          <a:avLst/>
-        </a:prstGeom>
-        <a:solidFill>
-          <a:schemeClr val="accent1">
-            <a:hueOff val="0"/>
-            <a:satOff val="0"/>
-            <a:lumOff val="0"/>
-            <a:alphaOff val="0"/>
-          </a:schemeClr>
-        </a:solidFill>
-        <a:ln w="25400" cap="flat" cmpd="sng" algn="ctr">
-          <a:solidFill>
-            <a:schemeClr val="lt1">
-              <a:hueOff val="0"/>
-              <a:satOff val="0"/>
-              <a:lumOff val="0"/>
-              <a:alphaOff val="0"/>
-            </a:schemeClr>
-          </a:solidFill>
-          <a:prstDash val="solid"/>
-        </a:ln>
-        <a:effectLst/>
-      </dsp:spPr>
-      <dsp:style>
-        <a:lnRef idx="2">
-          <a:scrgbClr r="0" g="0" b="0"/>
-        </a:lnRef>
-        <a:fillRef idx="1">
-          <a:scrgbClr r="0" g="0" b="0"/>
-        </a:fillRef>
-        <a:effectRef idx="0">
-          <a:scrgbClr r="0" g="0" b="0"/>
-        </a:effectRef>
-        <a:fontRef idx="minor">
-          <a:schemeClr val="lt1"/>
-        </a:fontRef>
-      </dsp:style>
-      <dsp:txBody>
-        <a:bodyPr spcFirstLastPara="0" vert="horz" wrap="square" lIns="149933" tIns="60960" rIns="113792" bIns="60960" numCol="1" spcCol="1270" anchor="ctr" anchorCtr="0">
-          <a:noAutofit/>
-        </a:bodyPr>
-        <a:lstStyle/>
-        <a:p>
-          <a:pPr lvl="0" algn="ctr" defTabSz="711200">
-            <a:lnSpc>
-              <a:spcPct val="90000"/>
-            </a:lnSpc>
-            <a:spcBef>
-              <a:spcPct val="0"/>
-            </a:spcBef>
-            <a:spcAft>
-              <a:spcPct val="35000"/>
-            </a:spcAft>
-          </a:pPr>
-          <a:r>
-            <a:rPr lang="en-US" sz="1600" kern="1200" dirty="0" smtClean="0"/>
-            <a:t>Memento</a:t>
-          </a:r>
-          <a:endParaRPr lang="en-US" sz="1600" kern="1200" dirty="0"/>
-        </a:p>
-      </dsp:txBody>
-      <dsp:txXfrm rot="10800000">
-        <a:off x="1586750" y="2208072"/>
-        <a:ext cx="5539702" cy="340005"/>
-      </dsp:txXfrm>
-    </dsp:sp>
-    <dsp:sp modelId="{52FEEC7E-241A-4DCA-9CDE-134769A1CE5C}">
-      <dsp:nvSpPr>
-        <dsp:cNvPr id="0" name=""/>
-        <dsp:cNvSpPr/>
-      </dsp:nvSpPr>
-      <dsp:spPr>
-        <a:xfrm>
-          <a:off x="1331747" y="2208072"/>
-          <a:ext cx="340005" cy="340005"/>
+          <a:off x="1281507" y="2107592"/>
+          <a:ext cx="540965" cy="540965"/>
         </a:xfrm>
         <a:prstGeom prst="ellipse">
           <a:avLst/>
@@ -7610,8 +7065,8 @@
       </dsp:nvSpPr>
       <dsp:spPr>
         <a:xfrm rot="10800000">
-          <a:off x="1501749" y="2649572"/>
-          <a:ext cx="5624703" cy="340005"/>
+          <a:off x="1551989" y="2810039"/>
+          <a:ext cx="5624703" cy="540965"/>
         </a:xfrm>
         <a:prstGeom prst="homePlate">
           <a:avLst/>
@@ -7652,12 +7107,12 @@
         </a:fontRef>
       </dsp:style>
       <dsp:txBody>
-        <a:bodyPr spcFirstLastPara="0" vert="horz" wrap="square" lIns="149933" tIns="60960" rIns="113792" bIns="60960" numCol="1" spcCol="1270" anchor="ctr" anchorCtr="0">
+        <a:bodyPr spcFirstLastPara="0" vert="horz" wrap="square" lIns="238551" tIns="99060" rIns="184912" bIns="99060" numCol="1" spcCol="1270" anchor="ctr" anchorCtr="0">
           <a:noAutofit/>
         </a:bodyPr>
         <a:lstStyle/>
         <a:p>
-          <a:pPr lvl="0" algn="ctr" defTabSz="711200">
+          <a:pPr lvl="0" algn="ctr" defTabSz="1155700">
             <a:lnSpc>
               <a:spcPct val="90000"/>
             </a:lnSpc>
@@ -7669,15 +7124,15 @@
             </a:spcAft>
           </a:pPr>
           <a:r>
-            <a:rPr lang="en-US" sz="1600" kern="1200" dirty="0" smtClean="0"/>
+            <a:rPr lang="en-US" sz="2600" kern="1200" dirty="0" smtClean="0"/>
             <a:t>Observer</a:t>
           </a:r>
-          <a:endParaRPr lang="en-US" sz="1600" kern="1200" dirty="0"/>
+          <a:endParaRPr lang="en-US" sz="2600" kern="1200" dirty="0"/>
         </a:p>
       </dsp:txBody>
       <dsp:txXfrm rot="10800000">
-        <a:off x="1586750" y="2649572"/>
-        <a:ext cx="5539702" cy="340005"/>
+        <a:off x="1687230" y="2810039"/>
+        <a:ext cx="5489462" cy="540965"/>
       </dsp:txXfrm>
     </dsp:sp>
     <dsp:sp modelId="{88B3FE18-0B39-43AA-AFFC-8CA66A5D3B20}">
@@ -7687,133 +7142,8 @@
       </dsp:nvSpPr>
       <dsp:spPr>
         <a:xfrm>
-          <a:off x="1331747" y="2649572"/>
-          <a:ext cx="340005" cy="340005"/>
-        </a:xfrm>
-        <a:prstGeom prst="ellipse">
-          <a:avLst/>
-        </a:prstGeom>
-        <a:solidFill>
-          <a:schemeClr val="accent1">
-            <a:tint val="50000"/>
-            <a:hueOff val="0"/>
-            <a:satOff val="0"/>
-            <a:lumOff val="0"/>
-            <a:alphaOff val="0"/>
-          </a:schemeClr>
-        </a:solidFill>
-        <a:ln w="25400" cap="flat" cmpd="sng" algn="ctr">
-          <a:solidFill>
-            <a:schemeClr val="lt1">
-              <a:hueOff val="0"/>
-              <a:satOff val="0"/>
-              <a:lumOff val="0"/>
-              <a:alphaOff val="0"/>
-            </a:schemeClr>
-          </a:solidFill>
-          <a:prstDash val="solid"/>
-        </a:ln>
-        <a:effectLst/>
-      </dsp:spPr>
-      <dsp:style>
-        <a:lnRef idx="2">
-          <a:scrgbClr r="0" g="0" b="0"/>
-        </a:lnRef>
-        <a:fillRef idx="1">
-          <a:scrgbClr r="0" g="0" b="0"/>
-        </a:fillRef>
-        <a:effectRef idx="0">
-          <a:scrgbClr r="0" g="0" b="0"/>
-        </a:effectRef>
-        <a:fontRef idx="minor"/>
-      </dsp:style>
-    </dsp:sp>
-    <dsp:sp modelId="{2516A04B-4C41-4EE1-B19A-C2B7F77237DC}">
-      <dsp:nvSpPr>
-        <dsp:cNvPr id="0" name=""/>
-        <dsp:cNvSpPr/>
-      </dsp:nvSpPr>
-      <dsp:spPr>
-        <a:xfrm rot="10800000">
-          <a:off x="1501749" y="3091072"/>
-          <a:ext cx="5624703" cy="340005"/>
-        </a:xfrm>
-        <a:prstGeom prst="homePlate">
-          <a:avLst/>
-        </a:prstGeom>
-        <a:solidFill>
-          <a:schemeClr val="accent1">
-            <a:hueOff val="0"/>
-            <a:satOff val="0"/>
-            <a:lumOff val="0"/>
-            <a:alphaOff val="0"/>
-          </a:schemeClr>
-        </a:solidFill>
-        <a:ln w="25400" cap="flat" cmpd="sng" algn="ctr">
-          <a:solidFill>
-            <a:schemeClr val="lt1">
-              <a:hueOff val="0"/>
-              <a:satOff val="0"/>
-              <a:lumOff val="0"/>
-              <a:alphaOff val="0"/>
-            </a:schemeClr>
-          </a:solidFill>
-          <a:prstDash val="solid"/>
-        </a:ln>
-        <a:effectLst/>
-      </dsp:spPr>
-      <dsp:style>
-        <a:lnRef idx="2">
-          <a:scrgbClr r="0" g="0" b="0"/>
-        </a:lnRef>
-        <a:fillRef idx="1">
-          <a:scrgbClr r="0" g="0" b="0"/>
-        </a:fillRef>
-        <a:effectRef idx="0">
-          <a:scrgbClr r="0" g="0" b="0"/>
-        </a:effectRef>
-        <a:fontRef idx="minor">
-          <a:schemeClr val="lt1"/>
-        </a:fontRef>
-      </dsp:style>
-      <dsp:txBody>
-        <a:bodyPr spcFirstLastPara="0" vert="horz" wrap="square" lIns="149933" tIns="60960" rIns="113792" bIns="60960" numCol="1" spcCol="1270" anchor="ctr" anchorCtr="0">
-          <a:noAutofit/>
-        </a:bodyPr>
-        <a:lstStyle/>
-        <a:p>
-          <a:pPr lvl="0" algn="ctr" defTabSz="711200">
-            <a:lnSpc>
-              <a:spcPct val="90000"/>
-            </a:lnSpc>
-            <a:spcBef>
-              <a:spcPct val="0"/>
-            </a:spcBef>
-            <a:spcAft>
-              <a:spcPct val="35000"/>
-            </a:spcAft>
-          </a:pPr>
-          <a:r>
-            <a:rPr lang="en-US" sz="1600" kern="1200" dirty="0" smtClean="0"/>
-            <a:t>State</a:t>
-          </a:r>
-          <a:endParaRPr lang="en-US" sz="1600" kern="1200" dirty="0"/>
-        </a:p>
-      </dsp:txBody>
-      <dsp:txXfrm rot="10800000">
-        <a:off x="1586750" y="3091072"/>
-        <a:ext cx="5539702" cy="340005"/>
-      </dsp:txXfrm>
-    </dsp:sp>
-    <dsp:sp modelId="{DC245991-AA9E-4875-BB32-E19A10EEE7BB}">
-      <dsp:nvSpPr>
-        <dsp:cNvPr id="0" name=""/>
-        <dsp:cNvSpPr/>
-      </dsp:nvSpPr>
-      <dsp:spPr>
-        <a:xfrm>
-          <a:off x="1331747" y="3091072"/>
-          <a:ext cx="340005" cy="340005"/>
+          <a:off x="1281507" y="2810039"/>
+          <a:ext cx="540965" cy="540965"/>
         </a:xfrm>
         <a:prstGeom prst="ellipse">
           <a:avLst/>
@@ -7860,8 +7190,8 @@
       </dsp:nvSpPr>
       <dsp:spPr>
         <a:xfrm rot="10800000">
-          <a:off x="1501749" y="3532572"/>
-          <a:ext cx="5624703" cy="340005"/>
+          <a:off x="1551989" y="3512487"/>
+          <a:ext cx="5624703" cy="540965"/>
         </a:xfrm>
         <a:prstGeom prst="homePlate">
           <a:avLst/>
@@ -7902,12 +7232,12 @@
         </a:fontRef>
       </dsp:style>
       <dsp:txBody>
-        <a:bodyPr spcFirstLastPara="0" vert="horz" wrap="square" lIns="149933" tIns="60960" rIns="113792" bIns="60960" numCol="1" spcCol="1270" anchor="ctr" anchorCtr="0">
+        <a:bodyPr spcFirstLastPara="0" vert="horz" wrap="square" lIns="238551" tIns="99060" rIns="184912" bIns="99060" numCol="1" spcCol="1270" anchor="ctr" anchorCtr="0">
           <a:noAutofit/>
         </a:bodyPr>
         <a:lstStyle/>
         <a:p>
-          <a:pPr lvl="0" algn="ctr" defTabSz="711200">
+          <a:pPr lvl="0" algn="ctr" defTabSz="1155700">
             <a:lnSpc>
               <a:spcPct val="90000"/>
             </a:lnSpc>
@@ -7919,15 +7249,15 @@
             </a:spcAft>
           </a:pPr>
           <a:r>
-            <a:rPr lang="en-US" sz="1600" kern="1200" dirty="0" smtClean="0"/>
+            <a:rPr lang="en-US" sz="2600" kern="1200" dirty="0" smtClean="0"/>
             <a:t>Strategy</a:t>
           </a:r>
-          <a:endParaRPr lang="en-US" sz="1600" kern="1200" dirty="0"/>
+          <a:endParaRPr lang="en-US" sz="2600" kern="1200" dirty="0"/>
         </a:p>
       </dsp:txBody>
       <dsp:txXfrm rot="10800000">
-        <a:off x="1586750" y="3532572"/>
-        <a:ext cx="5539702" cy="340005"/>
+        <a:off x="1687230" y="3512487"/>
+        <a:ext cx="5489462" cy="540965"/>
       </dsp:txXfrm>
     </dsp:sp>
     <dsp:sp modelId="{13FAD4E5-2420-49E9-9462-FBF7DD908FF1}">
@@ -7937,8 +7267,8 @@
       </dsp:nvSpPr>
       <dsp:spPr>
         <a:xfrm>
-          <a:off x="1331747" y="3532572"/>
-          <a:ext cx="340005" cy="340005"/>
+          <a:off x="1281507" y="3512487"/>
+          <a:ext cx="540965" cy="540965"/>
         </a:xfrm>
         <a:prstGeom prst="ellipse">
           <a:avLst/>
@@ -7978,15 +7308,15 @@
         <a:fontRef idx="minor"/>
       </dsp:style>
     </dsp:sp>
-    <dsp:sp modelId="{10E05AE9-C755-4B89-B80F-6821000F6D86}">
+    <dsp:sp modelId="{24C8095E-364B-47DE-9642-0E5B54B5FD87}">
       <dsp:nvSpPr>
         <dsp:cNvPr id="0" name=""/>
         <dsp:cNvSpPr/>
       </dsp:nvSpPr>
       <dsp:spPr>
         <a:xfrm rot="10800000">
-          <a:off x="1501749" y="3974072"/>
-          <a:ext cx="5624703" cy="340005"/>
+          <a:off x="1551989" y="4214935"/>
+          <a:ext cx="5624703" cy="540965"/>
         </a:xfrm>
         <a:prstGeom prst="homePlate">
           <a:avLst/>
@@ -8027,12 +7357,12 @@
         </a:fontRef>
       </dsp:style>
       <dsp:txBody>
-        <a:bodyPr spcFirstLastPara="0" vert="horz" wrap="square" lIns="149933" tIns="60960" rIns="113792" bIns="60960" numCol="1" spcCol="1270" anchor="ctr" anchorCtr="0">
+        <a:bodyPr spcFirstLastPara="0" vert="horz" wrap="square" lIns="238551" tIns="99060" rIns="184912" bIns="99060" numCol="1" spcCol="1270" anchor="ctr" anchorCtr="0">
           <a:noAutofit/>
         </a:bodyPr>
         <a:lstStyle/>
         <a:p>
-          <a:pPr lvl="0" algn="ctr" defTabSz="711200">
+          <a:pPr lvl="0" algn="ctr" defTabSz="1155700">
             <a:lnSpc>
               <a:spcPct val="90000"/>
             </a:lnSpc>
@@ -8044,151 +7374,26 @@
             </a:spcAft>
           </a:pPr>
           <a:r>
-            <a:rPr lang="en-US" sz="1600" kern="1200" dirty="0" smtClean="0"/>
-            <a:t>Template Method</a:t>
+            <a:rPr lang="en-US" sz="2600" kern="1200" dirty="0" smtClean="0"/>
+            <a:t>…</a:t>
           </a:r>
-          <a:endParaRPr lang="en-US" sz="1600" kern="1200" dirty="0"/>
+          <a:endParaRPr lang="en-US" sz="2600" kern="1200" dirty="0"/>
         </a:p>
       </dsp:txBody>
       <dsp:txXfrm rot="10800000">
-        <a:off x="1586750" y="3974072"/>
-        <a:ext cx="5539702" cy="340005"/>
+        <a:off x="1687230" y="4214935"/>
+        <a:ext cx="5489462" cy="540965"/>
       </dsp:txXfrm>
     </dsp:sp>
-    <dsp:sp modelId="{A3D2E2B6-E218-459F-B528-73A4A0C2E649}">
+    <dsp:sp modelId="{72E85A79-F72A-44C5-B601-7E3F5E926880}">
       <dsp:nvSpPr>
         <dsp:cNvPr id="0" name=""/>
         <dsp:cNvSpPr/>
       </dsp:nvSpPr>
       <dsp:spPr>
         <a:xfrm>
-          <a:off x="1331747" y="3974072"/>
-          <a:ext cx="340005" cy="340005"/>
-        </a:xfrm>
-        <a:prstGeom prst="ellipse">
-          <a:avLst/>
-        </a:prstGeom>
-        <a:solidFill>
-          <a:schemeClr val="accent1">
-            <a:tint val="50000"/>
-            <a:hueOff val="0"/>
-            <a:satOff val="0"/>
-            <a:lumOff val="0"/>
-            <a:alphaOff val="0"/>
-          </a:schemeClr>
-        </a:solidFill>
-        <a:ln w="25400" cap="flat" cmpd="sng" algn="ctr">
-          <a:solidFill>
-            <a:schemeClr val="lt1">
-              <a:hueOff val="0"/>
-              <a:satOff val="0"/>
-              <a:lumOff val="0"/>
-              <a:alphaOff val="0"/>
-            </a:schemeClr>
-          </a:solidFill>
-          <a:prstDash val="solid"/>
-        </a:ln>
-        <a:effectLst/>
-      </dsp:spPr>
-      <dsp:style>
-        <a:lnRef idx="2">
-          <a:scrgbClr r="0" g="0" b="0"/>
-        </a:lnRef>
-        <a:fillRef idx="1">
-          <a:scrgbClr r="0" g="0" b="0"/>
-        </a:fillRef>
-        <a:effectRef idx="0">
-          <a:scrgbClr r="0" g="0" b="0"/>
-        </a:effectRef>
-        <a:fontRef idx="minor"/>
-      </dsp:style>
-    </dsp:sp>
-    <dsp:sp modelId="{2E3CEB46-780E-4CF9-9719-B491FE1B9C61}">
-      <dsp:nvSpPr>
-        <dsp:cNvPr id="0" name=""/>
-        <dsp:cNvSpPr/>
-      </dsp:nvSpPr>
-      <dsp:spPr>
-        <a:xfrm rot="10800000">
-          <a:off x="1501749" y="4415572"/>
-          <a:ext cx="5624703" cy="340005"/>
-        </a:xfrm>
-        <a:prstGeom prst="homePlate">
-          <a:avLst/>
-        </a:prstGeom>
-        <a:solidFill>
-          <a:schemeClr val="accent1">
-            <a:hueOff val="0"/>
-            <a:satOff val="0"/>
-            <a:lumOff val="0"/>
-            <a:alphaOff val="0"/>
-          </a:schemeClr>
-        </a:solidFill>
-        <a:ln w="25400" cap="flat" cmpd="sng" algn="ctr">
-          <a:solidFill>
-            <a:schemeClr val="lt1">
-              <a:hueOff val="0"/>
-              <a:satOff val="0"/>
-              <a:lumOff val="0"/>
-              <a:alphaOff val="0"/>
-            </a:schemeClr>
-          </a:solidFill>
-          <a:prstDash val="solid"/>
-        </a:ln>
-        <a:effectLst/>
-      </dsp:spPr>
-      <dsp:style>
-        <a:lnRef idx="2">
-          <a:scrgbClr r="0" g="0" b="0"/>
-        </a:lnRef>
-        <a:fillRef idx="1">
-          <a:scrgbClr r="0" g="0" b="0"/>
-        </a:fillRef>
-        <a:effectRef idx="0">
-          <a:scrgbClr r="0" g="0" b="0"/>
-        </a:effectRef>
-        <a:fontRef idx="minor">
-          <a:schemeClr val="lt1"/>
-        </a:fontRef>
-      </dsp:style>
-      <dsp:txBody>
-        <a:bodyPr spcFirstLastPara="0" vert="horz" wrap="square" lIns="149933" tIns="60960" rIns="113792" bIns="60960" numCol="1" spcCol="1270" anchor="ctr" anchorCtr="0">
-          <a:noAutofit/>
-        </a:bodyPr>
-        <a:lstStyle/>
-        <a:p>
-          <a:pPr lvl="0" algn="ctr" defTabSz="711200">
-            <a:lnSpc>
-              <a:spcPct val="90000"/>
-            </a:lnSpc>
-            <a:spcBef>
-              <a:spcPct val="0"/>
-            </a:spcBef>
-            <a:spcAft>
-              <a:spcPct val="35000"/>
-            </a:spcAft>
-          </a:pPr>
-          <a:r>
-            <a:rPr lang="en-US" sz="1600" kern="1200" dirty="0" smtClean="0"/>
-            <a:t>Visitor</a:t>
-          </a:r>
-          <a:endParaRPr lang="en-US" sz="1600" kern="1200" dirty="0"/>
-        </a:p>
-      </dsp:txBody>
-      <dsp:txXfrm rot="10800000">
-        <a:off x="1586750" y="4415572"/>
-        <a:ext cx="5539702" cy="340005"/>
-      </dsp:txXfrm>
-    </dsp:sp>
-    <dsp:sp modelId="{AA1295BC-093F-482B-8FDB-60167ED18EBC}">
-      <dsp:nvSpPr>
-        <dsp:cNvPr id="0" name=""/>
-        <dsp:cNvSpPr/>
-      </dsp:nvSpPr>
-      <dsp:spPr>
-        <a:xfrm>
-          <a:off x="1331747" y="4415572"/>
-          <a:ext cx="340005" cy="340005"/>
+          <a:off x="1281507" y="4214935"/>
+          <a:ext cx="540965" cy="540965"/>
         </a:xfrm>
         <a:prstGeom prst="ellipse">
           <a:avLst/>
@@ -14751,7 +13956,7 @@
             <a:fld id="{559C4A52-4ACF-44E6-B7A9-3756997F58DA}" type="slidenum">
               <a:rPr lang="en-US" smtClean="0"/>
               <a:pPr/>
-              <a:t>13</a:t>
+              <a:t>12</a:t>
             </a:fld>
             <a:endParaRPr lang="en-US"/>
           </a:p>
@@ -18402,10 +17607,36 @@
           <a:lstStyle/>
           <a:p>
             <a:r>
-              <a:rPr lang="en-US" b="1" dirty="0"/>
-              <a:t>Behavioral</a:t>
+              <a:rPr lang="en-US" dirty="0" smtClean="0"/>
+              <a:t>Practice</a:t>
             </a:r>
             <a:endParaRPr lang="en-US" dirty="0"/>
+          </a:p>
+        </p:txBody>
+      </p:sp>
+      <p:sp>
+        <p:nvSpPr>
+          <p:cNvPr id="3" name="Content Placeholder 2"/>
+          <p:cNvSpPr>
+            <a:spLocks noGrp="1"/>
+          </p:cNvSpPr>
+          <p:nvPr>
+            <p:ph idx="1"/>
+          </p:nvPr>
+        </p:nvSpPr>
+        <p:spPr/>
+        <p:txBody>
+          <a:bodyPr/>
+          <a:lstStyle/>
+          <a:p>
+            <a:pPr marL="0" indent="0" algn="ctr">
+              <a:buNone/>
+            </a:pPr>
+            <a:r>
+              <a:rPr lang="en-US" sz="8800" dirty="0" err="1" smtClean="0"/>
+              <a:t>DoJo</a:t>
+            </a:r>
+            <a:endParaRPr lang="en-US" sz="8800" dirty="0"/>
           </a:p>
         </p:txBody>
       </p:sp>
@@ -18456,173 +17687,6 @@
           </a:p>
         </p:txBody>
       </p:sp>
-      <p:graphicFrame>
-        <p:nvGraphicFramePr>
-          <p:cNvPr id="6" name="Content Placeholder 6"/>
-          <p:cNvGraphicFramePr>
-            <a:graphicFrameLocks noGrp="1"/>
-          </p:cNvGraphicFramePr>
-          <p:nvPr>
-            <p:ph idx="1"/>
-            <p:extLst>
-              <p:ext uri="{D42A27DB-BD31-4B8C-83A1-F6EECF244321}">
-                <p14:modId xmlns:p14="http://schemas.microsoft.com/office/powerpoint/2010/main" val="3953584155"/>
-              </p:ext>
-            </p:extLst>
-          </p:nvPr>
-        </p:nvGraphicFramePr>
-        <p:xfrm>
-          <a:off x="457200" y="1600200"/>
-          <a:ext cx="8458200" cy="4756150"/>
-        </p:xfrm>
-        <a:graphic>
-          <a:graphicData uri="http://schemas.openxmlformats.org/drawingml/2006/diagram">
-            <dgm:relIds xmlns:dgm="http://schemas.openxmlformats.org/drawingml/2006/diagram" xmlns:r="http://schemas.openxmlformats.org/officeDocument/2006/relationships" r:dm="rId2" r:lo="rId3" r:qs="rId4" r:cs="rId5"/>
-          </a:graphicData>
-        </a:graphic>
-      </p:graphicFrame>
-    </p:spTree>
-    <p:extLst>
-      <p:ext uri="{BB962C8B-B14F-4D97-AF65-F5344CB8AC3E}">
-        <p14:creationId xmlns:p14="http://schemas.microsoft.com/office/powerpoint/2010/main" val="731809249"/>
-      </p:ext>
-    </p:extLst>
-  </p:cSld>
-  <p:clrMapOvr>
-    <a:masterClrMapping/>
-  </p:clrMapOvr>
-  <p:timing>
-    <p:tnLst>
-      <p:par>
-        <p:cTn id="1" dur="indefinite" restart="never" nodeType="tmRoot"/>
-      </p:par>
-    </p:tnLst>
-  </p:timing>
-</p:sld>
-</file>
-
-<file path=ppt/slides/slide11.xml><?xml version="1.0" encoding="utf-8"?>
-<p:sld xmlns:a="http://schemas.openxmlformats.org/drawingml/2006/main" xmlns:r="http://schemas.openxmlformats.org/officeDocument/2006/relationships" xmlns:p="http://schemas.openxmlformats.org/presentationml/2006/main">
-  <p:cSld>
-    <p:spTree>
-      <p:nvGrpSpPr>
-        <p:cNvPr id="1" name=""/>
-        <p:cNvGrpSpPr/>
-        <p:nvPr/>
-      </p:nvGrpSpPr>
-      <p:grpSpPr>
-        <a:xfrm>
-          <a:off x="0" y="0"/>
-          <a:ext cx="0" cy="0"/>
-          <a:chOff x="0" y="0"/>
-          <a:chExt cx="0" cy="0"/>
-        </a:xfrm>
-      </p:grpSpPr>
-      <p:sp>
-        <p:nvSpPr>
-          <p:cNvPr id="2" name="Title 1"/>
-          <p:cNvSpPr>
-            <a:spLocks noGrp="1"/>
-          </p:cNvSpPr>
-          <p:nvPr>
-            <p:ph type="title"/>
-          </p:nvPr>
-        </p:nvSpPr>
-        <p:spPr/>
-        <p:txBody>
-          <a:bodyPr/>
-          <a:lstStyle/>
-          <a:p>
-            <a:endParaRPr lang="en-US"/>
-          </a:p>
-        </p:txBody>
-      </p:sp>
-      <p:sp>
-        <p:nvSpPr>
-          <p:cNvPr id="3" name="Content Placeholder 2"/>
-          <p:cNvSpPr>
-            <a:spLocks noGrp="1"/>
-          </p:cNvSpPr>
-          <p:nvPr>
-            <p:ph idx="1"/>
-          </p:nvPr>
-        </p:nvSpPr>
-        <p:spPr/>
-        <p:txBody>
-          <a:bodyPr/>
-          <a:lstStyle/>
-          <a:p>
-            <a:pPr marL="0" indent="0" algn="ctr">
-              <a:buNone/>
-            </a:pPr>
-            <a:r>
-              <a:rPr lang="en-US" sz="4800" dirty="0" smtClean="0"/>
-              <a:t>Still don’t understand</a:t>
-            </a:r>
-          </a:p>
-          <a:p>
-            <a:pPr marL="0" indent="0" algn="ctr">
-              <a:buNone/>
-            </a:pPr>
-            <a:r>
-              <a:rPr lang="en-US" sz="8800" dirty="0" smtClean="0"/>
-              <a:t>Let </a:t>
-            </a:r>
-            <a:r>
-              <a:rPr lang="en-US" sz="8800" dirty="0" err="1" smtClean="0"/>
-              <a:t>DoJo</a:t>
-            </a:r>
-            <a:endParaRPr lang="en-US" sz="8800" dirty="0"/>
-          </a:p>
-        </p:txBody>
-      </p:sp>
-      <p:sp>
-        <p:nvSpPr>
-          <p:cNvPr id="4" name="Footer Placeholder 3"/>
-          <p:cNvSpPr>
-            <a:spLocks noGrp="1"/>
-          </p:cNvSpPr>
-          <p:nvPr>
-            <p:ph type="ftr" sz="quarter" idx="11"/>
-          </p:nvPr>
-        </p:nvSpPr>
-        <p:spPr/>
-        <p:txBody>
-          <a:bodyPr/>
-          <a:lstStyle/>
-          <a:p>
-            <a:r>
-              <a:rPr lang="en-US" smtClean="0"/>
-              <a:t>© Sioux 2013 | Confidential | </a:t>
-            </a:r>
-            <a:endParaRPr lang="en-US"/>
-          </a:p>
-        </p:txBody>
-      </p:sp>
-      <p:sp>
-        <p:nvSpPr>
-          <p:cNvPr id="5" name="Slide Number Placeholder 4"/>
-          <p:cNvSpPr>
-            <a:spLocks noGrp="1"/>
-          </p:cNvSpPr>
-          <p:nvPr>
-            <p:ph type="sldNum" sz="quarter" idx="12"/>
-          </p:nvPr>
-        </p:nvSpPr>
-        <p:spPr/>
-        <p:txBody>
-          <a:bodyPr/>
-          <a:lstStyle/>
-          <a:p>
-            <a:fld id="{B60E6772-B9F1-4672-903F-323A7A0E6EBD}" type="slidenum">
-              <a:rPr lang="en-US" smtClean="0"/>
-              <a:pPr/>
-              <a:t>11</a:t>
-            </a:fld>
-            <a:endParaRPr lang="en-US"/>
-          </a:p>
-        </p:txBody>
-      </p:sp>
     </p:spTree>
     <p:extLst>
       <p:ext uri="{BB962C8B-B14F-4D97-AF65-F5344CB8AC3E}">
@@ -18643,7 +17707,7 @@
 </p:sld>
 </file>
 
-<file path=ppt/slides/slide12.xml><?xml version="1.0" encoding="utf-8"?>
+<file path=ppt/slides/slide11.xml><?xml version="1.0" encoding="utf-8"?>
 <p:sld xmlns:a="http://schemas.openxmlformats.org/drawingml/2006/main" xmlns:r="http://schemas.openxmlformats.org/officeDocument/2006/relationships" xmlns:p="http://schemas.openxmlformats.org/presentationml/2006/main">
   <p:cSld>
     <p:spTree>
@@ -18794,7 +17858,7 @@
 </p:sld>
 </file>
 
-<file path=ppt/slides/slide13.xml><?xml version="1.0" encoding="utf-8"?>
+<file path=ppt/slides/slide12.xml><?xml version="1.0" encoding="utf-8"?>
 <p:sld xmlns:a="http://schemas.openxmlformats.org/drawingml/2006/main" xmlns:r="http://schemas.openxmlformats.org/officeDocument/2006/relationships" xmlns:p="http://schemas.openxmlformats.org/presentationml/2006/main">
   <p:cSld>
     <p:spTree>
@@ -18829,7 +17893,7 @@
             <a:fld id="{B60E6772-B9F1-4672-903F-323A7A0E6EBD}" type="slidenum">
               <a:rPr lang="en-GB" smtClean="0"/>
               <a:pPr/>
-              <a:t>13</a:t>
+              <a:t>12</a:t>
             </a:fld>
             <a:endParaRPr lang="en-GB"/>
           </a:p>
@@ -19902,131 +18966,6 @@
           <a:bodyPr/>
           <a:lstStyle/>
           <a:p>
-            <a:endParaRPr lang="en-US"/>
-          </a:p>
-        </p:txBody>
-      </p:sp>
-      <p:sp>
-        <p:nvSpPr>
-          <p:cNvPr id="3" name="Content Placeholder 2"/>
-          <p:cNvSpPr>
-            <a:spLocks noGrp="1"/>
-          </p:cNvSpPr>
-          <p:nvPr>
-            <p:ph idx="1"/>
-          </p:nvPr>
-        </p:nvSpPr>
-        <p:spPr/>
-        <p:txBody>
-          <a:bodyPr/>
-          <a:lstStyle/>
-          <a:p>
-            <a:r>
-              <a:rPr lang="en-US" dirty="0" smtClean="0"/>
-              <a:t>It base on OOP concept</a:t>
-            </a:r>
-          </a:p>
-          <a:p>
-            <a:r>
-              <a:rPr lang="en-US" dirty="0" smtClean="0"/>
-              <a:t>It capture from SE experiences</a:t>
-            </a:r>
-            <a:endParaRPr lang="en-US" dirty="0"/>
-          </a:p>
-        </p:txBody>
-      </p:sp>
-      <p:sp>
-        <p:nvSpPr>
-          <p:cNvPr id="4" name="Footer Placeholder 3"/>
-          <p:cNvSpPr>
-            <a:spLocks noGrp="1"/>
-          </p:cNvSpPr>
-          <p:nvPr>
-            <p:ph type="ftr" sz="quarter" idx="11"/>
-          </p:nvPr>
-        </p:nvSpPr>
-        <p:spPr/>
-        <p:txBody>
-          <a:bodyPr/>
-          <a:lstStyle/>
-          <a:p>
-            <a:r>
-              <a:rPr lang="en-US" smtClean="0"/>
-              <a:t>© Sioux 2013 | Confidential | </a:t>
-            </a:r>
-            <a:endParaRPr lang="en-US"/>
-          </a:p>
-        </p:txBody>
-      </p:sp>
-      <p:sp>
-        <p:nvSpPr>
-          <p:cNvPr id="5" name="Slide Number Placeholder 4"/>
-          <p:cNvSpPr>
-            <a:spLocks noGrp="1"/>
-          </p:cNvSpPr>
-          <p:nvPr>
-            <p:ph type="sldNum" sz="quarter" idx="12"/>
-          </p:nvPr>
-        </p:nvSpPr>
-        <p:spPr/>
-        <p:txBody>
-          <a:bodyPr/>
-          <a:lstStyle/>
-          <a:p>
-            <a:fld id="{B60E6772-B9F1-4672-903F-323A7A0E6EBD}" type="slidenum">
-              <a:rPr lang="en-US" smtClean="0"/>
-              <a:pPr/>
-              <a:t>6</a:t>
-            </a:fld>
-            <a:endParaRPr lang="en-US"/>
-          </a:p>
-        </p:txBody>
-      </p:sp>
-    </p:spTree>
-    <p:extLst>
-      <p:ext uri="{BB962C8B-B14F-4D97-AF65-F5344CB8AC3E}">
-        <p14:creationId xmlns:p14="http://schemas.microsoft.com/office/powerpoint/2010/main" val="3612732727"/>
-      </p:ext>
-    </p:extLst>
-  </p:cSld>
-  <p:clrMapOvr>
-    <a:masterClrMapping/>
-  </p:clrMapOvr>
-</p:sld>
-</file>
-
-<file path=ppt/slides/slide7.xml><?xml version="1.0" encoding="utf-8"?>
-<p:sld xmlns:a="http://schemas.openxmlformats.org/drawingml/2006/main" xmlns:r="http://schemas.openxmlformats.org/officeDocument/2006/relationships" xmlns:p="http://schemas.openxmlformats.org/presentationml/2006/main">
-  <p:cSld>
-    <p:spTree>
-      <p:nvGrpSpPr>
-        <p:cNvPr id="1" name=""/>
-        <p:cNvGrpSpPr/>
-        <p:nvPr/>
-      </p:nvGrpSpPr>
-      <p:grpSpPr>
-        <a:xfrm>
-          <a:off x="0" y="0"/>
-          <a:ext cx="0" cy="0"/>
-          <a:chOff x="0" y="0"/>
-          <a:chExt cx="0" cy="0"/>
-        </a:xfrm>
-      </p:grpSpPr>
-      <p:sp>
-        <p:nvSpPr>
-          <p:cNvPr id="2" name="Title 1"/>
-          <p:cNvSpPr>
-            <a:spLocks noGrp="1"/>
-          </p:cNvSpPr>
-          <p:nvPr>
-            <p:ph type="title"/>
-          </p:nvPr>
-        </p:nvSpPr>
-        <p:spPr/>
-        <p:txBody>
-          <a:bodyPr/>
-          <a:lstStyle/>
-          <a:p>
             <a:r>
               <a:rPr lang="en-US" dirty="0" smtClean="0"/>
               <a:t>Type</a:t>
@@ -20101,7 +19040,7 @@
             <a:fld id="{B60E6772-B9F1-4672-903F-323A7A0E6EBD}" type="slidenum">
               <a:rPr lang="en-US" smtClean="0"/>
               <a:pPr/>
-              <a:t>7</a:t>
+              <a:t>6</a:t>
             </a:fld>
             <a:endParaRPr lang="en-US"/>
           </a:p>
@@ -20127,7 +19066,7 @@
 </p:sld>
 </file>
 
-<file path=ppt/slides/slide8.xml><?xml version="1.0" encoding="utf-8"?>
+<file path=ppt/slides/slide7.xml><?xml version="1.0" encoding="utf-8"?>
 <p:sld xmlns:a="http://schemas.openxmlformats.org/drawingml/2006/main" xmlns:r="http://schemas.openxmlformats.org/officeDocument/2006/relationships" xmlns:p="http://schemas.openxmlformats.org/presentationml/2006/main">
   <p:cSld>
     <p:spTree>
@@ -20233,7 +19172,7 @@
             <a:fld id="{B60E6772-B9F1-4672-903F-323A7A0E6EBD}" type="slidenum">
               <a:rPr lang="en-US" smtClean="0"/>
               <a:pPr/>
-              <a:t>8</a:t>
+              <a:t>7</a:t>
             </a:fld>
             <a:endParaRPr lang="en-US"/>
           </a:p>
@@ -20259,7 +19198,7 @@
 </p:sld>
 </file>
 
-<file path=ppt/slides/slide9.xml><?xml version="1.0" encoding="utf-8"?>
+<file path=ppt/slides/slide8.xml><?xml version="1.0" encoding="utf-8"?>
 <p:sld xmlns:a="http://schemas.openxmlformats.org/drawingml/2006/main" xmlns:r="http://schemas.openxmlformats.org/officeDocument/2006/relationships" xmlns:p="http://schemas.openxmlformats.org/presentationml/2006/main">
   <p:cSld>
     <p:spTree>
@@ -20340,7 +19279,7 @@
             <a:fld id="{B60E6772-B9F1-4672-903F-323A7A0E6EBD}" type="slidenum">
               <a:rPr lang="en-US" smtClean="0"/>
               <a:pPr/>
-              <a:t>9</a:t>
+              <a:t>8</a:t>
             </a:fld>
             <a:endParaRPr lang="en-US"/>
           </a:p>
@@ -20375,6 +19314,138 @@
     <p:extLst>
       <p:ext uri="{BB962C8B-B14F-4D97-AF65-F5344CB8AC3E}">
         <p14:creationId xmlns:p14="http://schemas.microsoft.com/office/powerpoint/2010/main" val="3948523363"/>
+      </p:ext>
+    </p:extLst>
+  </p:cSld>
+  <p:clrMapOvr>
+    <a:masterClrMapping/>
+  </p:clrMapOvr>
+  <p:timing>
+    <p:tnLst>
+      <p:par>
+        <p:cTn id="1" dur="indefinite" restart="never" nodeType="tmRoot"/>
+      </p:par>
+    </p:tnLst>
+  </p:timing>
+</p:sld>
+</file>
+
+<file path=ppt/slides/slide9.xml><?xml version="1.0" encoding="utf-8"?>
+<p:sld xmlns:a="http://schemas.openxmlformats.org/drawingml/2006/main" xmlns:r="http://schemas.openxmlformats.org/officeDocument/2006/relationships" xmlns:p="http://schemas.openxmlformats.org/presentationml/2006/main">
+  <p:cSld>
+    <p:spTree>
+      <p:nvGrpSpPr>
+        <p:cNvPr id="1" name=""/>
+        <p:cNvGrpSpPr/>
+        <p:nvPr/>
+      </p:nvGrpSpPr>
+      <p:grpSpPr>
+        <a:xfrm>
+          <a:off x="0" y="0"/>
+          <a:ext cx="0" cy="0"/>
+          <a:chOff x="0" y="0"/>
+          <a:chExt cx="0" cy="0"/>
+        </a:xfrm>
+      </p:grpSpPr>
+      <p:sp>
+        <p:nvSpPr>
+          <p:cNvPr id="2" name="Title 1"/>
+          <p:cNvSpPr>
+            <a:spLocks noGrp="1"/>
+          </p:cNvSpPr>
+          <p:nvPr>
+            <p:ph type="title"/>
+          </p:nvPr>
+        </p:nvSpPr>
+        <p:spPr/>
+        <p:txBody>
+          <a:bodyPr/>
+          <a:lstStyle/>
+          <a:p>
+            <a:r>
+              <a:rPr lang="en-US" b="1" dirty="0"/>
+              <a:t>Behavioral</a:t>
+            </a:r>
+            <a:endParaRPr lang="en-US" dirty="0"/>
+          </a:p>
+        </p:txBody>
+      </p:sp>
+      <p:sp>
+        <p:nvSpPr>
+          <p:cNvPr id="4" name="Footer Placeholder 3"/>
+          <p:cNvSpPr>
+            <a:spLocks noGrp="1"/>
+          </p:cNvSpPr>
+          <p:nvPr>
+            <p:ph type="ftr" sz="quarter" idx="11"/>
+          </p:nvPr>
+        </p:nvSpPr>
+        <p:spPr/>
+        <p:txBody>
+          <a:bodyPr/>
+          <a:lstStyle/>
+          <a:p>
+            <a:r>
+              <a:rPr lang="en-US" smtClean="0"/>
+              <a:t>© Sioux 2013 | Confidential | </a:t>
+            </a:r>
+            <a:endParaRPr lang="en-US"/>
+          </a:p>
+        </p:txBody>
+      </p:sp>
+      <p:sp>
+        <p:nvSpPr>
+          <p:cNvPr id="5" name="Slide Number Placeholder 4"/>
+          <p:cNvSpPr>
+            <a:spLocks noGrp="1"/>
+          </p:cNvSpPr>
+          <p:nvPr>
+            <p:ph type="sldNum" sz="quarter" idx="12"/>
+          </p:nvPr>
+        </p:nvSpPr>
+        <p:spPr/>
+        <p:txBody>
+          <a:bodyPr/>
+          <a:lstStyle/>
+          <a:p>
+            <a:fld id="{B60E6772-B9F1-4672-903F-323A7A0E6EBD}" type="slidenum">
+              <a:rPr lang="en-US" smtClean="0"/>
+              <a:pPr/>
+              <a:t>9</a:t>
+            </a:fld>
+            <a:endParaRPr lang="en-US"/>
+          </a:p>
+        </p:txBody>
+      </p:sp>
+      <p:graphicFrame>
+        <p:nvGraphicFramePr>
+          <p:cNvPr id="6" name="Content Placeholder 6"/>
+          <p:cNvGraphicFramePr>
+            <a:graphicFrameLocks noGrp="1"/>
+          </p:cNvGraphicFramePr>
+          <p:nvPr>
+            <p:ph idx="1"/>
+            <p:extLst>
+              <p:ext uri="{D42A27DB-BD31-4B8C-83A1-F6EECF244321}">
+                <p14:modId xmlns:p14="http://schemas.microsoft.com/office/powerpoint/2010/main" val="3254462594"/>
+              </p:ext>
+            </p:extLst>
+          </p:nvPr>
+        </p:nvGraphicFramePr>
+        <p:xfrm>
+          <a:off x="457200" y="1600200"/>
+          <a:ext cx="8458200" cy="4756150"/>
+        </p:xfrm>
+        <a:graphic>
+          <a:graphicData uri="http://schemas.openxmlformats.org/drawingml/2006/diagram">
+            <dgm:relIds xmlns:dgm="http://schemas.openxmlformats.org/drawingml/2006/diagram" xmlns:r="http://schemas.openxmlformats.org/officeDocument/2006/relationships" r:dm="rId2" r:lo="rId3" r:qs="rId4" r:cs="rId5"/>
+          </a:graphicData>
+        </a:graphic>
+      </p:graphicFrame>
+    </p:spTree>
+    <p:extLst>
+      <p:ext uri="{BB962C8B-B14F-4D97-AF65-F5344CB8AC3E}">
+        <p14:creationId xmlns:p14="http://schemas.microsoft.com/office/powerpoint/2010/main" val="731809249"/>
       </p:ext>
     </p:extLst>
   </p:cSld>

</xml_diff>

<commit_message>
Edit ppt - add some design pattern
</commit_message>
<xml_diff>
--- a/doc/Lecture 5 - 2015.09.26 Design Pattern.pptx
+++ b/doc/Lecture 5 - 2015.09.26 Design Pattern.pptx
@@ -5,10 +5,10 @@
     <p:sldMasterId id="2147483648" r:id="rId1"/>
   </p:sldMasterIdLst>
   <p:notesMasterIdLst>
-    <p:notesMasterId r:id="rId14"/>
+    <p:notesMasterId r:id="rId25"/>
   </p:notesMasterIdLst>
   <p:handoutMasterIdLst>
-    <p:handoutMasterId r:id="rId15"/>
+    <p:handoutMasterId r:id="rId26"/>
   </p:handoutMasterIdLst>
   <p:sldIdLst>
     <p:sldId id="259" r:id="rId2"/>
@@ -21,8 +21,19 @@
     <p:sldId id="327" r:id="rId9"/>
     <p:sldId id="328" r:id="rId10"/>
     <p:sldId id="323" r:id="rId11"/>
-    <p:sldId id="317" r:id="rId12"/>
-    <p:sldId id="316" r:id="rId13"/>
+    <p:sldId id="329" r:id="rId12"/>
+    <p:sldId id="330" r:id="rId13"/>
+    <p:sldId id="331" r:id="rId14"/>
+    <p:sldId id="333" r:id="rId15"/>
+    <p:sldId id="334" r:id="rId16"/>
+    <p:sldId id="336" r:id="rId17"/>
+    <p:sldId id="337" r:id="rId18"/>
+    <p:sldId id="338" r:id="rId19"/>
+    <p:sldId id="335" r:id="rId20"/>
+    <p:sldId id="339" r:id="rId21"/>
+    <p:sldId id="340" r:id="rId22"/>
+    <p:sldId id="317" r:id="rId23"/>
+    <p:sldId id="316" r:id="rId24"/>
   </p:sldIdLst>
   <p:sldSz cx="9144000" cy="6858000" type="screen4x3"/>
   <p:notesSz cx="6858000" cy="9144000"/>
@@ -4721,21 +4732,21 @@
     </dgm:pt>
   </dgm:ptLst>
   <dgm:cxnLst>
-    <dgm:cxn modelId="{16F30B3B-3FB9-4D78-94AE-228C9DA73EAB}" type="presOf" srcId="{D271A796-3E87-43D8-84A8-1B6B39DF2595}" destId="{712A02A0-0414-49B8-B1E0-FA035CAF9D11}" srcOrd="0" destOrd="0" presId="urn:microsoft.com/office/officeart/2005/8/layout/vList3"/>
-    <dgm:cxn modelId="{81BA0608-3E25-48D9-B105-BE5164994F5E}" type="presOf" srcId="{38C6CF7C-CFEE-40B4-896A-67650067C7E7}" destId="{24C8095E-364B-47DE-9642-0E5B54B5FD87}" srcOrd="0" destOrd="0" presId="urn:microsoft.com/office/officeart/2005/8/layout/vList3"/>
     <dgm:cxn modelId="{6D72FC6D-D1D4-46B4-A825-A7810C903114}" srcId="{8645DBF3-D766-4E9C-9509-A1AC02DA01CD}" destId="{38C6CF7C-CFEE-40B4-896A-67650067C7E7}" srcOrd="6" destOrd="0" parTransId="{588723B5-8233-4BBE-A8DC-E6F55C63D8BC}" sibTransId="{DD55D6D6-192A-4DAE-B0DC-9410F8444455}"/>
+    <dgm:cxn modelId="{62A0118C-3F53-4920-BD35-83F9E2769E39}" srcId="{8645DBF3-D766-4E9C-9509-A1AC02DA01CD}" destId="{D271A796-3E87-43D8-84A8-1B6B39DF2595}" srcOrd="5" destOrd="0" parTransId="{B8843B96-2FE6-4B2A-BCB3-A28E9B499B3A}" sibTransId="{1DB3D68B-28C7-48C7-BB93-2DC9AA4EE4ED}"/>
+    <dgm:cxn modelId="{0919CA1E-0988-4B4D-ABBD-8F7FFA81B33E}" srcId="{8645DBF3-D766-4E9C-9509-A1AC02DA01CD}" destId="{C141CADB-4A11-4B21-A555-9F8EE9EA8E97}" srcOrd="2" destOrd="0" parTransId="{6EC8685B-9EE7-479B-A9A8-35507150442D}" sibTransId="{C5871109-29F2-49C5-B8A0-992B8918BB5B}"/>
     <dgm:cxn modelId="{B334B557-68F3-4B45-8490-A0AA9267F668}" type="presOf" srcId="{891FA1E3-5D29-4888-A1F9-E5A9BEADAAA9}" destId="{3F343952-278E-4762-AD99-C388636C6902}" srcOrd="0" destOrd="0" presId="urn:microsoft.com/office/officeart/2005/8/layout/vList3"/>
-    <dgm:cxn modelId="{62A0118C-3F53-4920-BD35-83F9E2769E39}" srcId="{8645DBF3-D766-4E9C-9509-A1AC02DA01CD}" destId="{D271A796-3E87-43D8-84A8-1B6B39DF2595}" srcOrd="5" destOrd="0" parTransId="{B8843B96-2FE6-4B2A-BCB3-A28E9B499B3A}" sibTransId="{1DB3D68B-28C7-48C7-BB93-2DC9AA4EE4ED}"/>
-    <dgm:cxn modelId="{EBE2EF64-4B4A-4F28-B1B2-052D8709410D}" type="presOf" srcId="{BAC3BBE6-2CFA-44FC-85F0-0C1463E1117B}" destId="{6B3C036E-74A3-4958-A43B-D1084CE1E10D}" srcOrd="0" destOrd="0" presId="urn:microsoft.com/office/officeart/2005/8/layout/vList3"/>
-    <dgm:cxn modelId="{D2B13300-FA95-487F-A705-DF1F1DC8DA9D}" srcId="{8645DBF3-D766-4E9C-9509-A1AC02DA01CD}" destId="{0D77B6EF-510F-4577-84F0-9A7CEA31D1BF}" srcOrd="0" destOrd="0" parTransId="{D9ED720C-CE49-4851-B5F5-3DE12783D42B}" sibTransId="{C23424EB-0653-41CF-8D26-19C4BD592C08}"/>
-    <dgm:cxn modelId="{D0376C59-9AD1-469F-9132-FEB4F66AC51C}" type="presOf" srcId="{A92F1BD3-6479-4DA1-907A-F5A8C1750816}" destId="{7D4C3070-190E-4B55-80D0-A4B6FA7AEBD7}" srcOrd="0" destOrd="0" presId="urn:microsoft.com/office/officeart/2005/8/layout/vList3"/>
-    <dgm:cxn modelId="{06C57ABE-E3C7-46AE-B9DD-905C79E51B28}" type="presOf" srcId="{0D77B6EF-510F-4577-84F0-9A7CEA31D1BF}" destId="{EC613F0C-2CCE-4C4A-8A0F-097FF9013F06}" srcOrd="0" destOrd="0" presId="urn:microsoft.com/office/officeart/2005/8/layout/vList3"/>
+    <dgm:cxn modelId="{79AF6161-00CF-4AC8-B200-682B256E81D2}" srcId="{8645DBF3-D766-4E9C-9509-A1AC02DA01CD}" destId="{A92F1BD3-6479-4DA1-907A-F5A8C1750816}" srcOrd="1" destOrd="0" parTransId="{FAE1A573-58DA-497B-9D64-8D53A99198B8}" sibTransId="{7A12C82E-4B75-41F6-BEE2-BB08EDF1145C}"/>
     <dgm:cxn modelId="{96B391FA-E995-4718-9BAF-3B8D4FC42AA3}" type="presOf" srcId="{C141CADB-4A11-4B21-A555-9F8EE9EA8E97}" destId="{77C38AEC-886E-4F4F-A3B0-6840519B353A}" srcOrd="0" destOrd="0" presId="urn:microsoft.com/office/officeart/2005/8/layout/vList3"/>
-    <dgm:cxn modelId="{79AF6161-00CF-4AC8-B200-682B256E81D2}" srcId="{8645DBF3-D766-4E9C-9509-A1AC02DA01CD}" destId="{A92F1BD3-6479-4DA1-907A-F5A8C1750816}" srcOrd="1" destOrd="0" parTransId="{FAE1A573-58DA-497B-9D64-8D53A99198B8}" sibTransId="{7A12C82E-4B75-41F6-BEE2-BB08EDF1145C}"/>
-    <dgm:cxn modelId="{5F0C7B92-4A41-45E0-B666-FA92666C5D30}" srcId="{8645DBF3-D766-4E9C-9509-A1AC02DA01CD}" destId="{BAC3BBE6-2CFA-44FC-85F0-0C1463E1117B}" srcOrd="4" destOrd="0" parTransId="{78D916AE-CC58-4DA3-A7C5-FB81372A052F}" sibTransId="{6529A9CF-C828-4490-9A69-5007CD9E726D}"/>
     <dgm:cxn modelId="{4A64FDBF-1F4C-4883-A13B-FB59B4846FF2}" type="presOf" srcId="{8645DBF3-D766-4E9C-9509-A1AC02DA01CD}" destId="{F26CEA5A-689D-4105-B63A-9612EBD15CC8}" srcOrd="0" destOrd="0" presId="urn:microsoft.com/office/officeart/2005/8/layout/vList3"/>
     <dgm:cxn modelId="{E95FCC32-C3CD-4493-A753-C54473C51B68}" srcId="{8645DBF3-D766-4E9C-9509-A1AC02DA01CD}" destId="{891FA1E3-5D29-4888-A1F9-E5A9BEADAAA9}" srcOrd="3" destOrd="0" parTransId="{D279C6F3-E559-4282-862E-03FE438334A1}" sibTransId="{09D30867-ED5D-4F72-8300-A924B6B77D09}"/>
-    <dgm:cxn modelId="{0919CA1E-0988-4B4D-ABBD-8F7FFA81B33E}" srcId="{8645DBF3-D766-4E9C-9509-A1AC02DA01CD}" destId="{C141CADB-4A11-4B21-A555-9F8EE9EA8E97}" srcOrd="2" destOrd="0" parTransId="{6EC8685B-9EE7-479B-A9A8-35507150442D}" sibTransId="{C5871109-29F2-49C5-B8A0-992B8918BB5B}"/>
+    <dgm:cxn modelId="{5F0C7B92-4A41-45E0-B666-FA92666C5D30}" srcId="{8645DBF3-D766-4E9C-9509-A1AC02DA01CD}" destId="{BAC3BBE6-2CFA-44FC-85F0-0C1463E1117B}" srcOrd="4" destOrd="0" parTransId="{78D916AE-CC58-4DA3-A7C5-FB81372A052F}" sibTransId="{6529A9CF-C828-4490-9A69-5007CD9E726D}"/>
+    <dgm:cxn modelId="{EBE2EF64-4B4A-4F28-B1B2-052D8709410D}" type="presOf" srcId="{BAC3BBE6-2CFA-44FC-85F0-0C1463E1117B}" destId="{6B3C036E-74A3-4958-A43B-D1084CE1E10D}" srcOrd="0" destOrd="0" presId="urn:microsoft.com/office/officeart/2005/8/layout/vList3"/>
+    <dgm:cxn modelId="{16F30B3B-3FB9-4D78-94AE-228C9DA73EAB}" type="presOf" srcId="{D271A796-3E87-43D8-84A8-1B6B39DF2595}" destId="{712A02A0-0414-49B8-B1E0-FA035CAF9D11}" srcOrd="0" destOrd="0" presId="urn:microsoft.com/office/officeart/2005/8/layout/vList3"/>
+    <dgm:cxn modelId="{06C57ABE-E3C7-46AE-B9DD-905C79E51B28}" type="presOf" srcId="{0D77B6EF-510F-4577-84F0-9A7CEA31D1BF}" destId="{EC613F0C-2CCE-4C4A-8A0F-097FF9013F06}" srcOrd="0" destOrd="0" presId="urn:microsoft.com/office/officeart/2005/8/layout/vList3"/>
+    <dgm:cxn modelId="{D0376C59-9AD1-469F-9132-FEB4F66AC51C}" type="presOf" srcId="{A92F1BD3-6479-4DA1-907A-F5A8C1750816}" destId="{7D4C3070-190E-4B55-80D0-A4B6FA7AEBD7}" srcOrd="0" destOrd="0" presId="urn:microsoft.com/office/officeart/2005/8/layout/vList3"/>
+    <dgm:cxn modelId="{D2B13300-FA95-487F-A705-DF1F1DC8DA9D}" srcId="{8645DBF3-D766-4E9C-9509-A1AC02DA01CD}" destId="{0D77B6EF-510F-4577-84F0-9A7CEA31D1BF}" srcOrd="0" destOrd="0" parTransId="{D9ED720C-CE49-4851-B5F5-3DE12783D42B}" sibTransId="{C23424EB-0653-41CF-8D26-19C4BD592C08}"/>
+    <dgm:cxn modelId="{81BA0608-3E25-48D9-B105-BE5164994F5E}" type="presOf" srcId="{38C6CF7C-CFEE-40B4-896A-67650067C7E7}" destId="{24C8095E-364B-47DE-9642-0E5B54B5FD87}" srcOrd="0" destOrd="0" presId="urn:microsoft.com/office/officeart/2005/8/layout/vList3"/>
     <dgm:cxn modelId="{C4CAB196-CCE8-452F-9C40-FC13F73FB87F}" type="presParOf" srcId="{F26CEA5A-689D-4105-B63A-9612EBD15CC8}" destId="{1925409C-D156-40B8-B679-CAB889E882B6}" srcOrd="0" destOrd="0" presId="urn:microsoft.com/office/officeart/2005/8/layout/vList3"/>
     <dgm:cxn modelId="{222C6F31-33B6-4C76-AB05-F067612C43CA}" type="presParOf" srcId="{1925409C-D156-40B8-B679-CAB889E882B6}" destId="{61EB4A0E-E38E-4FC9-9032-C8EB8BBF1894}" srcOrd="0" destOrd="0" presId="urn:microsoft.com/office/officeart/2005/8/layout/vList3"/>
     <dgm:cxn modelId="{6A541BFF-AF82-432A-B546-7E5C2853394D}" type="presParOf" srcId="{1925409C-D156-40B8-B679-CAB889E882B6}" destId="{EC613F0C-2CCE-4C4A-8A0F-097FF9013F06}" srcOrd="1" destOrd="0" presId="urn:microsoft.com/office/officeart/2005/8/layout/vList3"/>
@@ -5034,631 +5045,6 @@
       <dsp:cNvGrpSpPr/>
     </dsp:nvGrpSpPr>
     <dsp:grpSpPr/>
-    <dsp:sp modelId="{EC613F0C-2CCE-4C4A-8A0F-097FF9013F06}">
-      <dsp:nvSpPr>
-        <dsp:cNvPr id="0" name=""/>
-        <dsp:cNvSpPr/>
-      </dsp:nvSpPr>
-      <dsp:spPr>
-        <a:xfrm rot="10800000">
-          <a:off x="1560861" y="3357"/>
-          <a:ext cx="5472684" cy="729613"/>
-        </a:xfrm>
-        <a:prstGeom prst="homePlate">
-          <a:avLst/>
-        </a:prstGeom>
-        <a:solidFill>
-          <a:schemeClr val="accent1">
-            <a:hueOff val="0"/>
-            <a:satOff val="0"/>
-            <a:lumOff val="0"/>
-            <a:alphaOff val="0"/>
-          </a:schemeClr>
-        </a:solidFill>
-        <a:ln w="25400" cap="flat" cmpd="sng" algn="ctr">
-          <a:solidFill>
-            <a:schemeClr val="lt1">
-              <a:hueOff val="0"/>
-              <a:satOff val="0"/>
-              <a:lumOff val="0"/>
-              <a:alphaOff val="0"/>
-            </a:schemeClr>
-          </a:solidFill>
-          <a:prstDash val="solid"/>
-        </a:ln>
-        <a:effectLst/>
-      </dsp:spPr>
-      <dsp:style>
-        <a:lnRef idx="2">
-          <a:scrgbClr r="0" g="0" b="0"/>
-        </a:lnRef>
-        <a:fillRef idx="1">
-          <a:scrgbClr r="0" g="0" b="0"/>
-        </a:fillRef>
-        <a:effectRef idx="0">
-          <a:scrgbClr r="0" g="0" b="0"/>
-        </a:effectRef>
-        <a:fontRef idx="minor">
-          <a:schemeClr val="lt1"/>
-        </a:fontRef>
-      </dsp:style>
-      <dsp:txBody>
-        <a:bodyPr spcFirstLastPara="0" vert="horz" wrap="square" lIns="321739" tIns="133350" rIns="248920" bIns="133350" numCol="1" spcCol="1270" anchor="ctr" anchorCtr="0">
-          <a:noAutofit/>
-        </a:bodyPr>
-        <a:lstStyle/>
-        <a:p>
-          <a:pPr lvl="0" algn="ctr" defTabSz="1555750">
-            <a:lnSpc>
-              <a:spcPct val="90000"/>
-            </a:lnSpc>
-            <a:spcBef>
-              <a:spcPct val="0"/>
-            </a:spcBef>
-            <a:spcAft>
-              <a:spcPct val="35000"/>
-            </a:spcAft>
-          </a:pPr>
-          <a:r>
-            <a:rPr lang="en-US" sz="3500" kern="1200" dirty="0" smtClean="0"/>
-            <a:t>Abstract Factory</a:t>
-          </a:r>
-          <a:endParaRPr lang="en-US" sz="3500" kern="1200" dirty="0"/>
-        </a:p>
-      </dsp:txBody>
-      <dsp:txXfrm rot="10800000">
-        <a:off x="1743264" y="3357"/>
-        <a:ext cx="5290281" cy="729613"/>
-      </dsp:txXfrm>
-    </dsp:sp>
-    <dsp:sp modelId="{61EB4A0E-E38E-4FC9-9032-C8EB8BBF1894}">
-      <dsp:nvSpPr>
-        <dsp:cNvPr id="0" name=""/>
-        <dsp:cNvSpPr/>
-      </dsp:nvSpPr>
-      <dsp:spPr>
-        <a:xfrm>
-          <a:off x="1196054" y="3357"/>
-          <a:ext cx="729613" cy="729613"/>
-        </a:xfrm>
-        <a:prstGeom prst="ellipse">
-          <a:avLst/>
-        </a:prstGeom>
-        <a:solidFill>
-          <a:schemeClr val="accent1">
-            <a:tint val="50000"/>
-            <a:hueOff val="0"/>
-            <a:satOff val="0"/>
-            <a:lumOff val="0"/>
-            <a:alphaOff val="0"/>
-          </a:schemeClr>
-        </a:solidFill>
-        <a:ln w="25400" cap="flat" cmpd="sng" algn="ctr">
-          <a:solidFill>
-            <a:schemeClr val="lt1">
-              <a:hueOff val="0"/>
-              <a:satOff val="0"/>
-              <a:lumOff val="0"/>
-              <a:alphaOff val="0"/>
-            </a:schemeClr>
-          </a:solidFill>
-          <a:prstDash val="solid"/>
-        </a:ln>
-        <a:effectLst/>
-      </dsp:spPr>
-      <dsp:style>
-        <a:lnRef idx="2">
-          <a:scrgbClr r="0" g="0" b="0"/>
-        </a:lnRef>
-        <a:fillRef idx="1">
-          <a:scrgbClr r="0" g="0" b="0"/>
-        </a:fillRef>
-        <a:effectRef idx="0">
-          <a:scrgbClr r="0" g="0" b="0"/>
-        </a:effectRef>
-        <a:fontRef idx="minor"/>
-      </dsp:style>
-    </dsp:sp>
-    <dsp:sp modelId="{7D4C3070-190E-4B55-80D0-A4B6FA7AEBD7}">
-      <dsp:nvSpPr>
-        <dsp:cNvPr id="0" name=""/>
-        <dsp:cNvSpPr/>
-      </dsp:nvSpPr>
-      <dsp:spPr>
-        <a:xfrm rot="10800000">
-          <a:off x="1560861" y="950766"/>
-          <a:ext cx="5472684" cy="729613"/>
-        </a:xfrm>
-        <a:prstGeom prst="homePlate">
-          <a:avLst/>
-        </a:prstGeom>
-        <a:solidFill>
-          <a:schemeClr val="accent1">
-            <a:hueOff val="0"/>
-            <a:satOff val="0"/>
-            <a:lumOff val="0"/>
-            <a:alphaOff val="0"/>
-          </a:schemeClr>
-        </a:solidFill>
-        <a:ln w="25400" cap="flat" cmpd="sng" algn="ctr">
-          <a:solidFill>
-            <a:schemeClr val="lt1">
-              <a:hueOff val="0"/>
-              <a:satOff val="0"/>
-              <a:lumOff val="0"/>
-              <a:alphaOff val="0"/>
-            </a:schemeClr>
-          </a:solidFill>
-          <a:prstDash val="solid"/>
-        </a:ln>
-        <a:effectLst/>
-      </dsp:spPr>
-      <dsp:style>
-        <a:lnRef idx="2">
-          <a:scrgbClr r="0" g="0" b="0"/>
-        </a:lnRef>
-        <a:fillRef idx="1">
-          <a:scrgbClr r="0" g="0" b="0"/>
-        </a:fillRef>
-        <a:effectRef idx="0">
-          <a:scrgbClr r="0" g="0" b="0"/>
-        </a:effectRef>
-        <a:fontRef idx="minor">
-          <a:schemeClr val="lt1"/>
-        </a:fontRef>
-      </dsp:style>
-      <dsp:txBody>
-        <a:bodyPr spcFirstLastPara="0" vert="horz" wrap="square" lIns="321739" tIns="133350" rIns="248920" bIns="133350" numCol="1" spcCol="1270" anchor="ctr" anchorCtr="0">
-          <a:noAutofit/>
-        </a:bodyPr>
-        <a:lstStyle/>
-        <a:p>
-          <a:pPr lvl="0" algn="ctr" defTabSz="1555750">
-            <a:lnSpc>
-              <a:spcPct val="90000"/>
-            </a:lnSpc>
-            <a:spcBef>
-              <a:spcPct val="0"/>
-            </a:spcBef>
-            <a:spcAft>
-              <a:spcPct val="35000"/>
-            </a:spcAft>
-          </a:pPr>
-          <a:r>
-            <a:rPr lang="en-US" sz="3500" kern="1200" dirty="0" smtClean="0"/>
-            <a:t> Builder</a:t>
-          </a:r>
-          <a:endParaRPr lang="en-US" sz="3500" kern="1200" dirty="0"/>
-        </a:p>
-      </dsp:txBody>
-      <dsp:txXfrm rot="10800000">
-        <a:off x="1743264" y="950766"/>
-        <a:ext cx="5290281" cy="729613"/>
-      </dsp:txXfrm>
-    </dsp:sp>
-    <dsp:sp modelId="{A7B013B6-E598-4143-8859-9D9974156C11}">
-      <dsp:nvSpPr>
-        <dsp:cNvPr id="0" name=""/>
-        <dsp:cNvSpPr/>
-      </dsp:nvSpPr>
-      <dsp:spPr>
-        <a:xfrm>
-          <a:off x="1196054" y="950766"/>
-          <a:ext cx="729613" cy="729613"/>
-        </a:xfrm>
-        <a:prstGeom prst="ellipse">
-          <a:avLst/>
-        </a:prstGeom>
-        <a:solidFill>
-          <a:schemeClr val="accent1">
-            <a:tint val="50000"/>
-            <a:hueOff val="0"/>
-            <a:satOff val="0"/>
-            <a:lumOff val="0"/>
-            <a:alphaOff val="0"/>
-          </a:schemeClr>
-        </a:solidFill>
-        <a:ln w="25400" cap="flat" cmpd="sng" algn="ctr">
-          <a:solidFill>
-            <a:schemeClr val="lt1">
-              <a:hueOff val="0"/>
-              <a:satOff val="0"/>
-              <a:lumOff val="0"/>
-              <a:alphaOff val="0"/>
-            </a:schemeClr>
-          </a:solidFill>
-          <a:prstDash val="solid"/>
-        </a:ln>
-        <a:effectLst/>
-      </dsp:spPr>
-      <dsp:style>
-        <a:lnRef idx="2">
-          <a:scrgbClr r="0" g="0" b="0"/>
-        </a:lnRef>
-        <a:fillRef idx="1">
-          <a:scrgbClr r="0" g="0" b="0"/>
-        </a:fillRef>
-        <a:effectRef idx="0">
-          <a:scrgbClr r="0" g="0" b="0"/>
-        </a:effectRef>
-        <a:fontRef idx="minor"/>
-      </dsp:style>
-    </dsp:sp>
-    <dsp:sp modelId="{BD18BB72-A8A0-4A1C-AC4F-B5D189AA938E}">
-      <dsp:nvSpPr>
-        <dsp:cNvPr id="0" name=""/>
-        <dsp:cNvSpPr/>
-      </dsp:nvSpPr>
-      <dsp:spPr>
-        <a:xfrm rot="10800000">
-          <a:off x="1560861" y="1898174"/>
-          <a:ext cx="5472684" cy="729613"/>
-        </a:xfrm>
-        <a:prstGeom prst="homePlate">
-          <a:avLst/>
-        </a:prstGeom>
-        <a:solidFill>
-          <a:schemeClr val="accent1">
-            <a:hueOff val="0"/>
-            <a:satOff val="0"/>
-            <a:lumOff val="0"/>
-            <a:alphaOff val="0"/>
-          </a:schemeClr>
-        </a:solidFill>
-        <a:ln w="25400" cap="flat" cmpd="sng" algn="ctr">
-          <a:solidFill>
-            <a:schemeClr val="lt1">
-              <a:hueOff val="0"/>
-              <a:satOff val="0"/>
-              <a:lumOff val="0"/>
-              <a:alphaOff val="0"/>
-            </a:schemeClr>
-          </a:solidFill>
-          <a:prstDash val="solid"/>
-        </a:ln>
-        <a:effectLst/>
-      </dsp:spPr>
-      <dsp:style>
-        <a:lnRef idx="2">
-          <a:scrgbClr r="0" g="0" b="0"/>
-        </a:lnRef>
-        <a:fillRef idx="1">
-          <a:scrgbClr r="0" g="0" b="0"/>
-        </a:fillRef>
-        <a:effectRef idx="0">
-          <a:scrgbClr r="0" g="0" b="0"/>
-        </a:effectRef>
-        <a:fontRef idx="minor">
-          <a:schemeClr val="lt1"/>
-        </a:fontRef>
-      </dsp:style>
-      <dsp:txBody>
-        <a:bodyPr spcFirstLastPara="0" vert="horz" wrap="square" lIns="321739" tIns="133350" rIns="248920" bIns="133350" numCol="1" spcCol="1270" anchor="ctr" anchorCtr="0">
-          <a:noAutofit/>
-        </a:bodyPr>
-        <a:lstStyle/>
-        <a:p>
-          <a:pPr lvl="0" algn="ctr" defTabSz="1555750">
-            <a:lnSpc>
-              <a:spcPct val="90000"/>
-            </a:lnSpc>
-            <a:spcBef>
-              <a:spcPct val="0"/>
-            </a:spcBef>
-            <a:spcAft>
-              <a:spcPct val="35000"/>
-            </a:spcAft>
-          </a:pPr>
-          <a:r>
-            <a:rPr lang="en-US" sz="3500" kern="1200" dirty="0" smtClean="0"/>
-            <a:t>Factory Method</a:t>
-          </a:r>
-          <a:endParaRPr lang="en-US" sz="3500" kern="1200" dirty="0"/>
-        </a:p>
-      </dsp:txBody>
-      <dsp:txXfrm rot="10800000">
-        <a:off x="1743264" y="1898174"/>
-        <a:ext cx="5290281" cy="729613"/>
-      </dsp:txXfrm>
-    </dsp:sp>
-    <dsp:sp modelId="{8AB4289F-8568-4E03-87B1-76F88D31EDC0}">
-      <dsp:nvSpPr>
-        <dsp:cNvPr id="0" name=""/>
-        <dsp:cNvSpPr/>
-      </dsp:nvSpPr>
-      <dsp:spPr>
-        <a:xfrm>
-          <a:off x="1196054" y="1898174"/>
-          <a:ext cx="729613" cy="729613"/>
-        </a:xfrm>
-        <a:prstGeom prst="ellipse">
-          <a:avLst/>
-        </a:prstGeom>
-        <a:solidFill>
-          <a:schemeClr val="accent1">
-            <a:tint val="50000"/>
-            <a:hueOff val="0"/>
-            <a:satOff val="0"/>
-            <a:lumOff val="0"/>
-            <a:alphaOff val="0"/>
-          </a:schemeClr>
-        </a:solidFill>
-        <a:ln w="25400" cap="flat" cmpd="sng" algn="ctr">
-          <a:solidFill>
-            <a:schemeClr val="lt1">
-              <a:hueOff val="0"/>
-              <a:satOff val="0"/>
-              <a:lumOff val="0"/>
-              <a:alphaOff val="0"/>
-            </a:schemeClr>
-          </a:solidFill>
-          <a:prstDash val="solid"/>
-        </a:ln>
-        <a:effectLst/>
-      </dsp:spPr>
-      <dsp:style>
-        <a:lnRef idx="2">
-          <a:scrgbClr r="0" g="0" b="0"/>
-        </a:lnRef>
-        <a:fillRef idx="1">
-          <a:scrgbClr r="0" g="0" b="0"/>
-        </a:fillRef>
-        <a:effectRef idx="0">
-          <a:scrgbClr r="0" g="0" b="0"/>
-        </a:effectRef>
-        <a:fontRef idx="minor"/>
-      </dsp:style>
-    </dsp:sp>
-    <dsp:sp modelId="{B2D969D2-8D63-48E8-BD89-BFFA05BD0B21}">
-      <dsp:nvSpPr>
-        <dsp:cNvPr id="0" name=""/>
-        <dsp:cNvSpPr/>
-      </dsp:nvSpPr>
-      <dsp:spPr>
-        <a:xfrm rot="10800000">
-          <a:off x="1560861" y="2845583"/>
-          <a:ext cx="5472684" cy="729613"/>
-        </a:xfrm>
-        <a:prstGeom prst="homePlate">
-          <a:avLst/>
-        </a:prstGeom>
-        <a:solidFill>
-          <a:schemeClr val="accent1">
-            <a:hueOff val="0"/>
-            <a:satOff val="0"/>
-            <a:lumOff val="0"/>
-            <a:alphaOff val="0"/>
-          </a:schemeClr>
-        </a:solidFill>
-        <a:ln w="25400" cap="flat" cmpd="sng" algn="ctr">
-          <a:solidFill>
-            <a:schemeClr val="lt1">
-              <a:hueOff val="0"/>
-              <a:satOff val="0"/>
-              <a:lumOff val="0"/>
-              <a:alphaOff val="0"/>
-            </a:schemeClr>
-          </a:solidFill>
-          <a:prstDash val="solid"/>
-        </a:ln>
-        <a:effectLst/>
-      </dsp:spPr>
-      <dsp:style>
-        <a:lnRef idx="2">
-          <a:scrgbClr r="0" g="0" b="0"/>
-        </a:lnRef>
-        <a:fillRef idx="1">
-          <a:scrgbClr r="0" g="0" b="0"/>
-        </a:fillRef>
-        <a:effectRef idx="0">
-          <a:scrgbClr r="0" g="0" b="0"/>
-        </a:effectRef>
-        <a:fontRef idx="minor">
-          <a:schemeClr val="lt1"/>
-        </a:fontRef>
-      </dsp:style>
-      <dsp:txBody>
-        <a:bodyPr spcFirstLastPara="0" vert="horz" wrap="square" lIns="321739" tIns="133350" rIns="248920" bIns="133350" numCol="1" spcCol="1270" anchor="ctr" anchorCtr="0">
-          <a:noAutofit/>
-        </a:bodyPr>
-        <a:lstStyle/>
-        <a:p>
-          <a:pPr lvl="0" algn="ctr" defTabSz="1555750">
-            <a:lnSpc>
-              <a:spcPct val="90000"/>
-            </a:lnSpc>
-            <a:spcBef>
-              <a:spcPct val="0"/>
-            </a:spcBef>
-            <a:spcAft>
-              <a:spcPct val="35000"/>
-            </a:spcAft>
-          </a:pPr>
-          <a:r>
-            <a:rPr lang="en-US" sz="3500" kern="1200" dirty="0" smtClean="0"/>
-            <a:t> Prototype</a:t>
-          </a:r>
-          <a:endParaRPr lang="en-US" sz="3500" kern="1200" dirty="0"/>
-        </a:p>
-      </dsp:txBody>
-      <dsp:txXfrm rot="10800000">
-        <a:off x="1743264" y="2845583"/>
-        <a:ext cx="5290281" cy="729613"/>
-      </dsp:txXfrm>
-    </dsp:sp>
-    <dsp:sp modelId="{E7F53410-D78E-4A37-93F5-E1AFC444224B}">
-      <dsp:nvSpPr>
-        <dsp:cNvPr id="0" name=""/>
-        <dsp:cNvSpPr/>
-      </dsp:nvSpPr>
-      <dsp:spPr>
-        <a:xfrm>
-          <a:off x="1196054" y="2845583"/>
-          <a:ext cx="729613" cy="729613"/>
-        </a:xfrm>
-        <a:prstGeom prst="ellipse">
-          <a:avLst/>
-        </a:prstGeom>
-        <a:solidFill>
-          <a:schemeClr val="accent1">
-            <a:tint val="50000"/>
-            <a:hueOff val="0"/>
-            <a:satOff val="0"/>
-            <a:lumOff val="0"/>
-            <a:alphaOff val="0"/>
-          </a:schemeClr>
-        </a:solidFill>
-        <a:ln w="25400" cap="flat" cmpd="sng" algn="ctr">
-          <a:solidFill>
-            <a:schemeClr val="lt1">
-              <a:hueOff val="0"/>
-              <a:satOff val="0"/>
-              <a:lumOff val="0"/>
-              <a:alphaOff val="0"/>
-            </a:schemeClr>
-          </a:solidFill>
-          <a:prstDash val="solid"/>
-        </a:ln>
-        <a:effectLst/>
-      </dsp:spPr>
-      <dsp:style>
-        <a:lnRef idx="2">
-          <a:scrgbClr r="0" g="0" b="0"/>
-        </a:lnRef>
-        <a:fillRef idx="1">
-          <a:scrgbClr r="0" g="0" b="0"/>
-        </a:fillRef>
-        <a:effectRef idx="0">
-          <a:scrgbClr r="0" g="0" b="0"/>
-        </a:effectRef>
-        <a:fontRef idx="minor"/>
-      </dsp:style>
-    </dsp:sp>
-    <dsp:sp modelId="{BFF35D2E-9B54-4C30-90EE-25CD67A9980A}">
-      <dsp:nvSpPr>
-        <dsp:cNvPr id="0" name=""/>
-        <dsp:cNvSpPr/>
-      </dsp:nvSpPr>
-      <dsp:spPr>
-        <a:xfrm rot="10800000">
-          <a:off x="1560861" y="3792991"/>
-          <a:ext cx="5472684" cy="729613"/>
-        </a:xfrm>
-        <a:prstGeom prst="homePlate">
-          <a:avLst/>
-        </a:prstGeom>
-        <a:solidFill>
-          <a:schemeClr val="accent1">
-            <a:hueOff val="0"/>
-            <a:satOff val="0"/>
-            <a:lumOff val="0"/>
-            <a:alphaOff val="0"/>
-          </a:schemeClr>
-        </a:solidFill>
-        <a:ln w="25400" cap="flat" cmpd="sng" algn="ctr">
-          <a:solidFill>
-            <a:schemeClr val="lt1">
-              <a:hueOff val="0"/>
-              <a:satOff val="0"/>
-              <a:lumOff val="0"/>
-              <a:alphaOff val="0"/>
-            </a:schemeClr>
-          </a:solidFill>
-          <a:prstDash val="solid"/>
-        </a:ln>
-        <a:effectLst/>
-      </dsp:spPr>
-      <dsp:style>
-        <a:lnRef idx="2">
-          <a:scrgbClr r="0" g="0" b="0"/>
-        </a:lnRef>
-        <a:fillRef idx="1">
-          <a:scrgbClr r="0" g="0" b="0"/>
-        </a:fillRef>
-        <a:effectRef idx="0">
-          <a:scrgbClr r="0" g="0" b="0"/>
-        </a:effectRef>
-        <a:fontRef idx="minor">
-          <a:schemeClr val="lt1"/>
-        </a:fontRef>
-      </dsp:style>
-      <dsp:txBody>
-        <a:bodyPr spcFirstLastPara="0" vert="horz" wrap="square" lIns="321739" tIns="133350" rIns="248920" bIns="133350" numCol="1" spcCol="1270" anchor="ctr" anchorCtr="0">
-          <a:noAutofit/>
-        </a:bodyPr>
-        <a:lstStyle/>
-        <a:p>
-          <a:pPr lvl="0" algn="ctr" defTabSz="1555750">
-            <a:lnSpc>
-              <a:spcPct val="90000"/>
-            </a:lnSpc>
-            <a:spcBef>
-              <a:spcPct val="0"/>
-            </a:spcBef>
-            <a:spcAft>
-              <a:spcPct val="35000"/>
-            </a:spcAft>
-          </a:pPr>
-          <a:r>
-            <a:rPr lang="en-US" sz="3500" kern="1200" dirty="0" smtClean="0"/>
-            <a:t>Singleton</a:t>
-          </a:r>
-          <a:endParaRPr lang="en-US" sz="3500" kern="1200" dirty="0"/>
-        </a:p>
-      </dsp:txBody>
-      <dsp:txXfrm rot="10800000">
-        <a:off x="1743264" y="3792991"/>
-        <a:ext cx="5290281" cy="729613"/>
-      </dsp:txXfrm>
-    </dsp:sp>
-    <dsp:sp modelId="{00209BB4-FE71-4984-8E21-9A2D28B799C0}">
-      <dsp:nvSpPr>
-        <dsp:cNvPr id="0" name=""/>
-        <dsp:cNvSpPr/>
-      </dsp:nvSpPr>
-      <dsp:spPr>
-        <a:xfrm>
-          <a:off x="1196054" y="3792991"/>
-          <a:ext cx="729613" cy="729613"/>
-        </a:xfrm>
-        <a:prstGeom prst="ellipse">
-          <a:avLst/>
-        </a:prstGeom>
-        <a:solidFill>
-          <a:schemeClr val="accent1">
-            <a:tint val="50000"/>
-            <a:hueOff val="0"/>
-            <a:satOff val="0"/>
-            <a:lumOff val="0"/>
-            <a:alphaOff val="0"/>
-          </a:schemeClr>
-        </a:solidFill>
-        <a:ln w="25400" cap="flat" cmpd="sng" algn="ctr">
-          <a:solidFill>
-            <a:schemeClr val="lt1">
-              <a:hueOff val="0"/>
-              <a:satOff val="0"/>
-              <a:lumOff val="0"/>
-              <a:alphaOff val="0"/>
-            </a:schemeClr>
-          </a:solidFill>
-          <a:prstDash val="solid"/>
-        </a:ln>
-        <a:effectLst/>
-      </dsp:spPr>
-      <dsp:style>
-        <a:lnRef idx="2">
-          <a:scrgbClr r="0" g="0" b="0"/>
-        </a:lnRef>
-        <a:fillRef idx="1">
-          <a:scrgbClr r="0" g="0" b="0"/>
-        </a:fillRef>
-        <a:effectRef idx="0">
-          <a:scrgbClr r="0" g="0" b="0"/>
-        </a:effectRef>
-        <a:fontRef idx="minor"/>
-      </dsp:style>
-    </dsp:sp>
   </dsp:spTree>
 </dsp:drawing>
 </file>
@@ -13450,7 +12836,7 @@
             <a:fld id="{33F2956A-3F06-4D42-B2C6-B694A4913167}" type="datetimeFigureOut">
               <a:rPr lang="en-US" smtClean="0"/>
               <a:pPr/>
-              <a:t>9/22/2015</a:t>
+              <a:t>9/24/2015</a:t>
             </a:fld>
             <a:endParaRPr lang="en-US"/>
           </a:p>
@@ -13617,7 +13003,7 @@
             <a:fld id="{4EA6A4AE-6FAC-4420-9485-A57254806E09}" type="datetimeFigureOut">
               <a:rPr lang="en-US" smtClean="0"/>
               <a:pPr/>
-              <a:t>9/22/2015</a:t>
+              <a:t>9/24/2015</a:t>
             </a:fld>
             <a:endParaRPr lang="en-US"/>
           </a:p>
@@ -13956,7 +13342,7 @@
             <a:fld id="{559C4A52-4ACF-44E6-B7A9-3756997F58DA}" type="slidenum">
               <a:rPr lang="en-US" smtClean="0"/>
               <a:pPr/>
-              <a:t>12</a:t>
+              <a:t>23</a:t>
             </a:fld>
             <a:endParaRPr lang="en-US"/>
           </a:p>
@@ -14186,7 +13572,7 @@
           <a:p>
             <a:fld id="{66168998-7791-4C91-862C-7D29C1901C33}" type="datetime1">
               <a:rPr lang="nl-NL" smtClean="0"/>
-              <a:t>22-9-2015</a:t>
+              <a:t>24-9-2015</a:t>
             </a:fld>
             <a:endParaRPr lang="en-US" dirty="0"/>
           </a:p>
@@ -14584,7 +13970,7 @@
           <a:p>
             <a:fld id="{AD1B2783-C803-4D24-A3C3-35E903236CBD}" type="datetime1">
               <a:rPr lang="nl-NL" smtClean="0"/>
-              <a:t>22-9-2015</a:t>
+              <a:t>24-9-2015</a:t>
             </a:fld>
             <a:endParaRPr lang="en-US"/>
           </a:p>
@@ -14754,7 +14140,7 @@
           <a:p>
             <a:fld id="{8F3BE623-9F18-47C0-A364-1F33C583993A}" type="datetime1">
               <a:rPr lang="nl-NL" smtClean="0"/>
-              <a:t>22-9-2015</a:t>
+              <a:t>24-9-2015</a:t>
             </a:fld>
             <a:endParaRPr lang="en-US"/>
           </a:p>
@@ -14934,7 +14320,7 @@
           <a:p>
             <a:fld id="{9FF6B35B-5A68-4B81-8FC3-E8873F8F71F6}" type="datetime1">
               <a:rPr lang="nl-NL" smtClean="0"/>
-              <a:t>22-9-2015</a:t>
+              <a:t>24-9-2015</a:t>
             </a:fld>
             <a:endParaRPr lang="en-US"/>
           </a:p>
@@ -15053,7 +14439,7 @@
           <a:p>
             <a:fld id="{76A68E0B-E9E3-4E92-8245-5AEFB774724C}" type="datetime1">
               <a:rPr lang="nl-NL" smtClean="0"/>
-              <a:t>22-9-2015</a:t>
+              <a:t>24-9-2015</a:t>
             </a:fld>
             <a:endParaRPr lang="en-US" dirty="0"/>
           </a:p>
@@ -15390,7 +14776,7 @@
           <a:p>
             <a:fld id="{A76D15E2-7B87-4FEB-B8F9-159866541DE7}" type="datetime1">
               <a:rPr lang="nl-NL" smtClean="0"/>
-              <a:t>22-9-2015</a:t>
+              <a:t>24-9-2015</a:t>
             </a:fld>
             <a:endParaRPr lang="en-US"/>
           </a:p>
@@ -15636,7 +15022,7 @@
           <a:p>
             <a:fld id="{5112E402-FF9D-4D74-8DF9-F69724540F2B}" type="datetime1">
               <a:rPr lang="nl-NL" smtClean="0"/>
-              <a:t>22-9-2015</a:t>
+              <a:t>24-9-2015</a:t>
             </a:fld>
             <a:endParaRPr lang="en-US"/>
           </a:p>
@@ -15924,7 +15310,7 @@
           <a:p>
             <a:fld id="{F79931C9-5BD1-473B-9ED8-5DDF204CA39C}" type="datetime1">
               <a:rPr lang="nl-NL" smtClean="0"/>
-              <a:t>22-9-2015</a:t>
+              <a:t>24-9-2015</a:t>
             </a:fld>
             <a:endParaRPr lang="en-US"/>
           </a:p>
@@ -16346,7 +15732,7 @@
           <a:p>
             <a:fld id="{C14ECEC6-1D55-479B-BB1F-42C886624E34}" type="datetime1">
               <a:rPr lang="nl-NL" smtClean="0"/>
-              <a:t>22-9-2015</a:t>
+              <a:t>24-9-2015</a:t>
             </a:fld>
             <a:endParaRPr lang="en-US"/>
           </a:p>
@@ -16464,7 +15850,7 @@
           <a:p>
             <a:fld id="{DFFD1F79-5751-4712-B4B6-A9439316434A}" type="datetime1">
               <a:rPr lang="nl-NL" smtClean="0"/>
-              <a:t>22-9-2015</a:t>
+              <a:t>24-9-2015</a:t>
             </a:fld>
             <a:endParaRPr lang="en-US"/>
           </a:p>
@@ -16559,7 +15945,7 @@
           <a:p>
             <a:fld id="{49A4846A-90E5-4604-A832-0C3517803DCD}" type="datetime1">
               <a:rPr lang="nl-NL" smtClean="0"/>
-              <a:t>22-9-2015</a:t>
+              <a:t>24-9-2015</a:t>
             </a:fld>
             <a:endParaRPr lang="en-US"/>
           </a:p>
@@ -16842,7 +16228,7 @@
           <a:p>
             <a:fld id="{E304040F-F100-4556-BFB5-85647BA453C3}" type="datetime1">
               <a:rPr lang="nl-NL" smtClean="0"/>
-              <a:t>22-9-2015</a:t>
+              <a:t>24-9-2015</a:t>
             </a:fld>
             <a:endParaRPr lang="en-US"/>
           </a:p>
@@ -17079,7 +16465,7 @@
           <a:p>
             <a:fld id="{D4A84FF5-25D6-4482-BBD4-D75DDCDF405D}" type="datetime1">
               <a:rPr lang="nl-NL" smtClean="0"/>
-              <a:t>22-9-2015</a:t>
+              <a:t>24-9-2015</a:t>
             </a:fld>
             <a:endParaRPr lang="en-US"/>
           </a:p>
@@ -17740,6 +17126,1621 @@
           <a:lstStyle/>
           <a:p>
             <a:r>
+              <a:rPr lang="en-US" dirty="0" smtClean="0"/>
+              <a:t>Structural</a:t>
+            </a:r>
+            <a:endParaRPr lang="nl-NL" dirty="0"/>
+          </a:p>
+        </p:txBody>
+      </p:sp>
+      <p:sp>
+        <p:nvSpPr>
+          <p:cNvPr id="3" name="Content Placeholder 2"/>
+          <p:cNvSpPr>
+            <a:spLocks noGrp="1"/>
+          </p:cNvSpPr>
+          <p:nvPr>
+            <p:ph idx="1"/>
+          </p:nvPr>
+        </p:nvSpPr>
+        <p:spPr/>
+        <p:txBody>
+          <a:bodyPr/>
+          <a:lstStyle/>
+          <a:p>
+            <a:pPr marL="0" indent="0" algn="ctr">
+              <a:buNone/>
+            </a:pPr>
+            <a:r>
+              <a:rPr lang="en-US" sz="6000" dirty="0" smtClean="0"/>
+              <a:t>Facade</a:t>
+            </a:r>
+          </a:p>
+          <a:p>
+            <a:pPr marL="0" indent="0" algn="ctr">
+              <a:buNone/>
+            </a:pPr>
+            <a:r>
+              <a:rPr lang="nl-NL" sz="3200" dirty="0" smtClean="0"/>
+              <a:t>(</a:t>
+            </a:r>
+            <a:r>
+              <a:rPr lang="nl-NL" sz="3200" dirty="0" err="1" smtClean="0"/>
+              <a:t>fə</a:t>
+            </a:r>
+            <a:r>
+              <a:rPr lang="nl-NL" sz="3200" dirty="0" err="1"/>
+              <a:t>ˈ</a:t>
+            </a:r>
+            <a:r>
+              <a:rPr lang="nl-NL" sz="3200" dirty="0" err="1" smtClean="0"/>
+              <a:t>sɑːd</a:t>
+            </a:r>
+            <a:r>
+              <a:rPr lang="nl-NL" sz="3200" dirty="0" smtClean="0"/>
+              <a:t>)</a:t>
+            </a:r>
+            <a:endParaRPr lang="nl-NL" sz="3200" dirty="0"/>
+          </a:p>
+        </p:txBody>
+      </p:sp>
+      <p:sp>
+        <p:nvSpPr>
+          <p:cNvPr id="4" name="Footer Placeholder 3"/>
+          <p:cNvSpPr>
+            <a:spLocks noGrp="1"/>
+          </p:cNvSpPr>
+          <p:nvPr>
+            <p:ph type="ftr" sz="quarter" idx="11"/>
+          </p:nvPr>
+        </p:nvSpPr>
+        <p:spPr/>
+        <p:txBody>
+          <a:bodyPr/>
+          <a:lstStyle/>
+          <a:p>
+            <a:r>
+              <a:rPr lang="en-US" smtClean="0"/>
+              <a:t>© Sioux 2013 | Confidential | </a:t>
+            </a:r>
+            <a:endParaRPr lang="en-US"/>
+          </a:p>
+        </p:txBody>
+      </p:sp>
+      <p:sp>
+        <p:nvSpPr>
+          <p:cNvPr id="5" name="Slide Number Placeholder 4"/>
+          <p:cNvSpPr>
+            <a:spLocks noGrp="1"/>
+          </p:cNvSpPr>
+          <p:nvPr>
+            <p:ph type="sldNum" sz="quarter" idx="12"/>
+          </p:nvPr>
+        </p:nvSpPr>
+        <p:spPr/>
+        <p:txBody>
+          <a:bodyPr/>
+          <a:lstStyle/>
+          <a:p>
+            <a:fld id="{B60E6772-B9F1-4672-903F-323A7A0E6EBD}" type="slidenum">
+              <a:rPr lang="en-US" smtClean="0"/>
+              <a:pPr/>
+              <a:t>11</a:t>
+            </a:fld>
+            <a:endParaRPr lang="en-US"/>
+          </a:p>
+        </p:txBody>
+      </p:sp>
+    </p:spTree>
+    <p:extLst>
+      <p:ext uri="{BB962C8B-B14F-4D97-AF65-F5344CB8AC3E}">
+        <p14:creationId xmlns:p14="http://schemas.microsoft.com/office/powerpoint/2010/main" val="4256152604"/>
+      </p:ext>
+    </p:extLst>
+  </p:cSld>
+  <p:clrMapOvr>
+    <a:masterClrMapping/>
+  </p:clrMapOvr>
+</p:sld>
+</file>
+
+<file path=ppt/slides/slide12.xml><?xml version="1.0" encoding="utf-8"?>
+<p:sld xmlns:a="http://schemas.openxmlformats.org/drawingml/2006/main" xmlns:r="http://schemas.openxmlformats.org/officeDocument/2006/relationships" xmlns:p="http://schemas.openxmlformats.org/presentationml/2006/main">
+  <p:cSld>
+    <p:spTree>
+      <p:nvGrpSpPr>
+        <p:cNvPr id="1" name=""/>
+        <p:cNvGrpSpPr/>
+        <p:nvPr/>
+      </p:nvGrpSpPr>
+      <p:grpSpPr>
+        <a:xfrm>
+          <a:off x="0" y="0"/>
+          <a:ext cx="0" cy="0"/>
+          <a:chOff x="0" y="0"/>
+          <a:chExt cx="0" cy="0"/>
+        </a:xfrm>
+      </p:grpSpPr>
+      <p:sp>
+        <p:nvSpPr>
+          <p:cNvPr id="2" name="Title 1"/>
+          <p:cNvSpPr>
+            <a:spLocks noGrp="1"/>
+          </p:cNvSpPr>
+          <p:nvPr>
+            <p:ph type="title"/>
+          </p:nvPr>
+        </p:nvSpPr>
+        <p:spPr/>
+        <p:txBody>
+          <a:bodyPr/>
+          <a:lstStyle/>
+          <a:p>
+            <a:r>
+              <a:rPr lang="en-US" dirty="0" smtClean="0"/>
+              <a:t>Problem</a:t>
+            </a:r>
+            <a:endParaRPr lang="nl-NL" dirty="0"/>
+          </a:p>
+        </p:txBody>
+      </p:sp>
+      <p:sp>
+        <p:nvSpPr>
+          <p:cNvPr id="3" name="Content Placeholder 2"/>
+          <p:cNvSpPr>
+            <a:spLocks noGrp="1"/>
+          </p:cNvSpPr>
+          <p:nvPr>
+            <p:ph idx="1"/>
+          </p:nvPr>
+        </p:nvSpPr>
+        <p:spPr/>
+        <p:txBody>
+          <a:bodyPr/>
+          <a:lstStyle/>
+          <a:p>
+            <a:r>
+              <a:rPr lang="en-US" dirty="0" smtClean="0"/>
+              <a:t>The </a:t>
+            </a:r>
+            <a:r>
+              <a:rPr lang="en-US" dirty="0"/>
+              <a:t>system is very complex or difficult to </a:t>
+            </a:r>
+            <a:r>
+              <a:rPr lang="en-US" dirty="0" smtClean="0"/>
+              <a:t>understand</a:t>
+            </a:r>
+            <a:endParaRPr lang="nl-NL" dirty="0"/>
+          </a:p>
+          <a:p>
+            <a:r>
+              <a:rPr lang="en-US" dirty="0"/>
+              <a:t>S</a:t>
+            </a:r>
+            <a:r>
+              <a:rPr lang="en-US" dirty="0" smtClean="0"/>
+              <a:t>ystem </a:t>
+            </a:r>
+            <a:r>
+              <a:rPr lang="en-US" dirty="0"/>
+              <a:t>has a large number of interdependent classes</a:t>
+            </a:r>
+            <a:endParaRPr lang="nl-NL" dirty="0"/>
+          </a:p>
+        </p:txBody>
+      </p:sp>
+      <p:sp>
+        <p:nvSpPr>
+          <p:cNvPr id="4" name="Footer Placeholder 3"/>
+          <p:cNvSpPr>
+            <a:spLocks noGrp="1"/>
+          </p:cNvSpPr>
+          <p:nvPr>
+            <p:ph type="ftr" sz="quarter" idx="11"/>
+          </p:nvPr>
+        </p:nvSpPr>
+        <p:spPr/>
+        <p:txBody>
+          <a:bodyPr/>
+          <a:lstStyle/>
+          <a:p>
+            <a:r>
+              <a:rPr lang="en-US" smtClean="0"/>
+              <a:t>© Sioux 2013 | Confidential | </a:t>
+            </a:r>
+            <a:endParaRPr lang="en-US"/>
+          </a:p>
+        </p:txBody>
+      </p:sp>
+      <p:sp>
+        <p:nvSpPr>
+          <p:cNvPr id="5" name="Slide Number Placeholder 4"/>
+          <p:cNvSpPr>
+            <a:spLocks noGrp="1"/>
+          </p:cNvSpPr>
+          <p:nvPr>
+            <p:ph type="sldNum" sz="quarter" idx="12"/>
+          </p:nvPr>
+        </p:nvSpPr>
+        <p:spPr/>
+        <p:txBody>
+          <a:bodyPr/>
+          <a:lstStyle/>
+          <a:p>
+            <a:fld id="{B60E6772-B9F1-4672-903F-323A7A0E6EBD}" type="slidenum">
+              <a:rPr lang="en-US" smtClean="0"/>
+              <a:pPr/>
+              <a:t>12</a:t>
+            </a:fld>
+            <a:endParaRPr lang="en-US"/>
+          </a:p>
+        </p:txBody>
+      </p:sp>
+    </p:spTree>
+    <p:extLst>
+      <p:ext uri="{BB962C8B-B14F-4D97-AF65-F5344CB8AC3E}">
+        <p14:creationId xmlns:p14="http://schemas.microsoft.com/office/powerpoint/2010/main" val="2397851473"/>
+      </p:ext>
+    </p:extLst>
+  </p:cSld>
+  <p:clrMapOvr>
+    <a:masterClrMapping/>
+  </p:clrMapOvr>
+</p:sld>
+</file>
+
+<file path=ppt/slides/slide13.xml><?xml version="1.0" encoding="utf-8"?>
+<p:sld xmlns:a="http://schemas.openxmlformats.org/drawingml/2006/main" xmlns:r="http://schemas.openxmlformats.org/officeDocument/2006/relationships" xmlns:p="http://schemas.openxmlformats.org/presentationml/2006/main">
+  <p:cSld>
+    <p:spTree>
+      <p:nvGrpSpPr>
+        <p:cNvPr id="1" name=""/>
+        <p:cNvGrpSpPr/>
+        <p:nvPr/>
+      </p:nvGrpSpPr>
+      <p:grpSpPr>
+        <a:xfrm>
+          <a:off x="0" y="0"/>
+          <a:ext cx="0" cy="0"/>
+          <a:chOff x="0" y="0"/>
+          <a:chExt cx="0" cy="0"/>
+        </a:xfrm>
+      </p:grpSpPr>
+      <p:sp>
+        <p:nvSpPr>
+          <p:cNvPr id="2" name="Title 1"/>
+          <p:cNvSpPr>
+            <a:spLocks noGrp="1"/>
+          </p:cNvSpPr>
+          <p:nvPr>
+            <p:ph type="title"/>
+          </p:nvPr>
+        </p:nvSpPr>
+        <p:spPr/>
+        <p:txBody>
+          <a:bodyPr/>
+          <a:lstStyle/>
+          <a:p>
+            <a:r>
+              <a:rPr lang="en-US" dirty="0" smtClean="0"/>
+              <a:t>How</a:t>
+            </a:r>
+            <a:endParaRPr lang="nl-NL" dirty="0"/>
+          </a:p>
+        </p:txBody>
+      </p:sp>
+      <p:sp>
+        <p:nvSpPr>
+          <p:cNvPr id="3" name="Content Placeholder 2"/>
+          <p:cNvSpPr>
+            <a:spLocks noGrp="1"/>
+          </p:cNvSpPr>
+          <p:nvPr>
+            <p:ph idx="1"/>
+          </p:nvPr>
+        </p:nvSpPr>
+        <p:spPr/>
+        <p:txBody>
+          <a:bodyPr/>
+          <a:lstStyle/>
+          <a:p>
+            <a:r>
+              <a:rPr lang="en-US" dirty="0" smtClean="0"/>
+              <a:t>Hides </a:t>
+            </a:r>
+            <a:r>
+              <a:rPr lang="en-US" dirty="0"/>
+              <a:t>the complexities of the </a:t>
+            </a:r>
+            <a:r>
+              <a:rPr lang="en-US" dirty="0" smtClean="0"/>
+              <a:t>system</a:t>
+            </a:r>
+          </a:p>
+          <a:p>
+            <a:r>
+              <a:rPr lang="en-US" dirty="0" smtClean="0"/>
+              <a:t>Provides </a:t>
+            </a:r>
+            <a:r>
+              <a:rPr lang="en-US" dirty="0"/>
+              <a:t>an interface to the client using which the client can access the system</a:t>
+            </a:r>
+            <a:endParaRPr lang="nl-NL" dirty="0"/>
+          </a:p>
+        </p:txBody>
+      </p:sp>
+      <p:sp>
+        <p:nvSpPr>
+          <p:cNvPr id="4" name="Footer Placeholder 3"/>
+          <p:cNvSpPr>
+            <a:spLocks noGrp="1"/>
+          </p:cNvSpPr>
+          <p:nvPr>
+            <p:ph type="ftr" sz="quarter" idx="11"/>
+          </p:nvPr>
+        </p:nvSpPr>
+        <p:spPr/>
+        <p:txBody>
+          <a:bodyPr/>
+          <a:lstStyle/>
+          <a:p>
+            <a:r>
+              <a:rPr lang="en-US" smtClean="0"/>
+              <a:t>© Sioux 2013 | Confidential | </a:t>
+            </a:r>
+            <a:endParaRPr lang="en-US"/>
+          </a:p>
+        </p:txBody>
+      </p:sp>
+      <p:sp>
+        <p:nvSpPr>
+          <p:cNvPr id="5" name="Slide Number Placeholder 4"/>
+          <p:cNvSpPr>
+            <a:spLocks noGrp="1"/>
+          </p:cNvSpPr>
+          <p:nvPr>
+            <p:ph type="sldNum" sz="quarter" idx="12"/>
+          </p:nvPr>
+        </p:nvSpPr>
+        <p:spPr/>
+        <p:txBody>
+          <a:bodyPr/>
+          <a:lstStyle/>
+          <a:p>
+            <a:fld id="{B60E6772-B9F1-4672-903F-323A7A0E6EBD}" type="slidenum">
+              <a:rPr lang="en-US" smtClean="0"/>
+              <a:pPr/>
+              <a:t>13</a:t>
+            </a:fld>
+            <a:endParaRPr lang="en-US"/>
+          </a:p>
+        </p:txBody>
+      </p:sp>
+    </p:spTree>
+    <p:extLst>
+      <p:ext uri="{BB962C8B-B14F-4D97-AF65-F5344CB8AC3E}">
+        <p14:creationId xmlns:p14="http://schemas.microsoft.com/office/powerpoint/2010/main" val="1989611756"/>
+      </p:ext>
+    </p:extLst>
+  </p:cSld>
+  <p:clrMapOvr>
+    <a:masterClrMapping/>
+  </p:clrMapOvr>
+</p:sld>
+</file>
+
+<file path=ppt/slides/slide14.xml><?xml version="1.0" encoding="utf-8"?>
+<p:sld xmlns:a="http://schemas.openxmlformats.org/drawingml/2006/main" xmlns:r="http://schemas.openxmlformats.org/officeDocument/2006/relationships" xmlns:p="http://schemas.openxmlformats.org/presentationml/2006/main">
+  <p:cSld>
+    <p:spTree>
+      <p:nvGrpSpPr>
+        <p:cNvPr id="1" name=""/>
+        <p:cNvGrpSpPr/>
+        <p:nvPr/>
+      </p:nvGrpSpPr>
+      <p:grpSpPr>
+        <a:xfrm>
+          <a:off x="0" y="0"/>
+          <a:ext cx="0" cy="0"/>
+          <a:chOff x="0" y="0"/>
+          <a:chExt cx="0" cy="0"/>
+        </a:xfrm>
+      </p:grpSpPr>
+      <p:sp>
+        <p:nvSpPr>
+          <p:cNvPr id="2" name="Title 1"/>
+          <p:cNvSpPr>
+            <a:spLocks noGrp="1"/>
+          </p:cNvSpPr>
+          <p:nvPr>
+            <p:ph type="title"/>
+          </p:nvPr>
+        </p:nvSpPr>
+        <p:spPr/>
+        <p:txBody>
+          <a:bodyPr/>
+          <a:lstStyle/>
+          <a:p>
+            <a:r>
+              <a:rPr lang="en-US" dirty="0" smtClean="0"/>
+              <a:t>How</a:t>
+            </a:r>
+            <a:endParaRPr lang="nl-NL" dirty="0"/>
+          </a:p>
+        </p:txBody>
+      </p:sp>
+      <p:pic>
+        <p:nvPicPr>
+          <p:cNvPr id="6" name="Content Placeholder 5"/>
+          <p:cNvPicPr>
+            <a:picLocks noGrp="1" noChangeAspect="1"/>
+          </p:cNvPicPr>
+          <p:nvPr>
+            <p:ph idx="1"/>
+          </p:nvPr>
+        </p:nvPicPr>
+        <p:blipFill>
+          <a:blip r:embed="rId2">
+            <a:extLst>
+              <a:ext uri="{28A0092B-C50C-407E-A947-70E740481C1C}">
+                <a14:useLocalDpi xmlns:a14="http://schemas.microsoft.com/office/drawing/2010/main" val="0"/>
+              </a:ext>
+            </a:extLst>
+          </a:blip>
+          <a:stretch>
+            <a:fillRect/>
+          </a:stretch>
+        </p:blipFill>
+        <p:spPr>
+          <a:xfrm>
+            <a:off x="1981200" y="2133600"/>
+            <a:ext cx="5029200" cy="3599849"/>
+          </a:xfrm>
+        </p:spPr>
+      </p:pic>
+      <p:sp>
+        <p:nvSpPr>
+          <p:cNvPr id="4" name="Footer Placeholder 3"/>
+          <p:cNvSpPr>
+            <a:spLocks noGrp="1"/>
+          </p:cNvSpPr>
+          <p:nvPr>
+            <p:ph type="ftr" sz="quarter" idx="11"/>
+          </p:nvPr>
+        </p:nvSpPr>
+        <p:spPr/>
+        <p:txBody>
+          <a:bodyPr/>
+          <a:lstStyle/>
+          <a:p>
+            <a:r>
+              <a:rPr lang="en-US" smtClean="0"/>
+              <a:t>© Sioux 2013 | Confidential | </a:t>
+            </a:r>
+            <a:endParaRPr lang="en-US"/>
+          </a:p>
+        </p:txBody>
+      </p:sp>
+      <p:sp>
+        <p:nvSpPr>
+          <p:cNvPr id="5" name="Slide Number Placeholder 4"/>
+          <p:cNvSpPr>
+            <a:spLocks noGrp="1"/>
+          </p:cNvSpPr>
+          <p:nvPr>
+            <p:ph type="sldNum" sz="quarter" idx="12"/>
+          </p:nvPr>
+        </p:nvSpPr>
+        <p:spPr/>
+        <p:txBody>
+          <a:bodyPr/>
+          <a:lstStyle/>
+          <a:p>
+            <a:fld id="{B60E6772-B9F1-4672-903F-323A7A0E6EBD}" type="slidenum">
+              <a:rPr lang="en-US" smtClean="0"/>
+              <a:pPr/>
+              <a:t>14</a:t>
+            </a:fld>
+            <a:endParaRPr lang="en-US"/>
+          </a:p>
+        </p:txBody>
+      </p:sp>
+    </p:spTree>
+    <p:extLst>
+      <p:ext uri="{BB962C8B-B14F-4D97-AF65-F5344CB8AC3E}">
+        <p14:creationId xmlns:p14="http://schemas.microsoft.com/office/powerpoint/2010/main" val="3162188453"/>
+      </p:ext>
+    </p:extLst>
+  </p:cSld>
+  <p:clrMapOvr>
+    <a:masterClrMapping/>
+  </p:clrMapOvr>
+</p:sld>
+</file>
+
+<file path=ppt/slides/slide15.xml><?xml version="1.0" encoding="utf-8"?>
+<p:sld xmlns:a="http://schemas.openxmlformats.org/drawingml/2006/main" xmlns:r="http://schemas.openxmlformats.org/officeDocument/2006/relationships" xmlns:p="http://schemas.openxmlformats.org/presentationml/2006/main">
+  <p:cSld>
+    <p:spTree>
+      <p:nvGrpSpPr>
+        <p:cNvPr id="1" name=""/>
+        <p:cNvGrpSpPr/>
+        <p:nvPr/>
+      </p:nvGrpSpPr>
+      <p:grpSpPr>
+        <a:xfrm>
+          <a:off x="0" y="0"/>
+          <a:ext cx="0" cy="0"/>
+          <a:chOff x="0" y="0"/>
+          <a:chExt cx="0" cy="0"/>
+        </a:xfrm>
+      </p:grpSpPr>
+      <p:sp>
+        <p:nvSpPr>
+          <p:cNvPr id="2" name="Title 1"/>
+          <p:cNvSpPr>
+            <a:spLocks noGrp="1"/>
+          </p:cNvSpPr>
+          <p:nvPr>
+            <p:ph type="title"/>
+          </p:nvPr>
+        </p:nvSpPr>
+        <p:spPr/>
+        <p:txBody>
+          <a:bodyPr/>
+          <a:lstStyle/>
+          <a:p>
+            <a:endParaRPr lang="nl-NL" dirty="0"/>
+          </a:p>
+        </p:txBody>
+      </p:sp>
+      <p:sp>
+        <p:nvSpPr>
+          <p:cNvPr id="3" name="Content Placeholder 2"/>
+          <p:cNvSpPr>
+            <a:spLocks noGrp="1"/>
+          </p:cNvSpPr>
+          <p:nvPr>
+            <p:ph idx="1"/>
+          </p:nvPr>
+        </p:nvSpPr>
+        <p:spPr/>
+        <p:txBody>
+          <a:bodyPr>
+            <a:normAutofit/>
+          </a:bodyPr>
+          <a:lstStyle/>
+          <a:p>
+            <a:pPr marL="0" indent="0" algn="ctr">
+              <a:buNone/>
+            </a:pPr>
+            <a:r>
+              <a:rPr lang="en-US" sz="6000" dirty="0" smtClean="0"/>
+              <a:t>Let code</a:t>
+            </a:r>
+            <a:endParaRPr lang="nl-NL" sz="6000" dirty="0"/>
+          </a:p>
+        </p:txBody>
+      </p:sp>
+      <p:sp>
+        <p:nvSpPr>
+          <p:cNvPr id="4" name="Footer Placeholder 3"/>
+          <p:cNvSpPr>
+            <a:spLocks noGrp="1"/>
+          </p:cNvSpPr>
+          <p:nvPr>
+            <p:ph type="ftr" sz="quarter" idx="11"/>
+          </p:nvPr>
+        </p:nvSpPr>
+        <p:spPr/>
+        <p:txBody>
+          <a:bodyPr/>
+          <a:lstStyle/>
+          <a:p>
+            <a:r>
+              <a:rPr lang="en-US" smtClean="0"/>
+              <a:t>© Sioux 2013 | Confidential | </a:t>
+            </a:r>
+            <a:endParaRPr lang="en-US"/>
+          </a:p>
+        </p:txBody>
+      </p:sp>
+      <p:sp>
+        <p:nvSpPr>
+          <p:cNvPr id="5" name="Slide Number Placeholder 4"/>
+          <p:cNvSpPr>
+            <a:spLocks noGrp="1"/>
+          </p:cNvSpPr>
+          <p:nvPr>
+            <p:ph type="sldNum" sz="quarter" idx="12"/>
+          </p:nvPr>
+        </p:nvSpPr>
+        <p:spPr/>
+        <p:txBody>
+          <a:bodyPr/>
+          <a:lstStyle/>
+          <a:p>
+            <a:fld id="{B60E6772-B9F1-4672-903F-323A7A0E6EBD}" type="slidenum">
+              <a:rPr lang="en-US" smtClean="0"/>
+              <a:pPr/>
+              <a:t>15</a:t>
+            </a:fld>
+            <a:endParaRPr lang="en-US"/>
+          </a:p>
+        </p:txBody>
+      </p:sp>
+    </p:spTree>
+    <p:extLst>
+      <p:ext uri="{BB962C8B-B14F-4D97-AF65-F5344CB8AC3E}">
+        <p14:creationId xmlns:p14="http://schemas.microsoft.com/office/powerpoint/2010/main" val="3732815819"/>
+      </p:ext>
+    </p:extLst>
+  </p:cSld>
+  <p:clrMapOvr>
+    <a:masterClrMapping/>
+  </p:clrMapOvr>
+</p:sld>
+</file>
+
+<file path=ppt/slides/slide16.xml><?xml version="1.0" encoding="utf-8"?>
+<p:sld xmlns:a="http://schemas.openxmlformats.org/drawingml/2006/main" xmlns:r="http://schemas.openxmlformats.org/officeDocument/2006/relationships" xmlns:p="http://schemas.openxmlformats.org/presentationml/2006/main">
+  <p:cSld>
+    <p:spTree>
+      <p:nvGrpSpPr>
+        <p:cNvPr id="1" name=""/>
+        <p:cNvGrpSpPr/>
+        <p:nvPr/>
+      </p:nvGrpSpPr>
+      <p:grpSpPr>
+        <a:xfrm>
+          <a:off x="0" y="0"/>
+          <a:ext cx="0" cy="0"/>
+          <a:chOff x="0" y="0"/>
+          <a:chExt cx="0" cy="0"/>
+        </a:xfrm>
+      </p:grpSpPr>
+      <p:sp>
+        <p:nvSpPr>
+          <p:cNvPr id="2" name="Title 1"/>
+          <p:cNvSpPr>
+            <a:spLocks noGrp="1"/>
+          </p:cNvSpPr>
+          <p:nvPr>
+            <p:ph type="title"/>
+          </p:nvPr>
+        </p:nvSpPr>
+        <p:spPr/>
+        <p:txBody>
+          <a:bodyPr/>
+          <a:lstStyle/>
+          <a:p>
+            <a:r>
+              <a:rPr lang="nl-NL" dirty="0" err="1"/>
+              <a:t>Behavioral</a:t>
+            </a:r>
+            <a:endParaRPr lang="nl-NL" dirty="0"/>
+          </a:p>
+        </p:txBody>
+      </p:sp>
+      <p:sp>
+        <p:nvSpPr>
+          <p:cNvPr id="3" name="Content Placeholder 2"/>
+          <p:cNvSpPr>
+            <a:spLocks noGrp="1"/>
+          </p:cNvSpPr>
+          <p:nvPr>
+            <p:ph idx="1"/>
+          </p:nvPr>
+        </p:nvSpPr>
+        <p:spPr>
+          <a:xfrm>
+            <a:off x="457200" y="2895600"/>
+            <a:ext cx="8229600" cy="1600200"/>
+          </a:xfrm>
+        </p:spPr>
+        <p:txBody>
+          <a:bodyPr>
+            <a:normAutofit/>
+          </a:bodyPr>
+          <a:lstStyle/>
+          <a:p>
+            <a:pPr marL="0" indent="0" algn="ctr">
+              <a:buNone/>
+            </a:pPr>
+            <a:r>
+              <a:rPr lang="en-US" sz="6000" dirty="0" smtClean="0"/>
+              <a:t>Observer</a:t>
+            </a:r>
+            <a:endParaRPr lang="nl-NL" sz="6000" dirty="0"/>
+          </a:p>
+        </p:txBody>
+      </p:sp>
+      <p:sp>
+        <p:nvSpPr>
+          <p:cNvPr id="4" name="Footer Placeholder 3"/>
+          <p:cNvSpPr>
+            <a:spLocks noGrp="1"/>
+          </p:cNvSpPr>
+          <p:nvPr>
+            <p:ph type="ftr" sz="quarter" idx="11"/>
+          </p:nvPr>
+        </p:nvSpPr>
+        <p:spPr/>
+        <p:txBody>
+          <a:bodyPr/>
+          <a:lstStyle/>
+          <a:p>
+            <a:r>
+              <a:rPr lang="en-US" smtClean="0"/>
+              <a:t>© Sioux 2013 | Confidential | </a:t>
+            </a:r>
+            <a:endParaRPr lang="en-US"/>
+          </a:p>
+        </p:txBody>
+      </p:sp>
+      <p:sp>
+        <p:nvSpPr>
+          <p:cNvPr id="5" name="Slide Number Placeholder 4"/>
+          <p:cNvSpPr>
+            <a:spLocks noGrp="1"/>
+          </p:cNvSpPr>
+          <p:nvPr>
+            <p:ph type="sldNum" sz="quarter" idx="12"/>
+          </p:nvPr>
+        </p:nvSpPr>
+        <p:spPr/>
+        <p:txBody>
+          <a:bodyPr/>
+          <a:lstStyle/>
+          <a:p>
+            <a:fld id="{B60E6772-B9F1-4672-903F-323A7A0E6EBD}" type="slidenum">
+              <a:rPr lang="en-US" smtClean="0"/>
+              <a:pPr/>
+              <a:t>16</a:t>
+            </a:fld>
+            <a:endParaRPr lang="en-US"/>
+          </a:p>
+        </p:txBody>
+      </p:sp>
+    </p:spTree>
+    <p:extLst>
+      <p:ext uri="{BB962C8B-B14F-4D97-AF65-F5344CB8AC3E}">
+        <p14:creationId xmlns:p14="http://schemas.microsoft.com/office/powerpoint/2010/main" val="2963351720"/>
+      </p:ext>
+    </p:extLst>
+  </p:cSld>
+  <p:clrMapOvr>
+    <a:masterClrMapping/>
+  </p:clrMapOvr>
+</p:sld>
+</file>
+
+<file path=ppt/slides/slide17.xml><?xml version="1.0" encoding="utf-8"?>
+<p:sld xmlns:a="http://schemas.openxmlformats.org/drawingml/2006/main" xmlns:r="http://schemas.openxmlformats.org/officeDocument/2006/relationships" xmlns:p="http://schemas.openxmlformats.org/presentationml/2006/main">
+  <p:cSld>
+    <p:spTree>
+      <p:nvGrpSpPr>
+        <p:cNvPr id="1" name=""/>
+        <p:cNvGrpSpPr/>
+        <p:nvPr/>
+      </p:nvGrpSpPr>
+      <p:grpSpPr>
+        <a:xfrm>
+          <a:off x="0" y="0"/>
+          <a:ext cx="0" cy="0"/>
+          <a:chOff x="0" y="0"/>
+          <a:chExt cx="0" cy="0"/>
+        </a:xfrm>
+      </p:grpSpPr>
+      <p:sp>
+        <p:nvSpPr>
+          <p:cNvPr id="2" name="Title 1"/>
+          <p:cNvSpPr>
+            <a:spLocks noGrp="1"/>
+          </p:cNvSpPr>
+          <p:nvPr>
+            <p:ph type="title"/>
+          </p:nvPr>
+        </p:nvSpPr>
+        <p:spPr/>
+        <p:txBody>
+          <a:bodyPr/>
+          <a:lstStyle/>
+          <a:p>
+            <a:r>
+              <a:rPr lang="en-US" dirty="0" smtClean="0"/>
+              <a:t>Whe</a:t>
+            </a:r>
+            <a:r>
+              <a:rPr lang="en-US" dirty="0" smtClean="0"/>
+              <a:t>n</a:t>
+            </a:r>
+            <a:endParaRPr lang="nl-NL" dirty="0"/>
+          </a:p>
+        </p:txBody>
+      </p:sp>
+      <p:sp>
+        <p:nvSpPr>
+          <p:cNvPr id="3" name="Content Placeholder 2"/>
+          <p:cNvSpPr>
+            <a:spLocks noGrp="1"/>
+          </p:cNvSpPr>
+          <p:nvPr>
+            <p:ph idx="1"/>
+          </p:nvPr>
+        </p:nvSpPr>
+        <p:spPr/>
+        <p:txBody>
+          <a:bodyPr/>
+          <a:lstStyle/>
+          <a:p>
+            <a:r>
+              <a:rPr lang="en-US" dirty="0" smtClean="0"/>
+              <a:t>An object want to notify other objects automatically</a:t>
+            </a:r>
+            <a:endParaRPr lang="nl-NL" dirty="0"/>
+          </a:p>
+        </p:txBody>
+      </p:sp>
+      <p:sp>
+        <p:nvSpPr>
+          <p:cNvPr id="4" name="Footer Placeholder 3"/>
+          <p:cNvSpPr>
+            <a:spLocks noGrp="1"/>
+          </p:cNvSpPr>
+          <p:nvPr>
+            <p:ph type="ftr" sz="quarter" idx="11"/>
+          </p:nvPr>
+        </p:nvSpPr>
+        <p:spPr/>
+        <p:txBody>
+          <a:bodyPr/>
+          <a:lstStyle/>
+          <a:p>
+            <a:r>
+              <a:rPr lang="en-US" smtClean="0"/>
+              <a:t>© Sioux 2013 | Confidential | </a:t>
+            </a:r>
+            <a:endParaRPr lang="en-US"/>
+          </a:p>
+        </p:txBody>
+      </p:sp>
+      <p:sp>
+        <p:nvSpPr>
+          <p:cNvPr id="5" name="Slide Number Placeholder 4"/>
+          <p:cNvSpPr>
+            <a:spLocks noGrp="1"/>
+          </p:cNvSpPr>
+          <p:nvPr>
+            <p:ph type="sldNum" sz="quarter" idx="12"/>
+          </p:nvPr>
+        </p:nvSpPr>
+        <p:spPr/>
+        <p:txBody>
+          <a:bodyPr/>
+          <a:lstStyle/>
+          <a:p>
+            <a:fld id="{B60E6772-B9F1-4672-903F-323A7A0E6EBD}" type="slidenum">
+              <a:rPr lang="en-US" smtClean="0"/>
+              <a:pPr/>
+              <a:t>17</a:t>
+            </a:fld>
+            <a:endParaRPr lang="en-US"/>
+          </a:p>
+        </p:txBody>
+      </p:sp>
+    </p:spTree>
+    <p:extLst>
+      <p:ext uri="{BB962C8B-B14F-4D97-AF65-F5344CB8AC3E}">
+        <p14:creationId xmlns:p14="http://schemas.microsoft.com/office/powerpoint/2010/main" val="165750580"/>
+      </p:ext>
+    </p:extLst>
+  </p:cSld>
+  <p:clrMapOvr>
+    <a:masterClrMapping/>
+  </p:clrMapOvr>
+</p:sld>
+</file>
+
+<file path=ppt/slides/slide18.xml><?xml version="1.0" encoding="utf-8"?>
+<p:sld xmlns:a="http://schemas.openxmlformats.org/drawingml/2006/main" xmlns:r="http://schemas.openxmlformats.org/officeDocument/2006/relationships" xmlns:p="http://schemas.openxmlformats.org/presentationml/2006/main">
+  <p:cSld>
+    <p:spTree>
+      <p:nvGrpSpPr>
+        <p:cNvPr id="1" name=""/>
+        <p:cNvGrpSpPr/>
+        <p:nvPr/>
+      </p:nvGrpSpPr>
+      <p:grpSpPr>
+        <a:xfrm>
+          <a:off x="0" y="0"/>
+          <a:ext cx="0" cy="0"/>
+          <a:chOff x="0" y="0"/>
+          <a:chExt cx="0" cy="0"/>
+        </a:xfrm>
+      </p:grpSpPr>
+      <p:sp>
+        <p:nvSpPr>
+          <p:cNvPr id="2" name="Title 1"/>
+          <p:cNvSpPr>
+            <a:spLocks noGrp="1"/>
+          </p:cNvSpPr>
+          <p:nvPr>
+            <p:ph type="title"/>
+          </p:nvPr>
+        </p:nvSpPr>
+        <p:spPr/>
+        <p:txBody>
+          <a:bodyPr/>
+          <a:lstStyle/>
+          <a:p>
+            <a:r>
+              <a:rPr lang="en-US" dirty="0" smtClean="0"/>
+              <a:t>How</a:t>
+            </a:r>
+            <a:endParaRPr lang="nl-NL" dirty="0"/>
+          </a:p>
+        </p:txBody>
+      </p:sp>
+      <p:sp>
+        <p:nvSpPr>
+          <p:cNvPr id="3" name="Content Placeholder 2"/>
+          <p:cNvSpPr>
+            <a:spLocks noGrp="1"/>
+          </p:cNvSpPr>
+          <p:nvPr>
+            <p:ph idx="1"/>
+          </p:nvPr>
+        </p:nvSpPr>
+        <p:spPr/>
+        <p:txBody>
+          <a:bodyPr/>
+          <a:lstStyle/>
+          <a:p>
+            <a:r>
+              <a:rPr lang="en-US" dirty="0" smtClean="0"/>
+              <a:t>Calling </a:t>
+            </a:r>
+            <a:r>
+              <a:rPr lang="en-US" dirty="0"/>
+              <a:t>one of their methods</a:t>
+            </a:r>
+            <a:endParaRPr lang="nl-NL" dirty="0"/>
+          </a:p>
+        </p:txBody>
+      </p:sp>
+      <p:sp>
+        <p:nvSpPr>
+          <p:cNvPr id="4" name="Footer Placeholder 3"/>
+          <p:cNvSpPr>
+            <a:spLocks noGrp="1"/>
+          </p:cNvSpPr>
+          <p:nvPr>
+            <p:ph type="ftr" sz="quarter" idx="11"/>
+          </p:nvPr>
+        </p:nvSpPr>
+        <p:spPr/>
+        <p:txBody>
+          <a:bodyPr/>
+          <a:lstStyle/>
+          <a:p>
+            <a:r>
+              <a:rPr lang="en-US" smtClean="0"/>
+              <a:t>© Sioux 2013 | Confidential | </a:t>
+            </a:r>
+            <a:endParaRPr lang="en-US"/>
+          </a:p>
+        </p:txBody>
+      </p:sp>
+      <p:sp>
+        <p:nvSpPr>
+          <p:cNvPr id="5" name="Slide Number Placeholder 4"/>
+          <p:cNvSpPr>
+            <a:spLocks noGrp="1"/>
+          </p:cNvSpPr>
+          <p:nvPr>
+            <p:ph type="sldNum" sz="quarter" idx="12"/>
+          </p:nvPr>
+        </p:nvSpPr>
+        <p:spPr/>
+        <p:txBody>
+          <a:bodyPr/>
+          <a:lstStyle/>
+          <a:p>
+            <a:fld id="{B60E6772-B9F1-4672-903F-323A7A0E6EBD}" type="slidenum">
+              <a:rPr lang="en-US" smtClean="0"/>
+              <a:pPr/>
+              <a:t>18</a:t>
+            </a:fld>
+            <a:endParaRPr lang="en-US"/>
+          </a:p>
+        </p:txBody>
+      </p:sp>
+    </p:spTree>
+    <p:extLst>
+      <p:ext uri="{BB962C8B-B14F-4D97-AF65-F5344CB8AC3E}">
+        <p14:creationId xmlns:p14="http://schemas.microsoft.com/office/powerpoint/2010/main" val="2871310983"/>
+      </p:ext>
+    </p:extLst>
+  </p:cSld>
+  <p:clrMapOvr>
+    <a:masterClrMapping/>
+  </p:clrMapOvr>
+</p:sld>
+</file>
+
+<file path=ppt/slides/slide19.xml><?xml version="1.0" encoding="utf-8"?>
+<p:sld xmlns:a="http://schemas.openxmlformats.org/drawingml/2006/main" xmlns:r="http://schemas.openxmlformats.org/officeDocument/2006/relationships" xmlns:p="http://schemas.openxmlformats.org/presentationml/2006/main">
+  <p:cSld>
+    <p:spTree>
+      <p:nvGrpSpPr>
+        <p:cNvPr id="1" name=""/>
+        <p:cNvGrpSpPr/>
+        <p:nvPr/>
+      </p:nvGrpSpPr>
+      <p:grpSpPr>
+        <a:xfrm>
+          <a:off x="0" y="0"/>
+          <a:ext cx="0" cy="0"/>
+          <a:chOff x="0" y="0"/>
+          <a:chExt cx="0" cy="0"/>
+        </a:xfrm>
+      </p:grpSpPr>
+      <p:sp>
+        <p:nvSpPr>
+          <p:cNvPr id="2" name="Title 1"/>
+          <p:cNvSpPr>
+            <a:spLocks noGrp="1"/>
+          </p:cNvSpPr>
+          <p:nvPr>
+            <p:ph type="title"/>
+          </p:nvPr>
+        </p:nvSpPr>
+        <p:spPr/>
+        <p:txBody>
+          <a:bodyPr/>
+          <a:lstStyle/>
+          <a:p>
+            <a:r>
+              <a:rPr lang="en-US" dirty="0" smtClean="0"/>
+              <a:t>UML</a:t>
+            </a:r>
+            <a:endParaRPr lang="nl-NL" dirty="0"/>
+          </a:p>
+        </p:txBody>
+      </p:sp>
+      <p:pic>
+        <p:nvPicPr>
+          <p:cNvPr id="6" name="Content Placeholder 5"/>
+          <p:cNvPicPr>
+            <a:picLocks noGrp="1" noChangeAspect="1"/>
+          </p:cNvPicPr>
+          <p:nvPr>
+            <p:ph idx="1"/>
+          </p:nvPr>
+        </p:nvPicPr>
+        <p:blipFill>
+          <a:blip r:embed="rId2">
+            <a:extLst>
+              <a:ext uri="{28A0092B-C50C-407E-A947-70E740481C1C}">
+                <a14:useLocalDpi xmlns:a14="http://schemas.microsoft.com/office/drawing/2010/main" val="0"/>
+              </a:ext>
+            </a:extLst>
+          </a:blip>
+          <a:stretch>
+            <a:fillRect/>
+          </a:stretch>
+        </p:blipFill>
+        <p:spPr>
+          <a:xfrm>
+            <a:off x="595846" y="1600200"/>
+            <a:ext cx="7952308" cy="4525963"/>
+          </a:xfrm>
+        </p:spPr>
+      </p:pic>
+      <p:sp>
+        <p:nvSpPr>
+          <p:cNvPr id="4" name="Footer Placeholder 3"/>
+          <p:cNvSpPr>
+            <a:spLocks noGrp="1"/>
+          </p:cNvSpPr>
+          <p:nvPr>
+            <p:ph type="ftr" sz="quarter" idx="11"/>
+          </p:nvPr>
+        </p:nvSpPr>
+        <p:spPr/>
+        <p:txBody>
+          <a:bodyPr/>
+          <a:lstStyle/>
+          <a:p>
+            <a:r>
+              <a:rPr lang="en-US" smtClean="0"/>
+              <a:t>© Sioux 2013 | Confidential | </a:t>
+            </a:r>
+            <a:endParaRPr lang="en-US"/>
+          </a:p>
+        </p:txBody>
+      </p:sp>
+      <p:sp>
+        <p:nvSpPr>
+          <p:cNvPr id="5" name="Slide Number Placeholder 4"/>
+          <p:cNvSpPr>
+            <a:spLocks noGrp="1"/>
+          </p:cNvSpPr>
+          <p:nvPr>
+            <p:ph type="sldNum" sz="quarter" idx="12"/>
+          </p:nvPr>
+        </p:nvSpPr>
+        <p:spPr/>
+        <p:txBody>
+          <a:bodyPr/>
+          <a:lstStyle/>
+          <a:p>
+            <a:fld id="{B60E6772-B9F1-4672-903F-323A7A0E6EBD}" type="slidenum">
+              <a:rPr lang="en-US" smtClean="0"/>
+              <a:pPr/>
+              <a:t>19</a:t>
+            </a:fld>
+            <a:endParaRPr lang="en-US"/>
+          </a:p>
+        </p:txBody>
+      </p:sp>
+    </p:spTree>
+    <p:extLst>
+      <p:ext uri="{BB962C8B-B14F-4D97-AF65-F5344CB8AC3E}">
+        <p14:creationId xmlns:p14="http://schemas.microsoft.com/office/powerpoint/2010/main" val="2351232949"/>
+      </p:ext>
+    </p:extLst>
+  </p:cSld>
+  <p:clrMapOvr>
+    <a:masterClrMapping/>
+  </p:clrMapOvr>
+</p:sld>
+</file>
+
+<file path=ppt/slides/slide2.xml><?xml version="1.0" encoding="utf-8"?>
+<p:sld xmlns:a="http://schemas.openxmlformats.org/drawingml/2006/main" xmlns:r="http://schemas.openxmlformats.org/officeDocument/2006/relationships" xmlns:p="http://schemas.openxmlformats.org/presentationml/2006/main">
+  <p:cSld>
+    <p:spTree>
+      <p:nvGrpSpPr>
+        <p:cNvPr id="1" name=""/>
+        <p:cNvGrpSpPr/>
+        <p:nvPr/>
+      </p:nvGrpSpPr>
+      <p:grpSpPr>
+        <a:xfrm>
+          <a:off x="0" y="0"/>
+          <a:ext cx="0" cy="0"/>
+          <a:chOff x="0" y="0"/>
+          <a:chExt cx="0" cy="0"/>
+        </a:xfrm>
+      </p:grpSpPr>
+      <p:sp>
+        <p:nvSpPr>
+          <p:cNvPr id="2" name="Title 1"/>
+          <p:cNvSpPr>
+            <a:spLocks noGrp="1"/>
+          </p:cNvSpPr>
+          <p:nvPr>
+            <p:ph type="title"/>
+          </p:nvPr>
+        </p:nvSpPr>
+        <p:spPr/>
+        <p:txBody>
+          <a:bodyPr/>
+          <a:lstStyle/>
+          <a:p>
+            <a:r>
+              <a:rPr lang="en-US" dirty="0" smtClean="0"/>
+              <a:t>Problems </a:t>
+            </a:r>
+            <a:endParaRPr lang="en-US" dirty="0"/>
+          </a:p>
+        </p:txBody>
+      </p:sp>
+      <p:sp>
+        <p:nvSpPr>
+          <p:cNvPr id="3" name="Content Placeholder 2"/>
+          <p:cNvSpPr>
+            <a:spLocks noGrp="1"/>
+          </p:cNvSpPr>
+          <p:nvPr>
+            <p:ph idx="1"/>
+          </p:nvPr>
+        </p:nvSpPr>
+        <p:spPr/>
+        <p:txBody>
+          <a:bodyPr/>
+          <a:lstStyle/>
+          <a:p>
+            <a:pPr marL="0" indent="0">
+              <a:buNone/>
+            </a:pPr>
+            <a:r>
+              <a:rPr lang="en-US" dirty="0" smtClean="0"/>
+              <a:t>Problems when developing software</a:t>
+            </a:r>
+          </a:p>
+          <a:p>
+            <a:pPr lvl="1"/>
+            <a:r>
+              <a:rPr lang="en-US" dirty="0" smtClean="0"/>
+              <a:t>Readable</a:t>
+            </a:r>
+          </a:p>
+          <a:p>
+            <a:pPr lvl="1"/>
+            <a:r>
+              <a:rPr lang="en-US" dirty="0" smtClean="0"/>
+              <a:t>Maintainable</a:t>
+            </a:r>
+          </a:p>
+          <a:p>
+            <a:pPr lvl="1"/>
+            <a:r>
+              <a:rPr lang="en-US" dirty="0" smtClean="0"/>
+              <a:t>Scalable</a:t>
+            </a:r>
+          </a:p>
+          <a:p>
+            <a:pPr lvl="1"/>
+            <a:r>
+              <a:rPr lang="en-US" dirty="0" smtClean="0"/>
+              <a:t>Testable</a:t>
+            </a:r>
+          </a:p>
+          <a:p>
+            <a:pPr lvl="1"/>
+            <a:r>
+              <a:rPr lang="en-US" dirty="0" smtClean="0"/>
+              <a:t>…</a:t>
+            </a:r>
+            <a:endParaRPr lang="en-US" dirty="0"/>
+          </a:p>
+        </p:txBody>
+      </p:sp>
+      <p:sp>
+        <p:nvSpPr>
+          <p:cNvPr id="4" name="Footer Placeholder 3"/>
+          <p:cNvSpPr>
+            <a:spLocks noGrp="1"/>
+          </p:cNvSpPr>
+          <p:nvPr>
+            <p:ph type="ftr" sz="quarter" idx="11"/>
+          </p:nvPr>
+        </p:nvSpPr>
+        <p:spPr/>
+        <p:txBody>
+          <a:bodyPr/>
+          <a:lstStyle/>
+          <a:p>
+            <a:r>
+              <a:rPr lang="en-US" smtClean="0"/>
+              <a:t>© Sioux 2013 | Confidential | </a:t>
+            </a:r>
+            <a:endParaRPr lang="en-US"/>
+          </a:p>
+        </p:txBody>
+      </p:sp>
+      <p:sp>
+        <p:nvSpPr>
+          <p:cNvPr id="5" name="Slide Number Placeholder 4"/>
+          <p:cNvSpPr>
+            <a:spLocks noGrp="1"/>
+          </p:cNvSpPr>
+          <p:nvPr>
+            <p:ph type="sldNum" sz="quarter" idx="12"/>
+          </p:nvPr>
+        </p:nvSpPr>
+        <p:spPr/>
+        <p:txBody>
+          <a:bodyPr/>
+          <a:lstStyle/>
+          <a:p>
+            <a:fld id="{B60E6772-B9F1-4672-903F-323A7A0E6EBD}" type="slidenum">
+              <a:rPr lang="en-US" smtClean="0"/>
+              <a:pPr/>
+              <a:t>2</a:t>
+            </a:fld>
+            <a:endParaRPr lang="en-US"/>
+          </a:p>
+        </p:txBody>
+      </p:sp>
+    </p:spTree>
+    <p:extLst>
+      <p:ext uri="{BB962C8B-B14F-4D97-AF65-F5344CB8AC3E}">
+        <p14:creationId xmlns:p14="http://schemas.microsoft.com/office/powerpoint/2010/main" val="1726154158"/>
+      </p:ext>
+    </p:extLst>
+  </p:cSld>
+  <p:clrMapOvr>
+    <a:masterClrMapping/>
+  </p:clrMapOvr>
+</p:sld>
+</file>
+
+<file path=ppt/slides/slide20.xml><?xml version="1.0" encoding="utf-8"?>
+<p:sld xmlns:a="http://schemas.openxmlformats.org/drawingml/2006/main" xmlns:r="http://schemas.openxmlformats.org/officeDocument/2006/relationships" xmlns:p="http://schemas.openxmlformats.org/presentationml/2006/main">
+  <p:cSld>
+    <p:spTree>
+      <p:nvGrpSpPr>
+        <p:cNvPr id="1" name=""/>
+        <p:cNvGrpSpPr/>
+        <p:nvPr/>
+      </p:nvGrpSpPr>
+      <p:grpSpPr>
+        <a:xfrm>
+          <a:off x="0" y="0"/>
+          <a:ext cx="0" cy="0"/>
+          <a:chOff x="0" y="0"/>
+          <a:chExt cx="0" cy="0"/>
+        </a:xfrm>
+      </p:grpSpPr>
+      <p:sp>
+        <p:nvSpPr>
+          <p:cNvPr id="2" name="Title 1"/>
+          <p:cNvSpPr>
+            <a:spLocks noGrp="1"/>
+          </p:cNvSpPr>
+          <p:nvPr>
+            <p:ph type="title"/>
+          </p:nvPr>
+        </p:nvSpPr>
+        <p:spPr/>
+        <p:txBody>
+          <a:bodyPr/>
+          <a:lstStyle/>
+          <a:p>
+            <a:r>
+              <a:rPr lang="en-US" dirty="0" smtClean="0"/>
+              <a:t>Practice</a:t>
+            </a:r>
+            <a:endParaRPr lang="nl-NL" dirty="0"/>
+          </a:p>
+        </p:txBody>
+      </p:sp>
+      <p:sp>
+        <p:nvSpPr>
+          <p:cNvPr id="3" name="Content Placeholder 2"/>
+          <p:cNvSpPr>
+            <a:spLocks noGrp="1"/>
+          </p:cNvSpPr>
+          <p:nvPr>
+            <p:ph idx="1"/>
+          </p:nvPr>
+        </p:nvSpPr>
+        <p:spPr/>
+        <p:txBody>
+          <a:bodyPr>
+            <a:normAutofit/>
+          </a:bodyPr>
+          <a:lstStyle/>
+          <a:p>
+            <a:pPr marL="0" indent="0" algn="ctr">
+              <a:buNone/>
+            </a:pPr>
+            <a:r>
+              <a:rPr lang="en-US" sz="6000" dirty="0" smtClean="0"/>
+              <a:t>Let code</a:t>
+            </a:r>
+            <a:endParaRPr lang="nl-NL" sz="6000" dirty="0"/>
+          </a:p>
+        </p:txBody>
+      </p:sp>
+      <p:sp>
+        <p:nvSpPr>
+          <p:cNvPr id="4" name="Footer Placeholder 3"/>
+          <p:cNvSpPr>
+            <a:spLocks noGrp="1"/>
+          </p:cNvSpPr>
+          <p:nvPr>
+            <p:ph type="ftr" sz="quarter" idx="11"/>
+          </p:nvPr>
+        </p:nvSpPr>
+        <p:spPr/>
+        <p:txBody>
+          <a:bodyPr/>
+          <a:lstStyle/>
+          <a:p>
+            <a:r>
+              <a:rPr lang="en-US" smtClean="0"/>
+              <a:t>© Sioux 2013 | Confidential | </a:t>
+            </a:r>
+            <a:endParaRPr lang="en-US"/>
+          </a:p>
+        </p:txBody>
+      </p:sp>
+      <p:sp>
+        <p:nvSpPr>
+          <p:cNvPr id="5" name="Slide Number Placeholder 4"/>
+          <p:cNvSpPr>
+            <a:spLocks noGrp="1"/>
+          </p:cNvSpPr>
+          <p:nvPr>
+            <p:ph type="sldNum" sz="quarter" idx="12"/>
+          </p:nvPr>
+        </p:nvSpPr>
+        <p:spPr/>
+        <p:txBody>
+          <a:bodyPr/>
+          <a:lstStyle/>
+          <a:p>
+            <a:fld id="{B60E6772-B9F1-4672-903F-323A7A0E6EBD}" type="slidenum">
+              <a:rPr lang="en-US" smtClean="0"/>
+              <a:pPr/>
+              <a:t>20</a:t>
+            </a:fld>
+            <a:endParaRPr lang="en-US"/>
+          </a:p>
+        </p:txBody>
+      </p:sp>
+    </p:spTree>
+    <p:extLst>
+      <p:ext uri="{BB962C8B-B14F-4D97-AF65-F5344CB8AC3E}">
+        <p14:creationId xmlns:p14="http://schemas.microsoft.com/office/powerpoint/2010/main" val="451543122"/>
+      </p:ext>
+    </p:extLst>
+  </p:cSld>
+  <p:clrMapOvr>
+    <a:masterClrMapping/>
+  </p:clrMapOvr>
+</p:sld>
+</file>
+
+<file path=ppt/slides/slide21.xml><?xml version="1.0" encoding="utf-8"?>
+<p:sld xmlns:a="http://schemas.openxmlformats.org/drawingml/2006/main" xmlns:r="http://schemas.openxmlformats.org/officeDocument/2006/relationships" xmlns:p="http://schemas.openxmlformats.org/presentationml/2006/main">
+  <p:cSld>
+    <p:spTree>
+      <p:nvGrpSpPr>
+        <p:cNvPr id="1" name=""/>
+        <p:cNvGrpSpPr/>
+        <p:nvPr/>
+      </p:nvGrpSpPr>
+      <p:grpSpPr>
+        <a:xfrm>
+          <a:off x="0" y="0"/>
+          <a:ext cx="0" cy="0"/>
+          <a:chOff x="0" y="0"/>
+          <a:chExt cx="0" cy="0"/>
+        </a:xfrm>
+      </p:grpSpPr>
+      <p:sp>
+        <p:nvSpPr>
+          <p:cNvPr id="2" name="Title 1"/>
+          <p:cNvSpPr>
+            <a:spLocks noGrp="1"/>
+          </p:cNvSpPr>
+          <p:nvPr>
+            <p:ph type="title"/>
+          </p:nvPr>
+        </p:nvSpPr>
+        <p:spPr/>
+        <p:txBody>
+          <a:bodyPr/>
+          <a:lstStyle/>
+          <a:p>
+            <a:r>
+              <a:rPr lang="nl-NL" dirty="0" err="1"/>
+              <a:t>Behavioral</a:t>
+            </a:r>
+            <a:endParaRPr lang="nl-NL" dirty="0"/>
+          </a:p>
+        </p:txBody>
+      </p:sp>
+      <p:sp>
+        <p:nvSpPr>
+          <p:cNvPr id="3" name="Content Placeholder 2"/>
+          <p:cNvSpPr>
+            <a:spLocks noGrp="1"/>
+          </p:cNvSpPr>
+          <p:nvPr>
+            <p:ph idx="1"/>
+          </p:nvPr>
+        </p:nvSpPr>
+        <p:spPr/>
+        <p:txBody>
+          <a:bodyPr/>
+          <a:lstStyle/>
+          <a:p>
+            <a:endParaRPr lang="nl-NL" dirty="0"/>
+          </a:p>
+        </p:txBody>
+      </p:sp>
+      <p:sp>
+        <p:nvSpPr>
+          <p:cNvPr id="4" name="Footer Placeholder 3"/>
+          <p:cNvSpPr>
+            <a:spLocks noGrp="1"/>
+          </p:cNvSpPr>
+          <p:nvPr>
+            <p:ph type="ftr" sz="quarter" idx="11"/>
+          </p:nvPr>
+        </p:nvSpPr>
+        <p:spPr/>
+        <p:txBody>
+          <a:bodyPr/>
+          <a:lstStyle/>
+          <a:p>
+            <a:r>
+              <a:rPr lang="en-US" smtClean="0"/>
+              <a:t>© Sioux 2013 | Confidential | </a:t>
+            </a:r>
+            <a:endParaRPr lang="en-US"/>
+          </a:p>
+        </p:txBody>
+      </p:sp>
+      <p:sp>
+        <p:nvSpPr>
+          <p:cNvPr id="5" name="Slide Number Placeholder 4"/>
+          <p:cNvSpPr>
+            <a:spLocks noGrp="1"/>
+          </p:cNvSpPr>
+          <p:nvPr>
+            <p:ph type="sldNum" sz="quarter" idx="12"/>
+          </p:nvPr>
+        </p:nvSpPr>
+        <p:spPr/>
+        <p:txBody>
+          <a:bodyPr/>
+          <a:lstStyle/>
+          <a:p>
+            <a:fld id="{B60E6772-B9F1-4672-903F-323A7A0E6EBD}" type="slidenum">
+              <a:rPr lang="en-US" smtClean="0"/>
+              <a:pPr/>
+              <a:t>21</a:t>
+            </a:fld>
+            <a:endParaRPr lang="en-US"/>
+          </a:p>
+        </p:txBody>
+      </p:sp>
+    </p:spTree>
+    <p:extLst>
+      <p:ext uri="{BB962C8B-B14F-4D97-AF65-F5344CB8AC3E}">
+        <p14:creationId xmlns:p14="http://schemas.microsoft.com/office/powerpoint/2010/main" val="488482516"/>
+      </p:ext>
+    </p:extLst>
+  </p:cSld>
+  <p:clrMapOvr>
+    <a:masterClrMapping/>
+  </p:clrMapOvr>
+</p:sld>
+</file>
+
+<file path=ppt/slides/slide22.xml><?xml version="1.0" encoding="utf-8"?>
+<p:sld xmlns:a="http://schemas.openxmlformats.org/drawingml/2006/main" xmlns:r="http://schemas.openxmlformats.org/officeDocument/2006/relationships" xmlns:p="http://schemas.openxmlformats.org/presentationml/2006/main">
+  <p:cSld>
+    <p:spTree>
+      <p:nvGrpSpPr>
+        <p:cNvPr id="1" name=""/>
+        <p:cNvGrpSpPr/>
+        <p:nvPr/>
+      </p:nvGrpSpPr>
+      <p:grpSpPr>
+        <a:xfrm>
+          <a:off x="0" y="0"/>
+          <a:ext cx="0" cy="0"/>
+          <a:chOff x="0" y="0"/>
+          <a:chExt cx="0" cy="0"/>
+        </a:xfrm>
+      </p:grpSpPr>
+      <p:sp>
+        <p:nvSpPr>
+          <p:cNvPr id="2" name="Title 1"/>
+          <p:cNvSpPr>
+            <a:spLocks noGrp="1"/>
+          </p:cNvSpPr>
+          <p:nvPr>
+            <p:ph type="title"/>
+          </p:nvPr>
+        </p:nvSpPr>
+        <p:spPr/>
+        <p:txBody>
+          <a:bodyPr/>
+          <a:lstStyle/>
+          <a:p>
+            <a:r>
               <a:rPr lang="vi-VN" dirty="0" err="1" smtClean="0"/>
               <a:t>Question</a:t>
             </a:r>
@@ -17858,7 +18859,7 @@
 </p:sld>
 </file>
 
-<file path=ppt/slides/slide12.xml><?xml version="1.0" encoding="utf-8"?>
+<file path=ppt/slides/slide23.xml><?xml version="1.0" encoding="utf-8"?>
 <p:sld xmlns:a="http://schemas.openxmlformats.org/drawingml/2006/main" xmlns:r="http://schemas.openxmlformats.org/officeDocument/2006/relationships" xmlns:p="http://schemas.openxmlformats.org/presentationml/2006/main">
   <p:cSld>
     <p:spTree>
@@ -17893,7 +18894,7 @@
             <a:fld id="{B60E6772-B9F1-4672-903F-323A7A0E6EBD}" type="slidenum">
               <a:rPr lang="en-GB" smtClean="0"/>
               <a:pPr/>
-              <a:t>12</a:t>
+              <a:t>23</a:t>
             </a:fld>
             <a:endParaRPr lang="en-GB"/>
           </a:p>
@@ -18157,167 +19158,6 @@
       </p:par>
     </p:tnLst>
   </p:timing>
-</p:sld>
-</file>
-
-<file path=ppt/slides/slide2.xml><?xml version="1.0" encoding="utf-8"?>
-<p:sld xmlns:a="http://schemas.openxmlformats.org/drawingml/2006/main" xmlns:r="http://schemas.openxmlformats.org/officeDocument/2006/relationships" xmlns:p="http://schemas.openxmlformats.org/presentationml/2006/main">
-  <p:cSld>
-    <p:spTree>
-      <p:nvGrpSpPr>
-        <p:cNvPr id="1" name=""/>
-        <p:cNvGrpSpPr/>
-        <p:nvPr/>
-      </p:nvGrpSpPr>
-      <p:grpSpPr>
-        <a:xfrm>
-          <a:off x="0" y="0"/>
-          <a:ext cx="0" cy="0"/>
-          <a:chOff x="0" y="0"/>
-          <a:chExt cx="0" cy="0"/>
-        </a:xfrm>
-      </p:grpSpPr>
-      <p:sp>
-        <p:nvSpPr>
-          <p:cNvPr id="2" name="Title 1"/>
-          <p:cNvSpPr>
-            <a:spLocks noGrp="1"/>
-          </p:cNvSpPr>
-          <p:nvPr>
-            <p:ph type="title"/>
-          </p:nvPr>
-        </p:nvSpPr>
-        <p:spPr/>
-        <p:txBody>
-          <a:bodyPr/>
-          <a:lstStyle/>
-          <a:p>
-            <a:r>
-              <a:rPr lang="en-US" dirty="0" smtClean="0"/>
-              <a:t>Problems </a:t>
-            </a:r>
-            <a:endParaRPr lang="en-US" dirty="0"/>
-          </a:p>
-        </p:txBody>
-      </p:sp>
-      <p:sp>
-        <p:nvSpPr>
-          <p:cNvPr id="3" name="Content Placeholder 2"/>
-          <p:cNvSpPr>
-            <a:spLocks noGrp="1"/>
-          </p:cNvSpPr>
-          <p:nvPr>
-            <p:ph idx="1"/>
-          </p:nvPr>
-        </p:nvSpPr>
-        <p:spPr/>
-        <p:txBody>
-          <a:bodyPr/>
-          <a:lstStyle/>
-          <a:p>
-            <a:pPr marL="0" indent="0">
-              <a:buNone/>
-            </a:pPr>
-            <a:r>
-              <a:rPr lang="en-US" dirty="0" smtClean="0"/>
-              <a:t>Problems when developing software</a:t>
-            </a:r>
-          </a:p>
-          <a:p>
-            <a:pPr lvl="1"/>
-            <a:r>
-              <a:rPr lang="en-US" dirty="0" smtClean="0"/>
-              <a:t>Readable</a:t>
-            </a:r>
-          </a:p>
-          <a:p>
-            <a:pPr lvl="1"/>
-            <a:r>
-              <a:rPr lang="en-US" dirty="0" smtClean="0"/>
-              <a:t>Maintainable</a:t>
-            </a:r>
-          </a:p>
-          <a:p>
-            <a:pPr lvl="1"/>
-            <a:r>
-              <a:rPr lang="en-US" dirty="0" smtClean="0"/>
-              <a:t>Scalable</a:t>
-            </a:r>
-          </a:p>
-          <a:p>
-            <a:pPr lvl="1"/>
-            <a:r>
-              <a:rPr lang="en-US" dirty="0" smtClean="0"/>
-              <a:t>Testable</a:t>
-            </a:r>
-          </a:p>
-          <a:p>
-            <a:pPr lvl="1"/>
-            <a:r>
-              <a:rPr lang="en-US" dirty="0" smtClean="0"/>
-              <a:t>…</a:t>
-            </a:r>
-            <a:endParaRPr lang="en-US" dirty="0"/>
-          </a:p>
-        </p:txBody>
-      </p:sp>
-      <p:sp>
-        <p:nvSpPr>
-          <p:cNvPr id="4" name="Footer Placeholder 3"/>
-          <p:cNvSpPr>
-            <a:spLocks noGrp="1"/>
-          </p:cNvSpPr>
-          <p:nvPr>
-            <p:ph type="ftr" sz="quarter" idx="11"/>
-          </p:nvPr>
-        </p:nvSpPr>
-        <p:spPr/>
-        <p:txBody>
-          <a:bodyPr/>
-          <a:lstStyle/>
-          <a:p>
-            <a:r>
-              <a:rPr lang="en-US" smtClean="0"/>
-              <a:t>© Sioux 2013 | Confidential | </a:t>
-            </a:r>
-            <a:endParaRPr lang="en-US"/>
-          </a:p>
-        </p:txBody>
-      </p:sp>
-      <p:sp>
-        <p:nvSpPr>
-          <p:cNvPr id="5" name="Slide Number Placeholder 4"/>
-          <p:cNvSpPr>
-            <a:spLocks noGrp="1"/>
-          </p:cNvSpPr>
-          <p:nvPr>
-            <p:ph type="sldNum" sz="quarter" idx="12"/>
-          </p:nvPr>
-        </p:nvSpPr>
-        <p:spPr/>
-        <p:txBody>
-          <a:bodyPr/>
-          <a:lstStyle/>
-          <a:p>
-            <a:fld id="{B60E6772-B9F1-4672-903F-323A7A0E6EBD}" type="slidenum">
-              <a:rPr lang="en-US" smtClean="0"/>
-              <a:pPr/>
-              <a:t>2</a:t>
-            </a:fld>
-            <a:endParaRPr lang="en-US"/>
-          </a:p>
-        </p:txBody>
-      </p:sp>
-    </p:spTree>
-    <p:extLst>
-      <p:ext uri="{BB962C8B-B14F-4D97-AF65-F5344CB8AC3E}">
-        <p14:creationId xmlns:p14="http://schemas.microsoft.com/office/powerpoint/2010/main" val="1726154158"/>
-      </p:ext>
-    </p:extLst>
-  </p:cSld>
-  <p:clrMapOvr>
-    <a:masterClrMapping/>
-  </p:clrMapOvr>
 </p:sld>
 </file>
 

</xml_diff>

<commit_message>
Add some design pattern
</commit_message>
<xml_diff>
--- a/doc/Lecture 5 - 2015.09.26 Design Pattern.pptx
+++ b/doc/Lecture 5 - 2015.09.26 Design Pattern.pptx
@@ -5,10 +5,10 @@
     <p:sldMasterId id="2147483648" r:id="rId1"/>
   </p:sldMasterIdLst>
   <p:notesMasterIdLst>
-    <p:notesMasterId r:id="rId25"/>
+    <p:notesMasterId r:id="rId33"/>
   </p:notesMasterIdLst>
   <p:handoutMasterIdLst>
-    <p:handoutMasterId r:id="rId26"/>
+    <p:handoutMasterId r:id="rId34"/>
   </p:handoutMasterIdLst>
   <p:sldIdLst>
     <p:sldId id="259" r:id="rId2"/>
@@ -32,8 +32,16 @@
     <p:sldId id="335" r:id="rId20"/>
     <p:sldId id="339" r:id="rId21"/>
     <p:sldId id="340" r:id="rId22"/>
-    <p:sldId id="317" r:id="rId23"/>
-    <p:sldId id="316" r:id="rId24"/>
+    <p:sldId id="341" r:id="rId23"/>
+    <p:sldId id="342" r:id="rId24"/>
+    <p:sldId id="343" r:id="rId25"/>
+    <p:sldId id="344" r:id="rId26"/>
+    <p:sldId id="345" r:id="rId27"/>
+    <p:sldId id="346" r:id="rId28"/>
+    <p:sldId id="347" r:id="rId29"/>
+    <p:sldId id="348" r:id="rId30"/>
+    <p:sldId id="317" r:id="rId31"/>
+    <p:sldId id="316" r:id="rId32"/>
   </p:sldIdLst>
   <p:sldSz cx="9144000" cy="6858000" type="screen4x3"/>
   <p:notesSz cx="6858000" cy="9144000"/>
@@ -4793,246 +4801,6 @@
       <dsp:cNvGrpSpPr/>
     </dsp:nvGrpSpPr>
     <dsp:grpSpPr/>
-    <dsp:sp modelId="{F6A906D8-0B75-4F54-8EDD-7C25B09E01D9}">
-      <dsp:nvSpPr>
-        <dsp:cNvPr id="0" name=""/>
-        <dsp:cNvSpPr/>
-      </dsp:nvSpPr>
-      <dsp:spPr>
-        <a:xfrm>
-          <a:off x="2530082" y="305005"/>
-          <a:ext cx="4230696" cy="4565035"/>
-        </a:xfrm>
-        <a:prstGeom prst="pie">
-          <a:avLst>
-            <a:gd name="adj1" fmla="val 16200000"/>
-            <a:gd name="adj2" fmla="val 1800000"/>
-          </a:avLst>
-        </a:prstGeom>
-        <a:solidFill>
-          <a:schemeClr val="accent1">
-            <a:hueOff val="0"/>
-            <a:satOff val="0"/>
-            <a:lumOff val="0"/>
-            <a:alphaOff val="0"/>
-          </a:schemeClr>
-        </a:solidFill>
-        <a:ln w="25400" cap="flat" cmpd="sng" algn="ctr">
-          <a:solidFill>
-            <a:schemeClr val="lt1">
-              <a:hueOff val="0"/>
-              <a:satOff val="0"/>
-              <a:lumOff val="0"/>
-              <a:alphaOff val="0"/>
-            </a:schemeClr>
-          </a:solidFill>
-          <a:prstDash val="solid"/>
-        </a:ln>
-        <a:effectLst/>
-      </dsp:spPr>
-      <dsp:style>
-        <a:lnRef idx="2">
-          <a:scrgbClr r="0" g="0" b="0"/>
-        </a:lnRef>
-        <a:fillRef idx="1">
-          <a:scrgbClr r="0" g="0" b="0"/>
-        </a:fillRef>
-        <a:effectRef idx="0">
-          <a:scrgbClr r="0" g="0" b="0"/>
-        </a:effectRef>
-        <a:fontRef idx="minor">
-          <a:schemeClr val="lt1"/>
-        </a:fontRef>
-      </dsp:style>
-      <dsp:txBody>
-        <a:bodyPr spcFirstLastPara="0" vert="horz" wrap="square" lIns="27940" tIns="27940" rIns="27940" bIns="27940" numCol="1" spcCol="1270" anchor="ctr" anchorCtr="0">
-          <a:noAutofit/>
-        </a:bodyPr>
-        <a:lstStyle/>
-        <a:p>
-          <a:pPr lvl="0" algn="ctr" defTabSz="977900">
-            <a:lnSpc>
-              <a:spcPct val="90000"/>
-            </a:lnSpc>
-            <a:spcBef>
-              <a:spcPct val="0"/>
-            </a:spcBef>
-            <a:spcAft>
-              <a:spcPct val="35000"/>
-            </a:spcAft>
-          </a:pPr>
-          <a:r>
-            <a:rPr lang="en-US" sz="2200" b="1" i="0" kern="1200" dirty="0" smtClean="0"/>
-            <a:t>Creational</a:t>
-          </a:r>
-          <a:endParaRPr lang="en-US" sz="2200" kern="1200" dirty="0"/>
-        </a:p>
-      </dsp:txBody>
-      <dsp:txXfrm>
-        <a:off x="4830271" y="1147363"/>
-        <a:ext cx="1435414" cy="1521678"/>
-      </dsp:txXfrm>
-    </dsp:sp>
-    <dsp:sp modelId="{FFF2B9B3-A2B8-424D-8108-79250FE0331E}">
-      <dsp:nvSpPr>
-        <dsp:cNvPr id="0" name=""/>
-        <dsp:cNvSpPr/>
-      </dsp:nvSpPr>
-      <dsp:spPr>
-        <a:xfrm>
-          <a:off x="2230820" y="528876"/>
-          <a:ext cx="4377880" cy="4377880"/>
-        </a:xfrm>
-        <a:prstGeom prst="pie">
-          <a:avLst>
-            <a:gd name="adj1" fmla="val 1800000"/>
-            <a:gd name="adj2" fmla="val 9000000"/>
-          </a:avLst>
-        </a:prstGeom>
-        <a:solidFill>
-          <a:schemeClr val="accent1">
-            <a:hueOff val="0"/>
-            <a:satOff val="0"/>
-            <a:lumOff val="0"/>
-            <a:alphaOff val="0"/>
-          </a:schemeClr>
-        </a:solidFill>
-        <a:ln w="25400" cap="flat" cmpd="sng" algn="ctr">
-          <a:solidFill>
-            <a:schemeClr val="lt1">
-              <a:hueOff val="0"/>
-              <a:satOff val="0"/>
-              <a:lumOff val="0"/>
-              <a:alphaOff val="0"/>
-            </a:schemeClr>
-          </a:solidFill>
-          <a:prstDash val="solid"/>
-        </a:ln>
-        <a:effectLst/>
-      </dsp:spPr>
-      <dsp:style>
-        <a:lnRef idx="2">
-          <a:scrgbClr r="0" g="0" b="0"/>
-        </a:lnRef>
-        <a:fillRef idx="1">
-          <a:scrgbClr r="0" g="0" b="0"/>
-        </a:fillRef>
-        <a:effectRef idx="0">
-          <a:scrgbClr r="0" g="0" b="0"/>
-        </a:effectRef>
-        <a:fontRef idx="minor">
-          <a:schemeClr val="lt1"/>
-        </a:fontRef>
-      </dsp:style>
-      <dsp:txBody>
-        <a:bodyPr spcFirstLastPara="0" vert="horz" wrap="square" lIns="27940" tIns="27940" rIns="27940" bIns="27940" numCol="1" spcCol="1270" anchor="ctr" anchorCtr="0">
-          <a:noAutofit/>
-        </a:bodyPr>
-        <a:lstStyle/>
-        <a:p>
-          <a:pPr lvl="0" algn="ctr" defTabSz="977900">
-            <a:lnSpc>
-              <a:spcPct val="90000"/>
-            </a:lnSpc>
-            <a:spcBef>
-              <a:spcPct val="0"/>
-            </a:spcBef>
-            <a:spcAft>
-              <a:spcPct val="35000"/>
-            </a:spcAft>
-          </a:pPr>
-          <a:r>
-            <a:rPr lang="en-US" sz="2200" b="1" i="0" kern="1200" dirty="0" smtClean="0"/>
-            <a:t>Behavioral</a:t>
-          </a:r>
-          <a:endParaRPr lang="en-US" sz="2200" kern="1200" dirty="0"/>
-        </a:p>
-      </dsp:txBody>
-      <dsp:txXfrm>
-        <a:off x="3429526" y="3291111"/>
-        <a:ext cx="1980469" cy="1355058"/>
-      </dsp:txXfrm>
-    </dsp:sp>
-    <dsp:sp modelId="{9B20287D-5BAE-4A4D-BFCA-20D2900ABEFA}">
-      <dsp:nvSpPr>
-        <dsp:cNvPr id="0" name=""/>
-        <dsp:cNvSpPr/>
-      </dsp:nvSpPr>
-      <dsp:spPr>
-        <a:xfrm>
-          <a:off x="2230820" y="528876"/>
-          <a:ext cx="4377880" cy="4377880"/>
-        </a:xfrm>
-        <a:prstGeom prst="pie">
-          <a:avLst>
-            <a:gd name="adj1" fmla="val 9000000"/>
-            <a:gd name="adj2" fmla="val 16200000"/>
-          </a:avLst>
-        </a:prstGeom>
-        <a:solidFill>
-          <a:schemeClr val="accent1">
-            <a:hueOff val="0"/>
-            <a:satOff val="0"/>
-            <a:lumOff val="0"/>
-            <a:alphaOff val="0"/>
-          </a:schemeClr>
-        </a:solidFill>
-        <a:ln w="25400" cap="flat" cmpd="sng" algn="ctr">
-          <a:solidFill>
-            <a:schemeClr val="lt1">
-              <a:hueOff val="0"/>
-              <a:satOff val="0"/>
-              <a:lumOff val="0"/>
-              <a:alphaOff val="0"/>
-            </a:schemeClr>
-          </a:solidFill>
-          <a:prstDash val="solid"/>
-        </a:ln>
-        <a:effectLst/>
-      </dsp:spPr>
-      <dsp:style>
-        <a:lnRef idx="2">
-          <a:scrgbClr r="0" g="0" b="0"/>
-        </a:lnRef>
-        <a:fillRef idx="1">
-          <a:scrgbClr r="0" g="0" b="0"/>
-        </a:fillRef>
-        <a:effectRef idx="0">
-          <a:scrgbClr r="0" g="0" b="0"/>
-        </a:effectRef>
-        <a:fontRef idx="minor">
-          <a:schemeClr val="lt1"/>
-        </a:fontRef>
-      </dsp:style>
-      <dsp:txBody>
-        <a:bodyPr spcFirstLastPara="0" vert="horz" wrap="square" lIns="27940" tIns="27940" rIns="27940" bIns="27940" numCol="1" spcCol="1270" anchor="ctr" anchorCtr="0">
-          <a:noAutofit/>
-        </a:bodyPr>
-        <a:lstStyle/>
-        <a:p>
-          <a:pPr lvl="0" algn="ctr" defTabSz="977900">
-            <a:lnSpc>
-              <a:spcPct val="90000"/>
-            </a:lnSpc>
-            <a:spcBef>
-              <a:spcPct val="0"/>
-            </a:spcBef>
-            <a:spcAft>
-              <a:spcPct val="35000"/>
-            </a:spcAft>
-          </a:pPr>
-          <a:r>
-            <a:rPr lang="en-US" sz="2200" b="1" i="0" kern="1200" dirty="0" smtClean="0"/>
-            <a:t>Structural</a:t>
-          </a:r>
-          <a:endParaRPr lang="en-US" sz="2200" kern="1200" dirty="0"/>
-        </a:p>
-      </dsp:txBody>
-      <dsp:txXfrm>
-        <a:off x="2699879" y="1388817"/>
-        <a:ext cx="1485352" cy="1459293"/>
-      </dsp:txXfrm>
-    </dsp:sp>
   </dsp:spTree>
 </dsp:drawing>
 </file>
@@ -5057,881 +4825,6 @@
       <dsp:cNvGrpSpPr/>
     </dsp:nvGrpSpPr>
     <dsp:grpSpPr/>
-    <dsp:sp modelId="{EC613F0C-2CCE-4C4A-8A0F-097FF9013F06}">
-      <dsp:nvSpPr>
-        <dsp:cNvPr id="0" name=""/>
-        <dsp:cNvSpPr/>
-      </dsp:nvSpPr>
-      <dsp:spPr>
-        <a:xfrm rot="10800000">
-          <a:off x="1507015" y="2674"/>
-          <a:ext cx="5472684" cy="514229"/>
-        </a:xfrm>
-        <a:prstGeom prst="homePlate">
-          <a:avLst/>
-        </a:prstGeom>
-        <a:solidFill>
-          <a:schemeClr val="accent1">
-            <a:hueOff val="0"/>
-            <a:satOff val="0"/>
-            <a:lumOff val="0"/>
-            <a:alphaOff val="0"/>
-          </a:schemeClr>
-        </a:solidFill>
-        <a:ln w="25400" cap="flat" cmpd="sng" algn="ctr">
-          <a:solidFill>
-            <a:schemeClr val="lt1">
-              <a:hueOff val="0"/>
-              <a:satOff val="0"/>
-              <a:lumOff val="0"/>
-              <a:alphaOff val="0"/>
-            </a:schemeClr>
-          </a:solidFill>
-          <a:prstDash val="solid"/>
-        </a:ln>
-        <a:effectLst/>
-      </dsp:spPr>
-      <dsp:style>
-        <a:lnRef idx="2">
-          <a:scrgbClr r="0" g="0" b="0"/>
-        </a:lnRef>
-        <a:fillRef idx="1">
-          <a:scrgbClr r="0" g="0" b="0"/>
-        </a:fillRef>
-        <a:effectRef idx="0">
-          <a:scrgbClr r="0" g="0" b="0"/>
-        </a:effectRef>
-        <a:fontRef idx="minor">
-          <a:schemeClr val="lt1"/>
-        </a:fontRef>
-      </dsp:style>
-      <dsp:txBody>
-        <a:bodyPr spcFirstLastPara="0" vert="horz" wrap="square" lIns="226761" tIns="91440" rIns="170688" bIns="91440" numCol="1" spcCol="1270" anchor="ctr" anchorCtr="0">
-          <a:noAutofit/>
-        </a:bodyPr>
-        <a:lstStyle/>
-        <a:p>
-          <a:pPr lvl="0" algn="ctr" defTabSz="1066800">
-            <a:lnSpc>
-              <a:spcPct val="90000"/>
-            </a:lnSpc>
-            <a:spcBef>
-              <a:spcPct val="0"/>
-            </a:spcBef>
-            <a:spcAft>
-              <a:spcPct val="35000"/>
-            </a:spcAft>
-          </a:pPr>
-          <a:r>
-            <a:rPr lang="en-US" sz="2400" kern="1200" dirty="0" smtClean="0"/>
-            <a:t>Adapter</a:t>
-          </a:r>
-          <a:endParaRPr lang="en-US" sz="2400" kern="1200" dirty="0"/>
-        </a:p>
-      </dsp:txBody>
-      <dsp:txXfrm rot="10800000">
-        <a:off x="1635572" y="2674"/>
-        <a:ext cx="5344127" cy="514229"/>
-      </dsp:txXfrm>
-    </dsp:sp>
-    <dsp:sp modelId="{61EB4A0E-E38E-4FC9-9032-C8EB8BBF1894}">
-      <dsp:nvSpPr>
-        <dsp:cNvPr id="0" name=""/>
-        <dsp:cNvSpPr/>
-      </dsp:nvSpPr>
-      <dsp:spPr>
-        <a:xfrm>
-          <a:off x="1249900" y="2674"/>
-          <a:ext cx="514229" cy="514229"/>
-        </a:xfrm>
-        <a:prstGeom prst="ellipse">
-          <a:avLst/>
-        </a:prstGeom>
-        <a:solidFill>
-          <a:schemeClr val="accent1">
-            <a:tint val="50000"/>
-            <a:hueOff val="0"/>
-            <a:satOff val="0"/>
-            <a:lumOff val="0"/>
-            <a:alphaOff val="0"/>
-          </a:schemeClr>
-        </a:solidFill>
-        <a:ln w="25400" cap="flat" cmpd="sng" algn="ctr">
-          <a:solidFill>
-            <a:schemeClr val="lt1">
-              <a:hueOff val="0"/>
-              <a:satOff val="0"/>
-              <a:lumOff val="0"/>
-              <a:alphaOff val="0"/>
-            </a:schemeClr>
-          </a:solidFill>
-          <a:prstDash val="solid"/>
-        </a:ln>
-        <a:effectLst/>
-      </dsp:spPr>
-      <dsp:style>
-        <a:lnRef idx="2">
-          <a:scrgbClr r="0" g="0" b="0"/>
-        </a:lnRef>
-        <a:fillRef idx="1">
-          <a:scrgbClr r="0" g="0" b="0"/>
-        </a:fillRef>
-        <a:effectRef idx="0">
-          <a:scrgbClr r="0" g="0" b="0"/>
-        </a:effectRef>
-        <a:fontRef idx="minor"/>
-      </dsp:style>
-    </dsp:sp>
-    <dsp:sp modelId="{7D4C3070-190E-4B55-80D0-A4B6FA7AEBD7}">
-      <dsp:nvSpPr>
-        <dsp:cNvPr id="0" name=""/>
-        <dsp:cNvSpPr/>
-      </dsp:nvSpPr>
-      <dsp:spPr>
-        <a:xfrm rot="10800000">
-          <a:off x="1507015" y="670405"/>
-          <a:ext cx="5472684" cy="514229"/>
-        </a:xfrm>
-        <a:prstGeom prst="homePlate">
-          <a:avLst/>
-        </a:prstGeom>
-        <a:solidFill>
-          <a:schemeClr val="accent1">
-            <a:hueOff val="0"/>
-            <a:satOff val="0"/>
-            <a:lumOff val="0"/>
-            <a:alphaOff val="0"/>
-          </a:schemeClr>
-        </a:solidFill>
-        <a:ln w="25400" cap="flat" cmpd="sng" algn="ctr">
-          <a:solidFill>
-            <a:schemeClr val="lt1">
-              <a:hueOff val="0"/>
-              <a:satOff val="0"/>
-              <a:lumOff val="0"/>
-              <a:alphaOff val="0"/>
-            </a:schemeClr>
-          </a:solidFill>
-          <a:prstDash val="solid"/>
-        </a:ln>
-        <a:effectLst/>
-      </dsp:spPr>
-      <dsp:style>
-        <a:lnRef idx="2">
-          <a:scrgbClr r="0" g="0" b="0"/>
-        </a:lnRef>
-        <a:fillRef idx="1">
-          <a:scrgbClr r="0" g="0" b="0"/>
-        </a:fillRef>
-        <a:effectRef idx="0">
-          <a:scrgbClr r="0" g="0" b="0"/>
-        </a:effectRef>
-        <a:fontRef idx="minor">
-          <a:schemeClr val="lt1"/>
-        </a:fontRef>
-      </dsp:style>
-      <dsp:txBody>
-        <a:bodyPr spcFirstLastPara="0" vert="horz" wrap="square" lIns="226761" tIns="91440" rIns="170688" bIns="91440" numCol="1" spcCol="1270" anchor="ctr" anchorCtr="0">
-          <a:noAutofit/>
-        </a:bodyPr>
-        <a:lstStyle/>
-        <a:p>
-          <a:pPr lvl="0" algn="ctr" defTabSz="1066800">
-            <a:lnSpc>
-              <a:spcPct val="90000"/>
-            </a:lnSpc>
-            <a:spcBef>
-              <a:spcPct val="0"/>
-            </a:spcBef>
-            <a:spcAft>
-              <a:spcPct val="35000"/>
-            </a:spcAft>
-          </a:pPr>
-          <a:r>
-            <a:rPr lang="en-US" sz="2400" kern="1200" dirty="0" smtClean="0"/>
-            <a:t> Bridge</a:t>
-          </a:r>
-          <a:endParaRPr lang="en-US" sz="2400" kern="1200" dirty="0"/>
-        </a:p>
-      </dsp:txBody>
-      <dsp:txXfrm rot="10800000">
-        <a:off x="1635572" y="670405"/>
-        <a:ext cx="5344127" cy="514229"/>
-      </dsp:txXfrm>
-    </dsp:sp>
-    <dsp:sp modelId="{A7B013B6-E598-4143-8859-9D9974156C11}">
-      <dsp:nvSpPr>
-        <dsp:cNvPr id="0" name=""/>
-        <dsp:cNvSpPr/>
-      </dsp:nvSpPr>
-      <dsp:spPr>
-        <a:xfrm>
-          <a:off x="1249900" y="670405"/>
-          <a:ext cx="514229" cy="514229"/>
-        </a:xfrm>
-        <a:prstGeom prst="ellipse">
-          <a:avLst/>
-        </a:prstGeom>
-        <a:solidFill>
-          <a:schemeClr val="accent1">
-            <a:tint val="50000"/>
-            <a:hueOff val="0"/>
-            <a:satOff val="0"/>
-            <a:lumOff val="0"/>
-            <a:alphaOff val="0"/>
-          </a:schemeClr>
-        </a:solidFill>
-        <a:ln w="25400" cap="flat" cmpd="sng" algn="ctr">
-          <a:solidFill>
-            <a:schemeClr val="lt1">
-              <a:hueOff val="0"/>
-              <a:satOff val="0"/>
-              <a:lumOff val="0"/>
-              <a:alphaOff val="0"/>
-            </a:schemeClr>
-          </a:solidFill>
-          <a:prstDash val="solid"/>
-        </a:ln>
-        <a:effectLst/>
-      </dsp:spPr>
-      <dsp:style>
-        <a:lnRef idx="2">
-          <a:scrgbClr r="0" g="0" b="0"/>
-        </a:lnRef>
-        <a:fillRef idx="1">
-          <a:scrgbClr r="0" g="0" b="0"/>
-        </a:fillRef>
-        <a:effectRef idx="0">
-          <a:scrgbClr r="0" g="0" b="0"/>
-        </a:effectRef>
-        <a:fontRef idx="minor"/>
-      </dsp:style>
-    </dsp:sp>
-    <dsp:sp modelId="{B2D969D2-8D63-48E8-BD89-BFFA05BD0B21}">
-      <dsp:nvSpPr>
-        <dsp:cNvPr id="0" name=""/>
-        <dsp:cNvSpPr/>
-      </dsp:nvSpPr>
-      <dsp:spPr>
-        <a:xfrm rot="10800000">
-          <a:off x="1507015" y="1338135"/>
-          <a:ext cx="5472684" cy="514229"/>
-        </a:xfrm>
-        <a:prstGeom prst="homePlate">
-          <a:avLst/>
-        </a:prstGeom>
-        <a:solidFill>
-          <a:schemeClr val="accent1">
-            <a:hueOff val="0"/>
-            <a:satOff val="0"/>
-            <a:lumOff val="0"/>
-            <a:alphaOff val="0"/>
-          </a:schemeClr>
-        </a:solidFill>
-        <a:ln w="25400" cap="flat" cmpd="sng" algn="ctr">
-          <a:solidFill>
-            <a:schemeClr val="lt1">
-              <a:hueOff val="0"/>
-              <a:satOff val="0"/>
-              <a:lumOff val="0"/>
-              <a:alphaOff val="0"/>
-            </a:schemeClr>
-          </a:solidFill>
-          <a:prstDash val="solid"/>
-        </a:ln>
-        <a:effectLst/>
-      </dsp:spPr>
-      <dsp:style>
-        <a:lnRef idx="2">
-          <a:scrgbClr r="0" g="0" b="0"/>
-        </a:lnRef>
-        <a:fillRef idx="1">
-          <a:scrgbClr r="0" g="0" b="0"/>
-        </a:fillRef>
-        <a:effectRef idx="0">
-          <a:scrgbClr r="0" g="0" b="0"/>
-        </a:effectRef>
-        <a:fontRef idx="minor">
-          <a:schemeClr val="lt1"/>
-        </a:fontRef>
-      </dsp:style>
-      <dsp:txBody>
-        <a:bodyPr spcFirstLastPara="0" vert="horz" wrap="square" lIns="226761" tIns="91440" rIns="170688" bIns="91440" numCol="1" spcCol="1270" anchor="ctr" anchorCtr="0">
-          <a:noAutofit/>
-        </a:bodyPr>
-        <a:lstStyle/>
-        <a:p>
-          <a:pPr lvl="0" algn="ctr" defTabSz="1066800">
-            <a:lnSpc>
-              <a:spcPct val="90000"/>
-            </a:lnSpc>
-            <a:spcBef>
-              <a:spcPct val="0"/>
-            </a:spcBef>
-            <a:spcAft>
-              <a:spcPct val="35000"/>
-            </a:spcAft>
-          </a:pPr>
-          <a:r>
-            <a:rPr lang="en-US" sz="2400" kern="1200" dirty="0" smtClean="0"/>
-            <a:t> Composite</a:t>
-          </a:r>
-          <a:endParaRPr lang="en-US" sz="2400" kern="1200" dirty="0"/>
-        </a:p>
-      </dsp:txBody>
-      <dsp:txXfrm rot="10800000">
-        <a:off x="1635572" y="1338135"/>
-        <a:ext cx="5344127" cy="514229"/>
-      </dsp:txXfrm>
-    </dsp:sp>
-    <dsp:sp modelId="{E7F53410-D78E-4A37-93F5-E1AFC444224B}">
-      <dsp:nvSpPr>
-        <dsp:cNvPr id="0" name=""/>
-        <dsp:cNvSpPr/>
-      </dsp:nvSpPr>
-      <dsp:spPr>
-        <a:xfrm>
-          <a:off x="1249900" y="1338135"/>
-          <a:ext cx="514229" cy="514229"/>
-        </a:xfrm>
-        <a:prstGeom prst="ellipse">
-          <a:avLst/>
-        </a:prstGeom>
-        <a:solidFill>
-          <a:schemeClr val="accent1">
-            <a:tint val="50000"/>
-            <a:hueOff val="0"/>
-            <a:satOff val="0"/>
-            <a:lumOff val="0"/>
-            <a:alphaOff val="0"/>
-          </a:schemeClr>
-        </a:solidFill>
-        <a:ln w="25400" cap="flat" cmpd="sng" algn="ctr">
-          <a:solidFill>
-            <a:schemeClr val="lt1">
-              <a:hueOff val="0"/>
-              <a:satOff val="0"/>
-              <a:lumOff val="0"/>
-              <a:alphaOff val="0"/>
-            </a:schemeClr>
-          </a:solidFill>
-          <a:prstDash val="solid"/>
-        </a:ln>
-        <a:effectLst/>
-      </dsp:spPr>
-      <dsp:style>
-        <a:lnRef idx="2">
-          <a:scrgbClr r="0" g="0" b="0"/>
-        </a:lnRef>
-        <a:fillRef idx="1">
-          <a:scrgbClr r="0" g="0" b="0"/>
-        </a:fillRef>
-        <a:effectRef idx="0">
-          <a:scrgbClr r="0" g="0" b="0"/>
-        </a:effectRef>
-        <a:fontRef idx="minor"/>
-      </dsp:style>
-    </dsp:sp>
-    <dsp:sp modelId="{BFF35D2E-9B54-4C30-90EE-25CD67A9980A}">
-      <dsp:nvSpPr>
-        <dsp:cNvPr id="0" name=""/>
-        <dsp:cNvSpPr/>
-      </dsp:nvSpPr>
-      <dsp:spPr>
-        <a:xfrm rot="10800000">
-          <a:off x="1507015" y="2005866"/>
-          <a:ext cx="5472684" cy="514229"/>
-        </a:xfrm>
-        <a:prstGeom prst="homePlate">
-          <a:avLst/>
-        </a:prstGeom>
-        <a:solidFill>
-          <a:schemeClr val="accent1">
-            <a:hueOff val="0"/>
-            <a:satOff val="0"/>
-            <a:lumOff val="0"/>
-            <a:alphaOff val="0"/>
-          </a:schemeClr>
-        </a:solidFill>
-        <a:ln w="25400" cap="flat" cmpd="sng" algn="ctr">
-          <a:solidFill>
-            <a:schemeClr val="lt1">
-              <a:hueOff val="0"/>
-              <a:satOff val="0"/>
-              <a:lumOff val="0"/>
-              <a:alphaOff val="0"/>
-            </a:schemeClr>
-          </a:solidFill>
-          <a:prstDash val="solid"/>
-        </a:ln>
-        <a:effectLst/>
-      </dsp:spPr>
-      <dsp:style>
-        <a:lnRef idx="2">
-          <a:scrgbClr r="0" g="0" b="0"/>
-        </a:lnRef>
-        <a:fillRef idx="1">
-          <a:scrgbClr r="0" g="0" b="0"/>
-        </a:fillRef>
-        <a:effectRef idx="0">
-          <a:scrgbClr r="0" g="0" b="0"/>
-        </a:effectRef>
-        <a:fontRef idx="minor">
-          <a:schemeClr val="lt1"/>
-        </a:fontRef>
-      </dsp:style>
-      <dsp:txBody>
-        <a:bodyPr spcFirstLastPara="0" vert="horz" wrap="square" lIns="226761" tIns="91440" rIns="170688" bIns="91440" numCol="1" spcCol="1270" anchor="ctr" anchorCtr="0">
-          <a:noAutofit/>
-        </a:bodyPr>
-        <a:lstStyle/>
-        <a:p>
-          <a:pPr lvl="0" algn="ctr" defTabSz="1066800">
-            <a:lnSpc>
-              <a:spcPct val="90000"/>
-            </a:lnSpc>
-            <a:spcBef>
-              <a:spcPct val="0"/>
-            </a:spcBef>
-            <a:spcAft>
-              <a:spcPct val="35000"/>
-            </a:spcAft>
-          </a:pPr>
-          <a:r>
-            <a:rPr lang="en-US" sz="2400" kern="1200" dirty="0" smtClean="0"/>
-            <a:t>Decorator</a:t>
-          </a:r>
-          <a:endParaRPr lang="en-US" sz="2400" kern="1200" dirty="0"/>
-        </a:p>
-      </dsp:txBody>
-      <dsp:txXfrm rot="10800000">
-        <a:off x="1635572" y="2005866"/>
-        <a:ext cx="5344127" cy="514229"/>
-      </dsp:txXfrm>
-    </dsp:sp>
-    <dsp:sp modelId="{00209BB4-FE71-4984-8E21-9A2D28B799C0}">
-      <dsp:nvSpPr>
-        <dsp:cNvPr id="0" name=""/>
-        <dsp:cNvSpPr/>
-      </dsp:nvSpPr>
-      <dsp:spPr>
-        <a:xfrm>
-          <a:off x="1249900" y="2005866"/>
-          <a:ext cx="514229" cy="514229"/>
-        </a:xfrm>
-        <a:prstGeom prst="ellipse">
-          <a:avLst/>
-        </a:prstGeom>
-        <a:solidFill>
-          <a:schemeClr val="accent1">
-            <a:tint val="50000"/>
-            <a:hueOff val="0"/>
-            <a:satOff val="0"/>
-            <a:lumOff val="0"/>
-            <a:alphaOff val="0"/>
-          </a:schemeClr>
-        </a:solidFill>
-        <a:ln w="25400" cap="flat" cmpd="sng" algn="ctr">
-          <a:solidFill>
-            <a:schemeClr val="lt1">
-              <a:hueOff val="0"/>
-              <a:satOff val="0"/>
-              <a:lumOff val="0"/>
-              <a:alphaOff val="0"/>
-            </a:schemeClr>
-          </a:solidFill>
-          <a:prstDash val="solid"/>
-        </a:ln>
-        <a:effectLst/>
-      </dsp:spPr>
-      <dsp:style>
-        <a:lnRef idx="2">
-          <a:scrgbClr r="0" g="0" b="0"/>
-        </a:lnRef>
-        <a:fillRef idx="1">
-          <a:scrgbClr r="0" g="0" b="0"/>
-        </a:fillRef>
-        <a:effectRef idx="0">
-          <a:scrgbClr r="0" g="0" b="0"/>
-        </a:effectRef>
-        <a:fontRef idx="minor"/>
-      </dsp:style>
-    </dsp:sp>
-    <dsp:sp modelId="{6407C4B0-F42F-4DBF-8A38-82F12A8E159B}">
-      <dsp:nvSpPr>
-        <dsp:cNvPr id="0" name=""/>
-        <dsp:cNvSpPr/>
-      </dsp:nvSpPr>
-      <dsp:spPr>
-        <a:xfrm rot="10800000">
-          <a:off x="1507015" y="2673597"/>
-          <a:ext cx="5472684" cy="514229"/>
-        </a:xfrm>
-        <a:prstGeom prst="homePlate">
-          <a:avLst/>
-        </a:prstGeom>
-        <a:solidFill>
-          <a:schemeClr val="accent1">
-            <a:hueOff val="0"/>
-            <a:satOff val="0"/>
-            <a:lumOff val="0"/>
-            <a:alphaOff val="0"/>
-          </a:schemeClr>
-        </a:solidFill>
-        <a:ln w="25400" cap="flat" cmpd="sng" algn="ctr">
-          <a:solidFill>
-            <a:schemeClr val="lt1">
-              <a:hueOff val="0"/>
-              <a:satOff val="0"/>
-              <a:lumOff val="0"/>
-              <a:alphaOff val="0"/>
-            </a:schemeClr>
-          </a:solidFill>
-          <a:prstDash val="solid"/>
-        </a:ln>
-        <a:effectLst/>
-      </dsp:spPr>
-      <dsp:style>
-        <a:lnRef idx="2">
-          <a:scrgbClr r="0" g="0" b="0"/>
-        </a:lnRef>
-        <a:fillRef idx="1">
-          <a:scrgbClr r="0" g="0" b="0"/>
-        </a:fillRef>
-        <a:effectRef idx="0">
-          <a:scrgbClr r="0" g="0" b="0"/>
-        </a:effectRef>
-        <a:fontRef idx="minor">
-          <a:schemeClr val="lt1"/>
-        </a:fontRef>
-      </dsp:style>
-      <dsp:txBody>
-        <a:bodyPr spcFirstLastPara="0" vert="horz" wrap="square" lIns="226761" tIns="91440" rIns="170688" bIns="91440" numCol="1" spcCol="1270" anchor="ctr" anchorCtr="0">
-          <a:noAutofit/>
-        </a:bodyPr>
-        <a:lstStyle/>
-        <a:p>
-          <a:pPr lvl="0" algn="ctr" defTabSz="1066800">
-            <a:lnSpc>
-              <a:spcPct val="90000"/>
-            </a:lnSpc>
-            <a:spcBef>
-              <a:spcPct val="0"/>
-            </a:spcBef>
-            <a:spcAft>
-              <a:spcPct val="35000"/>
-            </a:spcAft>
-          </a:pPr>
-          <a:r>
-            <a:rPr lang="en-US" sz="2400" kern="1200" dirty="0" smtClean="0"/>
-            <a:t>Facade</a:t>
-          </a:r>
-          <a:endParaRPr lang="en-US" sz="2400" kern="1200" dirty="0"/>
-        </a:p>
-      </dsp:txBody>
-      <dsp:txXfrm rot="10800000">
-        <a:off x="1635572" y="2673597"/>
-        <a:ext cx="5344127" cy="514229"/>
-      </dsp:txXfrm>
-    </dsp:sp>
-    <dsp:sp modelId="{B2015488-117F-42C4-85F0-C49FD9D5AFC4}">
-      <dsp:nvSpPr>
-        <dsp:cNvPr id="0" name=""/>
-        <dsp:cNvSpPr/>
-      </dsp:nvSpPr>
-      <dsp:spPr>
-        <a:xfrm>
-          <a:off x="1249900" y="2673597"/>
-          <a:ext cx="514229" cy="514229"/>
-        </a:xfrm>
-        <a:prstGeom prst="ellipse">
-          <a:avLst/>
-        </a:prstGeom>
-        <a:solidFill>
-          <a:schemeClr val="accent1">
-            <a:tint val="50000"/>
-            <a:hueOff val="0"/>
-            <a:satOff val="0"/>
-            <a:lumOff val="0"/>
-            <a:alphaOff val="0"/>
-          </a:schemeClr>
-        </a:solidFill>
-        <a:ln w="25400" cap="flat" cmpd="sng" algn="ctr">
-          <a:solidFill>
-            <a:schemeClr val="lt1">
-              <a:hueOff val="0"/>
-              <a:satOff val="0"/>
-              <a:lumOff val="0"/>
-              <a:alphaOff val="0"/>
-            </a:schemeClr>
-          </a:solidFill>
-          <a:prstDash val="solid"/>
-        </a:ln>
-        <a:effectLst/>
-      </dsp:spPr>
-      <dsp:style>
-        <a:lnRef idx="2">
-          <a:scrgbClr r="0" g="0" b="0"/>
-        </a:lnRef>
-        <a:fillRef idx="1">
-          <a:scrgbClr r="0" g="0" b="0"/>
-        </a:fillRef>
-        <a:effectRef idx="0">
-          <a:scrgbClr r="0" g="0" b="0"/>
-        </a:effectRef>
-        <a:fontRef idx="minor"/>
-      </dsp:style>
-    </dsp:sp>
-    <dsp:sp modelId="{137245A0-AFD5-46B1-85E7-BB68551C831F}">
-      <dsp:nvSpPr>
-        <dsp:cNvPr id="0" name=""/>
-        <dsp:cNvSpPr/>
-      </dsp:nvSpPr>
-      <dsp:spPr>
-        <a:xfrm rot="10800000">
-          <a:off x="1507015" y="3341328"/>
-          <a:ext cx="5472684" cy="514229"/>
-        </a:xfrm>
-        <a:prstGeom prst="homePlate">
-          <a:avLst/>
-        </a:prstGeom>
-        <a:solidFill>
-          <a:schemeClr val="accent1">
-            <a:hueOff val="0"/>
-            <a:satOff val="0"/>
-            <a:lumOff val="0"/>
-            <a:alphaOff val="0"/>
-          </a:schemeClr>
-        </a:solidFill>
-        <a:ln w="25400" cap="flat" cmpd="sng" algn="ctr">
-          <a:solidFill>
-            <a:schemeClr val="lt1">
-              <a:hueOff val="0"/>
-              <a:satOff val="0"/>
-              <a:lumOff val="0"/>
-              <a:alphaOff val="0"/>
-            </a:schemeClr>
-          </a:solidFill>
-          <a:prstDash val="solid"/>
-        </a:ln>
-        <a:effectLst/>
-      </dsp:spPr>
-      <dsp:style>
-        <a:lnRef idx="2">
-          <a:scrgbClr r="0" g="0" b="0"/>
-        </a:lnRef>
-        <a:fillRef idx="1">
-          <a:scrgbClr r="0" g="0" b="0"/>
-        </a:fillRef>
-        <a:effectRef idx="0">
-          <a:scrgbClr r="0" g="0" b="0"/>
-        </a:effectRef>
-        <a:fontRef idx="minor">
-          <a:schemeClr val="lt1"/>
-        </a:fontRef>
-      </dsp:style>
-      <dsp:txBody>
-        <a:bodyPr spcFirstLastPara="0" vert="horz" wrap="square" lIns="226761" tIns="91440" rIns="170688" bIns="91440" numCol="1" spcCol="1270" anchor="ctr" anchorCtr="0">
-          <a:noAutofit/>
-        </a:bodyPr>
-        <a:lstStyle/>
-        <a:p>
-          <a:pPr lvl="0" algn="ctr" defTabSz="1066800">
-            <a:lnSpc>
-              <a:spcPct val="90000"/>
-            </a:lnSpc>
-            <a:spcBef>
-              <a:spcPct val="0"/>
-            </a:spcBef>
-            <a:spcAft>
-              <a:spcPct val="35000"/>
-            </a:spcAft>
-          </a:pPr>
-          <a:r>
-            <a:rPr lang="en-US" sz="2400" kern="1200" dirty="0" smtClean="0"/>
-            <a:t>Flyweight</a:t>
-          </a:r>
-          <a:endParaRPr lang="en-US" sz="2400" kern="1200" dirty="0"/>
-        </a:p>
-      </dsp:txBody>
-      <dsp:txXfrm rot="10800000">
-        <a:off x="1635572" y="3341328"/>
-        <a:ext cx="5344127" cy="514229"/>
-      </dsp:txXfrm>
-    </dsp:sp>
-    <dsp:sp modelId="{0689DD1A-B179-4F08-A728-3B48234A71A9}">
-      <dsp:nvSpPr>
-        <dsp:cNvPr id="0" name=""/>
-        <dsp:cNvSpPr/>
-      </dsp:nvSpPr>
-      <dsp:spPr>
-        <a:xfrm>
-          <a:off x="1249900" y="3341328"/>
-          <a:ext cx="514229" cy="514229"/>
-        </a:xfrm>
-        <a:prstGeom prst="ellipse">
-          <a:avLst/>
-        </a:prstGeom>
-        <a:solidFill>
-          <a:schemeClr val="accent1">
-            <a:tint val="50000"/>
-            <a:hueOff val="0"/>
-            <a:satOff val="0"/>
-            <a:lumOff val="0"/>
-            <a:alphaOff val="0"/>
-          </a:schemeClr>
-        </a:solidFill>
-        <a:ln w="25400" cap="flat" cmpd="sng" algn="ctr">
-          <a:solidFill>
-            <a:schemeClr val="lt1">
-              <a:hueOff val="0"/>
-              <a:satOff val="0"/>
-              <a:lumOff val="0"/>
-              <a:alphaOff val="0"/>
-            </a:schemeClr>
-          </a:solidFill>
-          <a:prstDash val="solid"/>
-        </a:ln>
-        <a:effectLst/>
-      </dsp:spPr>
-      <dsp:style>
-        <a:lnRef idx="2">
-          <a:scrgbClr r="0" g="0" b="0"/>
-        </a:lnRef>
-        <a:fillRef idx="1">
-          <a:scrgbClr r="0" g="0" b="0"/>
-        </a:fillRef>
-        <a:effectRef idx="0">
-          <a:scrgbClr r="0" g="0" b="0"/>
-        </a:effectRef>
-        <a:fontRef idx="minor"/>
-      </dsp:style>
-    </dsp:sp>
-    <dsp:sp modelId="{9906F487-1EA7-4862-B455-D44A163B4825}">
-      <dsp:nvSpPr>
-        <dsp:cNvPr id="0" name=""/>
-        <dsp:cNvSpPr/>
-      </dsp:nvSpPr>
-      <dsp:spPr>
-        <a:xfrm rot="10800000">
-          <a:off x="1507015" y="4009059"/>
-          <a:ext cx="5472684" cy="514229"/>
-        </a:xfrm>
-        <a:prstGeom prst="homePlate">
-          <a:avLst/>
-        </a:prstGeom>
-        <a:solidFill>
-          <a:schemeClr val="accent1">
-            <a:hueOff val="0"/>
-            <a:satOff val="0"/>
-            <a:lumOff val="0"/>
-            <a:alphaOff val="0"/>
-          </a:schemeClr>
-        </a:solidFill>
-        <a:ln w="25400" cap="flat" cmpd="sng" algn="ctr">
-          <a:solidFill>
-            <a:schemeClr val="lt1">
-              <a:hueOff val="0"/>
-              <a:satOff val="0"/>
-              <a:lumOff val="0"/>
-              <a:alphaOff val="0"/>
-            </a:schemeClr>
-          </a:solidFill>
-          <a:prstDash val="solid"/>
-        </a:ln>
-        <a:effectLst/>
-      </dsp:spPr>
-      <dsp:style>
-        <a:lnRef idx="2">
-          <a:scrgbClr r="0" g="0" b="0"/>
-        </a:lnRef>
-        <a:fillRef idx="1">
-          <a:scrgbClr r="0" g="0" b="0"/>
-        </a:fillRef>
-        <a:effectRef idx="0">
-          <a:scrgbClr r="0" g="0" b="0"/>
-        </a:effectRef>
-        <a:fontRef idx="minor">
-          <a:schemeClr val="lt1"/>
-        </a:fontRef>
-      </dsp:style>
-      <dsp:txBody>
-        <a:bodyPr spcFirstLastPara="0" vert="horz" wrap="square" lIns="226761" tIns="91440" rIns="170688" bIns="91440" numCol="1" spcCol="1270" anchor="ctr" anchorCtr="0">
-          <a:noAutofit/>
-        </a:bodyPr>
-        <a:lstStyle/>
-        <a:p>
-          <a:pPr lvl="0" algn="ctr" defTabSz="1066800">
-            <a:lnSpc>
-              <a:spcPct val="90000"/>
-            </a:lnSpc>
-            <a:spcBef>
-              <a:spcPct val="0"/>
-            </a:spcBef>
-            <a:spcAft>
-              <a:spcPct val="35000"/>
-            </a:spcAft>
-          </a:pPr>
-          <a:r>
-            <a:rPr lang="en-US" sz="2400" kern="1200" dirty="0" smtClean="0"/>
-            <a:t>Proxy</a:t>
-          </a:r>
-          <a:endParaRPr lang="en-US" sz="2400" kern="1200" dirty="0"/>
-        </a:p>
-      </dsp:txBody>
-      <dsp:txXfrm rot="10800000">
-        <a:off x="1635572" y="4009059"/>
-        <a:ext cx="5344127" cy="514229"/>
-      </dsp:txXfrm>
-    </dsp:sp>
-    <dsp:sp modelId="{C661F6C5-9E66-4B6C-A81E-BA3F696A492B}">
-      <dsp:nvSpPr>
-        <dsp:cNvPr id="0" name=""/>
-        <dsp:cNvSpPr/>
-      </dsp:nvSpPr>
-      <dsp:spPr>
-        <a:xfrm>
-          <a:off x="1249900" y="4009059"/>
-          <a:ext cx="514229" cy="514229"/>
-        </a:xfrm>
-        <a:prstGeom prst="ellipse">
-          <a:avLst/>
-        </a:prstGeom>
-        <a:solidFill>
-          <a:schemeClr val="accent1">
-            <a:tint val="50000"/>
-            <a:hueOff val="0"/>
-            <a:satOff val="0"/>
-            <a:lumOff val="0"/>
-            <a:alphaOff val="0"/>
-          </a:schemeClr>
-        </a:solidFill>
-        <a:ln w="25400" cap="flat" cmpd="sng" algn="ctr">
-          <a:solidFill>
-            <a:schemeClr val="lt1">
-              <a:hueOff val="0"/>
-              <a:satOff val="0"/>
-              <a:lumOff val="0"/>
-              <a:alphaOff val="0"/>
-            </a:schemeClr>
-          </a:solidFill>
-          <a:prstDash val="solid"/>
-        </a:ln>
-        <a:effectLst/>
-      </dsp:spPr>
-      <dsp:style>
-        <a:lnRef idx="2">
-          <a:scrgbClr r="0" g="0" b="0"/>
-        </a:lnRef>
-        <a:fillRef idx="1">
-          <a:scrgbClr r="0" g="0" b="0"/>
-        </a:fillRef>
-        <a:effectRef idx="0">
-          <a:scrgbClr r="0" g="0" b="0"/>
-        </a:effectRef>
-        <a:fontRef idx="minor"/>
-      </dsp:style>
-    </dsp:sp>
   </dsp:spTree>
 </dsp:drawing>
 </file>
@@ -5944,881 +4837,6 @@
       <dsp:cNvGrpSpPr/>
     </dsp:nvGrpSpPr>
     <dsp:grpSpPr/>
-    <dsp:sp modelId="{EC613F0C-2CCE-4C4A-8A0F-097FF9013F06}">
-      <dsp:nvSpPr>
-        <dsp:cNvPr id="0" name=""/>
-        <dsp:cNvSpPr/>
-      </dsp:nvSpPr>
-      <dsp:spPr>
-        <a:xfrm rot="10800000">
-          <a:off x="1551989" y="249"/>
-          <a:ext cx="5624703" cy="540965"/>
-        </a:xfrm>
-        <a:prstGeom prst="homePlate">
-          <a:avLst/>
-        </a:prstGeom>
-        <a:solidFill>
-          <a:schemeClr val="accent1">
-            <a:hueOff val="0"/>
-            <a:satOff val="0"/>
-            <a:lumOff val="0"/>
-            <a:alphaOff val="0"/>
-          </a:schemeClr>
-        </a:solidFill>
-        <a:ln w="25400" cap="flat" cmpd="sng" algn="ctr">
-          <a:solidFill>
-            <a:schemeClr val="lt1">
-              <a:hueOff val="0"/>
-              <a:satOff val="0"/>
-              <a:lumOff val="0"/>
-              <a:alphaOff val="0"/>
-            </a:schemeClr>
-          </a:solidFill>
-          <a:prstDash val="solid"/>
-        </a:ln>
-        <a:effectLst/>
-      </dsp:spPr>
-      <dsp:style>
-        <a:lnRef idx="2">
-          <a:scrgbClr r="0" g="0" b="0"/>
-        </a:lnRef>
-        <a:fillRef idx="1">
-          <a:scrgbClr r="0" g="0" b="0"/>
-        </a:fillRef>
-        <a:effectRef idx="0">
-          <a:scrgbClr r="0" g="0" b="0"/>
-        </a:effectRef>
-        <a:fontRef idx="minor">
-          <a:schemeClr val="lt1"/>
-        </a:fontRef>
-      </dsp:style>
-      <dsp:txBody>
-        <a:bodyPr spcFirstLastPara="0" vert="horz" wrap="square" lIns="238551" tIns="99060" rIns="184912" bIns="99060" numCol="1" spcCol="1270" anchor="ctr" anchorCtr="0">
-          <a:noAutofit/>
-        </a:bodyPr>
-        <a:lstStyle/>
-        <a:p>
-          <a:pPr lvl="0" algn="ctr" defTabSz="1155700">
-            <a:lnSpc>
-              <a:spcPct val="90000"/>
-            </a:lnSpc>
-            <a:spcBef>
-              <a:spcPct val="0"/>
-            </a:spcBef>
-            <a:spcAft>
-              <a:spcPct val="35000"/>
-            </a:spcAft>
-          </a:pPr>
-          <a:r>
-            <a:rPr lang="en-US" sz="2600" kern="1200" dirty="0" smtClean="0"/>
-            <a:t>Chain of Resp.</a:t>
-          </a:r>
-          <a:endParaRPr lang="en-US" sz="2600" kern="1200" dirty="0"/>
-        </a:p>
-      </dsp:txBody>
-      <dsp:txXfrm rot="10800000">
-        <a:off x="1687230" y="249"/>
-        <a:ext cx="5489462" cy="540965"/>
-      </dsp:txXfrm>
-    </dsp:sp>
-    <dsp:sp modelId="{61EB4A0E-E38E-4FC9-9032-C8EB8BBF1894}">
-      <dsp:nvSpPr>
-        <dsp:cNvPr id="0" name=""/>
-        <dsp:cNvSpPr/>
-      </dsp:nvSpPr>
-      <dsp:spPr>
-        <a:xfrm>
-          <a:off x="1281507" y="249"/>
-          <a:ext cx="540965" cy="540965"/>
-        </a:xfrm>
-        <a:prstGeom prst="ellipse">
-          <a:avLst/>
-        </a:prstGeom>
-        <a:solidFill>
-          <a:schemeClr val="accent1">
-            <a:tint val="50000"/>
-            <a:hueOff val="0"/>
-            <a:satOff val="0"/>
-            <a:lumOff val="0"/>
-            <a:alphaOff val="0"/>
-          </a:schemeClr>
-        </a:solidFill>
-        <a:ln w="25400" cap="flat" cmpd="sng" algn="ctr">
-          <a:solidFill>
-            <a:schemeClr val="lt1">
-              <a:hueOff val="0"/>
-              <a:satOff val="0"/>
-              <a:lumOff val="0"/>
-              <a:alphaOff val="0"/>
-            </a:schemeClr>
-          </a:solidFill>
-          <a:prstDash val="solid"/>
-        </a:ln>
-        <a:effectLst/>
-      </dsp:spPr>
-      <dsp:style>
-        <a:lnRef idx="2">
-          <a:scrgbClr r="0" g="0" b="0"/>
-        </a:lnRef>
-        <a:fillRef idx="1">
-          <a:scrgbClr r="0" g="0" b="0"/>
-        </a:fillRef>
-        <a:effectRef idx="0">
-          <a:scrgbClr r="0" g="0" b="0"/>
-        </a:effectRef>
-        <a:fontRef idx="minor"/>
-      </dsp:style>
-    </dsp:sp>
-    <dsp:sp modelId="{7D4C3070-190E-4B55-80D0-A4B6FA7AEBD7}">
-      <dsp:nvSpPr>
-        <dsp:cNvPr id="0" name=""/>
-        <dsp:cNvSpPr/>
-      </dsp:nvSpPr>
-      <dsp:spPr>
-        <a:xfrm rot="10800000">
-          <a:off x="1551989" y="702696"/>
-          <a:ext cx="5624703" cy="540965"/>
-        </a:xfrm>
-        <a:prstGeom prst="homePlate">
-          <a:avLst/>
-        </a:prstGeom>
-        <a:solidFill>
-          <a:schemeClr val="accent1">
-            <a:hueOff val="0"/>
-            <a:satOff val="0"/>
-            <a:lumOff val="0"/>
-            <a:alphaOff val="0"/>
-          </a:schemeClr>
-        </a:solidFill>
-        <a:ln w="25400" cap="flat" cmpd="sng" algn="ctr">
-          <a:solidFill>
-            <a:schemeClr val="lt1">
-              <a:hueOff val="0"/>
-              <a:satOff val="0"/>
-              <a:lumOff val="0"/>
-              <a:alphaOff val="0"/>
-            </a:schemeClr>
-          </a:solidFill>
-          <a:prstDash val="solid"/>
-        </a:ln>
-        <a:effectLst/>
-      </dsp:spPr>
-      <dsp:style>
-        <a:lnRef idx="2">
-          <a:scrgbClr r="0" g="0" b="0"/>
-        </a:lnRef>
-        <a:fillRef idx="1">
-          <a:scrgbClr r="0" g="0" b="0"/>
-        </a:fillRef>
-        <a:effectRef idx="0">
-          <a:scrgbClr r="0" g="0" b="0"/>
-        </a:effectRef>
-        <a:fontRef idx="minor">
-          <a:schemeClr val="lt1"/>
-        </a:fontRef>
-      </dsp:style>
-      <dsp:txBody>
-        <a:bodyPr spcFirstLastPara="0" vert="horz" wrap="square" lIns="238551" tIns="99060" rIns="184912" bIns="99060" numCol="1" spcCol="1270" anchor="ctr" anchorCtr="0">
-          <a:noAutofit/>
-        </a:bodyPr>
-        <a:lstStyle/>
-        <a:p>
-          <a:pPr lvl="0" algn="ctr" defTabSz="1155700">
-            <a:lnSpc>
-              <a:spcPct val="90000"/>
-            </a:lnSpc>
-            <a:spcBef>
-              <a:spcPct val="0"/>
-            </a:spcBef>
-            <a:spcAft>
-              <a:spcPct val="35000"/>
-            </a:spcAft>
-          </a:pPr>
-          <a:r>
-            <a:rPr lang="en-US" sz="2600" kern="1200" dirty="0" smtClean="0"/>
-            <a:t> Command</a:t>
-          </a:r>
-          <a:endParaRPr lang="en-US" sz="2600" kern="1200" dirty="0"/>
-        </a:p>
-      </dsp:txBody>
-      <dsp:txXfrm rot="10800000">
-        <a:off x="1687230" y="702696"/>
-        <a:ext cx="5489462" cy="540965"/>
-      </dsp:txXfrm>
-    </dsp:sp>
-    <dsp:sp modelId="{A7B013B6-E598-4143-8859-9D9974156C11}">
-      <dsp:nvSpPr>
-        <dsp:cNvPr id="0" name=""/>
-        <dsp:cNvSpPr/>
-      </dsp:nvSpPr>
-      <dsp:spPr>
-        <a:xfrm>
-          <a:off x="1281507" y="702696"/>
-          <a:ext cx="540965" cy="540965"/>
-        </a:xfrm>
-        <a:prstGeom prst="ellipse">
-          <a:avLst/>
-        </a:prstGeom>
-        <a:solidFill>
-          <a:schemeClr val="accent1">
-            <a:tint val="50000"/>
-            <a:hueOff val="0"/>
-            <a:satOff val="0"/>
-            <a:lumOff val="0"/>
-            <a:alphaOff val="0"/>
-          </a:schemeClr>
-        </a:solidFill>
-        <a:ln w="25400" cap="flat" cmpd="sng" algn="ctr">
-          <a:solidFill>
-            <a:schemeClr val="lt1">
-              <a:hueOff val="0"/>
-              <a:satOff val="0"/>
-              <a:lumOff val="0"/>
-              <a:alphaOff val="0"/>
-            </a:schemeClr>
-          </a:solidFill>
-          <a:prstDash val="solid"/>
-        </a:ln>
-        <a:effectLst/>
-      </dsp:spPr>
-      <dsp:style>
-        <a:lnRef idx="2">
-          <a:scrgbClr r="0" g="0" b="0"/>
-        </a:lnRef>
-        <a:fillRef idx="1">
-          <a:scrgbClr r="0" g="0" b="0"/>
-        </a:fillRef>
-        <a:effectRef idx="0">
-          <a:scrgbClr r="0" g="0" b="0"/>
-        </a:effectRef>
-        <a:fontRef idx="minor"/>
-      </dsp:style>
-    </dsp:sp>
-    <dsp:sp modelId="{77C38AEC-886E-4F4F-A3B0-6840519B353A}">
-      <dsp:nvSpPr>
-        <dsp:cNvPr id="0" name=""/>
-        <dsp:cNvSpPr/>
-      </dsp:nvSpPr>
-      <dsp:spPr>
-        <a:xfrm rot="10800000">
-          <a:off x="1551989" y="1405144"/>
-          <a:ext cx="5624703" cy="540965"/>
-        </a:xfrm>
-        <a:prstGeom prst="homePlate">
-          <a:avLst/>
-        </a:prstGeom>
-        <a:solidFill>
-          <a:schemeClr val="accent1">
-            <a:hueOff val="0"/>
-            <a:satOff val="0"/>
-            <a:lumOff val="0"/>
-            <a:alphaOff val="0"/>
-          </a:schemeClr>
-        </a:solidFill>
-        <a:ln w="25400" cap="flat" cmpd="sng" algn="ctr">
-          <a:solidFill>
-            <a:schemeClr val="lt1">
-              <a:hueOff val="0"/>
-              <a:satOff val="0"/>
-              <a:lumOff val="0"/>
-              <a:alphaOff val="0"/>
-            </a:schemeClr>
-          </a:solidFill>
-          <a:prstDash val="solid"/>
-        </a:ln>
-        <a:effectLst/>
-      </dsp:spPr>
-      <dsp:style>
-        <a:lnRef idx="2">
-          <a:scrgbClr r="0" g="0" b="0"/>
-        </a:lnRef>
-        <a:fillRef idx="1">
-          <a:scrgbClr r="0" g="0" b="0"/>
-        </a:fillRef>
-        <a:effectRef idx="0">
-          <a:scrgbClr r="0" g="0" b="0"/>
-        </a:effectRef>
-        <a:fontRef idx="minor">
-          <a:schemeClr val="lt1"/>
-        </a:fontRef>
-      </dsp:style>
-      <dsp:txBody>
-        <a:bodyPr spcFirstLastPara="0" vert="horz" wrap="square" lIns="238551" tIns="99060" rIns="184912" bIns="99060" numCol="1" spcCol="1270" anchor="ctr" anchorCtr="0">
-          <a:noAutofit/>
-        </a:bodyPr>
-        <a:lstStyle/>
-        <a:p>
-          <a:pPr lvl="0" algn="ctr" defTabSz="1155700">
-            <a:lnSpc>
-              <a:spcPct val="90000"/>
-            </a:lnSpc>
-            <a:spcBef>
-              <a:spcPct val="0"/>
-            </a:spcBef>
-            <a:spcAft>
-              <a:spcPct val="35000"/>
-            </a:spcAft>
-          </a:pPr>
-          <a:r>
-            <a:rPr lang="en-US" sz="2600" kern="1200" dirty="0" smtClean="0"/>
-            <a:t>Interpreter</a:t>
-          </a:r>
-          <a:endParaRPr lang="en-US" sz="2600" kern="1200" dirty="0"/>
-        </a:p>
-      </dsp:txBody>
-      <dsp:txXfrm rot="10800000">
-        <a:off x="1687230" y="1405144"/>
-        <a:ext cx="5489462" cy="540965"/>
-      </dsp:txXfrm>
-    </dsp:sp>
-    <dsp:sp modelId="{C73195EA-CB97-4458-9C93-1CD410DA78C6}">
-      <dsp:nvSpPr>
-        <dsp:cNvPr id="0" name=""/>
-        <dsp:cNvSpPr/>
-      </dsp:nvSpPr>
-      <dsp:spPr>
-        <a:xfrm>
-          <a:off x="1281507" y="1405144"/>
-          <a:ext cx="540965" cy="540965"/>
-        </a:xfrm>
-        <a:prstGeom prst="ellipse">
-          <a:avLst/>
-        </a:prstGeom>
-        <a:solidFill>
-          <a:schemeClr val="accent1">
-            <a:tint val="50000"/>
-            <a:hueOff val="0"/>
-            <a:satOff val="0"/>
-            <a:lumOff val="0"/>
-            <a:alphaOff val="0"/>
-          </a:schemeClr>
-        </a:solidFill>
-        <a:ln w="25400" cap="flat" cmpd="sng" algn="ctr">
-          <a:solidFill>
-            <a:schemeClr val="lt1">
-              <a:hueOff val="0"/>
-              <a:satOff val="0"/>
-              <a:lumOff val="0"/>
-              <a:alphaOff val="0"/>
-            </a:schemeClr>
-          </a:solidFill>
-          <a:prstDash val="solid"/>
-        </a:ln>
-        <a:effectLst/>
-      </dsp:spPr>
-      <dsp:style>
-        <a:lnRef idx="2">
-          <a:scrgbClr r="0" g="0" b="0"/>
-        </a:lnRef>
-        <a:fillRef idx="1">
-          <a:scrgbClr r="0" g="0" b="0"/>
-        </a:fillRef>
-        <a:effectRef idx="0">
-          <a:scrgbClr r="0" g="0" b="0"/>
-        </a:effectRef>
-        <a:fontRef idx="minor"/>
-      </dsp:style>
-    </dsp:sp>
-    <dsp:sp modelId="{3F343952-278E-4762-AD99-C388636C6902}">
-      <dsp:nvSpPr>
-        <dsp:cNvPr id="0" name=""/>
-        <dsp:cNvSpPr/>
-      </dsp:nvSpPr>
-      <dsp:spPr>
-        <a:xfrm rot="10800000">
-          <a:off x="1551989" y="2107592"/>
-          <a:ext cx="5624703" cy="540965"/>
-        </a:xfrm>
-        <a:prstGeom prst="homePlate">
-          <a:avLst/>
-        </a:prstGeom>
-        <a:solidFill>
-          <a:schemeClr val="accent1">
-            <a:hueOff val="0"/>
-            <a:satOff val="0"/>
-            <a:lumOff val="0"/>
-            <a:alphaOff val="0"/>
-          </a:schemeClr>
-        </a:solidFill>
-        <a:ln w="25400" cap="flat" cmpd="sng" algn="ctr">
-          <a:solidFill>
-            <a:schemeClr val="lt1">
-              <a:hueOff val="0"/>
-              <a:satOff val="0"/>
-              <a:lumOff val="0"/>
-              <a:alphaOff val="0"/>
-            </a:schemeClr>
-          </a:solidFill>
-          <a:prstDash val="solid"/>
-        </a:ln>
-        <a:effectLst/>
-      </dsp:spPr>
-      <dsp:style>
-        <a:lnRef idx="2">
-          <a:scrgbClr r="0" g="0" b="0"/>
-        </a:lnRef>
-        <a:fillRef idx="1">
-          <a:scrgbClr r="0" g="0" b="0"/>
-        </a:fillRef>
-        <a:effectRef idx="0">
-          <a:scrgbClr r="0" g="0" b="0"/>
-        </a:effectRef>
-        <a:fontRef idx="minor">
-          <a:schemeClr val="lt1"/>
-        </a:fontRef>
-      </dsp:style>
-      <dsp:txBody>
-        <a:bodyPr spcFirstLastPara="0" vert="horz" wrap="square" lIns="238551" tIns="99060" rIns="184912" bIns="99060" numCol="1" spcCol="1270" anchor="ctr" anchorCtr="0">
-          <a:noAutofit/>
-        </a:bodyPr>
-        <a:lstStyle/>
-        <a:p>
-          <a:pPr lvl="0" algn="ctr" defTabSz="1155700">
-            <a:lnSpc>
-              <a:spcPct val="90000"/>
-            </a:lnSpc>
-            <a:spcBef>
-              <a:spcPct val="0"/>
-            </a:spcBef>
-            <a:spcAft>
-              <a:spcPct val="35000"/>
-            </a:spcAft>
-          </a:pPr>
-          <a:r>
-            <a:rPr lang="en-US" sz="2600" kern="1200" dirty="0" smtClean="0"/>
-            <a:t>Iterator</a:t>
-          </a:r>
-          <a:endParaRPr lang="en-US" sz="2600" kern="1200" dirty="0"/>
-        </a:p>
-      </dsp:txBody>
-      <dsp:txXfrm rot="10800000">
-        <a:off x="1687230" y="2107592"/>
-        <a:ext cx="5489462" cy="540965"/>
-      </dsp:txXfrm>
-    </dsp:sp>
-    <dsp:sp modelId="{B93695E8-0A7A-47A1-9D19-690B35925A98}">
-      <dsp:nvSpPr>
-        <dsp:cNvPr id="0" name=""/>
-        <dsp:cNvSpPr/>
-      </dsp:nvSpPr>
-      <dsp:spPr>
-        <a:xfrm>
-          <a:off x="1281507" y="2107592"/>
-          <a:ext cx="540965" cy="540965"/>
-        </a:xfrm>
-        <a:prstGeom prst="ellipse">
-          <a:avLst/>
-        </a:prstGeom>
-        <a:solidFill>
-          <a:schemeClr val="accent1">
-            <a:tint val="50000"/>
-            <a:hueOff val="0"/>
-            <a:satOff val="0"/>
-            <a:lumOff val="0"/>
-            <a:alphaOff val="0"/>
-          </a:schemeClr>
-        </a:solidFill>
-        <a:ln w="25400" cap="flat" cmpd="sng" algn="ctr">
-          <a:solidFill>
-            <a:schemeClr val="lt1">
-              <a:hueOff val="0"/>
-              <a:satOff val="0"/>
-              <a:lumOff val="0"/>
-              <a:alphaOff val="0"/>
-            </a:schemeClr>
-          </a:solidFill>
-          <a:prstDash val="solid"/>
-        </a:ln>
-        <a:effectLst/>
-      </dsp:spPr>
-      <dsp:style>
-        <a:lnRef idx="2">
-          <a:scrgbClr r="0" g="0" b="0"/>
-        </a:lnRef>
-        <a:fillRef idx="1">
-          <a:scrgbClr r="0" g="0" b="0"/>
-        </a:fillRef>
-        <a:effectRef idx="0">
-          <a:scrgbClr r="0" g="0" b="0"/>
-        </a:effectRef>
-        <a:fontRef idx="minor"/>
-      </dsp:style>
-    </dsp:sp>
-    <dsp:sp modelId="{6B3C036E-74A3-4958-A43B-D1084CE1E10D}">
-      <dsp:nvSpPr>
-        <dsp:cNvPr id="0" name=""/>
-        <dsp:cNvSpPr/>
-      </dsp:nvSpPr>
-      <dsp:spPr>
-        <a:xfrm rot="10800000">
-          <a:off x="1551989" y="2810039"/>
-          <a:ext cx="5624703" cy="540965"/>
-        </a:xfrm>
-        <a:prstGeom prst="homePlate">
-          <a:avLst/>
-        </a:prstGeom>
-        <a:solidFill>
-          <a:schemeClr val="accent1">
-            <a:hueOff val="0"/>
-            <a:satOff val="0"/>
-            <a:lumOff val="0"/>
-            <a:alphaOff val="0"/>
-          </a:schemeClr>
-        </a:solidFill>
-        <a:ln w="25400" cap="flat" cmpd="sng" algn="ctr">
-          <a:solidFill>
-            <a:schemeClr val="lt1">
-              <a:hueOff val="0"/>
-              <a:satOff val="0"/>
-              <a:lumOff val="0"/>
-              <a:alphaOff val="0"/>
-            </a:schemeClr>
-          </a:solidFill>
-          <a:prstDash val="solid"/>
-        </a:ln>
-        <a:effectLst/>
-      </dsp:spPr>
-      <dsp:style>
-        <a:lnRef idx="2">
-          <a:scrgbClr r="0" g="0" b="0"/>
-        </a:lnRef>
-        <a:fillRef idx="1">
-          <a:scrgbClr r="0" g="0" b="0"/>
-        </a:fillRef>
-        <a:effectRef idx="0">
-          <a:scrgbClr r="0" g="0" b="0"/>
-        </a:effectRef>
-        <a:fontRef idx="minor">
-          <a:schemeClr val="lt1"/>
-        </a:fontRef>
-      </dsp:style>
-      <dsp:txBody>
-        <a:bodyPr spcFirstLastPara="0" vert="horz" wrap="square" lIns="238551" tIns="99060" rIns="184912" bIns="99060" numCol="1" spcCol="1270" anchor="ctr" anchorCtr="0">
-          <a:noAutofit/>
-        </a:bodyPr>
-        <a:lstStyle/>
-        <a:p>
-          <a:pPr lvl="0" algn="ctr" defTabSz="1155700">
-            <a:lnSpc>
-              <a:spcPct val="90000"/>
-            </a:lnSpc>
-            <a:spcBef>
-              <a:spcPct val="0"/>
-            </a:spcBef>
-            <a:spcAft>
-              <a:spcPct val="35000"/>
-            </a:spcAft>
-          </a:pPr>
-          <a:r>
-            <a:rPr lang="en-US" sz="2600" kern="1200" dirty="0" smtClean="0"/>
-            <a:t>Observer</a:t>
-          </a:r>
-          <a:endParaRPr lang="en-US" sz="2600" kern="1200" dirty="0"/>
-        </a:p>
-      </dsp:txBody>
-      <dsp:txXfrm rot="10800000">
-        <a:off x="1687230" y="2810039"/>
-        <a:ext cx="5489462" cy="540965"/>
-      </dsp:txXfrm>
-    </dsp:sp>
-    <dsp:sp modelId="{88B3FE18-0B39-43AA-AFFC-8CA66A5D3B20}">
-      <dsp:nvSpPr>
-        <dsp:cNvPr id="0" name=""/>
-        <dsp:cNvSpPr/>
-      </dsp:nvSpPr>
-      <dsp:spPr>
-        <a:xfrm>
-          <a:off x="1281507" y="2810039"/>
-          <a:ext cx="540965" cy="540965"/>
-        </a:xfrm>
-        <a:prstGeom prst="ellipse">
-          <a:avLst/>
-        </a:prstGeom>
-        <a:solidFill>
-          <a:schemeClr val="accent1">
-            <a:tint val="50000"/>
-            <a:hueOff val="0"/>
-            <a:satOff val="0"/>
-            <a:lumOff val="0"/>
-            <a:alphaOff val="0"/>
-          </a:schemeClr>
-        </a:solidFill>
-        <a:ln w="25400" cap="flat" cmpd="sng" algn="ctr">
-          <a:solidFill>
-            <a:schemeClr val="lt1">
-              <a:hueOff val="0"/>
-              <a:satOff val="0"/>
-              <a:lumOff val="0"/>
-              <a:alphaOff val="0"/>
-            </a:schemeClr>
-          </a:solidFill>
-          <a:prstDash val="solid"/>
-        </a:ln>
-        <a:effectLst/>
-      </dsp:spPr>
-      <dsp:style>
-        <a:lnRef idx="2">
-          <a:scrgbClr r="0" g="0" b="0"/>
-        </a:lnRef>
-        <a:fillRef idx="1">
-          <a:scrgbClr r="0" g="0" b="0"/>
-        </a:fillRef>
-        <a:effectRef idx="0">
-          <a:scrgbClr r="0" g="0" b="0"/>
-        </a:effectRef>
-        <a:fontRef idx="minor"/>
-      </dsp:style>
-    </dsp:sp>
-    <dsp:sp modelId="{712A02A0-0414-49B8-B1E0-FA035CAF9D11}">
-      <dsp:nvSpPr>
-        <dsp:cNvPr id="0" name=""/>
-        <dsp:cNvSpPr/>
-      </dsp:nvSpPr>
-      <dsp:spPr>
-        <a:xfrm rot="10800000">
-          <a:off x="1551989" y="3512487"/>
-          <a:ext cx="5624703" cy="540965"/>
-        </a:xfrm>
-        <a:prstGeom prst="homePlate">
-          <a:avLst/>
-        </a:prstGeom>
-        <a:solidFill>
-          <a:schemeClr val="accent1">
-            <a:hueOff val="0"/>
-            <a:satOff val="0"/>
-            <a:lumOff val="0"/>
-            <a:alphaOff val="0"/>
-          </a:schemeClr>
-        </a:solidFill>
-        <a:ln w="25400" cap="flat" cmpd="sng" algn="ctr">
-          <a:solidFill>
-            <a:schemeClr val="lt1">
-              <a:hueOff val="0"/>
-              <a:satOff val="0"/>
-              <a:lumOff val="0"/>
-              <a:alphaOff val="0"/>
-            </a:schemeClr>
-          </a:solidFill>
-          <a:prstDash val="solid"/>
-        </a:ln>
-        <a:effectLst/>
-      </dsp:spPr>
-      <dsp:style>
-        <a:lnRef idx="2">
-          <a:scrgbClr r="0" g="0" b="0"/>
-        </a:lnRef>
-        <a:fillRef idx="1">
-          <a:scrgbClr r="0" g="0" b="0"/>
-        </a:fillRef>
-        <a:effectRef idx="0">
-          <a:scrgbClr r="0" g="0" b="0"/>
-        </a:effectRef>
-        <a:fontRef idx="minor">
-          <a:schemeClr val="lt1"/>
-        </a:fontRef>
-      </dsp:style>
-      <dsp:txBody>
-        <a:bodyPr spcFirstLastPara="0" vert="horz" wrap="square" lIns="238551" tIns="99060" rIns="184912" bIns="99060" numCol="1" spcCol="1270" anchor="ctr" anchorCtr="0">
-          <a:noAutofit/>
-        </a:bodyPr>
-        <a:lstStyle/>
-        <a:p>
-          <a:pPr lvl="0" algn="ctr" defTabSz="1155700">
-            <a:lnSpc>
-              <a:spcPct val="90000"/>
-            </a:lnSpc>
-            <a:spcBef>
-              <a:spcPct val="0"/>
-            </a:spcBef>
-            <a:spcAft>
-              <a:spcPct val="35000"/>
-            </a:spcAft>
-          </a:pPr>
-          <a:r>
-            <a:rPr lang="en-US" sz="2600" kern="1200" dirty="0" smtClean="0"/>
-            <a:t>Strategy</a:t>
-          </a:r>
-          <a:endParaRPr lang="en-US" sz="2600" kern="1200" dirty="0"/>
-        </a:p>
-      </dsp:txBody>
-      <dsp:txXfrm rot="10800000">
-        <a:off x="1687230" y="3512487"/>
-        <a:ext cx="5489462" cy="540965"/>
-      </dsp:txXfrm>
-    </dsp:sp>
-    <dsp:sp modelId="{13FAD4E5-2420-49E9-9462-FBF7DD908FF1}">
-      <dsp:nvSpPr>
-        <dsp:cNvPr id="0" name=""/>
-        <dsp:cNvSpPr/>
-      </dsp:nvSpPr>
-      <dsp:spPr>
-        <a:xfrm>
-          <a:off x="1281507" y="3512487"/>
-          <a:ext cx="540965" cy="540965"/>
-        </a:xfrm>
-        <a:prstGeom prst="ellipse">
-          <a:avLst/>
-        </a:prstGeom>
-        <a:solidFill>
-          <a:schemeClr val="accent1">
-            <a:tint val="50000"/>
-            <a:hueOff val="0"/>
-            <a:satOff val="0"/>
-            <a:lumOff val="0"/>
-            <a:alphaOff val="0"/>
-          </a:schemeClr>
-        </a:solidFill>
-        <a:ln w="25400" cap="flat" cmpd="sng" algn="ctr">
-          <a:solidFill>
-            <a:schemeClr val="lt1">
-              <a:hueOff val="0"/>
-              <a:satOff val="0"/>
-              <a:lumOff val="0"/>
-              <a:alphaOff val="0"/>
-            </a:schemeClr>
-          </a:solidFill>
-          <a:prstDash val="solid"/>
-        </a:ln>
-        <a:effectLst/>
-      </dsp:spPr>
-      <dsp:style>
-        <a:lnRef idx="2">
-          <a:scrgbClr r="0" g="0" b="0"/>
-        </a:lnRef>
-        <a:fillRef idx="1">
-          <a:scrgbClr r="0" g="0" b="0"/>
-        </a:fillRef>
-        <a:effectRef idx="0">
-          <a:scrgbClr r="0" g="0" b="0"/>
-        </a:effectRef>
-        <a:fontRef idx="minor"/>
-      </dsp:style>
-    </dsp:sp>
-    <dsp:sp modelId="{24C8095E-364B-47DE-9642-0E5B54B5FD87}">
-      <dsp:nvSpPr>
-        <dsp:cNvPr id="0" name=""/>
-        <dsp:cNvSpPr/>
-      </dsp:nvSpPr>
-      <dsp:spPr>
-        <a:xfrm rot="10800000">
-          <a:off x="1551989" y="4214935"/>
-          <a:ext cx="5624703" cy="540965"/>
-        </a:xfrm>
-        <a:prstGeom prst="homePlate">
-          <a:avLst/>
-        </a:prstGeom>
-        <a:solidFill>
-          <a:schemeClr val="accent1">
-            <a:hueOff val="0"/>
-            <a:satOff val="0"/>
-            <a:lumOff val="0"/>
-            <a:alphaOff val="0"/>
-          </a:schemeClr>
-        </a:solidFill>
-        <a:ln w="25400" cap="flat" cmpd="sng" algn="ctr">
-          <a:solidFill>
-            <a:schemeClr val="lt1">
-              <a:hueOff val="0"/>
-              <a:satOff val="0"/>
-              <a:lumOff val="0"/>
-              <a:alphaOff val="0"/>
-            </a:schemeClr>
-          </a:solidFill>
-          <a:prstDash val="solid"/>
-        </a:ln>
-        <a:effectLst/>
-      </dsp:spPr>
-      <dsp:style>
-        <a:lnRef idx="2">
-          <a:scrgbClr r="0" g="0" b="0"/>
-        </a:lnRef>
-        <a:fillRef idx="1">
-          <a:scrgbClr r="0" g="0" b="0"/>
-        </a:fillRef>
-        <a:effectRef idx="0">
-          <a:scrgbClr r="0" g="0" b="0"/>
-        </a:effectRef>
-        <a:fontRef idx="minor">
-          <a:schemeClr val="lt1"/>
-        </a:fontRef>
-      </dsp:style>
-      <dsp:txBody>
-        <a:bodyPr spcFirstLastPara="0" vert="horz" wrap="square" lIns="238551" tIns="99060" rIns="184912" bIns="99060" numCol="1" spcCol="1270" anchor="ctr" anchorCtr="0">
-          <a:noAutofit/>
-        </a:bodyPr>
-        <a:lstStyle/>
-        <a:p>
-          <a:pPr lvl="0" algn="ctr" defTabSz="1155700">
-            <a:lnSpc>
-              <a:spcPct val="90000"/>
-            </a:lnSpc>
-            <a:spcBef>
-              <a:spcPct val="0"/>
-            </a:spcBef>
-            <a:spcAft>
-              <a:spcPct val="35000"/>
-            </a:spcAft>
-          </a:pPr>
-          <a:r>
-            <a:rPr lang="en-US" sz="2600" kern="1200" dirty="0" smtClean="0"/>
-            <a:t>…</a:t>
-          </a:r>
-          <a:endParaRPr lang="en-US" sz="2600" kern="1200" dirty="0"/>
-        </a:p>
-      </dsp:txBody>
-      <dsp:txXfrm rot="10800000">
-        <a:off x="1687230" y="4214935"/>
-        <a:ext cx="5489462" cy="540965"/>
-      </dsp:txXfrm>
-    </dsp:sp>
-    <dsp:sp modelId="{72E85A79-F72A-44C5-B601-7E3F5E926880}">
-      <dsp:nvSpPr>
-        <dsp:cNvPr id="0" name=""/>
-        <dsp:cNvSpPr/>
-      </dsp:nvSpPr>
-      <dsp:spPr>
-        <a:xfrm>
-          <a:off x="1281507" y="4214935"/>
-          <a:ext cx="540965" cy="540965"/>
-        </a:xfrm>
-        <a:prstGeom prst="ellipse">
-          <a:avLst/>
-        </a:prstGeom>
-        <a:solidFill>
-          <a:schemeClr val="accent1">
-            <a:tint val="50000"/>
-            <a:hueOff val="0"/>
-            <a:satOff val="0"/>
-            <a:lumOff val="0"/>
-            <a:alphaOff val="0"/>
-          </a:schemeClr>
-        </a:solidFill>
-        <a:ln w="25400" cap="flat" cmpd="sng" algn="ctr">
-          <a:solidFill>
-            <a:schemeClr val="lt1">
-              <a:hueOff val="0"/>
-              <a:satOff val="0"/>
-              <a:lumOff val="0"/>
-              <a:alphaOff val="0"/>
-            </a:schemeClr>
-          </a:solidFill>
-          <a:prstDash val="solid"/>
-        </a:ln>
-        <a:effectLst/>
-      </dsp:spPr>
-      <dsp:style>
-        <a:lnRef idx="2">
-          <a:scrgbClr r="0" g="0" b="0"/>
-        </a:lnRef>
-        <a:fillRef idx="1">
-          <a:scrgbClr r="0" g="0" b="0"/>
-        </a:fillRef>
-        <a:effectRef idx="0">
-          <a:scrgbClr r="0" g="0" b="0"/>
-        </a:effectRef>
-        <a:fontRef idx="minor"/>
-      </dsp:style>
-    </dsp:sp>
   </dsp:spTree>
 </dsp:drawing>
 </file>
@@ -13342,7 +11360,7 @@
             <a:fld id="{559C4A52-4ACF-44E6-B7A9-3756997F58DA}" type="slidenum">
               <a:rPr lang="en-US" smtClean="0"/>
               <a:pPr/>
-              <a:t>23</a:t>
+              <a:t>31</a:t>
             </a:fld>
             <a:endParaRPr lang="en-US"/>
           </a:p>
@@ -17565,7 +15583,7 @@
           <a:p>
             <a:r>
               <a:rPr lang="en-US" dirty="0" smtClean="0"/>
-              <a:t>How</a:t>
+              <a:t>UML</a:t>
             </a:r>
             <a:endParaRPr lang="nl-NL" dirty="0"/>
           </a:p>
@@ -17951,11 +15969,7 @@
           <a:p>
             <a:r>
               <a:rPr lang="en-US" dirty="0" smtClean="0"/>
-              <a:t>Whe</a:t>
-            </a:r>
-            <a:r>
-              <a:rPr lang="en-US" dirty="0" smtClean="0"/>
-              <a:t>n</a:t>
+              <a:t>When</a:t>
             </a:r>
             <a:endParaRPr lang="nl-NL" dirty="0"/>
           </a:p>
@@ -18644,6 +16658,16 @@
           <a:bodyPr/>
           <a:lstStyle/>
           <a:p>
+            <a:pPr marL="0" indent="0" algn="ctr">
+              <a:buNone/>
+            </a:pPr>
+            <a:r>
+              <a:rPr lang="nl-NL" sz="6000" dirty="0" err="1"/>
+              <a:t>Strategy</a:t>
+            </a:r>
+            <a:endParaRPr lang="nl-NL" sz="6000" dirty="0"/>
+          </a:p>
+          <a:p>
             <a:endParaRPr lang="nl-NL" dirty="0"/>
           </a:p>
         </p:txBody>
@@ -18709,6 +16733,1171 @@
 </file>
 
 <file path=ppt/slides/slide22.xml><?xml version="1.0" encoding="utf-8"?>
+<p:sld xmlns:a="http://schemas.openxmlformats.org/drawingml/2006/main" xmlns:r="http://schemas.openxmlformats.org/officeDocument/2006/relationships" xmlns:p="http://schemas.openxmlformats.org/presentationml/2006/main">
+  <p:cSld>
+    <p:spTree>
+      <p:nvGrpSpPr>
+        <p:cNvPr id="1" name=""/>
+        <p:cNvGrpSpPr/>
+        <p:nvPr/>
+      </p:nvGrpSpPr>
+      <p:grpSpPr>
+        <a:xfrm>
+          <a:off x="0" y="0"/>
+          <a:ext cx="0" cy="0"/>
+          <a:chOff x="0" y="0"/>
+          <a:chExt cx="0" cy="0"/>
+        </a:xfrm>
+      </p:grpSpPr>
+      <p:sp>
+        <p:nvSpPr>
+          <p:cNvPr id="2" name="Title 1"/>
+          <p:cNvSpPr>
+            <a:spLocks noGrp="1"/>
+          </p:cNvSpPr>
+          <p:nvPr>
+            <p:ph type="title"/>
+          </p:nvPr>
+        </p:nvSpPr>
+        <p:spPr/>
+        <p:txBody>
+          <a:bodyPr/>
+          <a:lstStyle/>
+          <a:p>
+            <a:r>
+              <a:rPr lang="en-US" dirty="0" smtClean="0"/>
+              <a:t>When</a:t>
+            </a:r>
+            <a:endParaRPr lang="nl-NL" dirty="0"/>
+          </a:p>
+        </p:txBody>
+      </p:sp>
+      <p:sp>
+        <p:nvSpPr>
+          <p:cNvPr id="3" name="Content Placeholder 2"/>
+          <p:cNvSpPr>
+            <a:spLocks noGrp="1"/>
+          </p:cNvSpPr>
+          <p:nvPr>
+            <p:ph idx="1"/>
+          </p:nvPr>
+        </p:nvSpPr>
+        <p:spPr/>
+        <p:txBody>
+          <a:bodyPr/>
+          <a:lstStyle/>
+          <a:p>
+            <a:r>
+              <a:rPr lang="en-US" dirty="0" smtClean="0"/>
+              <a:t>Have a family of implementation</a:t>
+            </a:r>
+          </a:p>
+          <a:p>
+            <a:r>
+              <a:rPr lang="en-US" dirty="0" smtClean="0"/>
+              <a:t>Make them </a:t>
+            </a:r>
+            <a:r>
+              <a:rPr lang="nl-NL" dirty="0" err="1"/>
+              <a:t>interchangeable</a:t>
+            </a:r>
+            <a:endParaRPr lang="nl-NL" dirty="0"/>
+          </a:p>
+        </p:txBody>
+      </p:sp>
+      <p:sp>
+        <p:nvSpPr>
+          <p:cNvPr id="4" name="Footer Placeholder 3"/>
+          <p:cNvSpPr>
+            <a:spLocks noGrp="1"/>
+          </p:cNvSpPr>
+          <p:nvPr>
+            <p:ph type="ftr" sz="quarter" idx="11"/>
+          </p:nvPr>
+        </p:nvSpPr>
+        <p:spPr/>
+        <p:txBody>
+          <a:bodyPr/>
+          <a:lstStyle/>
+          <a:p>
+            <a:r>
+              <a:rPr lang="en-US" smtClean="0"/>
+              <a:t>© Sioux 2013 | Confidential | </a:t>
+            </a:r>
+            <a:endParaRPr lang="en-US"/>
+          </a:p>
+        </p:txBody>
+      </p:sp>
+      <p:sp>
+        <p:nvSpPr>
+          <p:cNvPr id="5" name="Slide Number Placeholder 4"/>
+          <p:cNvSpPr>
+            <a:spLocks noGrp="1"/>
+          </p:cNvSpPr>
+          <p:nvPr>
+            <p:ph type="sldNum" sz="quarter" idx="12"/>
+          </p:nvPr>
+        </p:nvSpPr>
+        <p:spPr/>
+        <p:txBody>
+          <a:bodyPr/>
+          <a:lstStyle/>
+          <a:p>
+            <a:fld id="{B60E6772-B9F1-4672-903F-323A7A0E6EBD}" type="slidenum">
+              <a:rPr lang="en-US" smtClean="0"/>
+              <a:pPr/>
+              <a:t>22</a:t>
+            </a:fld>
+            <a:endParaRPr lang="en-US"/>
+          </a:p>
+        </p:txBody>
+      </p:sp>
+    </p:spTree>
+    <p:extLst>
+      <p:ext uri="{BB962C8B-B14F-4D97-AF65-F5344CB8AC3E}">
+        <p14:creationId xmlns:p14="http://schemas.microsoft.com/office/powerpoint/2010/main" val="2439555505"/>
+      </p:ext>
+    </p:extLst>
+  </p:cSld>
+  <p:clrMapOvr>
+    <a:masterClrMapping/>
+  </p:clrMapOvr>
+</p:sld>
+</file>
+
+<file path=ppt/slides/slide23.xml><?xml version="1.0" encoding="utf-8"?>
+<p:sld xmlns:a="http://schemas.openxmlformats.org/drawingml/2006/main" xmlns:r="http://schemas.openxmlformats.org/officeDocument/2006/relationships" xmlns:p="http://schemas.openxmlformats.org/presentationml/2006/main">
+  <p:cSld>
+    <p:spTree>
+      <p:nvGrpSpPr>
+        <p:cNvPr id="1" name=""/>
+        <p:cNvGrpSpPr/>
+        <p:nvPr/>
+      </p:nvGrpSpPr>
+      <p:grpSpPr>
+        <a:xfrm>
+          <a:off x="0" y="0"/>
+          <a:ext cx="0" cy="0"/>
+          <a:chOff x="0" y="0"/>
+          <a:chExt cx="0" cy="0"/>
+        </a:xfrm>
+      </p:grpSpPr>
+      <p:sp>
+        <p:nvSpPr>
+          <p:cNvPr id="2" name="Title 1"/>
+          <p:cNvSpPr>
+            <a:spLocks noGrp="1"/>
+          </p:cNvSpPr>
+          <p:nvPr>
+            <p:ph type="title"/>
+          </p:nvPr>
+        </p:nvSpPr>
+        <p:spPr/>
+        <p:txBody>
+          <a:bodyPr/>
+          <a:lstStyle/>
+          <a:p>
+            <a:r>
+              <a:rPr lang="en-US" dirty="0" smtClean="0"/>
+              <a:t>How</a:t>
+            </a:r>
+            <a:endParaRPr lang="nl-NL" dirty="0"/>
+          </a:p>
+        </p:txBody>
+      </p:sp>
+      <p:sp>
+        <p:nvSpPr>
+          <p:cNvPr id="3" name="Content Placeholder 2"/>
+          <p:cNvSpPr>
+            <a:spLocks noGrp="1"/>
+          </p:cNvSpPr>
+          <p:nvPr>
+            <p:ph idx="1"/>
+          </p:nvPr>
+        </p:nvSpPr>
+        <p:spPr/>
+        <p:txBody>
+          <a:bodyPr/>
+          <a:lstStyle/>
+          <a:p>
+            <a:r>
+              <a:rPr lang="en-US" dirty="0"/>
+              <a:t>Capture the abstraction in an </a:t>
+            </a:r>
+            <a:r>
+              <a:rPr lang="en-US" dirty="0" smtClean="0"/>
+              <a:t>interface</a:t>
+            </a:r>
+          </a:p>
+          <a:p>
+            <a:r>
+              <a:rPr lang="en-US" dirty="0" smtClean="0"/>
+              <a:t>Bury </a:t>
+            </a:r>
+            <a:r>
+              <a:rPr lang="en-US" dirty="0"/>
+              <a:t>implementation details in derived classes</a:t>
+            </a:r>
+            <a:endParaRPr lang="nl-NL" dirty="0"/>
+          </a:p>
+        </p:txBody>
+      </p:sp>
+      <p:sp>
+        <p:nvSpPr>
+          <p:cNvPr id="4" name="Footer Placeholder 3"/>
+          <p:cNvSpPr>
+            <a:spLocks noGrp="1"/>
+          </p:cNvSpPr>
+          <p:nvPr>
+            <p:ph type="ftr" sz="quarter" idx="11"/>
+          </p:nvPr>
+        </p:nvSpPr>
+        <p:spPr/>
+        <p:txBody>
+          <a:bodyPr/>
+          <a:lstStyle/>
+          <a:p>
+            <a:r>
+              <a:rPr lang="en-US" smtClean="0"/>
+              <a:t>© Sioux 2013 | Confidential | </a:t>
+            </a:r>
+            <a:endParaRPr lang="en-US"/>
+          </a:p>
+        </p:txBody>
+      </p:sp>
+      <p:sp>
+        <p:nvSpPr>
+          <p:cNvPr id="5" name="Slide Number Placeholder 4"/>
+          <p:cNvSpPr>
+            <a:spLocks noGrp="1"/>
+          </p:cNvSpPr>
+          <p:nvPr>
+            <p:ph type="sldNum" sz="quarter" idx="12"/>
+          </p:nvPr>
+        </p:nvSpPr>
+        <p:spPr/>
+        <p:txBody>
+          <a:bodyPr/>
+          <a:lstStyle/>
+          <a:p>
+            <a:fld id="{B60E6772-B9F1-4672-903F-323A7A0E6EBD}" type="slidenum">
+              <a:rPr lang="en-US" smtClean="0"/>
+              <a:pPr/>
+              <a:t>23</a:t>
+            </a:fld>
+            <a:endParaRPr lang="en-US"/>
+          </a:p>
+        </p:txBody>
+      </p:sp>
+    </p:spTree>
+    <p:extLst>
+      <p:ext uri="{BB962C8B-B14F-4D97-AF65-F5344CB8AC3E}">
+        <p14:creationId xmlns:p14="http://schemas.microsoft.com/office/powerpoint/2010/main" val="2066660422"/>
+      </p:ext>
+    </p:extLst>
+  </p:cSld>
+  <p:clrMapOvr>
+    <a:masterClrMapping/>
+  </p:clrMapOvr>
+</p:sld>
+</file>
+
+<file path=ppt/slides/slide24.xml><?xml version="1.0" encoding="utf-8"?>
+<p:sld xmlns:a="http://schemas.openxmlformats.org/drawingml/2006/main" xmlns:r="http://schemas.openxmlformats.org/officeDocument/2006/relationships" xmlns:p="http://schemas.openxmlformats.org/presentationml/2006/main">
+  <p:cSld>
+    <p:spTree>
+      <p:nvGrpSpPr>
+        <p:cNvPr id="1" name=""/>
+        <p:cNvGrpSpPr/>
+        <p:nvPr/>
+      </p:nvGrpSpPr>
+      <p:grpSpPr>
+        <a:xfrm>
+          <a:off x="0" y="0"/>
+          <a:ext cx="0" cy="0"/>
+          <a:chOff x="0" y="0"/>
+          <a:chExt cx="0" cy="0"/>
+        </a:xfrm>
+      </p:grpSpPr>
+      <p:sp>
+        <p:nvSpPr>
+          <p:cNvPr id="2" name="Title 1"/>
+          <p:cNvSpPr>
+            <a:spLocks noGrp="1"/>
+          </p:cNvSpPr>
+          <p:nvPr>
+            <p:ph type="title"/>
+          </p:nvPr>
+        </p:nvSpPr>
+        <p:spPr/>
+        <p:txBody>
+          <a:bodyPr/>
+          <a:lstStyle/>
+          <a:p>
+            <a:r>
+              <a:rPr lang="en-US" dirty="0" smtClean="0"/>
+              <a:t>UML</a:t>
+            </a:r>
+            <a:endParaRPr lang="nl-NL" dirty="0"/>
+          </a:p>
+        </p:txBody>
+      </p:sp>
+      <p:pic>
+        <p:nvPicPr>
+          <p:cNvPr id="6" name="Content Placeholder 5"/>
+          <p:cNvPicPr>
+            <a:picLocks noGrp="1" noChangeAspect="1"/>
+          </p:cNvPicPr>
+          <p:nvPr>
+            <p:ph idx="1"/>
+          </p:nvPr>
+        </p:nvPicPr>
+        <p:blipFill>
+          <a:blip r:embed="rId2">
+            <a:extLst>
+              <a:ext uri="{28A0092B-C50C-407E-A947-70E740481C1C}">
+                <a14:useLocalDpi xmlns:a14="http://schemas.microsoft.com/office/drawing/2010/main" val="0"/>
+              </a:ext>
+            </a:extLst>
+          </a:blip>
+          <a:stretch>
+            <a:fillRect/>
+          </a:stretch>
+        </p:blipFill>
+        <p:spPr>
+          <a:xfrm>
+            <a:off x="892620" y="1600200"/>
+            <a:ext cx="7358759" cy="4525963"/>
+          </a:xfrm>
+        </p:spPr>
+      </p:pic>
+      <p:sp>
+        <p:nvSpPr>
+          <p:cNvPr id="4" name="Footer Placeholder 3"/>
+          <p:cNvSpPr>
+            <a:spLocks noGrp="1"/>
+          </p:cNvSpPr>
+          <p:nvPr>
+            <p:ph type="ftr" sz="quarter" idx="11"/>
+          </p:nvPr>
+        </p:nvSpPr>
+        <p:spPr/>
+        <p:txBody>
+          <a:bodyPr/>
+          <a:lstStyle/>
+          <a:p>
+            <a:r>
+              <a:rPr lang="en-US" smtClean="0"/>
+              <a:t>© Sioux 2013 | Confidential | </a:t>
+            </a:r>
+            <a:endParaRPr lang="en-US"/>
+          </a:p>
+        </p:txBody>
+      </p:sp>
+      <p:sp>
+        <p:nvSpPr>
+          <p:cNvPr id="5" name="Slide Number Placeholder 4"/>
+          <p:cNvSpPr>
+            <a:spLocks noGrp="1"/>
+          </p:cNvSpPr>
+          <p:nvPr>
+            <p:ph type="sldNum" sz="quarter" idx="12"/>
+          </p:nvPr>
+        </p:nvSpPr>
+        <p:spPr/>
+        <p:txBody>
+          <a:bodyPr/>
+          <a:lstStyle/>
+          <a:p>
+            <a:fld id="{B60E6772-B9F1-4672-903F-323A7A0E6EBD}" type="slidenum">
+              <a:rPr lang="en-US" smtClean="0"/>
+              <a:pPr/>
+              <a:t>24</a:t>
+            </a:fld>
+            <a:endParaRPr lang="en-US"/>
+          </a:p>
+        </p:txBody>
+      </p:sp>
+    </p:spTree>
+    <p:extLst>
+      <p:ext uri="{BB962C8B-B14F-4D97-AF65-F5344CB8AC3E}">
+        <p14:creationId xmlns:p14="http://schemas.microsoft.com/office/powerpoint/2010/main" val="1061977333"/>
+      </p:ext>
+    </p:extLst>
+  </p:cSld>
+  <p:clrMapOvr>
+    <a:masterClrMapping/>
+  </p:clrMapOvr>
+</p:sld>
+</file>
+
+<file path=ppt/slides/slide25.xml><?xml version="1.0" encoding="utf-8"?>
+<p:sld xmlns:a="http://schemas.openxmlformats.org/drawingml/2006/main" xmlns:r="http://schemas.openxmlformats.org/officeDocument/2006/relationships" xmlns:p="http://schemas.openxmlformats.org/presentationml/2006/main">
+  <p:cSld>
+    <p:spTree>
+      <p:nvGrpSpPr>
+        <p:cNvPr id="1" name=""/>
+        <p:cNvGrpSpPr/>
+        <p:nvPr/>
+      </p:nvGrpSpPr>
+      <p:grpSpPr>
+        <a:xfrm>
+          <a:off x="0" y="0"/>
+          <a:ext cx="0" cy="0"/>
+          <a:chOff x="0" y="0"/>
+          <a:chExt cx="0" cy="0"/>
+        </a:xfrm>
+      </p:grpSpPr>
+      <p:sp>
+        <p:nvSpPr>
+          <p:cNvPr id="2" name="Title 1"/>
+          <p:cNvSpPr>
+            <a:spLocks noGrp="1"/>
+          </p:cNvSpPr>
+          <p:nvPr>
+            <p:ph type="title"/>
+          </p:nvPr>
+        </p:nvSpPr>
+        <p:spPr/>
+        <p:txBody>
+          <a:bodyPr/>
+          <a:lstStyle/>
+          <a:p>
+            <a:r>
+              <a:rPr lang="en-US" dirty="0" smtClean="0"/>
+              <a:t>Practice</a:t>
+            </a:r>
+            <a:endParaRPr lang="nl-NL" dirty="0"/>
+          </a:p>
+        </p:txBody>
+      </p:sp>
+      <p:sp>
+        <p:nvSpPr>
+          <p:cNvPr id="3" name="Content Placeholder 2"/>
+          <p:cNvSpPr>
+            <a:spLocks noGrp="1"/>
+          </p:cNvSpPr>
+          <p:nvPr>
+            <p:ph idx="1"/>
+          </p:nvPr>
+        </p:nvSpPr>
+        <p:spPr/>
+        <p:txBody>
+          <a:bodyPr>
+            <a:normAutofit/>
+          </a:bodyPr>
+          <a:lstStyle/>
+          <a:p>
+            <a:pPr marL="0" indent="0" algn="ctr">
+              <a:buNone/>
+            </a:pPr>
+            <a:r>
+              <a:rPr lang="en-US" sz="6000" dirty="0" smtClean="0"/>
+              <a:t>Let code</a:t>
+            </a:r>
+            <a:endParaRPr lang="nl-NL" sz="6000" dirty="0"/>
+          </a:p>
+        </p:txBody>
+      </p:sp>
+      <p:sp>
+        <p:nvSpPr>
+          <p:cNvPr id="4" name="Footer Placeholder 3"/>
+          <p:cNvSpPr>
+            <a:spLocks noGrp="1"/>
+          </p:cNvSpPr>
+          <p:nvPr>
+            <p:ph type="ftr" sz="quarter" idx="11"/>
+          </p:nvPr>
+        </p:nvSpPr>
+        <p:spPr/>
+        <p:txBody>
+          <a:bodyPr/>
+          <a:lstStyle/>
+          <a:p>
+            <a:r>
+              <a:rPr lang="en-US" smtClean="0"/>
+              <a:t>© Sioux 2013 | Confidential | </a:t>
+            </a:r>
+            <a:endParaRPr lang="en-US"/>
+          </a:p>
+        </p:txBody>
+      </p:sp>
+      <p:sp>
+        <p:nvSpPr>
+          <p:cNvPr id="5" name="Slide Number Placeholder 4"/>
+          <p:cNvSpPr>
+            <a:spLocks noGrp="1"/>
+          </p:cNvSpPr>
+          <p:nvPr>
+            <p:ph type="sldNum" sz="quarter" idx="12"/>
+          </p:nvPr>
+        </p:nvSpPr>
+        <p:spPr/>
+        <p:txBody>
+          <a:bodyPr/>
+          <a:lstStyle/>
+          <a:p>
+            <a:fld id="{B60E6772-B9F1-4672-903F-323A7A0E6EBD}" type="slidenum">
+              <a:rPr lang="en-US" smtClean="0"/>
+              <a:pPr/>
+              <a:t>25</a:t>
+            </a:fld>
+            <a:endParaRPr lang="en-US"/>
+          </a:p>
+        </p:txBody>
+      </p:sp>
+    </p:spTree>
+    <p:extLst>
+      <p:ext uri="{BB962C8B-B14F-4D97-AF65-F5344CB8AC3E}">
+        <p14:creationId xmlns:p14="http://schemas.microsoft.com/office/powerpoint/2010/main" val="3035198832"/>
+      </p:ext>
+    </p:extLst>
+  </p:cSld>
+  <p:clrMapOvr>
+    <a:masterClrMapping/>
+  </p:clrMapOvr>
+</p:sld>
+</file>
+
+<file path=ppt/slides/slide26.xml><?xml version="1.0" encoding="utf-8"?>
+<p:sld xmlns:a="http://schemas.openxmlformats.org/drawingml/2006/main" xmlns:r="http://schemas.openxmlformats.org/officeDocument/2006/relationships" xmlns:p="http://schemas.openxmlformats.org/presentationml/2006/main">
+  <p:cSld>
+    <p:spTree>
+      <p:nvGrpSpPr>
+        <p:cNvPr id="1" name=""/>
+        <p:cNvGrpSpPr/>
+        <p:nvPr/>
+      </p:nvGrpSpPr>
+      <p:grpSpPr>
+        <a:xfrm>
+          <a:off x="0" y="0"/>
+          <a:ext cx="0" cy="0"/>
+          <a:chOff x="0" y="0"/>
+          <a:chExt cx="0" cy="0"/>
+        </a:xfrm>
+      </p:grpSpPr>
+      <p:sp>
+        <p:nvSpPr>
+          <p:cNvPr id="2" name="Title 1"/>
+          <p:cNvSpPr>
+            <a:spLocks noGrp="1"/>
+          </p:cNvSpPr>
+          <p:nvPr>
+            <p:ph type="title"/>
+          </p:nvPr>
+        </p:nvSpPr>
+        <p:spPr/>
+        <p:txBody>
+          <a:bodyPr/>
+          <a:lstStyle/>
+          <a:p>
+            <a:r>
+              <a:rPr lang="nl-NL" dirty="0" err="1" smtClean="0"/>
+              <a:t>Behavioral</a:t>
+            </a:r>
+            <a:endParaRPr lang="nl-NL" dirty="0"/>
+          </a:p>
+        </p:txBody>
+      </p:sp>
+      <p:sp>
+        <p:nvSpPr>
+          <p:cNvPr id="3" name="Content Placeholder 2"/>
+          <p:cNvSpPr>
+            <a:spLocks noGrp="1"/>
+          </p:cNvSpPr>
+          <p:nvPr>
+            <p:ph idx="1"/>
+          </p:nvPr>
+        </p:nvSpPr>
+        <p:spPr/>
+        <p:txBody>
+          <a:bodyPr/>
+          <a:lstStyle/>
+          <a:p>
+            <a:pPr marL="0" indent="0" algn="ctr">
+              <a:buNone/>
+            </a:pPr>
+            <a:r>
+              <a:rPr lang="nl-NL" sz="6000" dirty="0" err="1"/>
+              <a:t>Iterator</a:t>
+            </a:r>
+            <a:endParaRPr lang="nl-NL" dirty="0"/>
+          </a:p>
+          <a:p>
+            <a:endParaRPr lang="nl-NL" dirty="0"/>
+          </a:p>
+        </p:txBody>
+      </p:sp>
+      <p:sp>
+        <p:nvSpPr>
+          <p:cNvPr id="4" name="Footer Placeholder 3"/>
+          <p:cNvSpPr>
+            <a:spLocks noGrp="1"/>
+          </p:cNvSpPr>
+          <p:nvPr>
+            <p:ph type="ftr" sz="quarter" idx="11"/>
+          </p:nvPr>
+        </p:nvSpPr>
+        <p:spPr/>
+        <p:txBody>
+          <a:bodyPr/>
+          <a:lstStyle/>
+          <a:p>
+            <a:r>
+              <a:rPr lang="en-US" dirty="0" smtClean="0"/>
+              <a:t>© Sioux 2013 | Confidential | </a:t>
+            </a:r>
+            <a:endParaRPr lang="en-US" dirty="0"/>
+          </a:p>
+        </p:txBody>
+      </p:sp>
+      <p:sp>
+        <p:nvSpPr>
+          <p:cNvPr id="5" name="Slide Number Placeholder 4"/>
+          <p:cNvSpPr>
+            <a:spLocks noGrp="1"/>
+          </p:cNvSpPr>
+          <p:nvPr>
+            <p:ph type="sldNum" sz="quarter" idx="12"/>
+          </p:nvPr>
+        </p:nvSpPr>
+        <p:spPr/>
+        <p:txBody>
+          <a:bodyPr/>
+          <a:lstStyle/>
+          <a:p>
+            <a:fld id="{B60E6772-B9F1-4672-903F-323A7A0E6EBD}" type="slidenum">
+              <a:rPr lang="en-US" smtClean="0"/>
+              <a:pPr/>
+              <a:t>26</a:t>
+            </a:fld>
+            <a:endParaRPr lang="en-US"/>
+          </a:p>
+        </p:txBody>
+      </p:sp>
+    </p:spTree>
+    <p:extLst>
+      <p:ext uri="{BB962C8B-B14F-4D97-AF65-F5344CB8AC3E}">
+        <p14:creationId xmlns:p14="http://schemas.microsoft.com/office/powerpoint/2010/main" val="194097392"/>
+      </p:ext>
+    </p:extLst>
+  </p:cSld>
+  <p:clrMapOvr>
+    <a:masterClrMapping/>
+  </p:clrMapOvr>
+</p:sld>
+</file>
+
+<file path=ppt/slides/slide27.xml><?xml version="1.0" encoding="utf-8"?>
+<p:sld xmlns:a="http://schemas.openxmlformats.org/drawingml/2006/main" xmlns:r="http://schemas.openxmlformats.org/officeDocument/2006/relationships" xmlns:p="http://schemas.openxmlformats.org/presentationml/2006/main">
+  <p:cSld>
+    <p:spTree>
+      <p:nvGrpSpPr>
+        <p:cNvPr id="1" name=""/>
+        <p:cNvGrpSpPr/>
+        <p:nvPr/>
+      </p:nvGrpSpPr>
+      <p:grpSpPr>
+        <a:xfrm>
+          <a:off x="0" y="0"/>
+          <a:ext cx="0" cy="0"/>
+          <a:chOff x="0" y="0"/>
+          <a:chExt cx="0" cy="0"/>
+        </a:xfrm>
+      </p:grpSpPr>
+      <p:sp>
+        <p:nvSpPr>
+          <p:cNvPr id="2" name="Title 1"/>
+          <p:cNvSpPr>
+            <a:spLocks noGrp="1"/>
+          </p:cNvSpPr>
+          <p:nvPr>
+            <p:ph type="title"/>
+          </p:nvPr>
+        </p:nvSpPr>
+        <p:spPr/>
+        <p:txBody>
+          <a:bodyPr/>
+          <a:lstStyle/>
+          <a:p>
+            <a:r>
+              <a:rPr lang="en-US" dirty="0" smtClean="0"/>
+              <a:t>When</a:t>
+            </a:r>
+            <a:endParaRPr lang="nl-NL" dirty="0"/>
+          </a:p>
+        </p:txBody>
+      </p:sp>
+      <p:sp>
+        <p:nvSpPr>
+          <p:cNvPr id="3" name="Content Placeholder 2"/>
+          <p:cNvSpPr>
+            <a:spLocks noGrp="1"/>
+          </p:cNvSpPr>
+          <p:nvPr>
+            <p:ph idx="1"/>
+          </p:nvPr>
+        </p:nvSpPr>
+        <p:spPr/>
+        <p:txBody>
+          <a:bodyPr/>
+          <a:lstStyle/>
+          <a:p>
+            <a:r>
+              <a:rPr lang="en-US" dirty="0" smtClean="0"/>
+              <a:t>Need a </a:t>
+            </a:r>
+            <a:r>
+              <a:rPr lang="en-US" dirty="0"/>
+              <a:t>way to access the elements of an aggregate object sequentially</a:t>
+            </a:r>
+            <a:endParaRPr lang="nl-NL" dirty="0"/>
+          </a:p>
+        </p:txBody>
+      </p:sp>
+      <p:sp>
+        <p:nvSpPr>
+          <p:cNvPr id="4" name="Footer Placeholder 3"/>
+          <p:cNvSpPr>
+            <a:spLocks noGrp="1"/>
+          </p:cNvSpPr>
+          <p:nvPr>
+            <p:ph type="ftr" sz="quarter" idx="11"/>
+          </p:nvPr>
+        </p:nvSpPr>
+        <p:spPr/>
+        <p:txBody>
+          <a:bodyPr/>
+          <a:lstStyle/>
+          <a:p>
+            <a:r>
+              <a:rPr lang="en-US" smtClean="0"/>
+              <a:t>© Sioux 2013 | Confidential | </a:t>
+            </a:r>
+            <a:endParaRPr lang="en-US"/>
+          </a:p>
+        </p:txBody>
+      </p:sp>
+      <p:sp>
+        <p:nvSpPr>
+          <p:cNvPr id="5" name="Slide Number Placeholder 4"/>
+          <p:cNvSpPr>
+            <a:spLocks noGrp="1"/>
+          </p:cNvSpPr>
+          <p:nvPr>
+            <p:ph type="sldNum" sz="quarter" idx="12"/>
+          </p:nvPr>
+        </p:nvSpPr>
+        <p:spPr/>
+        <p:txBody>
+          <a:bodyPr/>
+          <a:lstStyle/>
+          <a:p>
+            <a:fld id="{B60E6772-B9F1-4672-903F-323A7A0E6EBD}" type="slidenum">
+              <a:rPr lang="en-US" smtClean="0"/>
+              <a:pPr/>
+              <a:t>27</a:t>
+            </a:fld>
+            <a:endParaRPr lang="en-US"/>
+          </a:p>
+        </p:txBody>
+      </p:sp>
+    </p:spTree>
+    <p:extLst>
+      <p:ext uri="{BB962C8B-B14F-4D97-AF65-F5344CB8AC3E}">
+        <p14:creationId xmlns:p14="http://schemas.microsoft.com/office/powerpoint/2010/main" val="605439271"/>
+      </p:ext>
+    </p:extLst>
+  </p:cSld>
+  <p:clrMapOvr>
+    <a:masterClrMapping/>
+  </p:clrMapOvr>
+</p:sld>
+</file>
+
+<file path=ppt/slides/slide28.xml><?xml version="1.0" encoding="utf-8"?>
+<p:sld xmlns:a="http://schemas.openxmlformats.org/drawingml/2006/main" xmlns:r="http://schemas.openxmlformats.org/officeDocument/2006/relationships" xmlns:p="http://schemas.openxmlformats.org/presentationml/2006/main">
+  <p:cSld>
+    <p:spTree>
+      <p:nvGrpSpPr>
+        <p:cNvPr id="1" name=""/>
+        <p:cNvGrpSpPr/>
+        <p:nvPr/>
+      </p:nvGrpSpPr>
+      <p:grpSpPr>
+        <a:xfrm>
+          <a:off x="0" y="0"/>
+          <a:ext cx="0" cy="0"/>
+          <a:chOff x="0" y="0"/>
+          <a:chExt cx="0" cy="0"/>
+        </a:xfrm>
+      </p:grpSpPr>
+      <p:sp>
+        <p:nvSpPr>
+          <p:cNvPr id="2" name="Title 1"/>
+          <p:cNvSpPr>
+            <a:spLocks noGrp="1"/>
+          </p:cNvSpPr>
+          <p:nvPr>
+            <p:ph type="title"/>
+          </p:nvPr>
+        </p:nvSpPr>
+        <p:spPr/>
+        <p:txBody>
+          <a:bodyPr/>
+          <a:lstStyle/>
+          <a:p>
+            <a:endParaRPr lang="nl-NL"/>
+          </a:p>
+        </p:txBody>
+      </p:sp>
+      <p:sp>
+        <p:nvSpPr>
+          <p:cNvPr id="3" name="Content Placeholder 2"/>
+          <p:cNvSpPr>
+            <a:spLocks noGrp="1"/>
+          </p:cNvSpPr>
+          <p:nvPr>
+            <p:ph idx="1"/>
+          </p:nvPr>
+        </p:nvSpPr>
+        <p:spPr/>
+        <p:txBody>
+          <a:bodyPr/>
+          <a:lstStyle/>
+          <a:p>
+            <a:r>
+              <a:rPr lang="en-US" dirty="0" smtClean="0"/>
+              <a:t>Hide all element inside container</a:t>
+            </a:r>
+          </a:p>
+          <a:p>
+            <a:r>
+              <a:rPr lang="en-US" dirty="0" smtClean="0"/>
+              <a:t>The container provide interface to access element</a:t>
+            </a:r>
+            <a:endParaRPr lang="nl-NL" dirty="0"/>
+          </a:p>
+        </p:txBody>
+      </p:sp>
+      <p:sp>
+        <p:nvSpPr>
+          <p:cNvPr id="4" name="Footer Placeholder 3"/>
+          <p:cNvSpPr>
+            <a:spLocks noGrp="1"/>
+          </p:cNvSpPr>
+          <p:nvPr>
+            <p:ph type="ftr" sz="quarter" idx="11"/>
+          </p:nvPr>
+        </p:nvSpPr>
+        <p:spPr/>
+        <p:txBody>
+          <a:bodyPr/>
+          <a:lstStyle/>
+          <a:p>
+            <a:r>
+              <a:rPr lang="en-US" smtClean="0"/>
+              <a:t>© Sioux 2013 | Confidential | </a:t>
+            </a:r>
+            <a:endParaRPr lang="en-US"/>
+          </a:p>
+        </p:txBody>
+      </p:sp>
+      <p:sp>
+        <p:nvSpPr>
+          <p:cNvPr id="5" name="Slide Number Placeholder 4"/>
+          <p:cNvSpPr>
+            <a:spLocks noGrp="1"/>
+          </p:cNvSpPr>
+          <p:nvPr>
+            <p:ph type="sldNum" sz="quarter" idx="12"/>
+          </p:nvPr>
+        </p:nvSpPr>
+        <p:spPr/>
+        <p:txBody>
+          <a:bodyPr/>
+          <a:lstStyle/>
+          <a:p>
+            <a:fld id="{B60E6772-B9F1-4672-903F-323A7A0E6EBD}" type="slidenum">
+              <a:rPr lang="en-US" smtClean="0"/>
+              <a:pPr/>
+              <a:t>28</a:t>
+            </a:fld>
+            <a:endParaRPr lang="en-US"/>
+          </a:p>
+        </p:txBody>
+      </p:sp>
+    </p:spTree>
+    <p:extLst>
+      <p:ext uri="{BB962C8B-B14F-4D97-AF65-F5344CB8AC3E}">
+        <p14:creationId xmlns:p14="http://schemas.microsoft.com/office/powerpoint/2010/main" val="4268222831"/>
+      </p:ext>
+    </p:extLst>
+  </p:cSld>
+  <p:clrMapOvr>
+    <a:masterClrMapping/>
+  </p:clrMapOvr>
+</p:sld>
+</file>
+
+<file path=ppt/slides/slide29.xml><?xml version="1.0" encoding="utf-8"?>
+<p:sld xmlns:a="http://schemas.openxmlformats.org/drawingml/2006/main" xmlns:r="http://schemas.openxmlformats.org/officeDocument/2006/relationships" xmlns:p="http://schemas.openxmlformats.org/presentationml/2006/main">
+  <p:cSld>
+    <p:spTree>
+      <p:nvGrpSpPr>
+        <p:cNvPr id="1" name=""/>
+        <p:cNvGrpSpPr/>
+        <p:nvPr/>
+      </p:nvGrpSpPr>
+      <p:grpSpPr>
+        <a:xfrm>
+          <a:off x="0" y="0"/>
+          <a:ext cx="0" cy="0"/>
+          <a:chOff x="0" y="0"/>
+          <a:chExt cx="0" cy="0"/>
+        </a:xfrm>
+      </p:grpSpPr>
+      <p:sp>
+        <p:nvSpPr>
+          <p:cNvPr id="2" name="Title 1"/>
+          <p:cNvSpPr>
+            <a:spLocks noGrp="1"/>
+          </p:cNvSpPr>
+          <p:nvPr>
+            <p:ph type="title"/>
+          </p:nvPr>
+        </p:nvSpPr>
+        <p:spPr/>
+        <p:txBody>
+          <a:bodyPr/>
+          <a:lstStyle/>
+          <a:p>
+            <a:r>
+              <a:rPr lang="en-US" dirty="0" smtClean="0"/>
+              <a:t>UML</a:t>
+            </a:r>
+            <a:endParaRPr lang="nl-NL" dirty="0"/>
+          </a:p>
+        </p:txBody>
+      </p:sp>
+      <p:pic>
+        <p:nvPicPr>
+          <p:cNvPr id="6" name="Content Placeholder 5"/>
+          <p:cNvPicPr>
+            <a:picLocks noGrp="1" noChangeAspect="1"/>
+          </p:cNvPicPr>
+          <p:nvPr>
+            <p:ph idx="1"/>
+          </p:nvPr>
+        </p:nvPicPr>
+        <p:blipFill>
+          <a:blip r:embed="rId2">
+            <a:extLst>
+              <a:ext uri="{28A0092B-C50C-407E-A947-70E740481C1C}">
+                <a14:useLocalDpi xmlns:a14="http://schemas.microsoft.com/office/drawing/2010/main" val="0"/>
+              </a:ext>
+            </a:extLst>
+          </a:blip>
+          <a:stretch>
+            <a:fillRect/>
+          </a:stretch>
+        </p:blipFill>
+        <p:spPr>
+          <a:xfrm>
+            <a:off x="800364" y="1600200"/>
+            <a:ext cx="7543271" cy="4525963"/>
+          </a:xfrm>
+        </p:spPr>
+      </p:pic>
+      <p:sp>
+        <p:nvSpPr>
+          <p:cNvPr id="4" name="Footer Placeholder 3"/>
+          <p:cNvSpPr>
+            <a:spLocks noGrp="1"/>
+          </p:cNvSpPr>
+          <p:nvPr>
+            <p:ph type="ftr" sz="quarter" idx="11"/>
+          </p:nvPr>
+        </p:nvSpPr>
+        <p:spPr/>
+        <p:txBody>
+          <a:bodyPr/>
+          <a:lstStyle/>
+          <a:p>
+            <a:r>
+              <a:rPr lang="en-US" smtClean="0"/>
+              <a:t>© Sioux 2013 | Confidential | </a:t>
+            </a:r>
+            <a:endParaRPr lang="en-US"/>
+          </a:p>
+        </p:txBody>
+      </p:sp>
+      <p:sp>
+        <p:nvSpPr>
+          <p:cNvPr id="5" name="Slide Number Placeholder 4"/>
+          <p:cNvSpPr>
+            <a:spLocks noGrp="1"/>
+          </p:cNvSpPr>
+          <p:nvPr>
+            <p:ph type="sldNum" sz="quarter" idx="12"/>
+          </p:nvPr>
+        </p:nvSpPr>
+        <p:spPr/>
+        <p:txBody>
+          <a:bodyPr/>
+          <a:lstStyle/>
+          <a:p>
+            <a:fld id="{B60E6772-B9F1-4672-903F-323A7A0E6EBD}" type="slidenum">
+              <a:rPr lang="en-US" smtClean="0"/>
+              <a:pPr/>
+              <a:t>29</a:t>
+            </a:fld>
+            <a:endParaRPr lang="en-US"/>
+          </a:p>
+        </p:txBody>
+      </p:sp>
+    </p:spTree>
+    <p:extLst>
+      <p:ext uri="{BB962C8B-B14F-4D97-AF65-F5344CB8AC3E}">
+        <p14:creationId xmlns:p14="http://schemas.microsoft.com/office/powerpoint/2010/main" val="4126904560"/>
+      </p:ext>
+    </p:extLst>
+  </p:cSld>
+  <p:clrMapOvr>
+    <a:masterClrMapping/>
+  </p:clrMapOvr>
+</p:sld>
+</file>
+
+<file path=ppt/slides/slide3.xml><?xml version="1.0" encoding="utf-8"?>
+<p:sld xmlns:a="http://schemas.openxmlformats.org/drawingml/2006/main" xmlns:r="http://schemas.openxmlformats.org/officeDocument/2006/relationships" xmlns:p="http://schemas.openxmlformats.org/presentationml/2006/main">
+  <p:cSld>
+    <p:spTree>
+      <p:nvGrpSpPr>
+        <p:cNvPr id="1" name=""/>
+        <p:cNvGrpSpPr/>
+        <p:nvPr/>
+      </p:nvGrpSpPr>
+      <p:grpSpPr>
+        <a:xfrm>
+          <a:off x="0" y="0"/>
+          <a:ext cx="0" cy="0"/>
+          <a:chOff x="0" y="0"/>
+          <a:chExt cx="0" cy="0"/>
+        </a:xfrm>
+      </p:grpSpPr>
+      <p:sp>
+        <p:nvSpPr>
+          <p:cNvPr id="2" name="Title 1"/>
+          <p:cNvSpPr>
+            <a:spLocks noGrp="1"/>
+          </p:cNvSpPr>
+          <p:nvPr>
+            <p:ph type="title"/>
+          </p:nvPr>
+        </p:nvSpPr>
+        <p:spPr/>
+        <p:txBody>
+          <a:bodyPr/>
+          <a:lstStyle/>
+          <a:p>
+            <a:r>
+              <a:rPr lang="en-US" dirty="0" smtClean="0"/>
+              <a:t>OOP concepts</a:t>
+            </a:r>
+            <a:endParaRPr lang="en-US" dirty="0"/>
+          </a:p>
+        </p:txBody>
+      </p:sp>
+      <p:sp>
+        <p:nvSpPr>
+          <p:cNvPr id="4" name="Footer Placeholder 3"/>
+          <p:cNvSpPr>
+            <a:spLocks noGrp="1"/>
+          </p:cNvSpPr>
+          <p:nvPr>
+            <p:ph type="ftr" sz="quarter" idx="11"/>
+          </p:nvPr>
+        </p:nvSpPr>
+        <p:spPr/>
+        <p:txBody>
+          <a:bodyPr/>
+          <a:lstStyle/>
+          <a:p>
+            <a:r>
+              <a:rPr lang="en-US" dirty="0" smtClean="0"/>
+              <a:t>© Sioux 2013 | Confidential | </a:t>
+            </a:r>
+            <a:endParaRPr lang="en-US" dirty="0"/>
+          </a:p>
+        </p:txBody>
+      </p:sp>
+      <p:sp>
+        <p:nvSpPr>
+          <p:cNvPr id="5" name="Slide Number Placeholder 4"/>
+          <p:cNvSpPr>
+            <a:spLocks noGrp="1"/>
+          </p:cNvSpPr>
+          <p:nvPr>
+            <p:ph type="sldNum" sz="quarter" idx="12"/>
+          </p:nvPr>
+        </p:nvSpPr>
+        <p:spPr/>
+        <p:txBody>
+          <a:bodyPr/>
+          <a:lstStyle/>
+          <a:p>
+            <a:fld id="{B60E6772-B9F1-4672-903F-323A7A0E6EBD}" type="slidenum">
+              <a:rPr lang="en-US" smtClean="0"/>
+              <a:pPr/>
+              <a:t>3</a:t>
+            </a:fld>
+            <a:endParaRPr lang="en-US"/>
+          </a:p>
+        </p:txBody>
+      </p:sp>
+      <p:sp>
+        <p:nvSpPr>
+          <p:cNvPr id="3" name="Content Placeholder 2"/>
+          <p:cNvSpPr>
+            <a:spLocks noGrp="1"/>
+          </p:cNvSpPr>
+          <p:nvPr>
+            <p:ph idx="1"/>
+          </p:nvPr>
+        </p:nvSpPr>
+        <p:spPr/>
+        <p:txBody>
+          <a:bodyPr>
+            <a:normAutofit/>
+          </a:bodyPr>
+          <a:lstStyle/>
+          <a:p>
+            <a:pPr marL="0" indent="0">
+              <a:buNone/>
+            </a:pPr>
+            <a:r>
+              <a:rPr lang="en-US" sz="4800" dirty="0" smtClean="0"/>
+              <a:t>OOP concepts: Abstract class, interface, inheritance, polymorphism … use for ??</a:t>
+            </a:r>
+            <a:endParaRPr lang="en-US" sz="4800" dirty="0"/>
+          </a:p>
+        </p:txBody>
+      </p:sp>
+    </p:spTree>
+    <p:extLst>
+      <p:ext uri="{BB962C8B-B14F-4D97-AF65-F5344CB8AC3E}">
+        <p14:creationId xmlns:p14="http://schemas.microsoft.com/office/powerpoint/2010/main" val="2708233480"/>
+      </p:ext>
+    </p:extLst>
+  </p:cSld>
+  <p:clrMapOvr>
+    <a:masterClrMapping/>
+  </p:clrMapOvr>
+</p:sld>
+</file>
+
+<file path=ppt/slides/slide30.xml><?xml version="1.0" encoding="utf-8"?>
 <p:sld xmlns:a="http://schemas.openxmlformats.org/drawingml/2006/main" xmlns:r="http://schemas.openxmlformats.org/officeDocument/2006/relationships" xmlns:p="http://schemas.openxmlformats.org/presentationml/2006/main">
   <p:cSld>
     <p:spTree>
@@ -18859,7 +18048,7 @@
 </p:sld>
 </file>
 
-<file path=ppt/slides/slide23.xml><?xml version="1.0" encoding="utf-8"?>
+<file path=ppt/slides/slide31.xml><?xml version="1.0" encoding="utf-8"?>
 <p:sld xmlns:a="http://schemas.openxmlformats.org/drawingml/2006/main" xmlns:r="http://schemas.openxmlformats.org/officeDocument/2006/relationships" xmlns:p="http://schemas.openxmlformats.org/presentationml/2006/main">
   <p:cSld>
     <p:spTree>
@@ -18894,7 +18083,7 @@
             <a:fld id="{B60E6772-B9F1-4672-903F-323A7A0E6EBD}" type="slidenum">
               <a:rPr lang="en-GB" smtClean="0"/>
               <a:pPr/>
-              <a:t>23</a:t>
+              <a:t>31</a:t>
             </a:fld>
             <a:endParaRPr lang="en-GB"/>
           </a:p>
@@ -19158,134 +18347,6 @@
       </p:par>
     </p:tnLst>
   </p:timing>
-</p:sld>
-</file>
-
-<file path=ppt/slides/slide3.xml><?xml version="1.0" encoding="utf-8"?>
-<p:sld xmlns:a="http://schemas.openxmlformats.org/drawingml/2006/main" xmlns:r="http://schemas.openxmlformats.org/officeDocument/2006/relationships" xmlns:p="http://schemas.openxmlformats.org/presentationml/2006/main">
-  <p:cSld>
-    <p:spTree>
-      <p:nvGrpSpPr>
-        <p:cNvPr id="1" name=""/>
-        <p:cNvGrpSpPr/>
-        <p:nvPr/>
-      </p:nvGrpSpPr>
-      <p:grpSpPr>
-        <a:xfrm>
-          <a:off x="0" y="0"/>
-          <a:ext cx="0" cy="0"/>
-          <a:chOff x="0" y="0"/>
-          <a:chExt cx="0" cy="0"/>
-        </a:xfrm>
-      </p:grpSpPr>
-      <p:sp>
-        <p:nvSpPr>
-          <p:cNvPr id="2" name="Title 1"/>
-          <p:cNvSpPr>
-            <a:spLocks noGrp="1"/>
-          </p:cNvSpPr>
-          <p:nvPr>
-            <p:ph type="title"/>
-          </p:nvPr>
-        </p:nvSpPr>
-        <p:spPr/>
-        <p:txBody>
-          <a:bodyPr/>
-          <a:lstStyle/>
-          <a:p>
-            <a:r>
-              <a:rPr lang="en-US" dirty="0" smtClean="0"/>
-              <a:t>OOP concepts</a:t>
-            </a:r>
-            <a:endParaRPr lang="en-US" dirty="0"/>
-          </a:p>
-        </p:txBody>
-      </p:sp>
-      <p:sp>
-        <p:nvSpPr>
-          <p:cNvPr id="4" name="Footer Placeholder 3"/>
-          <p:cNvSpPr>
-            <a:spLocks noGrp="1"/>
-          </p:cNvSpPr>
-          <p:nvPr>
-            <p:ph type="ftr" sz="quarter" idx="11"/>
-          </p:nvPr>
-        </p:nvSpPr>
-        <p:spPr/>
-        <p:txBody>
-          <a:bodyPr/>
-          <a:lstStyle/>
-          <a:p>
-            <a:r>
-              <a:rPr lang="en-US" dirty="0" smtClean="0"/>
-              <a:t>© Sioux 2013 | Confidential | </a:t>
-            </a:r>
-            <a:endParaRPr lang="en-US" dirty="0"/>
-          </a:p>
-        </p:txBody>
-      </p:sp>
-      <p:sp>
-        <p:nvSpPr>
-          <p:cNvPr id="5" name="Slide Number Placeholder 4"/>
-          <p:cNvSpPr>
-            <a:spLocks noGrp="1"/>
-          </p:cNvSpPr>
-          <p:nvPr>
-            <p:ph type="sldNum" sz="quarter" idx="12"/>
-          </p:nvPr>
-        </p:nvSpPr>
-        <p:spPr/>
-        <p:txBody>
-          <a:bodyPr/>
-          <a:lstStyle/>
-          <a:p>
-            <a:fld id="{B60E6772-B9F1-4672-903F-323A7A0E6EBD}" type="slidenum">
-              <a:rPr lang="en-US" smtClean="0"/>
-              <a:pPr/>
-              <a:t>3</a:t>
-            </a:fld>
-            <a:endParaRPr lang="en-US"/>
-          </a:p>
-        </p:txBody>
-      </p:sp>
-      <p:sp>
-        <p:nvSpPr>
-          <p:cNvPr id="3" name="Content Placeholder 2"/>
-          <p:cNvSpPr>
-            <a:spLocks noGrp="1"/>
-          </p:cNvSpPr>
-          <p:nvPr>
-            <p:ph idx="1"/>
-          </p:nvPr>
-        </p:nvSpPr>
-        <p:spPr/>
-        <p:txBody>
-          <a:bodyPr>
-            <a:normAutofit/>
-          </a:bodyPr>
-          <a:lstStyle/>
-          <a:p>
-            <a:pPr marL="0" indent="0">
-              <a:buNone/>
-            </a:pPr>
-            <a:r>
-              <a:rPr lang="en-US" sz="4800" dirty="0" smtClean="0"/>
-              <a:t>OOP concepts: Abstract class, interface, inheritance, polymorphism … use for ??</a:t>
-            </a:r>
-            <a:endParaRPr lang="en-US" sz="4800" dirty="0"/>
-          </a:p>
-        </p:txBody>
-      </p:sp>
-    </p:spTree>
-    <p:extLst>
-      <p:ext uri="{BB962C8B-B14F-4D97-AF65-F5344CB8AC3E}">
-        <p14:creationId xmlns:p14="http://schemas.microsoft.com/office/powerpoint/2010/main" val="2708233480"/>
-      </p:ext>
-    </p:extLst>
-  </p:cSld>
-  <p:clrMapOvr>
-    <a:masterClrMapping/>
-  </p:clrMapOvr>
 </p:sld>
 </file>
 

</xml_diff>

<commit_message>
Change the order of design pattern
</commit_message>
<xml_diff>
--- a/doc/Lecture 5 - 2015.09.26 Design Pattern.pptx
+++ b/doc/Lecture 5 - 2015.09.26 Design Pattern.pptx
@@ -30,21 +30,21 @@
     <p:sldId id="359" r:id="rId18"/>
     <p:sldId id="360" r:id="rId19"/>
     <p:sldId id="361" r:id="rId20"/>
-    <p:sldId id="329" r:id="rId21"/>
-    <p:sldId id="330" r:id="rId22"/>
-    <p:sldId id="331" r:id="rId23"/>
-    <p:sldId id="333" r:id="rId24"/>
-    <p:sldId id="334" r:id="rId25"/>
-    <p:sldId id="336" r:id="rId26"/>
-    <p:sldId id="337" r:id="rId27"/>
-    <p:sldId id="338" r:id="rId28"/>
-    <p:sldId id="335" r:id="rId29"/>
-    <p:sldId id="339" r:id="rId30"/>
-    <p:sldId id="340" r:id="rId31"/>
-    <p:sldId id="341" r:id="rId32"/>
-    <p:sldId id="342" r:id="rId33"/>
-    <p:sldId id="343" r:id="rId34"/>
-    <p:sldId id="344" r:id="rId35"/>
+    <p:sldId id="367" r:id="rId21"/>
+    <p:sldId id="368" r:id="rId22"/>
+    <p:sldId id="369" r:id="rId23"/>
+    <p:sldId id="370" r:id="rId24"/>
+    <p:sldId id="371" r:id="rId25"/>
+    <p:sldId id="329" r:id="rId26"/>
+    <p:sldId id="330" r:id="rId27"/>
+    <p:sldId id="331" r:id="rId28"/>
+    <p:sldId id="333" r:id="rId29"/>
+    <p:sldId id="334" r:id="rId30"/>
+    <p:sldId id="336" r:id="rId31"/>
+    <p:sldId id="337" r:id="rId32"/>
+    <p:sldId id="338" r:id="rId33"/>
+    <p:sldId id="335" r:id="rId34"/>
+    <p:sldId id="339" r:id="rId35"/>
     <p:sldId id="362" r:id="rId36"/>
     <p:sldId id="363" r:id="rId37"/>
     <p:sldId id="364" r:id="rId38"/>
@@ -13509,7 +13509,7 @@
             <a:fld id="{33F2956A-3F06-4D42-B2C6-B694A4913167}" type="datetimeFigureOut">
               <a:rPr lang="en-US" smtClean="0"/>
               <a:pPr/>
-              <a:t>9/24/2015</a:t>
+              <a:t>9/25/2015</a:t>
             </a:fld>
             <a:endParaRPr lang="en-US"/>
           </a:p>
@@ -13676,7 +13676,7 @@
             <a:fld id="{4EA6A4AE-6FAC-4420-9485-A57254806E09}" type="datetimeFigureOut">
               <a:rPr lang="en-US" smtClean="0"/>
               <a:pPr/>
-              <a:t>9/24/2015</a:t>
+              <a:t>9/25/2015</a:t>
             </a:fld>
             <a:endParaRPr lang="en-US"/>
           </a:p>
@@ -14670,7 +14670,7 @@
           <a:p>
             <a:fld id="{66168998-7791-4C91-862C-7D29C1901C33}" type="datetime1">
               <a:rPr lang="nl-NL" smtClean="0"/>
-              <a:t>24-9-2015</a:t>
+              <a:t>25-9-2015</a:t>
             </a:fld>
             <a:endParaRPr lang="en-US" dirty="0"/>
           </a:p>
@@ -15068,7 +15068,7 @@
           <a:p>
             <a:fld id="{AD1B2783-C803-4D24-A3C3-35E903236CBD}" type="datetime1">
               <a:rPr lang="nl-NL" smtClean="0"/>
-              <a:t>24-9-2015</a:t>
+              <a:t>25-9-2015</a:t>
             </a:fld>
             <a:endParaRPr lang="en-US"/>
           </a:p>
@@ -15238,7 +15238,7 @@
           <a:p>
             <a:fld id="{8F3BE623-9F18-47C0-A364-1F33C583993A}" type="datetime1">
               <a:rPr lang="nl-NL" smtClean="0"/>
-              <a:t>24-9-2015</a:t>
+              <a:t>25-9-2015</a:t>
             </a:fld>
             <a:endParaRPr lang="en-US"/>
           </a:p>
@@ -15418,7 +15418,7 @@
           <a:p>
             <a:fld id="{9FF6B35B-5A68-4B81-8FC3-E8873F8F71F6}" type="datetime1">
               <a:rPr lang="nl-NL" smtClean="0"/>
-              <a:t>24-9-2015</a:t>
+              <a:t>25-9-2015</a:t>
             </a:fld>
             <a:endParaRPr lang="en-US"/>
           </a:p>
@@ -15537,7 +15537,7 @@
           <a:p>
             <a:fld id="{76A68E0B-E9E3-4E92-8245-5AEFB774724C}" type="datetime1">
               <a:rPr lang="nl-NL" smtClean="0"/>
-              <a:t>24-9-2015</a:t>
+              <a:t>25-9-2015</a:t>
             </a:fld>
             <a:endParaRPr lang="en-US" dirty="0"/>
           </a:p>
@@ -15874,7 +15874,7 @@
           <a:p>
             <a:fld id="{A76D15E2-7B87-4FEB-B8F9-159866541DE7}" type="datetime1">
               <a:rPr lang="nl-NL" smtClean="0"/>
-              <a:t>24-9-2015</a:t>
+              <a:t>25-9-2015</a:t>
             </a:fld>
             <a:endParaRPr lang="en-US"/>
           </a:p>
@@ -16120,7 +16120,7 @@
           <a:p>
             <a:fld id="{5112E402-FF9D-4D74-8DF9-F69724540F2B}" type="datetime1">
               <a:rPr lang="nl-NL" smtClean="0"/>
-              <a:t>24-9-2015</a:t>
+              <a:t>25-9-2015</a:t>
             </a:fld>
             <a:endParaRPr lang="en-US"/>
           </a:p>
@@ -16408,7 +16408,7 @@
           <a:p>
             <a:fld id="{F79931C9-5BD1-473B-9ED8-5DDF204CA39C}" type="datetime1">
               <a:rPr lang="nl-NL" smtClean="0"/>
-              <a:t>24-9-2015</a:t>
+              <a:t>25-9-2015</a:t>
             </a:fld>
             <a:endParaRPr lang="en-US"/>
           </a:p>
@@ -16830,7 +16830,7 @@
           <a:p>
             <a:fld id="{C14ECEC6-1D55-479B-BB1F-42C886624E34}" type="datetime1">
               <a:rPr lang="nl-NL" smtClean="0"/>
-              <a:t>24-9-2015</a:t>
+              <a:t>25-9-2015</a:t>
             </a:fld>
             <a:endParaRPr lang="en-US"/>
           </a:p>
@@ -16948,7 +16948,7 @@
           <a:p>
             <a:fld id="{DFFD1F79-5751-4712-B4B6-A9439316434A}" type="datetime1">
               <a:rPr lang="nl-NL" smtClean="0"/>
-              <a:t>24-9-2015</a:t>
+              <a:t>25-9-2015</a:t>
             </a:fld>
             <a:endParaRPr lang="en-US"/>
           </a:p>
@@ -17043,7 +17043,7 @@
           <a:p>
             <a:fld id="{49A4846A-90E5-4604-A832-0C3517803DCD}" type="datetime1">
               <a:rPr lang="nl-NL" smtClean="0"/>
-              <a:t>24-9-2015</a:t>
+              <a:t>25-9-2015</a:t>
             </a:fld>
             <a:endParaRPr lang="en-US"/>
           </a:p>
@@ -17326,7 +17326,7 @@
           <a:p>
             <a:fld id="{E304040F-F100-4556-BFB5-85647BA453C3}" type="datetime1">
               <a:rPr lang="nl-NL" smtClean="0"/>
-              <a:t>24-9-2015</a:t>
+              <a:t>25-9-2015</a:t>
             </a:fld>
             <a:endParaRPr lang="en-US"/>
           </a:p>
@@ -17563,7 +17563,7 @@
           <a:p>
             <a:fld id="{D4A84FF5-25D6-4482-BBD4-D75DDCDF405D}" type="datetime1">
               <a:rPr lang="nl-NL" smtClean="0"/>
-              <a:t>24-9-2015</a:t>
+              <a:t>25-9-2015</a:t>
             </a:fld>
             <a:endParaRPr lang="en-US"/>
           </a:p>
@@ -18123,7 +18123,11 @@
             </a:pPr>
             <a:r>
               <a:rPr lang="en-US" sz="6000" dirty="0" smtClean="0"/>
-              <a:t>Let code</a:t>
+              <a:t>Let's </a:t>
+            </a:r>
+            <a:r>
+              <a:rPr lang="en-US" sz="6000" dirty="0" smtClean="0"/>
+              <a:t>code</a:t>
             </a:r>
             <a:endParaRPr lang="en-US" sz="6000" dirty="0"/>
           </a:p>
@@ -18146,15 +18150,7 @@
           <a:p>
             <a:r>
               <a:rPr lang="en-US" dirty="0" smtClean="0"/>
-              <a:t>© Sioux </a:t>
-            </a:r>
-            <a:r>
-              <a:rPr lang="en-US" dirty="0" smtClean="0"/>
-              <a:t>2015 </a:t>
-            </a:r>
-            <a:r>
-              <a:rPr lang="en-US" dirty="0" smtClean="0"/>
-              <a:t>| Confidential | </a:t>
+              <a:t>© Sioux 2015 | Confidential | </a:t>
             </a:r>
             <a:endParaRPr lang="en-US" dirty="0"/>
           </a:p>
@@ -18261,15 +18257,7 @@
           <a:p>
             <a:r>
               <a:rPr lang="en-US" dirty="0" smtClean="0"/>
-              <a:t>© Sioux </a:t>
-            </a:r>
-            <a:r>
-              <a:rPr lang="en-US" dirty="0" smtClean="0"/>
-              <a:t>2015 </a:t>
-            </a:r>
-            <a:r>
-              <a:rPr lang="en-US" dirty="0" smtClean="0"/>
-              <a:t>| Confidential | </a:t>
+              <a:t>© Sioux 2015 | Confidential | </a:t>
             </a:r>
             <a:endParaRPr lang="en-US" dirty="0"/>
           </a:p>
@@ -18404,15 +18392,7 @@
           <a:p>
             <a:r>
               <a:rPr lang="en-US" dirty="0" smtClean="0"/>
-              <a:t>© Sioux </a:t>
-            </a:r>
-            <a:r>
-              <a:rPr lang="en-US" dirty="0" smtClean="0"/>
-              <a:t>2015 </a:t>
-            </a:r>
-            <a:r>
-              <a:rPr lang="en-US" dirty="0" smtClean="0"/>
-              <a:t>| Commercial| </a:t>
+              <a:t>© Sioux 2015 | Commercial| </a:t>
             </a:r>
             <a:endParaRPr lang="en-US" dirty="0"/>
           </a:p>
@@ -18745,15 +18725,7 @@
           <a:p>
             <a:r>
               <a:rPr lang="en-US" dirty="0" smtClean="0"/>
-              <a:t>© Sioux </a:t>
-            </a:r>
-            <a:r>
-              <a:rPr lang="en-US" dirty="0" smtClean="0"/>
-              <a:t>2015 </a:t>
-            </a:r>
-            <a:r>
-              <a:rPr lang="en-US" dirty="0" smtClean="0"/>
-              <a:t>| Commercial| </a:t>
+              <a:t>© Sioux 2015 | Commercial| </a:t>
             </a:r>
             <a:endParaRPr lang="en-US" dirty="0"/>
           </a:p>
@@ -19102,15 +19074,7 @@
           <a:p>
             <a:r>
               <a:rPr lang="en-US" dirty="0" smtClean="0"/>
-              <a:t>© Sioux </a:t>
-            </a:r>
-            <a:r>
-              <a:rPr lang="en-US" dirty="0" smtClean="0"/>
-              <a:t>2015 </a:t>
-            </a:r>
-            <a:r>
-              <a:rPr lang="en-US" dirty="0" smtClean="0"/>
-              <a:t>| Commercial| </a:t>
+              <a:t>© Sioux 2015 | Commercial| </a:t>
             </a:r>
             <a:endParaRPr lang="en-US" dirty="0"/>
           </a:p>
@@ -20043,15 +20007,7 @@
           <a:p>
             <a:r>
               <a:rPr lang="en-US" dirty="0" smtClean="0"/>
-              <a:t>© Sioux </a:t>
-            </a:r>
-            <a:r>
-              <a:rPr lang="en-US" dirty="0" smtClean="0"/>
-              <a:t>2015 </a:t>
-            </a:r>
-            <a:r>
-              <a:rPr lang="en-US" dirty="0" smtClean="0"/>
-              <a:t>| Commercial| </a:t>
+              <a:t>© Sioux 2015 | Commercial| </a:t>
             </a:r>
             <a:endParaRPr lang="en-US" dirty="0"/>
           </a:p>
@@ -21143,15 +21099,7 @@
           <a:p>
             <a:r>
               <a:rPr lang="en-US" dirty="0" smtClean="0"/>
-              <a:t>© Sioux </a:t>
-            </a:r>
-            <a:r>
-              <a:rPr lang="en-US" dirty="0" smtClean="0"/>
-              <a:t>2015 </a:t>
-            </a:r>
-            <a:r>
-              <a:rPr lang="en-US" dirty="0" smtClean="0"/>
-              <a:t>| Commercial| </a:t>
+              <a:t>© Sioux 2015 | Commercial| </a:t>
             </a:r>
             <a:endParaRPr lang="en-US" dirty="0"/>
           </a:p>
@@ -21489,15 +21437,7 @@
           <a:p>
             <a:r>
               <a:rPr lang="en-US" dirty="0" smtClean="0"/>
-              <a:t>© Sioux </a:t>
-            </a:r>
-            <a:r>
-              <a:rPr lang="en-US" dirty="0" smtClean="0"/>
-              <a:t>2015 </a:t>
-            </a:r>
-            <a:r>
-              <a:rPr lang="en-US" dirty="0" smtClean="0"/>
-              <a:t>| Commercial| </a:t>
+              <a:t>© Sioux 2015 | Commercial| </a:t>
             </a:r>
             <a:endParaRPr lang="en-US" dirty="0"/>
           </a:p>
@@ -21803,15 +21743,7 @@
           <a:p>
             <a:r>
               <a:rPr lang="en-US" dirty="0" smtClean="0"/>
-              <a:t>© Sioux </a:t>
-            </a:r>
-            <a:r>
-              <a:rPr lang="en-US" dirty="0" smtClean="0"/>
-              <a:t>2015 </a:t>
-            </a:r>
-            <a:r>
-              <a:rPr lang="en-US" dirty="0" smtClean="0"/>
-              <a:t>| Commercial| </a:t>
+              <a:t>© Sioux 2015 | Commercial| </a:t>
             </a:r>
             <a:endParaRPr lang="en-US" dirty="0"/>
           </a:p>
@@ -22130,15 +22062,7 @@
           <a:p>
             <a:r>
               <a:rPr lang="en-US" dirty="0" smtClean="0"/>
-              <a:t>© Sioux </a:t>
-            </a:r>
-            <a:r>
-              <a:rPr lang="en-US" dirty="0" smtClean="0"/>
-              <a:t>2015 </a:t>
-            </a:r>
-            <a:r>
-              <a:rPr lang="en-US" dirty="0" smtClean="0"/>
-              <a:t>| Commercial| </a:t>
+              <a:t>© Sioux 2015 | Commercial| </a:t>
             </a:r>
             <a:endParaRPr lang="en-US" dirty="0"/>
           </a:p>
@@ -22872,15 +22796,7 @@
           <a:p>
             <a:r>
               <a:rPr lang="en-US" dirty="0" smtClean="0"/>
-              <a:t>© Sioux </a:t>
-            </a:r>
-            <a:r>
-              <a:rPr lang="en-US" dirty="0" smtClean="0"/>
-              <a:t>2015 </a:t>
-            </a:r>
-            <a:r>
-              <a:rPr lang="en-US" dirty="0" smtClean="0"/>
-              <a:t>| Confidential | </a:t>
+              <a:t>© Sioux 2015 | Confidential | </a:t>
             </a:r>
             <a:endParaRPr lang="en-US" dirty="0"/>
           </a:p>
@@ -23193,8 +23109,8 @@
           <a:lstStyle/>
           <a:p>
             <a:r>
-              <a:rPr lang="en-US" dirty="0"/>
-              <a:t>Facade</a:t>
+              <a:rPr lang="nl-NL" dirty="0" err="1"/>
+              <a:t>Behavioral</a:t>
             </a:r>
             <a:endParaRPr lang="nl-NL" dirty="0"/>
           </a:p>
@@ -23210,7 +23126,12 @@
             <p:ph idx="1"/>
           </p:nvPr>
         </p:nvSpPr>
-        <p:spPr/>
+        <p:spPr>
+          <a:xfrm>
+            <a:off x="437606" y="3048000"/>
+            <a:ext cx="8229600" cy="1447800"/>
+          </a:xfrm>
+        </p:spPr>
         <p:txBody>
           <a:bodyPr/>
           <a:lstStyle/>
@@ -23219,35 +23140,13 @@
               <a:buNone/>
             </a:pPr>
             <a:r>
-              <a:rPr lang="en-US" sz="6000" dirty="0" smtClean="0"/>
-              <a:t>Facade</a:t>
-            </a:r>
-          </a:p>
-          <a:p>
-            <a:pPr marL="0" indent="0" algn="ctr">
-              <a:buNone/>
-            </a:pPr>
-            <a:r>
-              <a:rPr lang="nl-NL" sz="3200" dirty="0" smtClean="0"/>
-              <a:t>(</a:t>
-            </a:r>
-            <a:r>
-              <a:rPr lang="nl-NL" sz="3200" dirty="0" err="1" smtClean="0"/>
-              <a:t>fə</a:t>
-            </a:r>
-            <a:r>
-              <a:rPr lang="nl-NL" sz="3200" dirty="0" err="1"/>
-              <a:t>ˈ</a:t>
-            </a:r>
-            <a:r>
-              <a:rPr lang="nl-NL" sz="3200" dirty="0" err="1" smtClean="0"/>
-              <a:t>sɑːd</a:t>
-            </a:r>
-            <a:r>
-              <a:rPr lang="nl-NL" sz="3200" dirty="0" smtClean="0"/>
-              <a:t>)</a:t>
-            </a:r>
-            <a:endParaRPr lang="nl-NL" sz="3200" dirty="0"/>
+              <a:rPr lang="nl-NL" sz="6000" dirty="0" err="1"/>
+              <a:t>Strategy</a:t>
+            </a:r>
+            <a:endParaRPr lang="nl-NL" sz="6000" dirty="0"/>
+          </a:p>
+          <a:p>
+            <a:endParaRPr lang="nl-NL" dirty="0"/>
           </a:p>
         </p:txBody>
       </p:sp>
@@ -23268,15 +23167,7 @@
           <a:p>
             <a:r>
               <a:rPr lang="en-US" dirty="0" smtClean="0"/>
-              <a:t>© Sioux </a:t>
-            </a:r>
-            <a:r>
-              <a:rPr lang="en-US" dirty="0" smtClean="0"/>
-              <a:t>2015 </a:t>
-            </a:r>
-            <a:r>
-              <a:rPr lang="en-US" dirty="0" smtClean="0"/>
-              <a:t>| Confidential | </a:t>
+              <a:t>© Sioux 2015 | Confidential | </a:t>
             </a:r>
             <a:endParaRPr lang="en-US" dirty="0"/>
           </a:p>
@@ -23309,13 +23200,20 @@
     </p:spTree>
     <p:extLst>
       <p:ext uri="{BB962C8B-B14F-4D97-AF65-F5344CB8AC3E}">
-        <p14:creationId xmlns:p14="http://schemas.microsoft.com/office/powerpoint/2010/main" val="4256152604"/>
+        <p14:creationId xmlns:p14="http://schemas.microsoft.com/office/powerpoint/2010/main" val="3782735708"/>
       </p:ext>
     </p:extLst>
   </p:cSld>
   <p:clrMapOvr>
     <a:masterClrMapping/>
   </p:clrMapOvr>
+  <p:timing>
+    <p:tnLst>
+      <p:par>
+        <p:cTn id="1" dur="indefinite" restart="never" nodeType="tmRoot"/>
+      </p:par>
+    </p:tnLst>
+  </p:timing>
 </p:sld>
 </file>
 
@@ -23376,30 +23274,17 @@
           <a:p>
             <a:r>
               <a:rPr lang="en-US" dirty="0" smtClean="0"/>
-              <a:t>The </a:t>
-            </a:r>
-            <a:r>
-              <a:rPr lang="en-US" dirty="0"/>
-              <a:t>system is very complex or difficult to </a:t>
-            </a:r>
+              <a:t>Have a family of implementation</a:t>
+            </a:r>
+          </a:p>
+          <a:p>
             <a:r>
               <a:rPr lang="en-US" dirty="0" smtClean="0"/>
-              <a:t>understand</a:t>
-            </a:r>
-            <a:endParaRPr lang="nl-NL" dirty="0"/>
-          </a:p>
-          <a:p>
-            <a:r>
-              <a:rPr lang="en-US" dirty="0"/>
-              <a:t>S</a:t>
-            </a:r>
-            <a:r>
-              <a:rPr lang="en-US" dirty="0" smtClean="0"/>
-              <a:t>ystem </a:t>
-            </a:r>
-            <a:r>
-              <a:rPr lang="en-US" dirty="0"/>
-              <a:t>has a large number of interdependent classes</a:t>
+              <a:t>Make them </a:t>
+            </a:r>
+            <a:r>
+              <a:rPr lang="nl-NL" dirty="0" err="1"/>
+              <a:t>interchangeable</a:t>
             </a:r>
             <a:endParaRPr lang="nl-NL" dirty="0"/>
           </a:p>
@@ -23422,15 +23307,7 @@
           <a:p>
             <a:r>
               <a:rPr lang="en-US" dirty="0" smtClean="0"/>
-              <a:t>© Sioux </a:t>
-            </a:r>
-            <a:r>
-              <a:rPr lang="en-US" dirty="0" smtClean="0"/>
-              <a:t>2015 </a:t>
-            </a:r>
-            <a:r>
-              <a:rPr lang="en-US" dirty="0" smtClean="0"/>
-              <a:t>| Confidential | </a:t>
+              <a:t>© Sioux 2015 | Confidential | </a:t>
             </a:r>
             <a:endParaRPr lang="en-US" dirty="0"/>
           </a:p>
@@ -23463,13 +23340,20 @@
     </p:spTree>
     <p:extLst>
       <p:ext uri="{BB962C8B-B14F-4D97-AF65-F5344CB8AC3E}">
-        <p14:creationId xmlns:p14="http://schemas.microsoft.com/office/powerpoint/2010/main" val="2397851473"/>
+        <p14:creationId xmlns:p14="http://schemas.microsoft.com/office/powerpoint/2010/main" val="1018874104"/>
       </p:ext>
     </p:extLst>
   </p:cSld>
   <p:clrMapOvr>
     <a:masterClrMapping/>
   </p:clrMapOvr>
+  <p:timing>
+    <p:tnLst>
+      <p:par>
+        <p:cTn id="1" dur="indefinite" restart="never" nodeType="tmRoot"/>
+      </p:par>
+    </p:tnLst>
+  </p:timing>
 </p:sld>
 </file>
 
@@ -23529,26 +23413,22 @@
           <a:lstStyle/>
           <a:p>
             <a:r>
+              <a:rPr lang="en-US" dirty="0"/>
+              <a:t>Capture the abstraction in an </a:t>
+            </a:r>
+            <a:r>
               <a:rPr lang="en-US" dirty="0" smtClean="0"/>
-              <a:t>Hides </a:t>
+              <a:t>interface</a:t>
+            </a:r>
+          </a:p>
+          <a:p>
+            <a:r>
+              <a:rPr lang="en-US" dirty="0" smtClean="0"/>
+              <a:t>Bury </a:t>
             </a:r>
             <a:r>
               <a:rPr lang="en-US" dirty="0"/>
-              <a:t>the complexities of the </a:t>
-            </a:r>
-            <a:r>
-              <a:rPr lang="en-US" dirty="0" smtClean="0"/>
-              <a:t>system</a:t>
-            </a:r>
-          </a:p>
-          <a:p>
-            <a:r>
-              <a:rPr lang="en-US" dirty="0" smtClean="0"/>
-              <a:t>Provides </a:t>
-            </a:r>
-            <a:r>
-              <a:rPr lang="en-US" dirty="0"/>
-              <a:t>an interface to the client using which the client can access the system</a:t>
+              <a:t>implementation details in derived classes</a:t>
             </a:r>
             <a:endParaRPr lang="nl-NL" dirty="0"/>
           </a:p>
@@ -23571,15 +23451,7 @@
           <a:p>
             <a:r>
               <a:rPr lang="en-US" dirty="0" smtClean="0"/>
-              <a:t>© Sioux </a:t>
-            </a:r>
-            <a:r>
-              <a:rPr lang="en-US" dirty="0" smtClean="0"/>
-              <a:t>2015 </a:t>
-            </a:r>
-            <a:r>
-              <a:rPr lang="en-US" dirty="0" smtClean="0"/>
-              <a:t>| Confidential | </a:t>
+              <a:t>© Sioux 2015 | Confidential | </a:t>
             </a:r>
             <a:endParaRPr lang="en-US" dirty="0"/>
           </a:p>
@@ -23612,13 +23484,20 @@
     </p:spTree>
     <p:extLst>
       <p:ext uri="{BB962C8B-B14F-4D97-AF65-F5344CB8AC3E}">
-        <p14:creationId xmlns:p14="http://schemas.microsoft.com/office/powerpoint/2010/main" val="1989611756"/>
+        <p14:creationId xmlns:p14="http://schemas.microsoft.com/office/powerpoint/2010/main" val="2629939280"/>
       </p:ext>
     </p:extLst>
   </p:cSld>
   <p:clrMapOvr>
     <a:masterClrMapping/>
   </p:clrMapOvr>
+  <p:timing>
+    <p:tnLst>
+      <p:par>
+        <p:cTn id="1" dur="indefinite" restart="never" nodeType="tmRoot"/>
+      </p:par>
+    </p:tnLst>
+  </p:timing>
 </p:sld>
 </file>
 
@@ -23686,8 +23565,8 @@
         </p:blipFill>
         <p:spPr>
           <a:xfrm>
-            <a:off x="1981200" y="2133600"/>
-            <a:ext cx="5029200" cy="3599849"/>
+            <a:off x="892620" y="1600200"/>
+            <a:ext cx="7358759" cy="4525963"/>
           </a:xfrm>
         </p:spPr>
       </p:pic>
@@ -23708,15 +23587,7 @@
           <a:p>
             <a:r>
               <a:rPr lang="en-US" dirty="0" smtClean="0"/>
-              <a:t>© Sioux </a:t>
-            </a:r>
-            <a:r>
-              <a:rPr lang="en-US" dirty="0" smtClean="0"/>
-              <a:t>2015 </a:t>
-            </a:r>
-            <a:r>
-              <a:rPr lang="en-US" dirty="0" smtClean="0"/>
-              <a:t>| Confidential | </a:t>
+              <a:t>© Sioux 2015 | Confidential | </a:t>
             </a:r>
             <a:endParaRPr lang="en-US" dirty="0"/>
           </a:p>
@@ -23749,13 +23620,20 @@
     </p:spTree>
     <p:extLst>
       <p:ext uri="{BB962C8B-B14F-4D97-AF65-F5344CB8AC3E}">
-        <p14:creationId xmlns:p14="http://schemas.microsoft.com/office/powerpoint/2010/main" val="3162188453"/>
+        <p14:creationId xmlns:p14="http://schemas.microsoft.com/office/powerpoint/2010/main" val="3898236678"/>
       </p:ext>
     </p:extLst>
   </p:cSld>
   <p:clrMapOvr>
     <a:masterClrMapping/>
   </p:clrMapOvr>
+  <p:timing>
+    <p:tnLst>
+      <p:par>
+        <p:cTn id="1" dur="indefinite" restart="never" nodeType="tmRoot"/>
+      </p:par>
+    </p:tnLst>
+  </p:timing>
 </p:sld>
 </file>
 
@@ -23792,7 +23670,7 @@
           <a:lstStyle/>
           <a:p>
             <a:r>
-              <a:rPr lang="nl-NL" dirty="0" smtClean="0"/>
+              <a:rPr lang="en-US" dirty="0" smtClean="0"/>
               <a:t>Practice</a:t>
             </a:r>
             <a:endParaRPr lang="nl-NL" dirty="0"/>
@@ -23811,7 +23689,7 @@
         </p:nvSpPr>
         <p:spPr>
           <a:xfrm>
-            <a:off x="457200" y="2667000"/>
+            <a:off x="445389" y="2895600"/>
             <a:ext cx="8229600" cy="4525963"/>
           </a:xfrm>
         </p:spPr>
@@ -23826,7 +23704,11 @@
             </a:pPr>
             <a:r>
               <a:rPr lang="en-US" sz="6000" dirty="0" smtClean="0"/>
-              <a:t>Let code</a:t>
+              <a:t>Let's </a:t>
+            </a:r>
+            <a:r>
+              <a:rPr lang="en-US" sz="6000" dirty="0" smtClean="0"/>
+              <a:t>code</a:t>
             </a:r>
             <a:endParaRPr lang="nl-NL" sz="6000" dirty="0"/>
           </a:p>
@@ -23849,15 +23731,7 @@
           <a:p>
             <a:r>
               <a:rPr lang="en-US" dirty="0" smtClean="0"/>
-              <a:t>© Sioux </a:t>
-            </a:r>
-            <a:r>
-              <a:rPr lang="en-US" dirty="0" smtClean="0"/>
-              <a:t>2015 </a:t>
-            </a:r>
-            <a:r>
-              <a:rPr lang="en-US" dirty="0" smtClean="0"/>
-              <a:t>| Confidential | </a:t>
+              <a:t>© Sioux 2015 | Confidential | </a:t>
             </a:r>
             <a:endParaRPr lang="en-US" dirty="0"/>
           </a:p>
@@ -23890,7 +23764,7 @@
     </p:spTree>
     <p:extLst>
       <p:ext uri="{BB962C8B-B14F-4D97-AF65-F5344CB8AC3E}">
-        <p14:creationId xmlns:p14="http://schemas.microsoft.com/office/powerpoint/2010/main" val="3732815819"/>
+        <p14:creationId xmlns:p14="http://schemas.microsoft.com/office/powerpoint/2010/main" val="3539835804"/>
       </p:ext>
     </p:extLst>
   </p:cSld>
@@ -23940,8 +23814,8 @@
           <a:lstStyle/>
           <a:p>
             <a:r>
-              <a:rPr lang="nl-NL" dirty="0"/>
-              <a:t>Observer</a:t>
+              <a:rPr lang="en-US" dirty="0"/>
+              <a:t>Facade</a:t>
             </a:r>
             <a:endParaRPr lang="nl-NL" dirty="0"/>
           </a:p>
@@ -23957,16 +23831,9 @@
             <p:ph idx="1"/>
           </p:nvPr>
         </p:nvSpPr>
-        <p:spPr>
-          <a:xfrm>
-            <a:off x="457200" y="2895600"/>
-            <a:ext cx="8229600" cy="1600200"/>
-          </a:xfrm>
-        </p:spPr>
+        <p:spPr/>
         <p:txBody>
-          <a:bodyPr>
-            <a:normAutofit/>
-          </a:bodyPr>
+          <a:bodyPr/>
           <a:lstStyle/>
           <a:p>
             <a:pPr marL="0" indent="0" algn="ctr">
@@ -23974,9 +23841,34 @@
             </a:pPr>
             <a:r>
               <a:rPr lang="en-US" sz="6000" dirty="0" smtClean="0"/>
-              <a:t>Observer</a:t>
-            </a:r>
-            <a:endParaRPr lang="nl-NL" sz="6000" dirty="0"/>
+              <a:t>Facade</a:t>
+            </a:r>
+          </a:p>
+          <a:p>
+            <a:pPr marL="0" indent="0" algn="ctr">
+              <a:buNone/>
+            </a:pPr>
+            <a:r>
+              <a:rPr lang="nl-NL" sz="3200" dirty="0" smtClean="0"/>
+              <a:t>(</a:t>
+            </a:r>
+            <a:r>
+              <a:rPr lang="nl-NL" sz="3200" dirty="0" err="1" smtClean="0"/>
+              <a:t>fə</a:t>
+            </a:r>
+            <a:r>
+              <a:rPr lang="nl-NL" sz="3200" dirty="0" err="1"/>
+              <a:t>ˈ</a:t>
+            </a:r>
+            <a:r>
+              <a:rPr lang="nl-NL" sz="3200" dirty="0" err="1" smtClean="0"/>
+              <a:t>sɑːd</a:t>
+            </a:r>
+            <a:r>
+              <a:rPr lang="nl-NL" sz="3200" dirty="0" smtClean="0"/>
+              <a:t>)</a:t>
+            </a:r>
+            <a:endParaRPr lang="nl-NL" sz="3200" dirty="0"/>
           </a:p>
         </p:txBody>
       </p:sp>
@@ -23997,15 +23889,7 @@
           <a:p>
             <a:r>
               <a:rPr lang="en-US" dirty="0" smtClean="0"/>
-              <a:t>© Sioux </a:t>
-            </a:r>
-            <a:r>
-              <a:rPr lang="en-US" dirty="0" smtClean="0"/>
-              <a:t>2015 </a:t>
-            </a:r>
-            <a:r>
-              <a:rPr lang="en-US" dirty="0" smtClean="0"/>
-              <a:t>| Confidential | </a:t>
+              <a:t>© Sioux 2015 | Confidential | </a:t>
             </a:r>
             <a:endParaRPr lang="en-US" dirty="0"/>
           </a:p>
@@ -24038,13 +23922,20 @@
     </p:spTree>
     <p:extLst>
       <p:ext uri="{BB962C8B-B14F-4D97-AF65-F5344CB8AC3E}">
-        <p14:creationId xmlns:p14="http://schemas.microsoft.com/office/powerpoint/2010/main" val="2963351720"/>
+        <p14:creationId xmlns:p14="http://schemas.microsoft.com/office/powerpoint/2010/main" val="4256152604"/>
       </p:ext>
     </p:extLst>
   </p:cSld>
   <p:clrMapOvr>
     <a:masterClrMapping/>
   </p:clrMapOvr>
+  <p:timing>
+    <p:tnLst>
+      <p:par>
+        <p:cTn id="1" dur="indefinite" restart="never" nodeType="tmRoot"/>
+      </p:par>
+    </p:tnLst>
+  </p:timing>
 </p:sld>
 </file>
 
@@ -24105,7 +23996,30 @@
           <a:p>
             <a:r>
               <a:rPr lang="en-US" dirty="0" smtClean="0"/>
-              <a:t>An object want to notify other objects automatically</a:t>
+              <a:t>The </a:t>
+            </a:r>
+            <a:r>
+              <a:rPr lang="en-US" dirty="0"/>
+              <a:t>system is very complex or difficult to </a:t>
+            </a:r>
+            <a:r>
+              <a:rPr lang="en-US" dirty="0" smtClean="0"/>
+              <a:t>understand</a:t>
+            </a:r>
+            <a:endParaRPr lang="nl-NL" dirty="0"/>
+          </a:p>
+          <a:p>
+            <a:r>
+              <a:rPr lang="en-US" dirty="0"/>
+              <a:t>S</a:t>
+            </a:r>
+            <a:r>
+              <a:rPr lang="en-US" dirty="0" smtClean="0"/>
+              <a:t>ystem </a:t>
+            </a:r>
+            <a:r>
+              <a:rPr lang="en-US" dirty="0"/>
+              <a:t>has a large number of interdependent classes</a:t>
             </a:r>
             <a:endParaRPr lang="nl-NL" dirty="0"/>
           </a:p>
@@ -24128,15 +24042,7 @@
           <a:p>
             <a:r>
               <a:rPr lang="en-US" dirty="0" smtClean="0"/>
-              <a:t>© Sioux </a:t>
-            </a:r>
-            <a:r>
-              <a:rPr lang="en-US" dirty="0" smtClean="0"/>
-              <a:t>2015 </a:t>
-            </a:r>
-            <a:r>
-              <a:rPr lang="en-US" dirty="0" smtClean="0"/>
-              <a:t>| Confidential | </a:t>
+              <a:t>© Sioux 2015 | Confidential | </a:t>
             </a:r>
             <a:endParaRPr lang="en-US" dirty="0"/>
           </a:p>
@@ -24169,7 +24075,7 @@
     </p:spTree>
     <p:extLst>
       <p:ext uri="{BB962C8B-B14F-4D97-AF65-F5344CB8AC3E}">
-        <p14:creationId xmlns:p14="http://schemas.microsoft.com/office/powerpoint/2010/main" val="165750580"/>
+        <p14:creationId xmlns:p14="http://schemas.microsoft.com/office/powerpoint/2010/main" val="2397851473"/>
       </p:ext>
     </p:extLst>
   </p:cSld>
@@ -24243,11 +24149,25 @@
           <a:p>
             <a:r>
               <a:rPr lang="en-US" dirty="0" smtClean="0"/>
-              <a:t>Calling </a:t>
+              <a:t>Hides </a:t>
             </a:r>
             <a:r>
               <a:rPr lang="en-US" dirty="0"/>
-              <a:t>one of their methods</a:t>
+              <a:t>the complexities of the </a:t>
+            </a:r>
+            <a:r>
+              <a:rPr lang="en-US" dirty="0" smtClean="0"/>
+              <a:t>system</a:t>
+            </a:r>
+          </a:p>
+          <a:p>
+            <a:r>
+              <a:rPr lang="en-US" dirty="0" smtClean="0"/>
+              <a:t>Provides </a:t>
+            </a:r>
+            <a:r>
+              <a:rPr lang="en-US" dirty="0"/>
+              <a:t>an interface to the client using which the client can access the system</a:t>
             </a:r>
             <a:endParaRPr lang="nl-NL" dirty="0"/>
           </a:p>
@@ -24270,15 +24190,7 @@
           <a:p>
             <a:r>
               <a:rPr lang="en-US" dirty="0" smtClean="0"/>
-              <a:t>© Sioux </a:t>
-            </a:r>
-            <a:r>
-              <a:rPr lang="en-US" dirty="0" smtClean="0"/>
-              <a:t>2015 </a:t>
-            </a:r>
-            <a:r>
-              <a:rPr lang="en-US" dirty="0" smtClean="0"/>
-              <a:t>| Confidential | </a:t>
+              <a:t>© Sioux 2015 | Confidential | </a:t>
             </a:r>
             <a:endParaRPr lang="en-US" dirty="0"/>
           </a:p>
@@ -24311,7 +24223,7 @@
     </p:spTree>
     <p:extLst>
       <p:ext uri="{BB962C8B-B14F-4D97-AF65-F5344CB8AC3E}">
-        <p14:creationId xmlns:p14="http://schemas.microsoft.com/office/powerpoint/2010/main" val="2871310983"/>
+        <p14:creationId xmlns:p14="http://schemas.microsoft.com/office/powerpoint/2010/main" val="1989611756"/>
       </p:ext>
     </p:extLst>
   </p:cSld>
@@ -24392,8 +24304,8 @@
         </p:blipFill>
         <p:spPr>
           <a:xfrm>
-            <a:off x="595846" y="1600200"/>
-            <a:ext cx="7952308" cy="4525963"/>
+            <a:off x="1981200" y="2133600"/>
+            <a:ext cx="5029200" cy="3599849"/>
           </a:xfrm>
         </p:spPr>
       </p:pic>
@@ -24414,15 +24326,7 @@
           <a:p>
             <a:r>
               <a:rPr lang="en-US" dirty="0" smtClean="0"/>
-              <a:t>© Sioux </a:t>
-            </a:r>
-            <a:r>
-              <a:rPr lang="en-US" dirty="0" smtClean="0"/>
-              <a:t>2015 </a:t>
-            </a:r>
-            <a:r>
-              <a:rPr lang="en-US" dirty="0" smtClean="0"/>
-              <a:t>| Confidential | </a:t>
+              <a:t>© Sioux 2015 | Confidential | </a:t>
             </a:r>
             <a:endParaRPr lang="en-US" dirty="0"/>
           </a:p>
@@ -24455,13 +24359,20 @@
     </p:spTree>
     <p:extLst>
       <p:ext uri="{BB962C8B-B14F-4D97-AF65-F5344CB8AC3E}">
-        <p14:creationId xmlns:p14="http://schemas.microsoft.com/office/powerpoint/2010/main" val="2351232949"/>
+        <p14:creationId xmlns:p14="http://schemas.microsoft.com/office/powerpoint/2010/main" val="3162188453"/>
       </p:ext>
     </p:extLst>
   </p:cSld>
   <p:clrMapOvr>
     <a:masterClrMapping/>
   </p:clrMapOvr>
+  <p:timing>
+    <p:tnLst>
+      <p:par>
+        <p:cTn id="1" dur="indefinite" restart="never" nodeType="tmRoot"/>
+      </p:par>
+    </p:tnLst>
+  </p:timing>
 </p:sld>
 </file>
 
@@ -24498,7 +24409,7 @@
           <a:lstStyle/>
           <a:p>
             <a:r>
-              <a:rPr lang="en-US" dirty="0" smtClean="0"/>
+              <a:rPr lang="nl-NL" dirty="0" smtClean="0"/>
               <a:t>Practice</a:t>
             </a:r>
             <a:endParaRPr lang="nl-NL" dirty="0"/>
@@ -24517,7 +24428,7 @@
         </p:nvSpPr>
         <p:spPr>
           <a:xfrm>
-            <a:off x="457200" y="2971800"/>
+            <a:off x="457200" y="2667000"/>
             <a:ext cx="8229600" cy="4525963"/>
           </a:xfrm>
         </p:spPr>
@@ -24532,7 +24443,11 @@
             </a:pPr>
             <a:r>
               <a:rPr lang="en-US" sz="6000" dirty="0" smtClean="0"/>
-              <a:t>Let code</a:t>
+              <a:t>Let's </a:t>
+            </a:r>
+            <a:r>
+              <a:rPr lang="en-US" sz="6000" dirty="0" smtClean="0"/>
+              <a:t>code</a:t>
             </a:r>
             <a:endParaRPr lang="nl-NL" sz="6000" dirty="0"/>
           </a:p>
@@ -24555,15 +24470,7 @@
           <a:p>
             <a:r>
               <a:rPr lang="en-US" dirty="0" smtClean="0"/>
-              <a:t>© Sioux </a:t>
-            </a:r>
-            <a:r>
-              <a:rPr lang="en-US" dirty="0" smtClean="0"/>
-              <a:t>2015 </a:t>
-            </a:r>
-            <a:r>
-              <a:rPr lang="en-US" dirty="0" smtClean="0"/>
-              <a:t>| Confidential | </a:t>
+              <a:t>© Sioux 2015 | Confidential | </a:t>
             </a:r>
             <a:endParaRPr lang="en-US" dirty="0"/>
           </a:p>
@@ -24596,7 +24503,7 @@
     </p:spTree>
     <p:extLst>
       <p:ext uri="{BB962C8B-B14F-4D97-AF65-F5344CB8AC3E}">
-        <p14:creationId xmlns:p14="http://schemas.microsoft.com/office/powerpoint/2010/main" val="451543122"/>
+        <p14:creationId xmlns:p14="http://schemas.microsoft.com/office/powerpoint/2010/main" val="3732815819"/>
       </p:ext>
     </p:extLst>
   </p:cSld>
@@ -24738,15 +24645,7 @@
           <a:p>
             <a:r>
               <a:rPr lang="en-US" dirty="0" smtClean="0"/>
-              <a:t>© Sioux </a:t>
-            </a:r>
-            <a:r>
-              <a:rPr lang="en-US" dirty="0" smtClean="0"/>
-              <a:t>2015 </a:t>
-            </a:r>
-            <a:r>
-              <a:rPr lang="en-US" dirty="0" smtClean="0"/>
-              <a:t>| Confidential | </a:t>
+              <a:t>© Sioux 2015 | Confidential | </a:t>
             </a:r>
             <a:endParaRPr lang="en-US" dirty="0"/>
           </a:p>
@@ -25002,10 +24901,9 @@
           <a:lstStyle/>
           <a:p>
             <a:r>
-              <a:rPr lang="nl-NL" dirty="0" err="1"/>
-              <a:t>Behavioral</a:t>
-            </a:r>
-            <a:endParaRPr lang="nl-NL" dirty="0"/>
+              <a:rPr lang="nl-NL" dirty="0"/>
+              <a:t>Observer</a:t>
+            </a:r>
           </a:p>
         </p:txBody>
       </p:sp>
@@ -25021,25 +24919,24 @@
         </p:nvSpPr>
         <p:spPr>
           <a:xfrm>
-            <a:off x="437606" y="3048000"/>
-            <a:ext cx="8229600" cy="1447800"/>
+            <a:off x="457200" y="2895600"/>
+            <a:ext cx="8229600" cy="1600200"/>
           </a:xfrm>
         </p:spPr>
         <p:txBody>
-          <a:bodyPr/>
+          <a:bodyPr>
+            <a:normAutofit/>
+          </a:bodyPr>
           <a:lstStyle/>
           <a:p>
             <a:pPr marL="0" indent="0" algn="ctr">
               <a:buNone/>
             </a:pPr>
             <a:r>
-              <a:rPr lang="nl-NL" sz="6000" dirty="0" err="1"/>
-              <a:t>Strategy</a:t>
+              <a:rPr lang="en-US" sz="6000" dirty="0" smtClean="0"/>
+              <a:t>Observer</a:t>
             </a:r>
             <a:endParaRPr lang="nl-NL" sz="6000" dirty="0"/>
-          </a:p>
-          <a:p>
-            <a:endParaRPr lang="nl-NL" dirty="0"/>
           </a:p>
         </p:txBody>
       </p:sp>
@@ -25060,15 +24957,7 @@
           <a:p>
             <a:r>
               <a:rPr lang="en-US" dirty="0" smtClean="0"/>
-              <a:t>© Sioux </a:t>
-            </a:r>
-            <a:r>
-              <a:rPr lang="en-US" dirty="0" smtClean="0"/>
-              <a:t>2015 </a:t>
-            </a:r>
-            <a:r>
-              <a:rPr lang="en-US" dirty="0" smtClean="0"/>
-              <a:t>| Confidential | </a:t>
+              <a:t>© Sioux 2015 | Confidential | </a:t>
             </a:r>
             <a:endParaRPr lang="en-US" dirty="0"/>
           </a:p>
@@ -25101,7 +24990,7 @@
     </p:spTree>
     <p:extLst>
       <p:ext uri="{BB962C8B-B14F-4D97-AF65-F5344CB8AC3E}">
-        <p14:creationId xmlns:p14="http://schemas.microsoft.com/office/powerpoint/2010/main" val="488482516"/>
+        <p14:creationId xmlns:p14="http://schemas.microsoft.com/office/powerpoint/2010/main" val="2963351720"/>
       </p:ext>
     </p:extLst>
   </p:cSld>
@@ -25175,17 +25064,7 @@
           <a:p>
             <a:r>
               <a:rPr lang="en-US" dirty="0" smtClean="0"/>
-              <a:t>Have a family of implementation</a:t>
-            </a:r>
-          </a:p>
-          <a:p>
-            <a:r>
-              <a:rPr lang="en-US" dirty="0" smtClean="0"/>
-              <a:t>Make them </a:t>
-            </a:r>
-            <a:r>
-              <a:rPr lang="nl-NL" dirty="0" err="1"/>
-              <a:t>interchangeable</a:t>
+              <a:t>An object want to notify other objects automatically</a:t>
             </a:r>
             <a:endParaRPr lang="nl-NL" dirty="0"/>
           </a:p>
@@ -25208,15 +25087,7 @@
           <a:p>
             <a:r>
               <a:rPr lang="en-US" dirty="0" smtClean="0"/>
-              <a:t>© Sioux </a:t>
-            </a:r>
-            <a:r>
-              <a:rPr lang="en-US" dirty="0" smtClean="0"/>
-              <a:t>2015 </a:t>
-            </a:r>
-            <a:r>
-              <a:rPr lang="en-US" dirty="0" smtClean="0"/>
-              <a:t>| Confidential | </a:t>
+              <a:t>© Sioux 2015 | Confidential | </a:t>
             </a:r>
             <a:endParaRPr lang="en-US" dirty="0"/>
           </a:p>
@@ -25249,7 +25120,7 @@
     </p:spTree>
     <p:extLst>
       <p:ext uri="{BB962C8B-B14F-4D97-AF65-F5344CB8AC3E}">
-        <p14:creationId xmlns:p14="http://schemas.microsoft.com/office/powerpoint/2010/main" val="2439555505"/>
+        <p14:creationId xmlns:p14="http://schemas.microsoft.com/office/powerpoint/2010/main" val="165750580"/>
       </p:ext>
     </p:extLst>
   </p:cSld>
@@ -25322,22 +25193,12 @@
           <a:lstStyle/>
           <a:p>
             <a:r>
+              <a:rPr lang="en-US" dirty="0" smtClean="0"/>
+              <a:t>Calling </a:t>
+            </a:r>
+            <a:r>
               <a:rPr lang="en-US" dirty="0"/>
-              <a:t>Capture the abstraction in an </a:t>
-            </a:r>
-            <a:r>
-              <a:rPr lang="en-US" dirty="0" smtClean="0"/>
-              <a:t>interface</a:t>
-            </a:r>
-          </a:p>
-          <a:p>
-            <a:r>
-              <a:rPr lang="en-US" dirty="0" smtClean="0"/>
-              <a:t>Bury </a:t>
-            </a:r>
-            <a:r>
-              <a:rPr lang="en-US" dirty="0"/>
-              <a:t>implementation details in derived classes</a:t>
+              <a:t>one of their methods</a:t>
             </a:r>
             <a:endParaRPr lang="nl-NL" dirty="0"/>
           </a:p>
@@ -25360,15 +25221,7 @@
           <a:p>
             <a:r>
               <a:rPr lang="en-US" dirty="0" smtClean="0"/>
-              <a:t>© Sioux </a:t>
-            </a:r>
-            <a:r>
-              <a:rPr lang="en-US" dirty="0" smtClean="0"/>
-              <a:t>2015 </a:t>
-            </a:r>
-            <a:r>
-              <a:rPr lang="en-US" dirty="0" smtClean="0"/>
-              <a:t>| Confidential | </a:t>
+              <a:t>© Sioux 2015 | Confidential | </a:t>
             </a:r>
             <a:endParaRPr lang="en-US" dirty="0"/>
           </a:p>
@@ -25401,7 +25254,7 @@
     </p:spTree>
     <p:extLst>
       <p:ext uri="{BB962C8B-B14F-4D97-AF65-F5344CB8AC3E}">
-        <p14:creationId xmlns:p14="http://schemas.microsoft.com/office/powerpoint/2010/main" val="2066660422"/>
+        <p14:creationId xmlns:p14="http://schemas.microsoft.com/office/powerpoint/2010/main" val="2871310983"/>
       </p:ext>
     </p:extLst>
   </p:cSld>
@@ -25482,8 +25335,8 @@
         </p:blipFill>
         <p:spPr>
           <a:xfrm>
-            <a:off x="892620" y="1600200"/>
-            <a:ext cx="7358759" cy="4525963"/>
+            <a:off x="595846" y="1600200"/>
+            <a:ext cx="7952308" cy="4525963"/>
           </a:xfrm>
         </p:spPr>
       </p:pic>
@@ -25504,15 +25357,7 @@
           <a:p>
             <a:r>
               <a:rPr lang="en-US" dirty="0" smtClean="0"/>
-              <a:t>© Sioux </a:t>
-            </a:r>
-            <a:r>
-              <a:rPr lang="en-US" dirty="0" smtClean="0"/>
-              <a:t>2015 </a:t>
-            </a:r>
-            <a:r>
-              <a:rPr lang="en-US" dirty="0" smtClean="0"/>
-              <a:t>| Confidential | </a:t>
+              <a:t>© Sioux 2015 | Confidential | </a:t>
             </a:r>
             <a:endParaRPr lang="en-US" dirty="0"/>
           </a:p>
@@ -25545,7 +25390,7 @@
     </p:spTree>
     <p:extLst>
       <p:ext uri="{BB962C8B-B14F-4D97-AF65-F5344CB8AC3E}">
-        <p14:creationId xmlns:p14="http://schemas.microsoft.com/office/powerpoint/2010/main" val="1061977333"/>
+        <p14:creationId xmlns:p14="http://schemas.microsoft.com/office/powerpoint/2010/main" val="2351232949"/>
       </p:ext>
     </p:extLst>
   </p:cSld>
@@ -25614,7 +25459,7 @@
         </p:nvSpPr>
         <p:spPr>
           <a:xfrm>
-            <a:off x="445389" y="2895600"/>
+            <a:off x="457200" y="2971800"/>
             <a:ext cx="8229600" cy="4525963"/>
           </a:xfrm>
         </p:spPr>
@@ -25629,7 +25474,11 @@
             </a:pPr>
             <a:r>
               <a:rPr lang="en-US" sz="6000" dirty="0" smtClean="0"/>
-              <a:t>Let code</a:t>
+              <a:t>Let's </a:t>
+            </a:r>
+            <a:r>
+              <a:rPr lang="en-US" sz="6000" dirty="0" smtClean="0"/>
+              <a:t>code</a:t>
             </a:r>
             <a:endParaRPr lang="nl-NL" sz="6000" dirty="0"/>
           </a:p>
@@ -25652,15 +25501,7 @@
           <a:p>
             <a:r>
               <a:rPr lang="en-US" dirty="0" smtClean="0"/>
-              <a:t>© Sioux </a:t>
-            </a:r>
-            <a:r>
-              <a:rPr lang="en-US" dirty="0" smtClean="0"/>
-              <a:t>2015 </a:t>
-            </a:r>
-            <a:r>
-              <a:rPr lang="en-US" dirty="0" smtClean="0"/>
-              <a:t>| Confidential | </a:t>
+              <a:t>© Sioux 2015 | Confidential | </a:t>
             </a:r>
             <a:endParaRPr lang="en-US" dirty="0"/>
           </a:p>
@@ -25693,13 +25534,20 @@
     </p:spTree>
     <p:extLst>
       <p:ext uri="{BB962C8B-B14F-4D97-AF65-F5344CB8AC3E}">
-        <p14:creationId xmlns:p14="http://schemas.microsoft.com/office/powerpoint/2010/main" val="3035198832"/>
+        <p14:creationId xmlns:p14="http://schemas.microsoft.com/office/powerpoint/2010/main" val="451543122"/>
       </p:ext>
     </p:extLst>
   </p:cSld>
   <p:clrMapOvr>
     <a:masterClrMapping/>
   </p:clrMapOvr>
+  <p:timing>
+    <p:tnLst>
+      <p:par>
+        <p:cTn id="1" dur="indefinite" restart="never" nodeType="tmRoot"/>
+      </p:par>
+    </p:tnLst>
+  </p:timing>
 </p:sld>
 </file>
 
@@ -25737,15 +25585,7 @@
           <a:p>
             <a:r>
               <a:rPr lang="en-US" dirty="0" smtClean="0"/>
-              <a:t>© Sioux </a:t>
-            </a:r>
-            <a:r>
-              <a:rPr lang="en-US" dirty="0" smtClean="0"/>
-              <a:t>2015 </a:t>
-            </a:r>
-            <a:r>
-              <a:rPr lang="en-US" dirty="0" smtClean="0"/>
-              <a:t>| Commercial| </a:t>
+              <a:t>© Sioux 2015 | Commercial| </a:t>
             </a:r>
             <a:endParaRPr lang="en-US" dirty="0"/>
           </a:p>
@@ -26056,15 +25896,7 @@
           <a:p>
             <a:r>
               <a:rPr lang="en-US" dirty="0" smtClean="0"/>
-              <a:t>© Sioux </a:t>
-            </a:r>
-            <a:r>
-              <a:rPr lang="en-US" dirty="0" smtClean="0"/>
-              <a:t>2015 </a:t>
-            </a:r>
-            <a:r>
-              <a:rPr lang="en-US" dirty="0" smtClean="0"/>
-              <a:t>| Commercial| </a:t>
+              <a:t>© Sioux 2015 | Commercial| </a:t>
             </a:r>
             <a:endParaRPr lang="en-US" dirty="0"/>
           </a:p>
@@ -26386,15 +26218,7 @@
           <a:p>
             <a:r>
               <a:rPr lang="en-US" dirty="0" smtClean="0"/>
-              <a:t>© Sioux </a:t>
-            </a:r>
-            <a:r>
-              <a:rPr lang="en-US" dirty="0" smtClean="0"/>
-              <a:t>2015 </a:t>
-            </a:r>
-            <a:r>
-              <a:rPr lang="en-US" dirty="0" smtClean="0"/>
-              <a:t>| Commercial| </a:t>
+              <a:t>© Sioux 2015 | Commercial| </a:t>
             </a:r>
             <a:endParaRPr lang="en-US" dirty="0"/>
           </a:p>
@@ -26747,7 +26571,11 @@
             </a:pPr>
             <a:r>
               <a:rPr lang="en-US" sz="6000" dirty="0" smtClean="0"/>
-              <a:t>Let code</a:t>
+              <a:t>Let's </a:t>
+            </a:r>
+            <a:r>
+              <a:rPr lang="en-US" sz="6000" dirty="0" smtClean="0"/>
+              <a:t>code</a:t>
             </a:r>
             <a:endParaRPr lang="en-US" sz="6000" dirty="0"/>
           </a:p>
@@ -26911,15 +26739,7 @@
           <a:p>
             <a:r>
               <a:rPr lang="en-US" dirty="0" smtClean="0"/>
-              <a:t>© Sioux </a:t>
-            </a:r>
-            <a:r>
-              <a:rPr lang="en-US" dirty="0" smtClean="0"/>
-              <a:t>2015 </a:t>
-            </a:r>
-            <a:r>
-              <a:rPr lang="en-US" dirty="0" smtClean="0"/>
-              <a:t>| Confidential | </a:t>
+              <a:t>© Sioux 2015 | Confidential | </a:t>
             </a:r>
             <a:endParaRPr lang="en-US" dirty="0"/>
           </a:p>
@@ -27093,15 +26913,7 @@
           <a:p>
             <a:r>
               <a:rPr lang="en-US" dirty="0" smtClean="0"/>
-              <a:t>© Sioux </a:t>
-            </a:r>
-            <a:r>
-              <a:rPr lang="en-US" dirty="0" smtClean="0"/>
-              <a:t>2015 </a:t>
-            </a:r>
-            <a:r>
-              <a:rPr lang="en-US" dirty="0" smtClean="0"/>
-              <a:t>| Confidential | </a:t>
+              <a:t>© Sioux 2015 | Confidential | </a:t>
             </a:r>
             <a:endParaRPr lang="en-US" dirty="0"/>
           </a:p>
@@ -27408,15 +27220,7 @@
           <a:p>
             <a:r>
               <a:rPr lang="en-US" dirty="0" smtClean="0"/>
-              <a:t>© Sioux </a:t>
-            </a:r>
-            <a:r>
-              <a:rPr lang="en-US" dirty="0" smtClean="0"/>
-              <a:t>2015 </a:t>
-            </a:r>
-            <a:r>
-              <a:rPr lang="en-US" dirty="0" smtClean="0"/>
-              <a:t>| Confidential | </a:t>
+              <a:t>© Sioux 2015 | Confidential | </a:t>
             </a:r>
             <a:endParaRPr lang="en-US" dirty="0"/>
           </a:p>
@@ -27552,15 +27356,7 @@
           <a:p>
             <a:r>
               <a:rPr lang="en-US" dirty="0" smtClean="0"/>
-              <a:t>© Sioux </a:t>
-            </a:r>
-            <a:r>
-              <a:rPr lang="en-US" dirty="0" smtClean="0"/>
-              <a:t>2015 </a:t>
-            </a:r>
-            <a:r>
-              <a:rPr lang="en-US" dirty="0" smtClean="0"/>
-              <a:t>| Confidential | </a:t>
+              <a:t>© Sioux 2015 | Confidential | </a:t>
             </a:r>
             <a:endParaRPr lang="en-US" dirty="0"/>
           </a:p>
@@ -27696,15 +27492,7 @@
           <a:p>
             <a:r>
               <a:rPr lang="en-US" dirty="0" smtClean="0"/>
-              <a:t>© Sioux </a:t>
-            </a:r>
-            <a:r>
-              <a:rPr lang="en-US" dirty="0" smtClean="0"/>
-              <a:t>2015 </a:t>
-            </a:r>
-            <a:r>
-              <a:rPr lang="en-US" dirty="0" smtClean="0"/>
-              <a:t>| Confidential | </a:t>
+              <a:t>© Sioux 2015 | Confidential | </a:t>
             </a:r>
             <a:endParaRPr lang="en-US" dirty="0"/>
           </a:p>
@@ -27821,7 +27609,11 @@
             </a:pPr>
             <a:r>
               <a:rPr lang="en-US" sz="6000" dirty="0" smtClean="0"/>
-              <a:t>Let code</a:t>
+              <a:t>Let's </a:t>
+            </a:r>
+            <a:r>
+              <a:rPr lang="en-US" sz="6000" dirty="0" smtClean="0"/>
+              <a:t>code</a:t>
             </a:r>
             <a:endParaRPr lang="en-US" sz="6000" dirty="0"/>
           </a:p>
@@ -28103,15 +27895,7 @@
           <a:p>
             <a:r>
               <a:rPr lang="en-GB" dirty="0" smtClean="0"/>
-              <a:t>© Sioux </a:t>
-            </a:r>
-            <a:r>
-              <a:rPr lang="en-GB" dirty="0" smtClean="0"/>
-              <a:t>2015 </a:t>
-            </a:r>
-            <a:r>
-              <a:rPr lang="en-GB" dirty="0" smtClean="0"/>
-              <a:t>| Confidential | </a:t>
+              <a:t>© Sioux 2015 | Confidential | </a:t>
             </a:r>
             <a:endParaRPr lang="en-GB" dirty="0"/>
           </a:p>
@@ -28457,15 +28241,7 @@
           <a:p>
             <a:r>
               <a:rPr lang="en-US" dirty="0" smtClean="0"/>
-              <a:t>© Sioux </a:t>
-            </a:r>
-            <a:r>
-              <a:rPr lang="en-US" dirty="0" smtClean="0"/>
-              <a:t>2015 </a:t>
-            </a:r>
-            <a:r>
-              <a:rPr lang="en-US" dirty="0" smtClean="0"/>
-              <a:t>| Confidential | </a:t>
+              <a:t>© Sioux 2015 | Confidential | </a:t>
             </a:r>
             <a:endParaRPr lang="en-US" dirty="0"/>
           </a:p>
@@ -28819,15 +28595,7 @@
           <a:p>
             <a:r>
               <a:rPr lang="en-US" dirty="0" smtClean="0"/>
-              <a:t>© Sioux </a:t>
-            </a:r>
-            <a:r>
-              <a:rPr lang="en-US" dirty="0" smtClean="0"/>
-              <a:t>2015 </a:t>
-            </a:r>
-            <a:r>
-              <a:rPr lang="en-US" dirty="0" smtClean="0"/>
-              <a:t>| Confidential | </a:t>
+              <a:t>© Sioux 2015 | Confidential | </a:t>
             </a:r>
             <a:endParaRPr lang="en-US" dirty="0"/>
           </a:p>
@@ -28958,15 +28726,7 @@
           <a:p>
             <a:r>
               <a:rPr lang="en-US" dirty="0" smtClean="0"/>
-              <a:t>© Sioux </a:t>
-            </a:r>
-            <a:r>
-              <a:rPr lang="en-US" dirty="0" smtClean="0"/>
-              <a:t>2015 </a:t>
-            </a:r>
-            <a:r>
-              <a:rPr lang="en-US" dirty="0" smtClean="0"/>
-              <a:t>| Confidential | </a:t>
+              <a:t>© Sioux 2015 | Confidential | </a:t>
             </a:r>
             <a:endParaRPr lang="en-US" dirty="0"/>
           </a:p>
@@ -29072,15 +28832,7 @@
           <a:p>
             <a:r>
               <a:rPr lang="en-US" dirty="0" smtClean="0"/>
-              <a:t>© Sioux </a:t>
-            </a:r>
-            <a:r>
-              <a:rPr lang="en-US" dirty="0" smtClean="0"/>
-              <a:t>2015 </a:t>
-            </a:r>
-            <a:r>
-              <a:rPr lang="en-US" dirty="0" smtClean="0"/>
-              <a:t>| Confidential | </a:t>
+              <a:t>© Sioux 2015 | Confidential | </a:t>
             </a:r>
             <a:endParaRPr lang="en-US" dirty="0"/>
           </a:p>
@@ -29212,15 +28964,7 @@
           <a:p>
             <a:r>
               <a:rPr lang="en-US" dirty="0" smtClean="0"/>
-              <a:t>© Sioux </a:t>
-            </a:r>
-            <a:r>
-              <a:rPr lang="en-US" dirty="0" smtClean="0"/>
-              <a:t>2015 </a:t>
-            </a:r>
-            <a:r>
-              <a:rPr lang="en-US" dirty="0" smtClean="0"/>
-              <a:t>| Confidential | </a:t>
+              <a:t>© Sioux 2015 | Confidential | </a:t>
             </a:r>
             <a:endParaRPr lang="en-US" dirty="0"/>
           </a:p>

</xml_diff>